<commit_message>
created MicroTrendline - fully tested
</commit_message>
<xml_diff>
--- a/architecture.pptx
+++ b/architecture.pptx
@@ -7,14 +7,16 @@
   <p:sldIdLst>
     <p:sldId id="256" r:id="rId2"/>
     <p:sldId id="257" r:id="rId3"/>
-    <p:sldId id="258" r:id="rId4"/>
-    <p:sldId id="259" r:id="rId5"/>
-    <p:sldId id="260" r:id="rId6"/>
-    <p:sldId id="265" r:id="rId7"/>
-    <p:sldId id="261" r:id="rId8"/>
-    <p:sldId id="262" r:id="rId9"/>
-    <p:sldId id="264" r:id="rId10"/>
-    <p:sldId id="263" r:id="rId11"/>
+    <p:sldId id="267" r:id="rId4"/>
+    <p:sldId id="258" r:id="rId5"/>
+    <p:sldId id="259" r:id="rId6"/>
+    <p:sldId id="260" r:id="rId7"/>
+    <p:sldId id="265" r:id="rId8"/>
+    <p:sldId id="261" r:id="rId9"/>
+    <p:sldId id="262" r:id="rId10"/>
+    <p:sldId id="264" r:id="rId11"/>
+    <p:sldId id="263" r:id="rId12"/>
+    <p:sldId id="266" r:id="rId13"/>
   </p:sldIdLst>
   <p:sldSz cx="12192000" cy="6858000"/>
   <p:notesSz cx="6858000" cy="9144000"/>
@@ -270,7 +272,7 @@
           <a:p>
             <a:fld id="{E836676F-0B3F-419A-970B-6F0A8B86F3B3}" type="datetimeFigureOut">
               <a:rPr lang="en-GB" smtClean="0"/>
-              <a:t>25/12/2024</a:t>
+              <a:t>26/12/2024</a:t>
             </a:fld>
             <a:endParaRPr lang="en-GB"/>
           </a:p>
@@ -470,7 +472,7 @@
           <a:p>
             <a:fld id="{E836676F-0B3F-419A-970B-6F0A8B86F3B3}" type="datetimeFigureOut">
               <a:rPr lang="en-GB" smtClean="0"/>
-              <a:t>25/12/2024</a:t>
+              <a:t>26/12/2024</a:t>
             </a:fld>
             <a:endParaRPr lang="en-GB"/>
           </a:p>
@@ -680,7 +682,7 @@
           <a:p>
             <a:fld id="{E836676F-0B3F-419A-970B-6F0A8B86F3B3}" type="datetimeFigureOut">
               <a:rPr lang="en-GB" smtClean="0"/>
-              <a:t>25/12/2024</a:t>
+              <a:t>26/12/2024</a:t>
             </a:fld>
             <a:endParaRPr lang="en-GB"/>
           </a:p>
@@ -880,7 +882,7 @@
           <a:p>
             <a:fld id="{E836676F-0B3F-419A-970B-6F0A8B86F3B3}" type="datetimeFigureOut">
               <a:rPr lang="en-GB" smtClean="0"/>
-              <a:t>25/12/2024</a:t>
+              <a:t>26/12/2024</a:t>
             </a:fld>
             <a:endParaRPr lang="en-GB"/>
           </a:p>
@@ -1156,7 +1158,7 @@
           <a:p>
             <a:fld id="{E836676F-0B3F-419A-970B-6F0A8B86F3B3}" type="datetimeFigureOut">
               <a:rPr lang="en-GB" smtClean="0"/>
-              <a:t>25/12/2024</a:t>
+              <a:t>26/12/2024</a:t>
             </a:fld>
             <a:endParaRPr lang="en-GB"/>
           </a:p>
@@ -1424,7 +1426,7 @@
           <a:p>
             <a:fld id="{E836676F-0B3F-419A-970B-6F0A8B86F3B3}" type="datetimeFigureOut">
               <a:rPr lang="en-GB" smtClean="0"/>
-              <a:t>25/12/2024</a:t>
+              <a:t>26/12/2024</a:t>
             </a:fld>
             <a:endParaRPr lang="en-GB"/>
           </a:p>
@@ -1839,7 +1841,7 @@
           <a:p>
             <a:fld id="{E836676F-0B3F-419A-970B-6F0A8B86F3B3}" type="datetimeFigureOut">
               <a:rPr lang="en-GB" smtClean="0"/>
-              <a:t>25/12/2024</a:t>
+              <a:t>26/12/2024</a:t>
             </a:fld>
             <a:endParaRPr lang="en-GB"/>
           </a:p>
@@ -1981,7 +1983,7 @@
           <a:p>
             <a:fld id="{E836676F-0B3F-419A-970B-6F0A8B86F3B3}" type="datetimeFigureOut">
               <a:rPr lang="en-GB" smtClean="0"/>
-              <a:t>25/12/2024</a:t>
+              <a:t>26/12/2024</a:t>
             </a:fld>
             <a:endParaRPr lang="en-GB"/>
           </a:p>
@@ -2094,7 +2096,7 @@
           <a:p>
             <a:fld id="{E836676F-0B3F-419A-970B-6F0A8B86F3B3}" type="datetimeFigureOut">
               <a:rPr lang="en-GB" smtClean="0"/>
-              <a:t>25/12/2024</a:t>
+              <a:t>26/12/2024</a:t>
             </a:fld>
             <a:endParaRPr lang="en-GB"/>
           </a:p>
@@ -2407,7 +2409,7 @@
           <a:p>
             <a:fld id="{E836676F-0B3F-419A-970B-6F0A8B86F3B3}" type="datetimeFigureOut">
               <a:rPr lang="en-GB" smtClean="0"/>
-              <a:t>25/12/2024</a:t>
+              <a:t>26/12/2024</a:t>
             </a:fld>
             <a:endParaRPr lang="en-GB"/>
           </a:p>
@@ -2696,7 +2698,7 @@
           <a:p>
             <a:fld id="{E836676F-0B3F-419A-970B-6F0A8B86F3B3}" type="datetimeFigureOut">
               <a:rPr lang="en-GB" smtClean="0"/>
-              <a:t>25/12/2024</a:t>
+              <a:t>26/12/2024</a:t>
             </a:fld>
             <a:endParaRPr lang="en-GB"/>
           </a:p>
@@ -2939,7 +2941,7 @@
           <a:p>
             <a:fld id="{E836676F-0B3F-419A-970B-6F0A8B86F3B3}" type="datetimeFigureOut">
               <a:rPr lang="en-GB" smtClean="0"/>
-              <a:t>25/12/2024</a:t>
+              <a:t>26/12/2024</a:t>
             </a:fld>
             <a:endParaRPr lang="en-GB"/>
           </a:p>
@@ -5146,7 +5148,7 @@
           <p:cNvPr id="3" name="Picture 2">
             <a:extLst>
               <a:ext uri="{FF2B5EF4-FFF2-40B4-BE49-F238E27FC236}">
-                <a16:creationId xmlns:a16="http://schemas.microsoft.com/office/drawing/2014/main" id="{364673B3-F0E1-91E9-8766-8D76147CE9AE}"/>
+                <a16:creationId xmlns:a16="http://schemas.microsoft.com/office/drawing/2014/main" id="{EF2A13E4-73F8-406B-90F9-D41AFEB45C03}"/>
               </a:ext>
             </a:extLst>
           </p:cNvPr>
@@ -5163,6 +5165,698 @@
         </p:blipFill>
         <p:spPr>
           <a:xfrm>
+            <a:off x="347162" y="299120"/>
+            <a:ext cx="9836656" cy="3340272"/>
+          </a:xfrm>
+          <a:prstGeom prst="rect">
+            <a:avLst/>
+          </a:prstGeom>
+        </p:spPr>
+      </p:pic>
+      <p:cxnSp>
+        <p:nvCxnSpPr>
+          <p:cNvPr id="6" name="Straight Connector 5">
+            <a:extLst>
+              <a:ext uri="{FF2B5EF4-FFF2-40B4-BE49-F238E27FC236}">
+                <a16:creationId xmlns:a16="http://schemas.microsoft.com/office/drawing/2014/main" id="{0B7EAF12-D267-467B-67BE-24CBC550853F}"/>
+              </a:ext>
+            </a:extLst>
+          </p:cNvPr>
+          <p:cNvCxnSpPr>
+            <a:cxnSpLocks/>
+          </p:cNvCxnSpPr>
+          <p:nvPr/>
+        </p:nvCxnSpPr>
+        <p:spPr>
+          <a:xfrm flipV="1">
+            <a:off x="8441983" y="2864840"/>
+            <a:ext cx="1431859" cy="428048"/>
+          </a:xfrm>
+          <a:prstGeom prst="line">
+            <a:avLst/>
+          </a:prstGeom>
+          <a:ln>
+            <a:solidFill>
+              <a:srgbClr val="FFFF00"/>
+            </a:solidFill>
+          </a:ln>
+        </p:spPr>
+        <p:style>
+          <a:lnRef idx="2">
+            <a:schemeClr val="accent1"/>
+          </a:lnRef>
+          <a:fillRef idx="0">
+            <a:schemeClr val="accent1"/>
+          </a:fillRef>
+          <a:effectRef idx="1">
+            <a:schemeClr val="accent1"/>
+          </a:effectRef>
+          <a:fontRef idx="minor">
+            <a:schemeClr val="tx1"/>
+          </a:fontRef>
+        </p:style>
+      </p:cxnSp>
+      <p:cxnSp>
+        <p:nvCxnSpPr>
+          <p:cNvPr id="9" name="Straight Connector 8">
+            <a:extLst>
+              <a:ext uri="{FF2B5EF4-FFF2-40B4-BE49-F238E27FC236}">
+                <a16:creationId xmlns:a16="http://schemas.microsoft.com/office/drawing/2014/main" id="{00A927E4-B834-603A-3162-773CA602FE93}"/>
+              </a:ext>
+            </a:extLst>
+          </p:cNvPr>
+          <p:cNvCxnSpPr>
+            <a:cxnSpLocks/>
+          </p:cNvCxnSpPr>
+          <p:nvPr/>
+        </p:nvCxnSpPr>
+        <p:spPr>
+          <a:xfrm>
+            <a:off x="9055916" y="1598103"/>
+            <a:ext cx="666924" cy="1019262"/>
+          </a:xfrm>
+          <a:prstGeom prst="line">
+            <a:avLst/>
+          </a:prstGeom>
+          <a:ln w="19050">
+            <a:solidFill>
+              <a:srgbClr val="FF0000"/>
+            </a:solidFill>
+          </a:ln>
+        </p:spPr>
+        <p:style>
+          <a:lnRef idx="2">
+            <a:schemeClr val="accent1"/>
+          </a:lnRef>
+          <a:fillRef idx="0">
+            <a:schemeClr val="accent1"/>
+          </a:fillRef>
+          <a:effectRef idx="1">
+            <a:schemeClr val="accent1"/>
+          </a:effectRef>
+          <a:fontRef idx="minor">
+            <a:schemeClr val="tx1"/>
+          </a:fontRef>
+        </p:style>
+      </p:cxnSp>
+      <p:cxnSp>
+        <p:nvCxnSpPr>
+          <p:cNvPr id="10" name="Straight Connector 9">
+            <a:extLst>
+              <a:ext uri="{FF2B5EF4-FFF2-40B4-BE49-F238E27FC236}">
+                <a16:creationId xmlns:a16="http://schemas.microsoft.com/office/drawing/2014/main" id="{7611024F-7C7C-526C-EFA2-4D5192BE191A}"/>
+              </a:ext>
+            </a:extLst>
+          </p:cNvPr>
+          <p:cNvCxnSpPr>
+            <a:cxnSpLocks/>
+          </p:cNvCxnSpPr>
+          <p:nvPr/>
+        </p:nvCxnSpPr>
+        <p:spPr>
+          <a:xfrm>
+            <a:off x="3705976" y="3969435"/>
+            <a:ext cx="5473338" cy="0"/>
+          </a:xfrm>
+          <a:prstGeom prst="line">
+            <a:avLst/>
+          </a:prstGeom>
+          <a:ln w="9525">
+            <a:solidFill>
+              <a:srgbClr val="FFFF00"/>
+            </a:solidFill>
+            <a:prstDash val="dash"/>
+          </a:ln>
+        </p:spPr>
+        <p:style>
+          <a:lnRef idx="2">
+            <a:schemeClr val="accent1"/>
+          </a:lnRef>
+          <a:fillRef idx="0">
+            <a:schemeClr val="accent1"/>
+          </a:fillRef>
+          <a:effectRef idx="1">
+            <a:schemeClr val="accent1"/>
+          </a:effectRef>
+          <a:fontRef idx="minor">
+            <a:schemeClr val="tx1"/>
+          </a:fontRef>
+        </p:style>
+      </p:cxnSp>
+      <p:cxnSp>
+        <p:nvCxnSpPr>
+          <p:cNvPr id="20" name="Straight Connector 19">
+            <a:extLst>
+              <a:ext uri="{FF2B5EF4-FFF2-40B4-BE49-F238E27FC236}">
+                <a16:creationId xmlns:a16="http://schemas.microsoft.com/office/drawing/2014/main" id="{E4AB0656-BC3A-A5A5-5471-472A2ADCEC91}"/>
+              </a:ext>
+            </a:extLst>
+          </p:cNvPr>
+          <p:cNvCxnSpPr>
+            <a:cxnSpLocks/>
+          </p:cNvCxnSpPr>
+          <p:nvPr/>
+        </p:nvCxnSpPr>
+        <p:spPr>
+          <a:xfrm>
+            <a:off x="3829959" y="3414319"/>
+            <a:ext cx="523927" cy="0"/>
+          </a:xfrm>
+          <a:prstGeom prst="line">
+            <a:avLst/>
+          </a:prstGeom>
+          <a:ln>
+            <a:solidFill>
+              <a:srgbClr val="FFFF00"/>
+            </a:solidFill>
+          </a:ln>
+        </p:spPr>
+        <p:style>
+          <a:lnRef idx="2">
+            <a:schemeClr val="accent1"/>
+          </a:lnRef>
+          <a:fillRef idx="0">
+            <a:schemeClr val="accent1"/>
+          </a:fillRef>
+          <a:effectRef idx="1">
+            <a:schemeClr val="accent1"/>
+          </a:effectRef>
+          <a:fontRef idx="minor">
+            <a:schemeClr val="tx1"/>
+          </a:fontRef>
+        </p:style>
+      </p:cxnSp>
+      <p:cxnSp>
+        <p:nvCxnSpPr>
+          <p:cNvPr id="21" name="Straight Connector 20">
+            <a:extLst>
+              <a:ext uri="{FF2B5EF4-FFF2-40B4-BE49-F238E27FC236}">
+                <a16:creationId xmlns:a16="http://schemas.microsoft.com/office/drawing/2014/main" id="{AB50AC21-E512-E0E9-D6F1-EFD996BA12AE}"/>
+              </a:ext>
+            </a:extLst>
+          </p:cNvPr>
+          <p:cNvCxnSpPr>
+            <a:cxnSpLocks/>
+          </p:cNvCxnSpPr>
+          <p:nvPr/>
+        </p:nvCxnSpPr>
+        <p:spPr>
+          <a:xfrm>
+            <a:off x="6870584" y="560142"/>
+            <a:ext cx="1732326" cy="2518722"/>
+          </a:xfrm>
+          <a:prstGeom prst="line">
+            <a:avLst/>
+          </a:prstGeom>
+          <a:ln w="19050">
+            <a:solidFill>
+              <a:srgbClr val="FF0000"/>
+            </a:solidFill>
+          </a:ln>
+        </p:spPr>
+        <p:style>
+          <a:lnRef idx="2">
+            <a:schemeClr val="accent1"/>
+          </a:lnRef>
+          <a:fillRef idx="0">
+            <a:schemeClr val="accent1"/>
+          </a:fillRef>
+          <a:effectRef idx="1">
+            <a:schemeClr val="accent1"/>
+          </a:effectRef>
+          <a:fontRef idx="minor">
+            <a:schemeClr val="tx1"/>
+          </a:fontRef>
+        </p:style>
+      </p:cxnSp>
+      <p:cxnSp>
+        <p:nvCxnSpPr>
+          <p:cNvPr id="23" name="Straight Connector 22">
+            <a:extLst>
+              <a:ext uri="{FF2B5EF4-FFF2-40B4-BE49-F238E27FC236}">
+                <a16:creationId xmlns:a16="http://schemas.microsoft.com/office/drawing/2014/main" id="{0ACA9FA3-9C61-EF61-BA7A-605CE82EDAF1}"/>
+              </a:ext>
+            </a:extLst>
+          </p:cNvPr>
+          <p:cNvCxnSpPr>
+            <a:cxnSpLocks/>
+          </p:cNvCxnSpPr>
+          <p:nvPr/>
+        </p:nvCxnSpPr>
+        <p:spPr>
+          <a:xfrm>
+            <a:off x="2554416" y="787835"/>
+            <a:ext cx="1799470" cy="2641165"/>
+          </a:xfrm>
+          <a:prstGeom prst="line">
+            <a:avLst/>
+          </a:prstGeom>
+          <a:ln w="19050">
+            <a:solidFill>
+              <a:srgbClr val="FF0000"/>
+            </a:solidFill>
+          </a:ln>
+        </p:spPr>
+        <p:style>
+          <a:lnRef idx="2">
+            <a:schemeClr val="accent1"/>
+          </a:lnRef>
+          <a:fillRef idx="0">
+            <a:schemeClr val="accent1"/>
+          </a:fillRef>
+          <a:effectRef idx="1">
+            <a:schemeClr val="accent1"/>
+          </a:effectRef>
+          <a:fontRef idx="minor">
+            <a:schemeClr val="tx1"/>
+          </a:fontRef>
+        </p:style>
+      </p:cxnSp>
+      <p:cxnSp>
+        <p:nvCxnSpPr>
+          <p:cNvPr id="25" name="Straight Connector 24">
+            <a:extLst>
+              <a:ext uri="{FF2B5EF4-FFF2-40B4-BE49-F238E27FC236}">
+                <a16:creationId xmlns:a16="http://schemas.microsoft.com/office/drawing/2014/main" id="{2B10BE10-256C-2F98-DB6E-D371495A03B0}"/>
+              </a:ext>
+            </a:extLst>
+          </p:cNvPr>
+          <p:cNvCxnSpPr>
+            <a:cxnSpLocks/>
+          </p:cNvCxnSpPr>
+          <p:nvPr/>
+        </p:nvCxnSpPr>
+        <p:spPr>
+          <a:xfrm>
+            <a:off x="708869" y="452276"/>
+            <a:ext cx="1442874" cy="0"/>
+          </a:xfrm>
+          <a:prstGeom prst="line">
+            <a:avLst/>
+          </a:prstGeom>
+          <a:ln w="19050">
+            <a:solidFill>
+              <a:srgbClr val="FF0000"/>
+            </a:solidFill>
+          </a:ln>
+        </p:spPr>
+        <p:style>
+          <a:lnRef idx="2">
+            <a:schemeClr val="accent1"/>
+          </a:lnRef>
+          <a:fillRef idx="0">
+            <a:schemeClr val="accent1"/>
+          </a:fillRef>
+          <a:effectRef idx="1">
+            <a:schemeClr val="accent1"/>
+          </a:effectRef>
+          <a:fontRef idx="minor">
+            <a:schemeClr val="tx1"/>
+          </a:fontRef>
+        </p:style>
+      </p:cxnSp>
+      <p:sp>
+        <p:nvSpPr>
+          <p:cNvPr id="32" name="Rectangle 31">
+            <a:extLst>
+              <a:ext uri="{FF2B5EF4-FFF2-40B4-BE49-F238E27FC236}">
+                <a16:creationId xmlns:a16="http://schemas.microsoft.com/office/drawing/2014/main" id="{349638FB-7D5B-1D91-B612-0970897C5962}"/>
+              </a:ext>
+            </a:extLst>
+          </p:cNvPr>
+          <p:cNvSpPr/>
+          <p:nvPr/>
+        </p:nvSpPr>
+        <p:spPr>
+          <a:xfrm>
+            <a:off x="612723" y="758474"/>
+            <a:ext cx="2877097" cy="1410081"/>
+          </a:xfrm>
+          <a:prstGeom prst="rect">
+            <a:avLst/>
+          </a:prstGeom>
+          <a:solidFill>
+            <a:srgbClr val="FFFF00">
+              <a:alpha val="22000"/>
+            </a:srgbClr>
+          </a:solidFill>
+          <a:ln>
+            <a:noFill/>
+          </a:ln>
+        </p:spPr>
+        <p:style>
+          <a:lnRef idx="2">
+            <a:schemeClr val="accent1">
+              <a:shade val="15000"/>
+            </a:schemeClr>
+          </a:lnRef>
+          <a:fillRef idx="1">
+            <a:schemeClr val="accent1"/>
+          </a:fillRef>
+          <a:effectRef idx="0">
+            <a:schemeClr val="accent1"/>
+          </a:effectRef>
+          <a:fontRef idx="minor">
+            <a:schemeClr val="lt1"/>
+          </a:fontRef>
+        </p:style>
+        <p:txBody>
+          <a:bodyPr rtlCol="0" anchor="ctr"/>
+          <a:lstStyle/>
+          <a:p>
+            <a:pPr algn="ctr"/>
+            <a:endParaRPr lang="en-GB"/>
+          </a:p>
+        </p:txBody>
+      </p:sp>
+      <p:cxnSp>
+        <p:nvCxnSpPr>
+          <p:cNvPr id="35" name="Straight Connector 34">
+            <a:extLst>
+              <a:ext uri="{FF2B5EF4-FFF2-40B4-BE49-F238E27FC236}">
+                <a16:creationId xmlns:a16="http://schemas.microsoft.com/office/drawing/2014/main" id="{3EE10494-C1B7-5FA9-6532-53083499B2F4}"/>
+              </a:ext>
+            </a:extLst>
+          </p:cNvPr>
+          <p:cNvCxnSpPr>
+            <a:cxnSpLocks/>
+          </p:cNvCxnSpPr>
+          <p:nvPr/>
+        </p:nvCxnSpPr>
+        <p:spPr>
+          <a:xfrm flipV="1">
+            <a:off x="4165518" y="1191237"/>
+            <a:ext cx="3082570" cy="2290194"/>
+          </a:xfrm>
+          <a:prstGeom prst="line">
+            <a:avLst/>
+          </a:prstGeom>
+          <a:ln>
+            <a:solidFill>
+              <a:srgbClr val="FFFF00"/>
+            </a:solidFill>
+          </a:ln>
+        </p:spPr>
+        <p:style>
+          <a:lnRef idx="2">
+            <a:schemeClr val="accent1"/>
+          </a:lnRef>
+          <a:fillRef idx="0">
+            <a:schemeClr val="accent1"/>
+          </a:fillRef>
+          <a:effectRef idx="1">
+            <a:schemeClr val="accent1"/>
+          </a:effectRef>
+          <a:fontRef idx="minor">
+            <a:schemeClr val="tx1"/>
+          </a:fontRef>
+        </p:style>
+      </p:cxnSp>
+      <p:pic>
+        <p:nvPicPr>
+          <p:cNvPr id="41" name="Picture 40">
+            <a:extLst>
+              <a:ext uri="{FF2B5EF4-FFF2-40B4-BE49-F238E27FC236}">
+                <a16:creationId xmlns:a16="http://schemas.microsoft.com/office/drawing/2014/main" id="{4A8FA56F-1EC5-5097-3BF7-7A7053368C20}"/>
+              </a:ext>
+            </a:extLst>
+          </p:cNvPr>
+          <p:cNvPicPr>
+            <a:picLocks noChangeAspect="1"/>
+          </p:cNvPicPr>
+          <p:nvPr/>
+        </p:nvPicPr>
+        <p:blipFill>
+          <a:blip r:embed="rId3"/>
+          <a:stretch>
+            <a:fillRect/>
+          </a:stretch>
+        </p:blipFill>
+        <p:spPr>
+          <a:xfrm>
+            <a:off x="470478" y="3678572"/>
+            <a:ext cx="8077904" cy="2918254"/>
+          </a:xfrm>
+          <a:prstGeom prst="rect">
+            <a:avLst/>
+          </a:prstGeom>
+        </p:spPr>
+      </p:pic>
+      <p:cxnSp>
+        <p:nvCxnSpPr>
+          <p:cNvPr id="42" name="Straight Connector 41">
+            <a:extLst>
+              <a:ext uri="{FF2B5EF4-FFF2-40B4-BE49-F238E27FC236}">
+                <a16:creationId xmlns:a16="http://schemas.microsoft.com/office/drawing/2014/main" id="{0AF3FEB3-0582-5B69-BC35-6634829C5927}"/>
+              </a:ext>
+            </a:extLst>
+          </p:cNvPr>
+          <p:cNvCxnSpPr>
+            <a:cxnSpLocks/>
+          </p:cNvCxnSpPr>
+          <p:nvPr/>
+        </p:nvCxnSpPr>
+        <p:spPr>
+          <a:xfrm>
+            <a:off x="6350466" y="5652082"/>
+            <a:ext cx="981512" cy="757107"/>
+          </a:xfrm>
+          <a:prstGeom prst="line">
+            <a:avLst/>
+          </a:prstGeom>
+          <a:ln w="19050">
+            <a:solidFill>
+              <a:srgbClr val="FF0000"/>
+            </a:solidFill>
+          </a:ln>
+        </p:spPr>
+        <p:style>
+          <a:lnRef idx="2">
+            <a:schemeClr val="accent1"/>
+          </a:lnRef>
+          <a:fillRef idx="0">
+            <a:schemeClr val="accent1"/>
+          </a:fillRef>
+          <a:effectRef idx="1">
+            <a:schemeClr val="accent1"/>
+          </a:effectRef>
+          <a:fontRef idx="minor">
+            <a:schemeClr val="tx1"/>
+          </a:fontRef>
+        </p:style>
+      </p:cxnSp>
+      <p:cxnSp>
+        <p:nvCxnSpPr>
+          <p:cNvPr id="46" name="Straight Connector 45">
+            <a:extLst>
+              <a:ext uri="{FF2B5EF4-FFF2-40B4-BE49-F238E27FC236}">
+                <a16:creationId xmlns:a16="http://schemas.microsoft.com/office/drawing/2014/main" id="{9EF310CC-1EDC-6648-24EC-61E346ECCFF6}"/>
+              </a:ext>
+            </a:extLst>
+          </p:cNvPr>
+          <p:cNvCxnSpPr>
+            <a:cxnSpLocks/>
+          </p:cNvCxnSpPr>
+          <p:nvPr/>
+        </p:nvCxnSpPr>
+        <p:spPr>
+          <a:xfrm>
+            <a:off x="1870745" y="4383248"/>
+            <a:ext cx="5905849" cy="1568741"/>
+          </a:xfrm>
+          <a:prstGeom prst="line">
+            <a:avLst/>
+          </a:prstGeom>
+          <a:ln w="19050">
+            <a:solidFill>
+              <a:srgbClr val="FF0000"/>
+            </a:solidFill>
+          </a:ln>
+        </p:spPr>
+        <p:style>
+          <a:lnRef idx="2">
+            <a:schemeClr val="accent1"/>
+          </a:lnRef>
+          <a:fillRef idx="0">
+            <a:schemeClr val="accent1"/>
+          </a:fillRef>
+          <a:effectRef idx="1">
+            <a:schemeClr val="accent1"/>
+          </a:effectRef>
+          <a:fontRef idx="minor">
+            <a:schemeClr val="tx1"/>
+          </a:fontRef>
+        </p:style>
+      </p:cxnSp>
+      <p:cxnSp>
+        <p:nvCxnSpPr>
+          <p:cNvPr id="55" name="Straight Connector 54">
+            <a:extLst>
+              <a:ext uri="{FF2B5EF4-FFF2-40B4-BE49-F238E27FC236}">
+                <a16:creationId xmlns:a16="http://schemas.microsoft.com/office/drawing/2014/main" id="{8152550E-EA43-9D6B-CFE8-7D277511306D}"/>
+              </a:ext>
+            </a:extLst>
+          </p:cNvPr>
+          <p:cNvCxnSpPr>
+            <a:cxnSpLocks/>
+          </p:cNvCxnSpPr>
+          <p:nvPr/>
+        </p:nvCxnSpPr>
+        <p:spPr>
+          <a:xfrm>
+            <a:off x="6808051" y="6459523"/>
+            <a:ext cx="523927" cy="0"/>
+          </a:xfrm>
+          <a:prstGeom prst="line">
+            <a:avLst/>
+          </a:prstGeom>
+          <a:ln>
+            <a:solidFill>
+              <a:srgbClr val="FFFF00"/>
+            </a:solidFill>
+          </a:ln>
+        </p:spPr>
+        <p:style>
+          <a:lnRef idx="2">
+            <a:schemeClr val="accent1"/>
+          </a:lnRef>
+          <a:fillRef idx="0">
+            <a:schemeClr val="accent1"/>
+          </a:fillRef>
+          <a:effectRef idx="1">
+            <a:schemeClr val="accent1"/>
+          </a:effectRef>
+          <a:fontRef idx="minor">
+            <a:schemeClr val="tx1"/>
+          </a:fontRef>
+        </p:style>
+      </p:cxnSp>
+      <p:cxnSp>
+        <p:nvCxnSpPr>
+          <p:cNvPr id="56" name="Straight Connector 55">
+            <a:extLst>
+              <a:ext uri="{FF2B5EF4-FFF2-40B4-BE49-F238E27FC236}">
+                <a16:creationId xmlns:a16="http://schemas.microsoft.com/office/drawing/2014/main" id="{BA2E2107-256F-3FAA-1084-55BA0D10E46B}"/>
+              </a:ext>
+            </a:extLst>
+          </p:cNvPr>
+          <p:cNvCxnSpPr>
+            <a:cxnSpLocks/>
+          </p:cNvCxnSpPr>
+          <p:nvPr/>
+        </p:nvCxnSpPr>
+        <p:spPr>
+          <a:xfrm flipV="1">
+            <a:off x="7327784" y="4995644"/>
+            <a:ext cx="1114199" cy="1463879"/>
+          </a:xfrm>
+          <a:prstGeom prst="line">
+            <a:avLst/>
+          </a:prstGeom>
+          <a:ln w="6350">
+            <a:solidFill>
+              <a:srgbClr val="FFFF00"/>
+            </a:solidFill>
+            <a:prstDash val="dash"/>
+          </a:ln>
+        </p:spPr>
+        <p:style>
+          <a:lnRef idx="2">
+            <a:schemeClr val="accent1"/>
+          </a:lnRef>
+          <a:fillRef idx="0">
+            <a:schemeClr val="accent1"/>
+          </a:fillRef>
+          <a:effectRef idx="1">
+            <a:schemeClr val="accent1"/>
+          </a:effectRef>
+          <a:fontRef idx="minor">
+            <a:schemeClr val="tx1"/>
+          </a:fontRef>
+        </p:style>
+      </p:cxnSp>
+    </p:spTree>
+    <p:extLst>
+      <p:ext uri="{BB962C8B-B14F-4D97-AF65-F5344CB8AC3E}">
+        <p14:creationId xmlns:p14="http://schemas.microsoft.com/office/powerpoint/2010/main" val="138630216"/>
+      </p:ext>
+    </p:extLst>
+  </p:cSld>
+  <p:clrMapOvr>
+    <a:masterClrMapping/>
+  </p:clrMapOvr>
+</p:sld>
+</file>
+
+<file path=ppt/slides/slide11.xml><?xml version="1.0" encoding="utf-8"?>
+<p:sld xmlns:a="http://schemas.openxmlformats.org/drawingml/2006/main" xmlns:r="http://schemas.openxmlformats.org/officeDocument/2006/relationships" xmlns:p="http://schemas.openxmlformats.org/presentationml/2006/main">
+  <p:cSld>
+    <p:spTree>
+      <p:nvGrpSpPr>
+        <p:cNvPr id="1" name=""/>
+        <p:cNvGrpSpPr/>
+        <p:nvPr/>
+      </p:nvGrpSpPr>
+      <p:grpSpPr>
+        <a:xfrm>
+          <a:off x="0" y="0"/>
+          <a:ext cx="0" cy="0"/>
+          <a:chOff x="0" y="0"/>
+          <a:chExt cx="0" cy="0"/>
+        </a:xfrm>
+      </p:grpSpPr>
+      <p:pic>
+        <p:nvPicPr>
+          <p:cNvPr id="15" name="Picture 14">
+            <a:extLst>
+              <a:ext uri="{FF2B5EF4-FFF2-40B4-BE49-F238E27FC236}">
+                <a16:creationId xmlns:a16="http://schemas.microsoft.com/office/drawing/2014/main" id="{DFC00C86-E5CC-781C-5A4D-2361A7CF00C8}"/>
+              </a:ext>
+            </a:extLst>
+          </p:cNvPr>
+          <p:cNvPicPr>
+            <a:picLocks noChangeAspect="1"/>
+          </p:cNvPicPr>
+          <p:nvPr/>
+        </p:nvPicPr>
+        <p:blipFill>
+          <a:blip r:embed="rId2"/>
+          <a:stretch>
+            <a:fillRect/>
+          </a:stretch>
+        </p:blipFill>
+        <p:spPr>
+          <a:xfrm>
+            <a:off x="412412" y="3321490"/>
+            <a:ext cx="9608044" cy="3302170"/>
+          </a:xfrm>
+          <a:prstGeom prst="rect">
+            <a:avLst/>
+          </a:prstGeom>
+        </p:spPr>
+      </p:pic>
+      <p:pic>
+        <p:nvPicPr>
+          <p:cNvPr id="3" name="Picture 2">
+            <a:extLst>
+              <a:ext uri="{FF2B5EF4-FFF2-40B4-BE49-F238E27FC236}">
+                <a16:creationId xmlns:a16="http://schemas.microsoft.com/office/drawing/2014/main" id="{364673B3-F0E1-91E9-8766-8D76147CE9AE}"/>
+              </a:ext>
+            </a:extLst>
+          </p:cNvPr>
+          <p:cNvPicPr>
+            <a:picLocks noChangeAspect="1"/>
+          </p:cNvPicPr>
+          <p:nvPr/>
+        </p:nvPicPr>
+        <p:blipFill>
+          <a:blip r:embed="rId3"/>
+          <a:stretch>
+            <a:fillRect/>
+          </a:stretch>
+        </p:blipFill>
+        <p:spPr>
+          <a:xfrm>
             <a:off x="199290" y="181743"/>
             <a:ext cx="8469162" cy="3066685"/>
           </a:xfrm>
@@ -5185,7 +5879,7 @@
         </p:nvSpPr>
         <p:spPr>
           <a:xfrm>
-            <a:off x="5216434" y="1445624"/>
+            <a:off x="9650016" y="1349150"/>
             <a:ext cx="1010195" cy="552994"/>
           </a:xfrm>
           <a:prstGeom prst="rect">
@@ -5225,12 +5919,201 @@
           </a:p>
         </p:txBody>
       </p:sp>
+      <p:cxnSp>
+        <p:nvCxnSpPr>
+          <p:cNvPr id="5" name="Straight Connector 4">
+            <a:extLst>
+              <a:ext uri="{FF2B5EF4-FFF2-40B4-BE49-F238E27FC236}">
+                <a16:creationId xmlns:a16="http://schemas.microsoft.com/office/drawing/2014/main" id="{48625322-297F-2F65-34AA-CEF8C140DC8A}"/>
+              </a:ext>
+            </a:extLst>
+          </p:cNvPr>
+          <p:cNvCxnSpPr>
+            <a:cxnSpLocks/>
+          </p:cNvCxnSpPr>
+          <p:nvPr/>
+        </p:nvCxnSpPr>
+        <p:spPr>
+          <a:xfrm flipH="1">
+            <a:off x="6530829" y="426870"/>
+            <a:ext cx="1463879" cy="399446"/>
+          </a:xfrm>
+          <a:prstGeom prst="line">
+            <a:avLst/>
+          </a:prstGeom>
+          <a:ln>
+            <a:solidFill>
+              <a:srgbClr val="FFFF00"/>
+            </a:solidFill>
+          </a:ln>
+        </p:spPr>
+        <p:style>
+          <a:lnRef idx="2">
+            <a:schemeClr val="accent1"/>
+          </a:lnRef>
+          <a:fillRef idx="0">
+            <a:schemeClr val="accent1"/>
+          </a:fillRef>
+          <a:effectRef idx="1">
+            <a:schemeClr val="accent1"/>
+          </a:effectRef>
+          <a:fontRef idx="minor">
+            <a:schemeClr val="tx1"/>
+          </a:fontRef>
+        </p:style>
+      </p:cxnSp>
+      <p:cxnSp>
+        <p:nvCxnSpPr>
+          <p:cNvPr id="22" name="Straight Connector 21">
+            <a:extLst>
+              <a:ext uri="{FF2B5EF4-FFF2-40B4-BE49-F238E27FC236}">
+                <a16:creationId xmlns:a16="http://schemas.microsoft.com/office/drawing/2014/main" id="{51934E3D-C1D6-CCED-317D-E13917F549BA}"/>
+              </a:ext>
+            </a:extLst>
+          </p:cNvPr>
+          <p:cNvCxnSpPr>
+            <a:cxnSpLocks/>
+          </p:cNvCxnSpPr>
+          <p:nvPr/>
+        </p:nvCxnSpPr>
+        <p:spPr>
+          <a:xfrm flipH="1">
+            <a:off x="7592037" y="426870"/>
+            <a:ext cx="444616" cy="59691"/>
+          </a:xfrm>
+          <a:prstGeom prst="line">
+            <a:avLst/>
+          </a:prstGeom>
+          <a:ln>
+            <a:solidFill>
+              <a:srgbClr val="FFFF00"/>
+            </a:solidFill>
+          </a:ln>
+        </p:spPr>
+        <p:style>
+          <a:lnRef idx="2">
+            <a:schemeClr val="accent1"/>
+          </a:lnRef>
+          <a:fillRef idx="0">
+            <a:schemeClr val="accent1"/>
+          </a:fillRef>
+          <a:effectRef idx="1">
+            <a:schemeClr val="accent1"/>
+          </a:effectRef>
+          <a:fontRef idx="minor">
+            <a:schemeClr val="tx1"/>
+          </a:fontRef>
+        </p:style>
+      </p:cxnSp>
+      <p:cxnSp>
+        <p:nvCxnSpPr>
+          <p:cNvPr id="25" name="Straight Connector 24">
+            <a:extLst>
+              <a:ext uri="{FF2B5EF4-FFF2-40B4-BE49-F238E27FC236}">
+                <a16:creationId xmlns:a16="http://schemas.microsoft.com/office/drawing/2014/main" id="{E10E13B2-7364-1B0F-7081-2ADD3AB37EB1}"/>
+              </a:ext>
+            </a:extLst>
+          </p:cNvPr>
+          <p:cNvCxnSpPr>
+            <a:cxnSpLocks/>
+          </p:cNvCxnSpPr>
+          <p:nvPr/>
+        </p:nvCxnSpPr>
+        <p:spPr>
+          <a:xfrm flipH="1">
+            <a:off x="4899171" y="426870"/>
+            <a:ext cx="3137482" cy="697255"/>
+          </a:xfrm>
+          <a:prstGeom prst="line">
+            <a:avLst/>
+          </a:prstGeom>
+          <a:ln>
+            <a:solidFill>
+              <a:srgbClr val="FFFF00"/>
+            </a:solidFill>
+          </a:ln>
+        </p:spPr>
+        <p:style>
+          <a:lnRef idx="2">
+            <a:schemeClr val="accent1"/>
+          </a:lnRef>
+          <a:fillRef idx="0">
+            <a:schemeClr val="accent1"/>
+          </a:fillRef>
+          <a:effectRef idx="1">
+            <a:schemeClr val="accent1"/>
+          </a:effectRef>
+          <a:fontRef idx="minor">
+            <a:schemeClr val="tx1"/>
+          </a:fontRef>
+        </p:style>
+      </p:cxnSp>
+    </p:spTree>
+    <p:extLst>
+      <p:ext uri="{BB962C8B-B14F-4D97-AF65-F5344CB8AC3E}">
+        <p14:creationId xmlns:p14="http://schemas.microsoft.com/office/powerpoint/2010/main" val="415382485"/>
+      </p:ext>
+    </p:extLst>
+  </p:cSld>
+  <p:clrMapOvr>
+    <a:masterClrMapping/>
+  </p:clrMapOvr>
+</p:sld>
+</file>
+
+<file path=ppt/slides/slide12.xml><?xml version="1.0" encoding="utf-8"?>
+<p:sld xmlns:a="http://schemas.openxmlformats.org/drawingml/2006/main" xmlns:r="http://schemas.openxmlformats.org/officeDocument/2006/relationships" xmlns:p="http://schemas.openxmlformats.org/presentationml/2006/main">
+  <p:cSld>
+    <p:spTree>
+      <p:nvGrpSpPr>
+        <p:cNvPr id="1" name=""/>
+        <p:cNvGrpSpPr/>
+        <p:nvPr/>
+      </p:nvGrpSpPr>
+      <p:grpSpPr>
+        <a:xfrm>
+          <a:off x="0" y="0"/>
+          <a:ext cx="0" cy="0"/>
+          <a:chOff x="0" y="0"/>
+          <a:chExt cx="0" cy="0"/>
+        </a:xfrm>
+      </p:grpSpPr>
       <p:pic>
         <p:nvPicPr>
-          <p:cNvPr id="6" name="Picture 5">
-            <a:extLst>
-              <a:ext uri="{FF2B5EF4-FFF2-40B4-BE49-F238E27FC236}">
-                <a16:creationId xmlns:a16="http://schemas.microsoft.com/office/drawing/2014/main" id="{8615D236-26DF-8FBA-939F-DE0A77E4907E}"/>
+          <p:cNvPr id="3" name="Picture 2">
+            <a:extLst>
+              <a:ext uri="{FF2B5EF4-FFF2-40B4-BE49-F238E27FC236}">
+                <a16:creationId xmlns:a16="http://schemas.microsoft.com/office/drawing/2014/main" id="{DDF18FC7-8221-A414-7201-5A6C25E2F7DA}"/>
+              </a:ext>
+            </a:extLst>
+          </p:cNvPr>
+          <p:cNvPicPr>
+            <a:picLocks noChangeAspect="1"/>
+          </p:cNvPicPr>
+          <p:nvPr/>
+        </p:nvPicPr>
+        <p:blipFill>
+          <a:blip r:embed="rId2"/>
+          <a:stretch>
+            <a:fillRect/>
+          </a:stretch>
+        </p:blipFill>
+        <p:spPr>
+          <a:xfrm>
+            <a:off x="160000" y="40341"/>
+            <a:ext cx="9159289" cy="3290047"/>
+          </a:xfrm>
+          <a:prstGeom prst="rect">
+            <a:avLst/>
+          </a:prstGeom>
+        </p:spPr>
+      </p:pic>
+      <p:pic>
+        <p:nvPicPr>
+          <p:cNvPr id="5" name="Picture 4">
+            <a:extLst>
+              <a:ext uri="{FF2B5EF4-FFF2-40B4-BE49-F238E27FC236}">
+                <a16:creationId xmlns:a16="http://schemas.microsoft.com/office/drawing/2014/main" id="{CFAB8817-BAF3-516F-0603-C340171388BA}"/>
               </a:ext>
             </a:extLst>
           </p:cNvPr>
@@ -5247,220 +6130,913 @@
         </p:blipFill>
         <p:spPr>
           <a:xfrm>
-            <a:off x="199290" y="3393656"/>
-            <a:ext cx="2673487" cy="2178162"/>
+            <a:off x="185168" y="3429000"/>
+            <a:ext cx="9487388" cy="3340272"/>
           </a:xfrm>
           <a:prstGeom prst="rect">
             <a:avLst/>
           </a:prstGeom>
         </p:spPr>
       </p:pic>
-      <p:pic>
-        <p:nvPicPr>
-          <p:cNvPr id="8" name="Picture 7">
-            <a:extLst>
-              <a:ext uri="{FF2B5EF4-FFF2-40B4-BE49-F238E27FC236}">
-                <a16:creationId xmlns:a16="http://schemas.microsoft.com/office/drawing/2014/main" id="{8E5BC934-2B9A-9E69-4ED9-0618C9E011B9}"/>
-              </a:ext>
-            </a:extLst>
-          </p:cNvPr>
-          <p:cNvPicPr>
-            <a:picLocks noChangeAspect="1"/>
-          </p:cNvPicPr>
-          <p:nvPr/>
-        </p:nvPicPr>
-        <p:blipFill>
-          <a:blip r:embed="rId4"/>
-          <a:stretch>
-            <a:fillRect/>
-          </a:stretch>
-        </p:blipFill>
-        <p:spPr>
-          <a:xfrm>
-            <a:off x="2968713" y="3436669"/>
-            <a:ext cx="2478498" cy="2148887"/>
-          </a:xfrm>
-          <a:prstGeom prst="rect">
-            <a:avLst/>
-          </a:prstGeom>
-        </p:spPr>
-      </p:pic>
-      <p:pic>
-        <p:nvPicPr>
-          <p:cNvPr id="10" name="Picture 9">
-            <a:extLst>
-              <a:ext uri="{FF2B5EF4-FFF2-40B4-BE49-F238E27FC236}">
-                <a16:creationId xmlns:a16="http://schemas.microsoft.com/office/drawing/2014/main" id="{97383686-37EB-A017-8022-9AD061A6E152}"/>
-              </a:ext>
-            </a:extLst>
-          </p:cNvPr>
-          <p:cNvPicPr>
-            <a:picLocks noChangeAspect="1"/>
-          </p:cNvPicPr>
-          <p:nvPr/>
-        </p:nvPicPr>
-        <p:blipFill>
-          <a:blip r:embed="rId5"/>
-          <a:stretch>
-            <a:fillRect/>
-          </a:stretch>
-        </p:blipFill>
-        <p:spPr>
-          <a:xfrm>
-            <a:off x="8781390" y="181743"/>
-            <a:ext cx="2900793" cy="2142818"/>
-          </a:xfrm>
-          <a:prstGeom prst="rect">
-            <a:avLst/>
-          </a:prstGeom>
-        </p:spPr>
-      </p:pic>
-      <p:pic>
-        <p:nvPicPr>
-          <p:cNvPr id="12" name="Picture 11">
-            <a:extLst>
-              <a:ext uri="{FF2B5EF4-FFF2-40B4-BE49-F238E27FC236}">
-                <a16:creationId xmlns:a16="http://schemas.microsoft.com/office/drawing/2014/main" id="{0E32514F-8E3C-3F51-4784-8CD1A36D231F}"/>
-              </a:ext>
-            </a:extLst>
-          </p:cNvPr>
-          <p:cNvPicPr>
-            <a:picLocks noChangeAspect="1"/>
-          </p:cNvPicPr>
-          <p:nvPr/>
-        </p:nvPicPr>
-        <p:blipFill>
-          <a:blip r:embed="rId6"/>
-          <a:stretch>
-            <a:fillRect/>
-          </a:stretch>
-        </p:blipFill>
-        <p:spPr>
-          <a:xfrm>
-            <a:off x="5642483" y="3441283"/>
-            <a:ext cx="3988005" cy="2082907"/>
-          </a:xfrm>
-          <a:prstGeom prst="rect">
-            <a:avLst/>
-          </a:prstGeom>
-        </p:spPr>
-      </p:pic>
+      <p:cxnSp>
+        <p:nvCxnSpPr>
+          <p:cNvPr id="6" name="Straight Connector 5">
+            <a:extLst>
+              <a:ext uri="{FF2B5EF4-FFF2-40B4-BE49-F238E27FC236}">
+                <a16:creationId xmlns:a16="http://schemas.microsoft.com/office/drawing/2014/main" id="{1E72E2AE-684A-FCAC-1536-E2684EC03361}"/>
+              </a:ext>
+            </a:extLst>
+          </p:cNvPr>
+          <p:cNvCxnSpPr>
+            <a:cxnSpLocks/>
+          </p:cNvCxnSpPr>
+          <p:nvPr/>
+        </p:nvCxnSpPr>
+        <p:spPr>
+          <a:xfrm>
+            <a:off x="8534400" y="6490447"/>
+            <a:ext cx="848973" cy="138953"/>
+          </a:xfrm>
+          <a:prstGeom prst="line">
+            <a:avLst/>
+          </a:prstGeom>
+          <a:ln>
+            <a:solidFill>
+              <a:srgbClr val="FFFF00"/>
+            </a:solidFill>
+          </a:ln>
+        </p:spPr>
+        <p:style>
+          <a:lnRef idx="2">
+            <a:schemeClr val="accent1"/>
+          </a:lnRef>
+          <a:fillRef idx="0">
+            <a:schemeClr val="accent1"/>
+          </a:fillRef>
+          <a:effectRef idx="1">
+            <a:schemeClr val="accent1"/>
+          </a:effectRef>
+          <a:fontRef idx="minor">
+            <a:schemeClr val="tx1"/>
+          </a:fontRef>
+        </p:style>
+      </p:cxnSp>
+      <p:cxnSp>
+        <p:nvCxnSpPr>
+          <p:cNvPr id="7" name="Straight Connector 6">
+            <a:extLst>
+              <a:ext uri="{FF2B5EF4-FFF2-40B4-BE49-F238E27FC236}">
+                <a16:creationId xmlns:a16="http://schemas.microsoft.com/office/drawing/2014/main" id="{7E6543DF-B460-5397-EC7C-7F889DA5896E}"/>
+              </a:ext>
+            </a:extLst>
+          </p:cNvPr>
+          <p:cNvCxnSpPr>
+            <a:cxnSpLocks/>
+          </p:cNvCxnSpPr>
+          <p:nvPr/>
+        </p:nvCxnSpPr>
+        <p:spPr>
+          <a:xfrm>
+            <a:off x="8036654" y="5169953"/>
+            <a:ext cx="1426128" cy="1359036"/>
+          </a:xfrm>
+          <a:prstGeom prst="line">
+            <a:avLst/>
+          </a:prstGeom>
+          <a:ln w="19050">
+            <a:solidFill>
+              <a:srgbClr val="FF0000"/>
+            </a:solidFill>
+          </a:ln>
+        </p:spPr>
+        <p:style>
+          <a:lnRef idx="2">
+            <a:schemeClr val="accent1"/>
+          </a:lnRef>
+          <a:fillRef idx="0">
+            <a:schemeClr val="accent1"/>
+          </a:fillRef>
+          <a:effectRef idx="1">
+            <a:schemeClr val="accent1"/>
+          </a:effectRef>
+          <a:fontRef idx="minor">
+            <a:schemeClr val="tx1"/>
+          </a:fontRef>
+        </p:style>
+      </p:cxnSp>
+      <p:cxnSp>
+        <p:nvCxnSpPr>
+          <p:cNvPr id="8" name="Straight Connector 7">
+            <a:extLst>
+              <a:ext uri="{FF2B5EF4-FFF2-40B4-BE49-F238E27FC236}">
+                <a16:creationId xmlns:a16="http://schemas.microsoft.com/office/drawing/2014/main" id="{413E1663-33AE-7F25-1B45-977751112960}"/>
+              </a:ext>
+            </a:extLst>
+          </p:cNvPr>
+          <p:cNvCxnSpPr>
+            <a:cxnSpLocks/>
+          </p:cNvCxnSpPr>
+          <p:nvPr/>
+        </p:nvCxnSpPr>
+        <p:spPr>
+          <a:xfrm flipH="1" flipV="1">
+            <a:off x="8686800" y="5849471"/>
+            <a:ext cx="703729" cy="640976"/>
+          </a:xfrm>
+          <a:prstGeom prst="line">
+            <a:avLst/>
+          </a:prstGeom>
+          <a:ln w="6350">
+            <a:solidFill>
+              <a:srgbClr val="FF0000"/>
+            </a:solidFill>
+            <a:prstDash val="dash"/>
+          </a:ln>
+        </p:spPr>
+        <p:style>
+          <a:lnRef idx="2">
+            <a:schemeClr val="accent1"/>
+          </a:lnRef>
+          <a:fillRef idx="0">
+            <a:schemeClr val="accent1"/>
+          </a:fillRef>
+          <a:effectRef idx="1">
+            <a:schemeClr val="accent1"/>
+          </a:effectRef>
+          <a:fontRef idx="minor">
+            <a:schemeClr val="tx1"/>
+          </a:fontRef>
+        </p:style>
+      </p:cxnSp>
+      <p:cxnSp>
+        <p:nvCxnSpPr>
+          <p:cNvPr id="16" name="Straight Connector 15">
+            <a:extLst>
+              <a:ext uri="{FF2B5EF4-FFF2-40B4-BE49-F238E27FC236}">
+                <a16:creationId xmlns:a16="http://schemas.microsoft.com/office/drawing/2014/main" id="{2228894B-8FAC-A203-DE52-2FEBAAF0A49B}"/>
+              </a:ext>
+            </a:extLst>
+          </p:cNvPr>
+          <p:cNvCxnSpPr>
+            <a:cxnSpLocks/>
+          </p:cNvCxnSpPr>
+          <p:nvPr/>
+        </p:nvCxnSpPr>
+        <p:spPr>
+          <a:xfrm>
+            <a:off x="2442784" y="3723581"/>
+            <a:ext cx="2194735" cy="357128"/>
+          </a:xfrm>
+          <a:prstGeom prst="line">
+            <a:avLst/>
+          </a:prstGeom>
+          <a:ln w="19050">
+            <a:solidFill>
+              <a:srgbClr val="FF0000"/>
+            </a:solidFill>
+          </a:ln>
+        </p:spPr>
+        <p:style>
+          <a:lnRef idx="2">
+            <a:schemeClr val="accent1"/>
+          </a:lnRef>
+          <a:fillRef idx="0">
+            <a:schemeClr val="accent1"/>
+          </a:fillRef>
+          <a:effectRef idx="1">
+            <a:schemeClr val="accent1"/>
+          </a:effectRef>
+          <a:fontRef idx="minor">
+            <a:schemeClr val="tx1"/>
+          </a:fontRef>
+        </p:style>
+      </p:cxnSp>
+      <p:cxnSp>
+        <p:nvCxnSpPr>
+          <p:cNvPr id="17" name="Straight Connector 16">
+            <a:extLst>
+              <a:ext uri="{FF2B5EF4-FFF2-40B4-BE49-F238E27FC236}">
+                <a16:creationId xmlns:a16="http://schemas.microsoft.com/office/drawing/2014/main" id="{860BBCBE-EC1E-C65F-D38B-636B12CE2F38}"/>
+              </a:ext>
+            </a:extLst>
+          </p:cNvPr>
+          <p:cNvCxnSpPr>
+            <a:cxnSpLocks/>
+          </p:cNvCxnSpPr>
+          <p:nvPr/>
+        </p:nvCxnSpPr>
+        <p:spPr>
+          <a:xfrm flipH="1">
+            <a:off x="3591086" y="4112004"/>
+            <a:ext cx="846690" cy="1197885"/>
+          </a:xfrm>
+          <a:prstGeom prst="line">
+            <a:avLst/>
+          </a:prstGeom>
+          <a:ln w="6350">
+            <a:solidFill>
+              <a:srgbClr val="FF0000"/>
+            </a:solidFill>
+            <a:prstDash val="dash"/>
+          </a:ln>
+        </p:spPr>
+        <p:style>
+          <a:lnRef idx="2">
+            <a:schemeClr val="accent1"/>
+          </a:lnRef>
+          <a:fillRef idx="0">
+            <a:schemeClr val="accent1"/>
+          </a:fillRef>
+          <a:effectRef idx="1">
+            <a:schemeClr val="accent1"/>
+          </a:effectRef>
+          <a:fontRef idx="minor">
+            <a:schemeClr val="tx1"/>
+          </a:fontRef>
+        </p:style>
+      </p:cxnSp>
+      <p:cxnSp>
+        <p:nvCxnSpPr>
+          <p:cNvPr id="25" name="Straight Connector 24">
+            <a:extLst>
+              <a:ext uri="{FF2B5EF4-FFF2-40B4-BE49-F238E27FC236}">
+                <a16:creationId xmlns:a16="http://schemas.microsoft.com/office/drawing/2014/main" id="{CBCA836D-9AB9-464C-5A31-9A73E7832C7C}"/>
+              </a:ext>
+            </a:extLst>
+          </p:cNvPr>
+          <p:cNvCxnSpPr>
+            <a:cxnSpLocks/>
+          </p:cNvCxnSpPr>
+          <p:nvPr/>
+        </p:nvCxnSpPr>
+        <p:spPr>
+          <a:xfrm>
+            <a:off x="5251508" y="4710946"/>
+            <a:ext cx="1816217" cy="1779501"/>
+          </a:xfrm>
+          <a:prstGeom prst="line">
+            <a:avLst/>
+          </a:prstGeom>
+          <a:ln w="19050">
+            <a:solidFill>
+              <a:srgbClr val="FF0000"/>
+            </a:solidFill>
+          </a:ln>
+        </p:spPr>
+        <p:style>
+          <a:lnRef idx="2">
+            <a:schemeClr val="accent1"/>
+          </a:lnRef>
+          <a:fillRef idx="0">
+            <a:schemeClr val="accent1"/>
+          </a:fillRef>
+          <a:effectRef idx="1">
+            <a:schemeClr val="accent1"/>
+          </a:effectRef>
+          <a:fontRef idx="minor">
+            <a:schemeClr val="tx1"/>
+          </a:fontRef>
+        </p:style>
+      </p:cxnSp>
+      <p:cxnSp>
+        <p:nvCxnSpPr>
+          <p:cNvPr id="31" name="Straight Connector 30">
+            <a:extLst>
+              <a:ext uri="{FF2B5EF4-FFF2-40B4-BE49-F238E27FC236}">
+                <a16:creationId xmlns:a16="http://schemas.microsoft.com/office/drawing/2014/main" id="{5A484983-E57D-793E-BF52-90A202B964D0}"/>
+              </a:ext>
+            </a:extLst>
+          </p:cNvPr>
+          <p:cNvCxnSpPr>
+            <a:cxnSpLocks/>
+          </p:cNvCxnSpPr>
+          <p:nvPr/>
+        </p:nvCxnSpPr>
+        <p:spPr>
+          <a:xfrm flipV="1">
+            <a:off x="1566545" y="3948284"/>
+            <a:ext cx="1565400" cy="1810758"/>
+          </a:xfrm>
+          <a:prstGeom prst="line">
+            <a:avLst/>
+          </a:prstGeom>
+          <a:ln>
+            <a:solidFill>
+              <a:srgbClr val="FFFF00"/>
+            </a:solidFill>
+          </a:ln>
+        </p:spPr>
+        <p:style>
+          <a:lnRef idx="2">
+            <a:schemeClr val="accent1"/>
+          </a:lnRef>
+          <a:fillRef idx="0">
+            <a:schemeClr val="accent1"/>
+          </a:fillRef>
+          <a:effectRef idx="1">
+            <a:schemeClr val="accent1"/>
+          </a:effectRef>
+          <a:fontRef idx="minor">
+            <a:schemeClr val="tx1"/>
+          </a:fontRef>
+        </p:style>
+      </p:cxnSp>
+      <p:cxnSp>
+        <p:nvCxnSpPr>
+          <p:cNvPr id="36" name="Straight Connector 35">
+            <a:extLst>
+              <a:ext uri="{FF2B5EF4-FFF2-40B4-BE49-F238E27FC236}">
+                <a16:creationId xmlns:a16="http://schemas.microsoft.com/office/drawing/2014/main" id="{877254D8-9D5C-D616-A3C9-E1953806C639}"/>
+              </a:ext>
+            </a:extLst>
+          </p:cNvPr>
+          <p:cNvCxnSpPr>
+            <a:cxnSpLocks/>
+          </p:cNvCxnSpPr>
+          <p:nvPr/>
+        </p:nvCxnSpPr>
+        <p:spPr>
+          <a:xfrm flipH="1" flipV="1">
+            <a:off x="8858774" y="329011"/>
+            <a:ext cx="411061" cy="299657"/>
+          </a:xfrm>
+          <a:prstGeom prst="line">
+            <a:avLst/>
+          </a:prstGeom>
+          <a:ln w="6350">
+            <a:solidFill>
+              <a:srgbClr val="FF0000"/>
+            </a:solidFill>
+            <a:prstDash val="dash"/>
+          </a:ln>
+        </p:spPr>
+        <p:style>
+          <a:lnRef idx="2">
+            <a:schemeClr val="accent1"/>
+          </a:lnRef>
+          <a:fillRef idx="0">
+            <a:schemeClr val="accent1"/>
+          </a:fillRef>
+          <a:effectRef idx="1">
+            <a:schemeClr val="accent1"/>
+          </a:effectRef>
+          <a:fontRef idx="minor">
+            <a:schemeClr val="tx1"/>
+          </a:fontRef>
+        </p:style>
+      </p:cxnSp>
+      <p:cxnSp>
+        <p:nvCxnSpPr>
+          <p:cNvPr id="41" name="Straight Connector 40">
+            <a:extLst>
+              <a:ext uri="{FF2B5EF4-FFF2-40B4-BE49-F238E27FC236}">
+                <a16:creationId xmlns:a16="http://schemas.microsoft.com/office/drawing/2014/main" id="{2602F3A5-DCDA-13CA-4145-7937591F0F96}"/>
+              </a:ext>
+            </a:extLst>
+          </p:cNvPr>
+          <p:cNvCxnSpPr>
+            <a:cxnSpLocks/>
+          </p:cNvCxnSpPr>
+          <p:nvPr/>
+        </p:nvCxnSpPr>
+        <p:spPr>
+          <a:xfrm flipV="1">
+            <a:off x="8342851" y="805709"/>
+            <a:ext cx="976438" cy="276471"/>
+          </a:xfrm>
+          <a:prstGeom prst="line">
+            <a:avLst/>
+          </a:prstGeom>
+          <a:ln>
+            <a:solidFill>
+              <a:srgbClr val="FFFF00"/>
+            </a:solidFill>
+          </a:ln>
+        </p:spPr>
+        <p:style>
+          <a:lnRef idx="2">
+            <a:schemeClr val="accent1"/>
+          </a:lnRef>
+          <a:fillRef idx="0">
+            <a:schemeClr val="accent1"/>
+          </a:fillRef>
+          <a:effectRef idx="1">
+            <a:schemeClr val="accent1"/>
+          </a:effectRef>
+          <a:fontRef idx="minor">
+            <a:schemeClr val="tx1"/>
+          </a:fontRef>
+        </p:style>
+      </p:cxnSp>
+      <p:cxnSp>
+        <p:nvCxnSpPr>
+          <p:cNvPr id="45" name="Straight Connector 44">
+            <a:extLst>
+              <a:ext uri="{FF2B5EF4-FFF2-40B4-BE49-F238E27FC236}">
+                <a16:creationId xmlns:a16="http://schemas.microsoft.com/office/drawing/2014/main" id="{FA71E4CE-9134-D943-9E13-68FADD8002C8}"/>
+              </a:ext>
+            </a:extLst>
+          </p:cNvPr>
+          <p:cNvCxnSpPr>
+            <a:cxnSpLocks/>
+          </p:cNvCxnSpPr>
+          <p:nvPr/>
+        </p:nvCxnSpPr>
+        <p:spPr>
+          <a:xfrm>
+            <a:off x="7751428" y="398477"/>
+            <a:ext cx="1107346" cy="323758"/>
+          </a:xfrm>
+          <a:prstGeom prst="line">
+            <a:avLst/>
+          </a:prstGeom>
+          <a:ln w="19050">
+            <a:solidFill>
+              <a:srgbClr val="FF0000"/>
+            </a:solidFill>
+          </a:ln>
+        </p:spPr>
+        <p:style>
+          <a:lnRef idx="2">
+            <a:schemeClr val="accent1"/>
+          </a:lnRef>
+          <a:fillRef idx="0">
+            <a:schemeClr val="accent1"/>
+          </a:fillRef>
+          <a:effectRef idx="1">
+            <a:schemeClr val="accent1"/>
+          </a:effectRef>
+          <a:fontRef idx="minor">
+            <a:schemeClr val="tx1"/>
+          </a:fontRef>
+        </p:style>
+      </p:cxnSp>
+      <p:cxnSp>
+        <p:nvCxnSpPr>
+          <p:cNvPr id="50" name="Straight Connector 49">
+            <a:extLst>
+              <a:ext uri="{FF2B5EF4-FFF2-40B4-BE49-F238E27FC236}">
+                <a16:creationId xmlns:a16="http://schemas.microsoft.com/office/drawing/2014/main" id="{F3D0DE87-8C30-68C7-403D-10F022367A45}"/>
+              </a:ext>
+            </a:extLst>
+          </p:cNvPr>
+          <p:cNvCxnSpPr>
+            <a:cxnSpLocks/>
+          </p:cNvCxnSpPr>
+          <p:nvPr/>
+        </p:nvCxnSpPr>
+        <p:spPr>
+          <a:xfrm flipV="1">
+            <a:off x="5381537" y="943944"/>
+            <a:ext cx="2508309" cy="1613539"/>
+          </a:xfrm>
+          <a:prstGeom prst="line">
+            <a:avLst/>
+          </a:prstGeom>
+          <a:ln>
+            <a:solidFill>
+              <a:srgbClr val="FFFF00"/>
+            </a:solidFill>
+          </a:ln>
+        </p:spPr>
+        <p:style>
+          <a:lnRef idx="2">
+            <a:schemeClr val="accent1"/>
+          </a:lnRef>
+          <a:fillRef idx="0">
+            <a:schemeClr val="accent1"/>
+          </a:fillRef>
+          <a:effectRef idx="1">
+            <a:schemeClr val="accent1"/>
+          </a:effectRef>
+          <a:fontRef idx="minor">
+            <a:schemeClr val="tx1"/>
+          </a:fontRef>
+        </p:style>
+      </p:cxnSp>
+      <p:cxnSp>
+        <p:nvCxnSpPr>
+          <p:cNvPr id="60" name="Straight Connector 59">
+            <a:extLst>
+              <a:ext uri="{FF2B5EF4-FFF2-40B4-BE49-F238E27FC236}">
+                <a16:creationId xmlns:a16="http://schemas.microsoft.com/office/drawing/2014/main" id="{5F66017C-B974-C864-EE7A-CABAFF3733A1}"/>
+              </a:ext>
+            </a:extLst>
+          </p:cNvPr>
+          <p:cNvCxnSpPr>
+            <a:cxnSpLocks/>
+          </p:cNvCxnSpPr>
+          <p:nvPr/>
+        </p:nvCxnSpPr>
+        <p:spPr>
+          <a:xfrm>
+            <a:off x="2315361" y="1108401"/>
+            <a:ext cx="3531629" cy="724541"/>
+          </a:xfrm>
+          <a:prstGeom prst="line">
+            <a:avLst/>
+          </a:prstGeom>
+          <a:ln w="19050">
+            <a:solidFill>
+              <a:srgbClr val="FF0000"/>
+            </a:solidFill>
+          </a:ln>
+        </p:spPr>
+        <p:style>
+          <a:lnRef idx="2">
+            <a:schemeClr val="accent1"/>
+          </a:lnRef>
+          <a:fillRef idx="0">
+            <a:schemeClr val="accent1"/>
+          </a:fillRef>
+          <a:effectRef idx="1">
+            <a:schemeClr val="accent1"/>
+          </a:effectRef>
+          <a:fontRef idx="minor">
+            <a:schemeClr val="tx1"/>
+          </a:fontRef>
+        </p:style>
+      </p:cxnSp>
+      <p:cxnSp>
+        <p:nvCxnSpPr>
+          <p:cNvPr id="63" name="Straight Connector 62">
+            <a:extLst>
+              <a:ext uri="{FF2B5EF4-FFF2-40B4-BE49-F238E27FC236}">
+                <a16:creationId xmlns:a16="http://schemas.microsoft.com/office/drawing/2014/main" id="{8A162EAB-C604-7EE9-9826-F7A5447F6ADA}"/>
+              </a:ext>
+            </a:extLst>
+          </p:cNvPr>
+          <p:cNvCxnSpPr>
+            <a:cxnSpLocks/>
+          </p:cNvCxnSpPr>
+          <p:nvPr/>
+        </p:nvCxnSpPr>
+        <p:spPr>
+          <a:xfrm>
+            <a:off x="4756353" y="1548111"/>
+            <a:ext cx="847493" cy="890757"/>
+          </a:xfrm>
+          <a:prstGeom prst="line">
+            <a:avLst/>
+          </a:prstGeom>
+          <a:ln w="6350">
+            <a:solidFill>
+              <a:srgbClr val="FF0000"/>
+            </a:solidFill>
+            <a:prstDash val="dash"/>
+          </a:ln>
+        </p:spPr>
+        <p:style>
+          <a:lnRef idx="2">
+            <a:schemeClr val="accent1"/>
+          </a:lnRef>
+          <a:fillRef idx="0">
+            <a:schemeClr val="accent1"/>
+          </a:fillRef>
+          <a:effectRef idx="1">
+            <a:schemeClr val="accent1"/>
+          </a:effectRef>
+          <a:fontRef idx="minor">
+            <a:schemeClr val="tx1"/>
+          </a:fontRef>
+        </p:style>
+      </p:cxnSp>
+      <p:cxnSp>
+        <p:nvCxnSpPr>
+          <p:cNvPr id="68" name="Straight Connector 67">
+            <a:extLst>
+              <a:ext uri="{FF2B5EF4-FFF2-40B4-BE49-F238E27FC236}">
+                <a16:creationId xmlns:a16="http://schemas.microsoft.com/office/drawing/2014/main" id="{75731FC1-53FC-BE3A-7A53-31A9E2BE5977}"/>
+              </a:ext>
+            </a:extLst>
+          </p:cNvPr>
+          <p:cNvCxnSpPr>
+            <a:cxnSpLocks/>
+          </p:cNvCxnSpPr>
+          <p:nvPr/>
+        </p:nvCxnSpPr>
+        <p:spPr>
+          <a:xfrm>
+            <a:off x="8036654" y="531019"/>
+            <a:ext cx="919606" cy="167115"/>
+          </a:xfrm>
+          <a:prstGeom prst="line">
+            <a:avLst/>
+          </a:prstGeom>
+          <a:ln w="6350">
+            <a:solidFill>
+              <a:srgbClr val="FF0000"/>
+            </a:solidFill>
+            <a:prstDash val="dash"/>
+          </a:ln>
+        </p:spPr>
+        <p:style>
+          <a:lnRef idx="2">
+            <a:schemeClr val="accent1"/>
+          </a:lnRef>
+          <a:fillRef idx="0">
+            <a:schemeClr val="accent1"/>
+          </a:fillRef>
+          <a:effectRef idx="1">
+            <a:schemeClr val="accent1"/>
+          </a:effectRef>
+          <a:fontRef idx="minor">
+            <a:schemeClr val="tx1"/>
+          </a:fontRef>
+        </p:style>
+      </p:cxnSp>
+      <p:cxnSp>
+        <p:nvCxnSpPr>
+          <p:cNvPr id="71" name="Straight Connector 70">
+            <a:extLst>
+              <a:ext uri="{FF2B5EF4-FFF2-40B4-BE49-F238E27FC236}">
+                <a16:creationId xmlns:a16="http://schemas.microsoft.com/office/drawing/2014/main" id="{CF7F9CB0-BA03-F63A-F28D-EA2D4C7D8297}"/>
+              </a:ext>
+            </a:extLst>
+          </p:cNvPr>
+          <p:cNvCxnSpPr>
+            <a:cxnSpLocks/>
+          </p:cNvCxnSpPr>
+          <p:nvPr/>
+        </p:nvCxnSpPr>
+        <p:spPr>
+          <a:xfrm flipH="1">
+            <a:off x="8615494" y="791701"/>
+            <a:ext cx="767879" cy="260792"/>
+          </a:xfrm>
+          <a:prstGeom prst="line">
+            <a:avLst/>
+          </a:prstGeom>
+          <a:ln w="6350">
+            <a:solidFill>
+              <a:srgbClr val="FFFF00"/>
+            </a:solidFill>
+            <a:prstDash val="dash"/>
+          </a:ln>
+        </p:spPr>
+        <p:style>
+          <a:lnRef idx="2">
+            <a:schemeClr val="accent1"/>
+          </a:lnRef>
+          <a:fillRef idx="0">
+            <a:schemeClr val="accent1"/>
+          </a:fillRef>
+          <a:effectRef idx="1">
+            <a:schemeClr val="accent1"/>
+          </a:effectRef>
+          <a:fontRef idx="minor">
+            <a:schemeClr val="tx1"/>
+          </a:fontRef>
+        </p:style>
+      </p:cxnSp>
+      <p:cxnSp>
+        <p:nvCxnSpPr>
+          <p:cNvPr id="74" name="Straight Connector 73">
+            <a:extLst>
+              <a:ext uri="{FF2B5EF4-FFF2-40B4-BE49-F238E27FC236}">
+                <a16:creationId xmlns:a16="http://schemas.microsoft.com/office/drawing/2014/main" id="{928064E3-10D5-F82B-FECE-0264C8DCD4BB}"/>
+              </a:ext>
+            </a:extLst>
+          </p:cNvPr>
+          <p:cNvCxnSpPr>
+            <a:cxnSpLocks/>
+          </p:cNvCxnSpPr>
+          <p:nvPr/>
+        </p:nvCxnSpPr>
+        <p:spPr>
+          <a:xfrm flipH="1">
+            <a:off x="7067725" y="764242"/>
+            <a:ext cx="1152903" cy="706429"/>
+          </a:xfrm>
+          <a:prstGeom prst="line">
+            <a:avLst/>
+          </a:prstGeom>
+          <a:ln w="6350">
+            <a:solidFill>
+              <a:srgbClr val="FFFF00"/>
+            </a:solidFill>
+            <a:prstDash val="dash"/>
+          </a:ln>
+        </p:spPr>
+        <p:style>
+          <a:lnRef idx="2">
+            <a:schemeClr val="accent1"/>
+          </a:lnRef>
+          <a:fillRef idx="0">
+            <a:schemeClr val="accent1"/>
+          </a:fillRef>
+          <a:effectRef idx="1">
+            <a:schemeClr val="accent1"/>
+          </a:effectRef>
+          <a:fontRef idx="minor">
+            <a:schemeClr val="tx1"/>
+          </a:fontRef>
+        </p:style>
+      </p:cxnSp>
+      <p:cxnSp>
+        <p:nvCxnSpPr>
+          <p:cNvPr id="76" name="Straight Connector 75">
+            <a:extLst>
+              <a:ext uri="{FF2B5EF4-FFF2-40B4-BE49-F238E27FC236}">
+                <a16:creationId xmlns:a16="http://schemas.microsoft.com/office/drawing/2014/main" id="{0D740499-AC5F-214D-5A2D-3E3B448FDDFB}"/>
+              </a:ext>
+            </a:extLst>
+          </p:cNvPr>
+          <p:cNvCxnSpPr>
+            <a:cxnSpLocks/>
+          </p:cNvCxnSpPr>
+          <p:nvPr/>
+        </p:nvCxnSpPr>
+        <p:spPr>
+          <a:xfrm flipH="1">
+            <a:off x="2847545" y="1577439"/>
+            <a:ext cx="879860" cy="353215"/>
+          </a:xfrm>
+          <a:prstGeom prst="line">
+            <a:avLst/>
+          </a:prstGeom>
+          <a:ln w="6350">
+            <a:solidFill>
+              <a:srgbClr val="FFFF00"/>
+            </a:solidFill>
+            <a:prstDash val="dash"/>
+          </a:ln>
+        </p:spPr>
+        <p:style>
+          <a:lnRef idx="2">
+            <a:schemeClr val="accent1"/>
+          </a:lnRef>
+          <a:fillRef idx="0">
+            <a:schemeClr val="accent1"/>
+          </a:fillRef>
+          <a:effectRef idx="1">
+            <a:schemeClr val="accent1"/>
+          </a:effectRef>
+          <a:fontRef idx="minor">
+            <a:schemeClr val="tx1"/>
+          </a:fontRef>
+        </p:style>
+      </p:cxnSp>
+      <p:cxnSp>
+        <p:nvCxnSpPr>
+          <p:cNvPr id="79" name="Straight Connector 78">
+            <a:extLst>
+              <a:ext uri="{FF2B5EF4-FFF2-40B4-BE49-F238E27FC236}">
+                <a16:creationId xmlns:a16="http://schemas.microsoft.com/office/drawing/2014/main" id="{635DA5E6-E935-71BD-6B1E-A1A5A3A51DDF}"/>
+              </a:ext>
+            </a:extLst>
+          </p:cNvPr>
+          <p:cNvCxnSpPr>
+            <a:cxnSpLocks/>
+          </p:cNvCxnSpPr>
+          <p:nvPr/>
+        </p:nvCxnSpPr>
+        <p:spPr>
+          <a:xfrm flipV="1">
+            <a:off x="1045006" y="1577439"/>
+            <a:ext cx="2612686" cy="1133564"/>
+          </a:xfrm>
+          <a:prstGeom prst="line">
+            <a:avLst/>
+          </a:prstGeom>
+          <a:ln>
+            <a:solidFill>
+              <a:srgbClr val="FFFF00"/>
+            </a:solidFill>
+          </a:ln>
+        </p:spPr>
+        <p:style>
+          <a:lnRef idx="2">
+            <a:schemeClr val="accent1"/>
+          </a:lnRef>
+          <a:fillRef idx="0">
+            <a:schemeClr val="accent1"/>
+          </a:fillRef>
+          <a:effectRef idx="1">
+            <a:schemeClr val="accent1"/>
+          </a:effectRef>
+          <a:fontRef idx="minor">
+            <a:schemeClr val="tx1"/>
+          </a:fontRef>
+        </p:style>
+      </p:cxnSp>
       <p:sp>
         <p:nvSpPr>
-          <p:cNvPr id="13" name="Rectangle 12">
-            <a:extLst>
-              <a:ext uri="{FF2B5EF4-FFF2-40B4-BE49-F238E27FC236}">
-                <a16:creationId xmlns:a16="http://schemas.microsoft.com/office/drawing/2014/main" id="{B3D17FBE-2D0A-FA00-9D59-5702BE4546B3}"/>
-              </a:ext>
-            </a:extLst>
-          </p:cNvPr>
-          <p:cNvSpPr/>
+          <p:cNvPr id="82" name="TextBox 81">
+            <a:extLst>
+              <a:ext uri="{FF2B5EF4-FFF2-40B4-BE49-F238E27FC236}">
+                <a16:creationId xmlns:a16="http://schemas.microsoft.com/office/drawing/2014/main" id="{E38065B0-CE7F-6B22-B64C-1024FBBBBC81}"/>
+              </a:ext>
+            </a:extLst>
+          </p:cNvPr>
+          <p:cNvSpPr txBox="1"/>
           <p:nvPr/>
         </p:nvSpPr>
         <p:spPr>
           <a:xfrm>
-            <a:off x="3553098" y="4127863"/>
-            <a:ext cx="975360" cy="857793"/>
+            <a:off x="9754485" y="218113"/>
+            <a:ext cx="2277611" cy="5632311"/>
           </a:xfrm>
           <a:prstGeom prst="rect">
             <a:avLst/>
           </a:prstGeom>
-          <a:solidFill>
-            <a:srgbClr val="FFC000">
-              <a:alpha val="22000"/>
-            </a:srgbClr>
-          </a:solidFill>
-          <a:ln>
-            <a:noFill/>
-          </a:ln>
-        </p:spPr>
-        <p:style>
-          <a:lnRef idx="2">
-            <a:schemeClr val="accent1">
-              <a:shade val="15000"/>
-            </a:schemeClr>
-          </a:lnRef>
-          <a:fillRef idx="1">
-            <a:schemeClr val="accent1"/>
-          </a:fillRef>
-          <a:effectRef idx="0">
-            <a:schemeClr val="accent1"/>
-          </a:effectRef>
-          <a:fontRef idx="minor">
-            <a:schemeClr val="lt1"/>
-          </a:fontRef>
-        </p:style>
+          <a:noFill/>
+        </p:spPr>
         <p:txBody>
-          <a:bodyPr rtlCol="0" anchor="ctr"/>
+          <a:bodyPr wrap="square" rtlCol="0">
+            <a:spAutoFit/>
+          </a:bodyPr>
           <a:lstStyle/>
           <a:p>
-            <a:pPr algn="ctr"/>
-            <a:endParaRPr lang="en-GB"/>
-          </a:p>
-        </p:txBody>
-      </p:sp>
-      <p:sp>
-        <p:nvSpPr>
-          <p:cNvPr id="14" name="Rectangle 13">
-            <a:extLst>
-              <a:ext uri="{FF2B5EF4-FFF2-40B4-BE49-F238E27FC236}">
-                <a16:creationId xmlns:a16="http://schemas.microsoft.com/office/drawing/2014/main" id="{64C9702D-9BFF-831B-96D8-5402CEC67D54}"/>
-              </a:ext>
-            </a:extLst>
-          </p:cNvPr>
-          <p:cNvSpPr/>
-          <p:nvPr/>
-        </p:nvSpPr>
-        <p:spPr>
-          <a:xfrm>
-            <a:off x="6492241" y="4332514"/>
-            <a:ext cx="2129246" cy="435429"/>
-          </a:xfrm>
-          <a:prstGeom prst="rect">
-            <a:avLst/>
-          </a:prstGeom>
-          <a:solidFill>
-            <a:srgbClr val="FFC000">
-              <a:alpha val="22000"/>
-            </a:srgbClr>
-          </a:solidFill>
-          <a:ln>
-            <a:solidFill>
-              <a:schemeClr val="accent1">
-                <a:shade val="15000"/>
-              </a:schemeClr>
-            </a:solidFill>
-          </a:ln>
-        </p:spPr>
-        <p:style>
-          <a:lnRef idx="2">
-            <a:schemeClr val="accent1">
-              <a:shade val="15000"/>
-            </a:schemeClr>
-          </a:lnRef>
-          <a:fillRef idx="1">
-            <a:schemeClr val="accent1"/>
-          </a:fillRef>
-          <a:effectRef idx="0">
-            <a:schemeClr val="accent1"/>
-          </a:effectRef>
-          <a:fontRef idx="minor">
-            <a:schemeClr val="lt1"/>
-          </a:fontRef>
-        </p:style>
-        <p:txBody>
-          <a:bodyPr rtlCol="0" anchor="ctr"/>
-          <a:lstStyle/>
-          <a:p>
-            <a:pPr algn="ctr"/>
-            <a:endParaRPr lang="en-GB"/>
+            <a:r>
+              <a:rPr lang="en-GB" sz="1000"/>
+              <a:t>Micro Trend Rules: </a:t>
+            </a:r>
+          </a:p>
+          <a:p>
+            <a:r>
+              <a:rPr lang="en-GB" sz="1000"/>
+              <a:t>Example down trends:</a:t>
+            </a:r>
+          </a:p>
+          <a:p>
+            <a:pPr marL="228600" indent="-228600">
+              <a:buAutoNum type="arabicPeriod"/>
+            </a:pPr>
+            <a:r>
+              <a:rPr lang="en-GB" sz="1000"/>
+              <a:t>Start at the end of the data and work backwards through all of the HPs as defined in the pointsCol1</a:t>
+            </a:r>
+          </a:p>
+          <a:p>
+            <a:pPr marL="228600" indent="-228600">
+              <a:buAutoNum type="arabicPeriod"/>
+            </a:pPr>
+            <a:r>
+              <a:rPr lang="en-GB" sz="1000"/>
+              <a:t>Find the next previous point that is nth * ATR higher (slopeTolerance) than the current point.</a:t>
+            </a:r>
+          </a:p>
+          <a:p>
+            <a:pPr marL="228600" indent="-228600">
+              <a:buAutoNum type="arabicPeriod"/>
+            </a:pPr>
+            <a:r>
+              <a:rPr lang="en-GB" sz="1000"/>
+              <a:t>Draw a line through the points and project it forward until the the low of the candlestick (bar) is &gt;  projected line and continues to be so for nth number of bars (projectionPeriod).</a:t>
+            </a:r>
+          </a:p>
+          <a:p>
+            <a:pPr marL="228600" indent="-228600">
+              <a:buAutoNum type="arabicPeriod"/>
+            </a:pPr>
+            <a:r>
+              <a:rPr lang="en-GB" sz="1000"/>
+              <a:t>If it is the last HP on the chart and all bars after than point are lower then switch to creating own micro HPs by checking if a high of a bar is &gt; the bar to the left and right and then draw a best fit line from the last HP and through any micro HPs to the end of the data.</a:t>
+            </a:r>
+          </a:p>
+          <a:p>
+            <a:pPr marL="228600" indent="-228600">
+              <a:buAutoNum type="arabicPeriod"/>
+            </a:pPr>
+            <a:r>
+              <a:rPr lang="en-GB" sz="1000"/>
+              <a:t>If no micro HPs found in step 4 then just use highs of each bar if there are more 2 bars from the last HP to the end of the chart and again find the best fit line.  </a:t>
+            </a:r>
+          </a:p>
+          <a:p>
+            <a:pPr marL="228600" indent="-228600">
+              <a:buAutoNum type="arabicPeriod"/>
+            </a:pPr>
+            <a:r>
+              <a:rPr lang="en-GB" sz="1000"/>
+              <a:t>When the best fit line is created from either step 4 or 5  find the high that most protrudes above the best fit line then draw the final line from that high back to the HP </a:t>
+            </a:r>
+          </a:p>
+          <a:p>
+            <a:pPr marL="228600" indent="-228600">
+              <a:buAutoNum type="arabicPeriod"/>
+            </a:pPr>
+            <a:endParaRPr lang="en-GB" sz="1000"/>
+          </a:p>
+          <a:p>
+            <a:pPr marL="228600" indent="-228600">
+              <a:buAutoNum type="arabicPeriod"/>
+            </a:pPr>
+            <a:endParaRPr lang="en-GB" sz="1000"/>
+          </a:p>
+          <a:p>
+            <a:pPr marL="228600" indent="-228600">
+              <a:buAutoNum type="arabicPeriod"/>
+            </a:pPr>
+            <a:endParaRPr lang="en-GB" sz="1000"/>
           </a:p>
         </p:txBody>
       </p:sp>
     </p:spTree>
     <p:extLst>
       <p:ext uri="{BB962C8B-B14F-4D97-AF65-F5344CB8AC3E}">
-        <p14:creationId xmlns:p14="http://schemas.microsoft.com/office/powerpoint/2010/main" val="415382485"/>
+        <p14:creationId xmlns:p14="http://schemas.microsoft.com/office/powerpoint/2010/main" val="1632626330"/>
       </p:ext>
     </p:extLst>
   </p:cSld>
@@ -6028,6 +7604,1052 @@
 </file>
 
 <file path=ppt/slides/slide3.xml><?xml version="1.0" encoding="utf-8"?>
+<p:sld xmlns:a="http://schemas.openxmlformats.org/drawingml/2006/main" xmlns:r="http://schemas.openxmlformats.org/officeDocument/2006/relationships" xmlns:p="http://schemas.openxmlformats.org/presentationml/2006/main">
+  <p:cSld>
+    <p:spTree>
+      <p:nvGrpSpPr>
+        <p:cNvPr id="1" name="">
+          <a:extLst>
+            <a:ext uri="{FF2B5EF4-FFF2-40B4-BE49-F238E27FC236}">
+              <a16:creationId xmlns:a16="http://schemas.microsoft.com/office/drawing/2014/main" id="{F36DBF78-E3B5-CF32-AEC0-1D7B05270682}"/>
+            </a:ext>
+          </a:extLst>
+        </p:cNvPr>
+        <p:cNvGrpSpPr/>
+        <p:nvPr/>
+      </p:nvGrpSpPr>
+      <p:grpSpPr>
+        <a:xfrm>
+          <a:off x="0" y="0"/>
+          <a:ext cx="0" cy="0"/>
+          <a:chOff x="0" y="0"/>
+          <a:chExt cx="0" cy="0"/>
+        </a:xfrm>
+      </p:grpSpPr>
+      <p:grpSp>
+        <p:nvGrpSpPr>
+          <p:cNvPr id="24" name="Group 23">
+            <a:extLst>
+              <a:ext uri="{FF2B5EF4-FFF2-40B4-BE49-F238E27FC236}">
+                <a16:creationId xmlns:a16="http://schemas.microsoft.com/office/drawing/2014/main" id="{EE565A71-1425-7BBB-DA9A-9749D3B9D07C}"/>
+              </a:ext>
+            </a:extLst>
+          </p:cNvPr>
+          <p:cNvGrpSpPr/>
+          <p:nvPr/>
+        </p:nvGrpSpPr>
+        <p:grpSpPr>
+          <a:xfrm>
+            <a:off x="1436840" y="1298197"/>
+            <a:ext cx="265671" cy="1822622"/>
+            <a:chOff x="3231290" y="2990335"/>
+            <a:chExt cx="265671" cy="1822622"/>
+          </a:xfrm>
+        </p:grpSpPr>
+        <p:cxnSp>
+          <p:nvCxnSpPr>
+            <p:cNvPr id="25" name="Straight Connector 24">
+              <a:extLst>
+                <a:ext uri="{FF2B5EF4-FFF2-40B4-BE49-F238E27FC236}">
+                  <a16:creationId xmlns:a16="http://schemas.microsoft.com/office/drawing/2014/main" id="{78A7AF2C-C433-AB09-AF71-D34CD28DF88F}"/>
+                </a:ext>
+              </a:extLst>
+            </p:cNvPr>
+            <p:cNvCxnSpPr>
+              <a:cxnSpLocks/>
+            </p:cNvCxnSpPr>
+            <p:nvPr/>
+          </p:nvCxnSpPr>
+          <p:spPr>
+            <a:xfrm>
+              <a:off x="3361038" y="2990335"/>
+              <a:ext cx="0" cy="1822622"/>
+            </a:xfrm>
+            <a:prstGeom prst="line">
+              <a:avLst/>
+            </a:prstGeom>
+          </p:spPr>
+          <p:style>
+            <a:lnRef idx="2">
+              <a:schemeClr val="accent1"/>
+            </a:lnRef>
+            <a:fillRef idx="0">
+              <a:schemeClr val="accent1"/>
+            </a:fillRef>
+            <a:effectRef idx="1">
+              <a:schemeClr val="accent1"/>
+            </a:effectRef>
+            <a:fontRef idx="minor">
+              <a:schemeClr val="tx1"/>
+            </a:fontRef>
+          </p:style>
+        </p:cxnSp>
+        <p:sp>
+          <p:nvSpPr>
+            <p:cNvPr id="26" name="Rectangle 25">
+              <a:extLst>
+                <a:ext uri="{FF2B5EF4-FFF2-40B4-BE49-F238E27FC236}">
+                  <a16:creationId xmlns:a16="http://schemas.microsoft.com/office/drawing/2014/main" id="{1EF10919-8420-54A8-E6EA-85C7F892F2FE}"/>
+                </a:ext>
+              </a:extLst>
+            </p:cNvPr>
+            <p:cNvSpPr/>
+            <p:nvPr/>
+          </p:nvSpPr>
+          <p:spPr>
+            <a:xfrm>
+              <a:off x="3231290" y="3472250"/>
+              <a:ext cx="265671" cy="951470"/>
+            </a:xfrm>
+            <a:prstGeom prst="rect">
+              <a:avLst/>
+            </a:prstGeom>
+            <a:solidFill>
+              <a:srgbClr val="FF0000"/>
+            </a:solidFill>
+          </p:spPr>
+          <p:style>
+            <a:lnRef idx="2">
+              <a:schemeClr val="accent1">
+                <a:shade val="15000"/>
+              </a:schemeClr>
+            </a:lnRef>
+            <a:fillRef idx="1">
+              <a:schemeClr val="accent1"/>
+            </a:fillRef>
+            <a:effectRef idx="0">
+              <a:schemeClr val="accent1"/>
+            </a:effectRef>
+            <a:fontRef idx="minor">
+              <a:schemeClr val="lt1"/>
+            </a:fontRef>
+          </p:style>
+          <p:txBody>
+            <a:bodyPr rtlCol="0" anchor="ctr"/>
+            <a:lstStyle/>
+            <a:p>
+              <a:pPr algn="ctr"/>
+              <a:endParaRPr lang="en-GB"/>
+            </a:p>
+          </p:txBody>
+        </p:sp>
+      </p:grpSp>
+      <p:grpSp>
+        <p:nvGrpSpPr>
+          <p:cNvPr id="27" name="Group 26">
+            <a:extLst>
+              <a:ext uri="{FF2B5EF4-FFF2-40B4-BE49-F238E27FC236}">
+                <a16:creationId xmlns:a16="http://schemas.microsoft.com/office/drawing/2014/main" id="{70DAA600-9DE4-29CD-B5EA-EA2DDC13DD5B}"/>
+              </a:ext>
+            </a:extLst>
+          </p:cNvPr>
+          <p:cNvGrpSpPr/>
+          <p:nvPr/>
+        </p:nvGrpSpPr>
+        <p:grpSpPr>
+          <a:xfrm>
+            <a:off x="2802008" y="2209508"/>
+            <a:ext cx="265671" cy="1822622"/>
+            <a:chOff x="3231290" y="2990335"/>
+            <a:chExt cx="265671" cy="1822622"/>
+          </a:xfrm>
+        </p:grpSpPr>
+        <p:cxnSp>
+          <p:nvCxnSpPr>
+            <p:cNvPr id="28" name="Straight Connector 27">
+              <a:extLst>
+                <a:ext uri="{FF2B5EF4-FFF2-40B4-BE49-F238E27FC236}">
+                  <a16:creationId xmlns:a16="http://schemas.microsoft.com/office/drawing/2014/main" id="{A1AC170B-CA69-4371-3059-F2F9DB907A63}"/>
+                </a:ext>
+              </a:extLst>
+            </p:cNvPr>
+            <p:cNvCxnSpPr>
+              <a:cxnSpLocks/>
+            </p:cNvCxnSpPr>
+            <p:nvPr/>
+          </p:nvCxnSpPr>
+          <p:spPr>
+            <a:xfrm>
+              <a:off x="3361038" y="2990335"/>
+              <a:ext cx="0" cy="1822622"/>
+            </a:xfrm>
+            <a:prstGeom prst="line">
+              <a:avLst/>
+            </a:prstGeom>
+          </p:spPr>
+          <p:style>
+            <a:lnRef idx="2">
+              <a:schemeClr val="accent1"/>
+            </a:lnRef>
+            <a:fillRef idx="0">
+              <a:schemeClr val="accent1"/>
+            </a:fillRef>
+            <a:effectRef idx="1">
+              <a:schemeClr val="accent1"/>
+            </a:effectRef>
+            <a:fontRef idx="minor">
+              <a:schemeClr val="tx1"/>
+            </a:fontRef>
+          </p:style>
+        </p:cxnSp>
+        <p:sp>
+          <p:nvSpPr>
+            <p:cNvPr id="29" name="Rectangle 28">
+              <a:extLst>
+                <a:ext uri="{FF2B5EF4-FFF2-40B4-BE49-F238E27FC236}">
+                  <a16:creationId xmlns:a16="http://schemas.microsoft.com/office/drawing/2014/main" id="{D88B8F7E-9B15-D7D9-FCD4-D3E820E73908}"/>
+                </a:ext>
+              </a:extLst>
+            </p:cNvPr>
+            <p:cNvSpPr/>
+            <p:nvPr/>
+          </p:nvSpPr>
+          <p:spPr>
+            <a:xfrm>
+              <a:off x="3231290" y="3472250"/>
+              <a:ext cx="265671" cy="951470"/>
+            </a:xfrm>
+            <a:prstGeom prst="rect">
+              <a:avLst/>
+            </a:prstGeom>
+            <a:solidFill>
+              <a:srgbClr val="92D050"/>
+            </a:solidFill>
+          </p:spPr>
+          <p:style>
+            <a:lnRef idx="2">
+              <a:schemeClr val="accent1">
+                <a:shade val="15000"/>
+              </a:schemeClr>
+            </a:lnRef>
+            <a:fillRef idx="1">
+              <a:schemeClr val="accent1"/>
+            </a:fillRef>
+            <a:effectRef idx="0">
+              <a:schemeClr val="accent1"/>
+            </a:effectRef>
+            <a:fontRef idx="minor">
+              <a:schemeClr val="lt1"/>
+            </a:fontRef>
+          </p:style>
+          <p:txBody>
+            <a:bodyPr rtlCol="0" anchor="ctr"/>
+            <a:lstStyle/>
+            <a:p>
+              <a:pPr algn="ctr"/>
+              <a:endParaRPr lang="en-GB"/>
+            </a:p>
+          </p:txBody>
+        </p:sp>
+      </p:grpSp>
+      <p:grpSp>
+        <p:nvGrpSpPr>
+          <p:cNvPr id="30" name="Group 29">
+            <a:extLst>
+              <a:ext uri="{FF2B5EF4-FFF2-40B4-BE49-F238E27FC236}">
+                <a16:creationId xmlns:a16="http://schemas.microsoft.com/office/drawing/2014/main" id="{F1FF564A-D2DA-B814-0158-89B9E2CD7569}"/>
+              </a:ext>
+            </a:extLst>
+          </p:cNvPr>
+          <p:cNvGrpSpPr/>
+          <p:nvPr/>
+        </p:nvGrpSpPr>
+        <p:grpSpPr>
+          <a:xfrm>
+            <a:off x="1907115" y="1868649"/>
+            <a:ext cx="265671" cy="1822622"/>
+            <a:chOff x="3231290" y="2990335"/>
+            <a:chExt cx="265671" cy="1822622"/>
+          </a:xfrm>
+        </p:grpSpPr>
+        <p:cxnSp>
+          <p:nvCxnSpPr>
+            <p:cNvPr id="31" name="Straight Connector 30">
+              <a:extLst>
+                <a:ext uri="{FF2B5EF4-FFF2-40B4-BE49-F238E27FC236}">
+                  <a16:creationId xmlns:a16="http://schemas.microsoft.com/office/drawing/2014/main" id="{246B02A4-3D8B-F817-2907-72B6551B8A90}"/>
+                </a:ext>
+              </a:extLst>
+            </p:cNvPr>
+            <p:cNvCxnSpPr>
+              <a:cxnSpLocks/>
+            </p:cNvCxnSpPr>
+            <p:nvPr/>
+          </p:nvCxnSpPr>
+          <p:spPr>
+            <a:xfrm>
+              <a:off x="3361038" y="2990335"/>
+              <a:ext cx="0" cy="1822622"/>
+            </a:xfrm>
+            <a:prstGeom prst="line">
+              <a:avLst/>
+            </a:prstGeom>
+          </p:spPr>
+          <p:style>
+            <a:lnRef idx="2">
+              <a:schemeClr val="accent1"/>
+            </a:lnRef>
+            <a:fillRef idx="0">
+              <a:schemeClr val="accent1"/>
+            </a:fillRef>
+            <a:effectRef idx="1">
+              <a:schemeClr val="accent1"/>
+            </a:effectRef>
+            <a:fontRef idx="minor">
+              <a:schemeClr val="tx1"/>
+            </a:fontRef>
+          </p:style>
+        </p:cxnSp>
+        <p:sp>
+          <p:nvSpPr>
+            <p:cNvPr id="32" name="Rectangle 31">
+              <a:extLst>
+                <a:ext uri="{FF2B5EF4-FFF2-40B4-BE49-F238E27FC236}">
+                  <a16:creationId xmlns:a16="http://schemas.microsoft.com/office/drawing/2014/main" id="{45B42DCC-0140-5D5B-0044-C225A7B57A7F}"/>
+                </a:ext>
+              </a:extLst>
+            </p:cNvPr>
+            <p:cNvSpPr/>
+            <p:nvPr/>
+          </p:nvSpPr>
+          <p:spPr>
+            <a:xfrm>
+              <a:off x="3231290" y="3472250"/>
+              <a:ext cx="265671" cy="951470"/>
+            </a:xfrm>
+            <a:prstGeom prst="rect">
+              <a:avLst/>
+            </a:prstGeom>
+            <a:solidFill>
+              <a:srgbClr val="FF0000"/>
+            </a:solidFill>
+          </p:spPr>
+          <p:style>
+            <a:lnRef idx="2">
+              <a:schemeClr val="accent1">
+                <a:shade val="15000"/>
+              </a:schemeClr>
+            </a:lnRef>
+            <a:fillRef idx="1">
+              <a:schemeClr val="accent1"/>
+            </a:fillRef>
+            <a:effectRef idx="0">
+              <a:schemeClr val="accent1"/>
+            </a:effectRef>
+            <a:fontRef idx="minor">
+              <a:schemeClr val="lt1"/>
+            </a:fontRef>
+          </p:style>
+          <p:txBody>
+            <a:bodyPr rtlCol="0" anchor="ctr"/>
+            <a:lstStyle/>
+            <a:p>
+              <a:pPr algn="ctr"/>
+              <a:endParaRPr lang="en-GB"/>
+            </a:p>
+          </p:txBody>
+        </p:sp>
+      </p:grpSp>
+      <p:grpSp>
+        <p:nvGrpSpPr>
+          <p:cNvPr id="33" name="Group 32">
+            <a:extLst>
+              <a:ext uri="{FF2B5EF4-FFF2-40B4-BE49-F238E27FC236}">
+                <a16:creationId xmlns:a16="http://schemas.microsoft.com/office/drawing/2014/main" id="{046BF2E4-84E6-A461-A0CC-0FE5FABC7E52}"/>
+              </a:ext>
+            </a:extLst>
+          </p:cNvPr>
+          <p:cNvGrpSpPr/>
+          <p:nvPr/>
+        </p:nvGrpSpPr>
+        <p:grpSpPr>
+          <a:xfrm>
+            <a:off x="4573500" y="3460269"/>
+            <a:ext cx="265671" cy="1822622"/>
+            <a:chOff x="3231290" y="2990335"/>
+            <a:chExt cx="265671" cy="1822622"/>
+          </a:xfrm>
+        </p:grpSpPr>
+        <p:cxnSp>
+          <p:nvCxnSpPr>
+            <p:cNvPr id="34" name="Straight Connector 33">
+              <a:extLst>
+                <a:ext uri="{FF2B5EF4-FFF2-40B4-BE49-F238E27FC236}">
+                  <a16:creationId xmlns:a16="http://schemas.microsoft.com/office/drawing/2014/main" id="{9A11AF54-C840-4668-B1A6-CFE670A5D2DB}"/>
+                </a:ext>
+              </a:extLst>
+            </p:cNvPr>
+            <p:cNvCxnSpPr>
+              <a:cxnSpLocks/>
+            </p:cNvCxnSpPr>
+            <p:nvPr/>
+          </p:nvCxnSpPr>
+          <p:spPr>
+            <a:xfrm>
+              <a:off x="3361038" y="2990335"/>
+              <a:ext cx="0" cy="1822622"/>
+            </a:xfrm>
+            <a:prstGeom prst="line">
+              <a:avLst/>
+            </a:prstGeom>
+          </p:spPr>
+          <p:style>
+            <a:lnRef idx="2">
+              <a:schemeClr val="accent1"/>
+            </a:lnRef>
+            <a:fillRef idx="0">
+              <a:schemeClr val="accent1"/>
+            </a:fillRef>
+            <a:effectRef idx="1">
+              <a:schemeClr val="accent1"/>
+            </a:effectRef>
+            <a:fontRef idx="minor">
+              <a:schemeClr val="tx1"/>
+            </a:fontRef>
+          </p:style>
+        </p:cxnSp>
+        <p:sp>
+          <p:nvSpPr>
+            <p:cNvPr id="35" name="Rectangle 34">
+              <a:extLst>
+                <a:ext uri="{FF2B5EF4-FFF2-40B4-BE49-F238E27FC236}">
+                  <a16:creationId xmlns:a16="http://schemas.microsoft.com/office/drawing/2014/main" id="{54F80C21-A1C7-8A4F-5C3F-3C650CF5BDD1}"/>
+                </a:ext>
+              </a:extLst>
+            </p:cNvPr>
+            <p:cNvSpPr/>
+            <p:nvPr/>
+          </p:nvSpPr>
+          <p:spPr>
+            <a:xfrm>
+              <a:off x="3231290" y="3472250"/>
+              <a:ext cx="265671" cy="951470"/>
+            </a:xfrm>
+            <a:prstGeom prst="rect">
+              <a:avLst/>
+            </a:prstGeom>
+            <a:solidFill>
+              <a:srgbClr val="92D050"/>
+            </a:solidFill>
+          </p:spPr>
+          <p:style>
+            <a:lnRef idx="2">
+              <a:schemeClr val="accent1">
+                <a:shade val="15000"/>
+              </a:schemeClr>
+            </a:lnRef>
+            <a:fillRef idx="1">
+              <a:schemeClr val="accent1"/>
+            </a:fillRef>
+            <a:effectRef idx="0">
+              <a:schemeClr val="accent1"/>
+            </a:effectRef>
+            <a:fontRef idx="minor">
+              <a:schemeClr val="lt1"/>
+            </a:fontRef>
+          </p:style>
+          <p:txBody>
+            <a:bodyPr rtlCol="0" anchor="ctr"/>
+            <a:lstStyle/>
+            <a:p>
+              <a:pPr algn="ctr"/>
+              <a:endParaRPr lang="en-GB"/>
+            </a:p>
+          </p:txBody>
+        </p:sp>
+      </p:grpSp>
+      <p:grpSp>
+        <p:nvGrpSpPr>
+          <p:cNvPr id="36" name="Group 35">
+            <a:extLst>
+              <a:ext uri="{FF2B5EF4-FFF2-40B4-BE49-F238E27FC236}">
+                <a16:creationId xmlns:a16="http://schemas.microsoft.com/office/drawing/2014/main" id="{25F943F6-6DC6-3E78-51E0-080A0698E20B}"/>
+              </a:ext>
+            </a:extLst>
+          </p:cNvPr>
+          <p:cNvGrpSpPr/>
+          <p:nvPr/>
+        </p:nvGrpSpPr>
+        <p:grpSpPr>
+          <a:xfrm>
+            <a:off x="2341760" y="2350564"/>
+            <a:ext cx="265671" cy="1822622"/>
+            <a:chOff x="3231290" y="2990335"/>
+            <a:chExt cx="265671" cy="1822622"/>
+          </a:xfrm>
+        </p:grpSpPr>
+        <p:cxnSp>
+          <p:nvCxnSpPr>
+            <p:cNvPr id="37" name="Straight Connector 36">
+              <a:extLst>
+                <a:ext uri="{FF2B5EF4-FFF2-40B4-BE49-F238E27FC236}">
+                  <a16:creationId xmlns:a16="http://schemas.microsoft.com/office/drawing/2014/main" id="{06E74711-9EF1-3A85-4370-27689C107788}"/>
+                </a:ext>
+              </a:extLst>
+            </p:cNvPr>
+            <p:cNvCxnSpPr>
+              <a:cxnSpLocks/>
+            </p:cNvCxnSpPr>
+            <p:nvPr/>
+          </p:nvCxnSpPr>
+          <p:spPr>
+            <a:xfrm>
+              <a:off x="3361038" y="2990335"/>
+              <a:ext cx="0" cy="1822622"/>
+            </a:xfrm>
+            <a:prstGeom prst="line">
+              <a:avLst/>
+            </a:prstGeom>
+          </p:spPr>
+          <p:style>
+            <a:lnRef idx="2">
+              <a:schemeClr val="accent1"/>
+            </a:lnRef>
+            <a:fillRef idx="0">
+              <a:schemeClr val="accent1"/>
+            </a:fillRef>
+            <a:effectRef idx="1">
+              <a:schemeClr val="accent1"/>
+            </a:effectRef>
+            <a:fontRef idx="minor">
+              <a:schemeClr val="tx1"/>
+            </a:fontRef>
+          </p:style>
+        </p:cxnSp>
+        <p:sp>
+          <p:nvSpPr>
+            <p:cNvPr id="38" name="Rectangle 37">
+              <a:extLst>
+                <a:ext uri="{FF2B5EF4-FFF2-40B4-BE49-F238E27FC236}">
+                  <a16:creationId xmlns:a16="http://schemas.microsoft.com/office/drawing/2014/main" id="{4753CE6C-C200-CF7F-4182-73229C737D31}"/>
+                </a:ext>
+              </a:extLst>
+            </p:cNvPr>
+            <p:cNvSpPr/>
+            <p:nvPr/>
+          </p:nvSpPr>
+          <p:spPr>
+            <a:xfrm>
+              <a:off x="3231290" y="3472250"/>
+              <a:ext cx="265671" cy="951470"/>
+            </a:xfrm>
+            <a:prstGeom prst="rect">
+              <a:avLst/>
+            </a:prstGeom>
+            <a:solidFill>
+              <a:srgbClr val="FF0000"/>
+            </a:solidFill>
+          </p:spPr>
+          <p:style>
+            <a:lnRef idx="2">
+              <a:schemeClr val="accent1">
+                <a:shade val="15000"/>
+              </a:schemeClr>
+            </a:lnRef>
+            <a:fillRef idx="1">
+              <a:schemeClr val="accent1"/>
+            </a:fillRef>
+            <a:effectRef idx="0">
+              <a:schemeClr val="accent1"/>
+            </a:effectRef>
+            <a:fontRef idx="minor">
+              <a:schemeClr val="lt1"/>
+            </a:fontRef>
+          </p:style>
+          <p:txBody>
+            <a:bodyPr rtlCol="0" anchor="ctr"/>
+            <a:lstStyle/>
+            <a:p>
+              <a:pPr algn="ctr"/>
+              <a:endParaRPr lang="en-GB"/>
+            </a:p>
+          </p:txBody>
+        </p:sp>
+      </p:grpSp>
+      <p:grpSp>
+        <p:nvGrpSpPr>
+          <p:cNvPr id="39" name="Group 38">
+            <a:extLst>
+              <a:ext uri="{FF2B5EF4-FFF2-40B4-BE49-F238E27FC236}">
+                <a16:creationId xmlns:a16="http://schemas.microsoft.com/office/drawing/2014/main" id="{A9C390CD-2B0E-06C4-E6AF-9323D37F4CD1}"/>
+              </a:ext>
+            </a:extLst>
+          </p:cNvPr>
+          <p:cNvGrpSpPr/>
+          <p:nvPr/>
+        </p:nvGrpSpPr>
+        <p:grpSpPr>
+          <a:xfrm>
+            <a:off x="3289645" y="2350564"/>
+            <a:ext cx="265671" cy="1822622"/>
+            <a:chOff x="3231290" y="2990335"/>
+            <a:chExt cx="265671" cy="1822622"/>
+          </a:xfrm>
+        </p:grpSpPr>
+        <p:cxnSp>
+          <p:nvCxnSpPr>
+            <p:cNvPr id="40" name="Straight Connector 39">
+              <a:extLst>
+                <a:ext uri="{FF2B5EF4-FFF2-40B4-BE49-F238E27FC236}">
+                  <a16:creationId xmlns:a16="http://schemas.microsoft.com/office/drawing/2014/main" id="{9FB39181-9500-3F4C-B045-5D402258E15D}"/>
+                </a:ext>
+              </a:extLst>
+            </p:cNvPr>
+            <p:cNvCxnSpPr>
+              <a:cxnSpLocks/>
+            </p:cNvCxnSpPr>
+            <p:nvPr/>
+          </p:nvCxnSpPr>
+          <p:spPr>
+            <a:xfrm>
+              <a:off x="3361038" y="2990335"/>
+              <a:ext cx="0" cy="1822622"/>
+            </a:xfrm>
+            <a:prstGeom prst="line">
+              <a:avLst/>
+            </a:prstGeom>
+          </p:spPr>
+          <p:style>
+            <a:lnRef idx="2">
+              <a:schemeClr val="accent1"/>
+            </a:lnRef>
+            <a:fillRef idx="0">
+              <a:schemeClr val="accent1"/>
+            </a:fillRef>
+            <a:effectRef idx="1">
+              <a:schemeClr val="accent1"/>
+            </a:effectRef>
+            <a:fontRef idx="minor">
+              <a:schemeClr val="tx1"/>
+            </a:fontRef>
+          </p:style>
+        </p:cxnSp>
+        <p:sp>
+          <p:nvSpPr>
+            <p:cNvPr id="41" name="Rectangle 40">
+              <a:extLst>
+                <a:ext uri="{FF2B5EF4-FFF2-40B4-BE49-F238E27FC236}">
+                  <a16:creationId xmlns:a16="http://schemas.microsoft.com/office/drawing/2014/main" id="{C8DCD3A1-AFBB-89BB-560B-40E061072B49}"/>
+                </a:ext>
+              </a:extLst>
+            </p:cNvPr>
+            <p:cNvSpPr/>
+            <p:nvPr/>
+          </p:nvSpPr>
+          <p:spPr>
+            <a:xfrm>
+              <a:off x="3231290" y="3472250"/>
+              <a:ext cx="265671" cy="951470"/>
+            </a:xfrm>
+            <a:prstGeom prst="rect">
+              <a:avLst/>
+            </a:prstGeom>
+            <a:solidFill>
+              <a:srgbClr val="FF0000"/>
+            </a:solidFill>
+          </p:spPr>
+          <p:style>
+            <a:lnRef idx="2">
+              <a:schemeClr val="accent1">
+                <a:shade val="15000"/>
+              </a:schemeClr>
+            </a:lnRef>
+            <a:fillRef idx="1">
+              <a:schemeClr val="accent1"/>
+            </a:fillRef>
+            <a:effectRef idx="0">
+              <a:schemeClr val="accent1"/>
+            </a:effectRef>
+            <a:fontRef idx="minor">
+              <a:schemeClr val="lt1"/>
+            </a:fontRef>
+          </p:style>
+          <p:txBody>
+            <a:bodyPr rtlCol="0" anchor="ctr"/>
+            <a:lstStyle/>
+            <a:p>
+              <a:pPr algn="ctr"/>
+              <a:endParaRPr lang="en-GB"/>
+            </a:p>
+          </p:txBody>
+        </p:sp>
+      </p:grpSp>
+      <p:cxnSp>
+        <p:nvCxnSpPr>
+          <p:cNvPr id="42" name="Straight Connector 41">
+            <a:extLst>
+              <a:ext uri="{FF2B5EF4-FFF2-40B4-BE49-F238E27FC236}">
+                <a16:creationId xmlns:a16="http://schemas.microsoft.com/office/drawing/2014/main" id="{5FF9406B-6B2A-B47F-F35E-4767B4ADD102}"/>
+              </a:ext>
+            </a:extLst>
+          </p:cNvPr>
+          <p:cNvCxnSpPr>
+            <a:cxnSpLocks/>
+          </p:cNvCxnSpPr>
+          <p:nvPr/>
+        </p:nvCxnSpPr>
+        <p:spPr>
+          <a:xfrm>
+            <a:off x="1554368" y="1353038"/>
+            <a:ext cx="4762906" cy="3628239"/>
+          </a:xfrm>
+          <a:prstGeom prst="line">
+            <a:avLst/>
+          </a:prstGeom>
+        </p:spPr>
+        <p:style>
+          <a:lnRef idx="2">
+            <a:schemeClr val="accent1"/>
+          </a:lnRef>
+          <a:fillRef idx="0">
+            <a:schemeClr val="accent1"/>
+          </a:fillRef>
+          <a:effectRef idx="1">
+            <a:schemeClr val="accent1"/>
+          </a:effectRef>
+          <a:fontRef idx="minor">
+            <a:schemeClr val="tx1"/>
+          </a:fontRef>
+        </p:style>
+      </p:cxnSp>
+      <p:grpSp>
+        <p:nvGrpSpPr>
+          <p:cNvPr id="45" name="Group 44">
+            <a:extLst>
+              <a:ext uri="{FF2B5EF4-FFF2-40B4-BE49-F238E27FC236}">
+                <a16:creationId xmlns:a16="http://schemas.microsoft.com/office/drawing/2014/main" id="{21FE05DA-C4EF-054D-8E61-78C783BAFC4C}"/>
+              </a:ext>
+            </a:extLst>
+          </p:cNvPr>
+          <p:cNvGrpSpPr/>
+          <p:nvPr/>
+        </p:nvGrpSpPr>
+        <p:grpSpPr>
+          <a:xfrm>
+            <a:off x="3767622" y="2779960"/>
+            <a:ext cx="265671" cy="1822622"/>
+            <a:chOff x="3231290" y="2990335"/>
+            <a:chExt cx="265671" cy="1822622"/>
+          </a:xfrm>
+        </p:grpSpPr>
+        <p:cxnSp>
+          <p:nvCxnSpPr>
+            <p:cNvPr id="46" name="Straight Connector 45">
+              <a:extLst>
+                <a:ext uri="{FF2B5EF4-FFF2-40B4-BE49-F238E27FC236}">
+                  <a16:creationId xmlns:a16="http://schemas.microsoft.com/office/drawing/2014/main" id="{99D8DF0D-DC63-A7BF-B2AE-77557FC7DB91}"/>
+                </a:ext>
+              </a:extLst>
+            </p:cNvPr>
+            <p:cNvCxnSpPr>
+              <a:cxnSpLocks/>
+            </p:cNvCxnSpPr>
+            <p:nvPr/>
+          </p:nvCxnSpPr>
+          <p:spPr>
+            <a:xfrm>
+              <a:off x="3361038" y="2990335"/>
+              <a:ext cx="0" cy="1822622"/>
+            </a:xfrm>
+            <a:prstGeom prst="line">
+              <a:avLst/>
+            </a:prstGeom>
+          </p:spPr>
+          <p:style>
+            <a:lnRef idx="2">
+              <a:schemeClr val="accent1"/>
+            </a:lnRef>
+            <a:fillRef idx="0">
+              <a:schemeClr val="accent1"/>
+            </a:fillRef>
+            <a:effectRef idx="1">
+              <a:schemeClr val="accent1"/>
+            </a:effectRef>
+            <a:fontRef idx="minor">
+              <a:schemeClr val="tx1"/>
+            </a:fontRef>
+          </p:style>
+        </p:cxnSp>
+        <p:sp>
+          <p:nvSpPr>
+            <p:cNvPr id="47" name="Rectangle 46">
+              <a:extLst>
+                <a:ext uri="{FF2B5EF4-FFF2-40B4-BE49-F238E27FC236}">
+                  <a16:creationId xmlns:a16="http://schemas.microsoft.com/office/drawing/2014/main" id="{980C5F5F-303A-46EF-51F6-50FB0F431D44}"/>
+                </a:ext>
+              </a:extLst>
+            </p:cNvPr>
+            <p:cNvSpPr/>
+            <p:nvPr/>
+          </p:nvSpPr>
+          <p:spPr>
+            <a:xfrm>
+              <a:off x="3231290" y="3472250"/>
+              <a:ext cx="265671" cy="951470"/>
+            </a:xfrm>
+            <a:prstGeom prst="rect">
+              <a:avLst/>
+            </a:prstGeom>
+            <a:solidFill>
+              <a:srgbClr val="FF0000"/>
+            </a:solidFill>
+          </p:spPr>
+          <p:style>
+            <a:lnRef idx="2">
+              <a:schemeClr val="accent1">
+                <a:shade val="15000"/>
+              </a:schemeClr>
+            </a:lnRef>
+            <a:fillRef idx="1">
+              <a:schemeClr val="accent1"/>
+            </a:fillRef>
+            <a:effectRef idx="0">
+              <a:schemeClr val="accent1"/>
+            </a:effectRef>
+            <a:fontRef idx="minor">
+              <a:schemeClr val="lt1"/>
+            </a:fontRef>
+          </p:style>
+          <p:txBody>
+            <a:bodyPr rtlCol="0" anchor="ctr"/>
+            <a:lstStyle/>
+            <a:p>
+              <a:pPr algn="ctr"/>
+              <a:endParaRPr lang="en-GB"/>
+            </a:p>
+          </p:txBody>
+        </p:sp>
+      </p:grpSp>
+      <p:grpSp>
+        <p:nvGrpSpPr>
+          <p:cNvPr id="48" name="Group 47">
+            <a:extLst>
+              <a:ext uri="{FF2B5EF4-FFF2-40B4-BE49-F238E27FC236}">
+                <a16:creationId xmlns:a16="http://schemas.microsoft.com/office/drawing/2014/main" id="{5E7909E4-55D5-53E8-9F3C-CF8BE21C3CCC}"/>
+              </a:ext>
+            </a:extLst>
+          </p:cNvPr>
+          <p:cNvGrpSpPr/>
+          <p:nvPr/>
+        </p:nvGrpSpPr>
+        <p:grpSpPr>
+          <a:xfrm>
+            <a:off x="4178081" y="3593361"/>
+            <a:ext cx="265671" cy="1822622"/>
+            <a:chOff x="3231290" y="2990335"/>
+            <a:chExt cx="265671" cy="1822622"/>
+          </a:xfrm>
+        </p:grpSpPr>
+        <p:cxnSp>
+          <p:nvCxnSpPr>
+            <p:cNvPr id="49" name="Straight Connector 48">
+              <a:extLst>
+                <a:ext uri="{FF2B5EF4-FFF2-40B4-BE49-F238E27FC236}">
+                  <a16:creationId xmlns:a16="http://schemas.microsoft.com/office/drawing/2014/main" id="{3A0B1B1D-72AE-8CAD-3D4C-5E7E13F1DCAC}"/>
+                </a:ext>
+              </a:extLst>
+            </p:cNvPr>
+            <p:cNvCxnSpPr>
+              <a:cxnSpLocks/>
+            </p:cNvCxnSpPr>
+            <p:nvPr/>
+          </p:nvCxnSpPr>
+          <p:spPr>
+            <a:xfrm>
+              <a:off x="3361038" y="2990335"/>
+              <a:ext cx="0" cy="1822622"/>
+            </a:xfrm>
+            <a:prstGeom prst="line">
+              <a:avLst/>
+            </a:prstGeom>
+          </p:spPr>
+          <p:style>
+            <a:lnRef idx="2">
+              <a:schemeClr val="accent1"/>
+            </a:lnRef>
+            <a:fillRef idx="0">
+              <a:schemeClr val="accent1"/>
+            </a:fillRef>
+            <a:effectRef idx="1">
+              <a:schemeClr val="accent1"/>
+            </a:effectRef>
+            <a:fontRef idx="minor">
+              <a:schemeClr val="tx1"/>
+            </a:fontRef>
+          </p:style>
+        </p:cxnSp>
+        <p:sp>
+          <p:nvSpPr>
+            <p:cNvPr id="50" name="Rectangle 49">
+              <a:extLst>
+                <a:ext uri="{FF2B5EF4-FFF2-40B4-BE49-F238E27FC236}">
+                  <a16:creationId xmlns:a16="http://schemas.microsoft.com/office/drawing/2014/main" id="{7A278773-BB80-43DC-9C17-C7A7B9F5335E}"/>
+                </a:ext>
+              </a:extLst>
+            </p:cNvPr>
+            <p:cNvSpPr/>
+            <p:nvPr/>
+          </p:nvSpPr>
+          <p:spPr>
+            <a:xfrm>
+              <a:off x="3231290" y="3472250"/>
+              <a:ext cx="265671" cy="951470"/>
+            </a:xfrm>
+            <a:prstGeom prst="rect">
+              <a:avLst/>
+            </a:prstGeom>
+            <a:solidFill>
+              <a:srgbClr val="FF0000"/>
+            </a:solidFill>
+          </p:spPr>
+          <p:style>
+            <a:lnRef idx="2">
+              <a:schemeClr val="accent1">
+                <a:shade val="15000"/>
+              </a:schemeClr>
+            </a:lnRef>
+            <a:fillRef idx="1">
+              <a:schemeClr val="accent1"/>
+            </a:fillRef>
+            <a:effectRef idx="0">
+              <a:schemeClr val="accent1"/>
+            </a:effectRef>
+            <a:fontRef idx="minor">
+              <a:schemeClr val="lt1"/>
+            </a:fontRef>
+          </p:style>
+          <p:txBody>
+            <a:bodyPr rtlCol="0" anchor="ctr"/>
+            <a:lstStyle/>
+            <a:p>
+              <a:pPr algn="ctr"/>
+              <a:endParaRPr lang="en-GB"/>
+            </a:p>
+          </p:txBody>
+        </p:sp>
+      </p:grpSp>
+      <p:grpSp>
+        <p:nvGrpSpPr>
+          <p:cNvPr id="51" name="Group 50">
+            <a:extLst>
+              <a:ext uri="{FF2B5EF4-FFF2-40B4-BE49-F238E27FC236}">
+                <a16:creationId xmlns:a16="http://schemas.microsoft.com/office/drawing/2014/main" id="{54A626DE-2B23-3068-1955-7CC200FE7478}"/>
+              </a:ext>
+            </a:extLst>
+          </p:cNvPr>
+          <p:cNvGrpSpPr/>
+          <p:nvPr/>
+        </p:nvGrpSpPr>
+        <p:grpSpPr>
+          <a:xfrm>
+            <a:off x="4968919" y="3597556"/>
+            <a:ext cx="265671" cy="1822622"/>
+            <a:chOff x="3231290" y="2990335"/>
+            <a:chExt cx="265671" cy="1822622"/>
+          </a:xfrm>
+        </p:grpSpPr>
+        <p:cxnSp>
+          <p:nvCxnSpPr>
+            <p:cNvPr id="52" name="Straight Connector 51">
+              <a:extLst>
+                <a:ext uri="{FF2B5EF4-FFF2-40B4-BE49-F238E27FC236}">
+                  <a16:creationId xmlns:a16="http://schemas.microsoft.com/office/drawing/2014/main" id="{A6E384D7-5302-1C3E-15F4-A0C5DE668AD4}"/>
+                </a:ext>
+              </a:extLst>
+            </p:cNvPr>
+            <p:cNvCxnSpPr>
+              <a:cxnSpLocks/>
+            </p:cNvCxnSpPr>
+            <p:nvPr/>
+          </p:nvCxnSpPr>
+          <p:spPr>
+            <a:xfrm>
+              <a:off x="3361038" y="2990335"/>
+              <a:ext cx="0" cy="1822622"/>
+            </a:xfrm>
+            <a:prstGeom prst="line">
+              <a:avLst/>
+            </a:prstGeom>
+          </p:spPr>
+          <p:style>
+            <a:lnRef idx="2">
+              <a:schemeClr val="accent1"/>
+            </a:lnRef>
+            <a:fillRef idx="0">
+              <a:schemeClr val="accent1"/>
+            </a:fillRef>
+            <a:effectRef idx="1">
+              <a:schemeClr val="accent1"/>
+            </a:effectRef>
+            <a:fontRef idx="minor">
+              <a:schemeClr val="tx1"/>
+            </a:fontRef>
+          </p:style>
+        </p:cxnSp>
+        <p:sp>
+          <p:nvSpPr>
+            <p:cNvPr id="53" name="Rectangle 52">
+              <a:extLst>
+                <a:ext uri="{FF2B5EF4-FFF2-40B4-BE49-F238E27FC236}">
+                  <a16:creationId xmlns:a16="http://schemas.microsoft.com/office/drawing/2014/main" id="{14E2BDC5-7E34-1E78-A51E-AC2A0069EFDD}"/>
+                </a:ext>
+              </a:extLst>
+            </p:cNvPr>
+            <p:cNvSpPr/>
+            <p:nvPr/>
+          </p:nvSpPr>
+          <p:spPr>
+            <a:xfrm>
+              <a:off x="3231290" y="3472250"/>
+              <a:ext cx="265671" cy="951470"/>
+            </a:xfrm>
+            <a:prstGeom prst="rect">
+              <a:avLst/>
+            </a:prstGeom>
+            <a:solidFill>
+              <a:srgbClr val="FF0000"/>
+            </a:solidFill>
+          </p:spPr>
+          <p:style>
+            <a:lnRef idx="2">
+              <a:schemeClr val="accent1">
+                <a:shade val="15000"/>
+              </a:schemeClr>
+            </a:lnRef>
+            <a:fillRef idx="1">
+              <a:schemeClr val="accent1"/>
+            </a:fillRef>
+            <a:effectRef idx="0">
+              <a:schemeClr val="accent1"/>
+            </a:effectRef>
+            <a:fontRef idx="minor">
+              <a:schemeClr val="lt1"/>
+            </a:fontRef>
+          </p:style>
+          <p:txBody>
+            <a:bodyPr rtlCol="0" anchor="ctr"/>
+            <a:lstStyle/>
+            <a:p>
+              <a:pPr algn="ctr"/>
+              <a:endParaRPr lang="en-GB"/>
+            </a:p>
+          </p:txBody>
+        </p:sp>
+      </p:grpSp>
+    </p:spTree>
+    <p:extLst>
+      <p:ext uri="{BB962C8B-B14F-4D97-AF65-F5344CB8AC3E}">
+        <p14:creationId xmlns:p14="http://schemas.microsoft.com/office/powerpoint/2010/main" val="1998862133"/>
+      </p:ext>
+    </p:extLst>
+  </p:cSld>
+  <p:clrMapOvr>
+    <a:masterClrMapping/>
+  </p:clrMapOvr>
+</p:sld>
+</file>
+
+<file path=ppt/slides/slide4.xml><?xml version="1.0" encoding="utf-8"?>
 <p:sld xmlns:a="http://schemas.openxmlformats.org/drawingml/2006/main" xmlns:r="http://schemas.openxmlformats.org/officeDocument/2006/relationships" xmlns:p="http://schemas.openxmlformats.org/presentationml/2006/main">
   <p:cSld>
     <p:spTree>
@@ -8195,7 +10817,7 @@
 </p:sld>
 </file>
 
-<file path=ppt/slides/slide4.xml><?xml version="1.0" encoding="utf-8"?>
+<file path=ppt/slides/slide5.xml><?xml version="1.0" encoding="utf-8"?>
 <p:sld xmlns:a="http://schemas.openxmlformats.org/drawingml/2006/main" xmlns:r="http://schemas.openxmlformats.org/officeDocument/2006/relationships" xmlns:p="http://schemas.openxmlformats.org/presentationml/2006/main">
   <p:cSld>
     <p:spTree>
@@ -11037,7 +13659,7 @@
 </p:sld>
 </file>
 
-<file path=ppt/slides/slide5.xml><?xml version="1.0" encoding="utf-8"?>
+<file path=ppt/slides/slide6.xml><?xml version="1.0" encoding="utf-8"?>
 <p:sld xmlns:a="http://schemas.openxmlformats.org/drawingml/2006/main" xmlns:r="http://schemas.openxmlformats.org/officeDocument/2006/relationships" xmlns:p="http://schemas.openxmlformats.org/presentationml/2006/main">
   <p:cSld>
     <p:spTree>
@@ -11577,206 +14199,6 @@
     <p:extLst>
       <p:ext uri="{BB962C8B-B14F-4D97-AF65-F5344CB8AC3E}">
         <p14:creationId xmlns:p14="http://schemas.microsoft.com/office/powerpoint/2010/main" val="2848408170"/>
-      </p:ext>
-    </p:extLst>
-  </p:cSld>
-  <p:clrMapOvr>
-    <a:masterClrMapping/>
-  </p:clrMapOvr>
-</p:sld>
-</file>
-
-<file path=ppt/slides/slide6.xml><?xml version="1.0" encoding="utf-8"?>
-<p:sld xmlns:a="http://schemas.openxmlformats.org/drawingml/2006/main" xmlns:r="http://schemas.openxmlformats.org/officeDocument/2006/relationships" xmlns:p="http://schemas.openxmlformats.org/presentationml/2006/main">
-  <p:cSld>
-    <p:spTree>
-      <p:nvGrpSpPr>
-        <p:cNvPr id="1" name=""/>
-        <p:cNvGrpSpPr/>
-        <p:nvPr/>
-      </p:nvGrpSpPr>
-      <p:grpSpPr>
-        <a:xfrm>
-          <a:off x="0" y="0"/>
-          <a:ext cx="0" cy="0"/>
-          <a:chOff x="0" y="0"/>
-          <a:chExt cx="0" cy="0"/>
-        </a:xfrm>
-      </p:grpSpPr>
-      <p:pic>
-        <p:nvPicPr>
-          <p:cNvPr id="7" name="Picture 6">
-            <a:extLst>
-              <a:ext uri="{FF2B5EF4-FFF2-40B4-BE49-F238E27FC236}">
-                <a16:creationId xmlns:a16="http://schemas.microsoft.com/office/drawing/2014/main" id="{63D2CB16-81AD-523B-442E-0149C3A914B0}"/>
-              </a:ext>
-            </a:extLst>
-          </p:cNvPr>
-          <p:cNvPicPr>
-            <a:picLocks noChangeAspect="1"/>
-          </p:cNvPicPr>
-          <p:nvPr/>
-        </p:nvPicPr>
-        <p:blipFill>
-          <a:blip r:embed="rId2"/>
-          <a:stretch>
-            <a:fillRect/>
-          </a:stretch>
-        </p:blipFill>
-        <p:spPr>
-          <a:xfrm>
-            <a:off x="1063366" y="1590580"/>
-            <a:ext cx="10065267" cy="3676839"/>
-          </a:xfrm>
-          <a:prstGeom prst="rect">
-            <a:avLst/>
-          </a:prstGeom>
-        </p:spPr>
-      </p:pic>
-      <p:sp>
-        <p:nvSpPr>
-          <p:cNvPr id="8" name="Rectangle 7">
-            <a:extLst>
-              <a:ext uri="{FF2B5EF4-FFF2-40B4-BE49-F238E27FC236}">
-                <a16:creationId xmlns:a16="http://schemas.microsoft.com/office/drawing/2014/main" id="{01902D24-DD4D-E215-B065-50A7223AC561}"/>
-              </a:ext>
-            </a:extLst>
-          </p:cNvPr>
-          <p:cNvSpPr/>
-          <p:nvPr/>
-        </p:nvSpPr>
-        <p:spPr>
-          <a:xfrm>
-            <a:off x="4563035" y="2247449"/>
-            <a:ext cx="2294965" cy="643669"/>
-          </a:xfrm>
-          <a:prstGeom prst="rect">
-            <a:avLst/>
-          </a:prstGeom>
-          <a:solidFill>
-            <a:srgbClr val="FFFF00">
-              <a:alpha val="22000"/>
-            </a:srgbClr>
-          </a:solidFill>
-          <a:ln>
-            <a:noFill/>
-          </a:ln>
-        </p:spPr>
-        <p:style>
-          <a:lnRef idx="2">
-            <a:schemeClr val="accent1">
-              <a:shade val="15000"/>
-            </a:schemeClr>
-          </a:lnRef>
-          <a:fillRef idx="1">
-            <a:schemeClr val="accent1"/>
-          </a:fillRef>
-          <a:effectRef idx="0">
-            <a:schemeClr val="accent1"/>
-          </a:effectRef>
-          <a:fontRef idx="minor">
-            <a:schemeClr val="lt1"/>
-          </a:fontRef>
-        </p:style>
-        <p:txBody>
-          <a:bodyPr rtlCol="0" anchor="ctr"/>
-          <a:lstStyle/>
-          <a:p>
-            <a:pPr algn="ctr"/>
-            <a:endParaRPr lang="en-GB"/>
-          </a:p>
-        </p:txBody>
-      </p:sp>
-      <p:cxnSp>
-        <p:nvCxnSpPr>
-          <p:cNvPr id="9" name="Straight Connector 8">
-            <a:extLst>
-              <a:ext uri="{FF2B5EF4-FFF2-40B4-BE49-F238E27FC236}">
-                <a16:creationId xmlns:a16="http://schemas.microsoft.com/office/drawing/2014/main" id="{E602F0FA-5980-F2B3-1B31-DE520EABED2B}"/>
-              </a:ext>
-            </a:extLst>
-          </p:cNvPr>
-          <p:cNvCxnSpPr>
-            <a:cxnSpLocks/>
-          </p:cNvCxnSpPr>
-          <p:nvPr/>
-        </p:nvCxnSpPr>
-        <p:spPr>
-          <a:xfrm>
-            <a:off x="5558118" y="2265508"/>
-            <a:ext cx="848820" cy="0"/>
-          </a:xfrm>
-          <a:prstGeom prst="line">
-            <a:avLst/>
-          </a:prstGeom>
-          <a:ln>
-            <a:solidFill>
-              <a:srgbClr val="FFFF00"/>
-            </a:solidFill>
-          </a:ln>
-        </p:spPr>
-        <p:style>
-          <a:lnRef idx="2">
-            <a:schemeClr val="accent1"/>
-          </a:lnRef>
-          <a:fillRef idx="0">
-            <a:schemeClr val="accent1"/>
-          </a:fillRef>
-          <a:effectRef idx="1">
-            <a:schemeClr val="accent1"/>
-          </a:effectRef>
-          <a:fontRef idx="minor">
-            <a:schemeClr val="tx1"/>
-          </a:fontRef>
-        </p:style>
-      </p:cxnSp>
-      <p:cxnSp>
-        <p:nvCxnSpPr>
-          <p:cNvPr id="11" name="Straight Connector 10">
-            <a:extLst>
-              <a:ext uri="{FF2B5EF4-FFF2-40B4-BE49-F238E27FC236}">
-                <a16:creationId xmlns:a16="http://schemas.microsoft.com/office/drawing/2014/main" id="{78110B7E-6494-2FCC-660F-1953077BDC36}"/>
-              </a:ext>
-            </a:extLst>
-          </p:cNvPr>
-          <p:cNvCxnSpPr>
-            <a:cxnSpLocks/>
-          </p:cNvCxnSpPr>
-          <p:nvPr/>
-        </p:nvCxnSpPr>
-        <p:spPr>
-          <a:xfrm>
-            <a:off x="5571565" y="2884073"/>
-            <a:ext cx="848820" cy="0"/>
-          </a:xfrm>
-          <a:prstGeom prst="line">
-            <a:avLst/>
-          </a:prstGeom>
-          <a:ln>
-            <a:solidFill>
-              <a:srgbClr val="FFFF00"/>
-            </a:solidFill>
-          </a:ln>
-        </p:spPr>
-        <p:style>
-          <a:lnRef idx="2">
-            <a:schemeClr val="accent1"/>
-          </a:lnRef>
-          <a:fillRef idx="0">
-            <a:schemeClr val="accent1"/>
-          </a:fillRef>
-          <a:effectRef idx="1">
-            <a:schemeClr val="accent1"/>
-          </a:effectRef>
-          <a:fontRef idx="minor">
-            <a:schemeClr val="tx1"/>
-          </a:fontRef>
-        </p:style>
-      </p:cxnSp>
-    </p:spTree>
-    <p:extLst>
-      <p:ext uri="{BB962C8B-B14F-4D97-AF65-F5344CB8AC3E}">
-        <p14:creationId xmlns:p14="http://schemas.microsoft.com/office/powerpoint/2010/main" val="347023000"/>
       </p:ext>
     </p:extLst>
   </p:cSld>
@@ -11805,10 +14227,10 @@
       </p:grpSpPr>
       <p:pic>
         <p:nvPicPr>
-          <p:cNvPr id="5" name="Picture 4">
-            <a:extLst>
-              <a:ext uri="{FF2B5EF4-FFF2-40B4-BE49-F238E27FC236}">
-                <a16:creationId xmlns:a16="http://schemas.microsoft.com/office/drawing/2014/main" id="{A62C7047-9E9E-A076-652A-3C1A88E5F5F9}"/>
+          <p:cNvPr id="7" name="Picture 6">
+            <a:extLst>
+              <a:ext uri="{FF2B5EF4-FFF2-40B4-BE49-F238E27FC236}">
+                <a16:creationId xmlns:a16="http://schemas.microsoft.com/office/drawing/2014/main" id="{63D2CB16-81AD-523B-442E-0149C3A914B0}"/>
               </a:ext>
             </a:extLst>
           </p:cNvPr>
@@ -11825,20 +14247,74 @@
         </p:blipFill>
         <p:spPr>
           <a:xfrm>
-            <a:off x="806178" y="1282589"/>
-            <a:ext cx="10579644" cy="4292821"/>
+            <a:off x="1063366" y="1590580"/>
+            <a:ext cx="10065267" cy="3676839"/>
           </a:xfrm>
           <a:prstGeom prst="rect">
             <a:avLst/>
           </a:prstGeom>
         </p:spPr>
       </p:pic>
+      <p:sp>
+        <p:nvSpPr>
+          <p:cNvPr id="8" name="Rectangle 7">
+            <a:extLst>
+              <a:ext uri="{FF2B5EF4-FFF2-40B4-BE49-F238E27FC236}">
+                <a16:creationId xmlns:a16="http://schemas.microsoft.com/office/drawing/2014/main" id="{01902D24-DD4D-E215-B065-50A7223AC561}"/>
+              </a:ext>
+            </a:extLst>
+          </p:cNvPr>
+          <p:cNvSpPr/>
+          <p:nvPr/>
+        </p:nvSpPr>
+        <p:spPr>
+          <a:xfrm>
+            <a:off x="4563035" y="2247449"/>
+            <a:ext cx="2294965" cy="643669"/>
+          </a:xfrm>
+          <a:prstGeom prst="rect">
+            <a:avLst/>
+          </a:prstGeom>
+          <a:solidFill>
+            <a:srgbClr val="FFFF00">
+              <a:alpha val="22000"/>
+            </a:srgbClr>
+          </a:solidFill>
+          <a:ln>
+            <a:noFill/>
+          </a:ln>
+        </p:spPr>
+        <p:style>
+          <a:lnRef idx="2">
+            <a:schemeClr val="accent1">
+              <a:shade val="15000"/>
+            </a:schemeClr>
+          </a:lnRef>
+          <a:fillRef idx="1">
+            <a:schemeClr val="accent1"/>
+          </a:fillRef>
+          <a:effectRef idx="0">
+            <a:schemeClr val="accent1"/>
+          </a:effectRef>
+          <a:fontRef idx="minor">
+            <a:schemeClr val="lt1"/>
+          </a:fontRef>
+        </p:style>
+        <p:txBody>
+          <a:bodyPr rtlCol="0" anchor="ctr"/>
+          <a:lstStyle/>
+          <a:p>
+            <a:pPr algn="ctr"/>
+            <a:endParaRPr lang="en-GB"/>
+          </a:p>
+        </p:txBody>
+      </p:sp>
       <p:cxnSp>
         <p:nvCxnSpPr>
-          <p:cNvPr id="7" name="Straight Connector 6">
-            <a:extLst>
-              <a:ext uri="{FF2B5EF4-FFF2-40B4-BE49-F238E27FC236}">
-                <a16:creationId xmlns:a16="http://schemas.microsoft.com/office/drawing/2014/main" id="{0AABEBD6-264F-211D-CCD8-6A5B4CC8EDE7}"/>
+          <p:cNvPr id="9" name="Straight Connector 8">
+            <a:extLst>
+              <a:ext uri="{FF2B5EF4-FFF2-40B4-BE49-F238E27FC236}">
+                <a16:creationId xmlns:a16="http://schemas.microsoft.com/office/drawing/2014/main" id="{E602F0FA-5980-F2B3-1B31-DE520EABED2B}"/>
               </a:ext>
             </a:extLst>
           </p:cNvPr>
@@ -11849,8 +14325,8 @@
         </p:nvCxnSpPr>
         <p:spPr>
           <a:xfrm>
-            <a:off x="2843349" y="4375928"/>
-            <a:ext cx="4337627" cy="0"/>
+            <a:off x="5558118" y="2265508"/>
+            <a:ext cx="848820" cy="0"/>
           </a:xfrm>
           <a:prstGeom prst="line">
             <a:avLst/>
@@ -11878,10 +14354,10 @@
       </p:cxnSp>
       <p:cxnSp>
         <p:nvCxnSpPr>
-          <p:cNvPr id="10" name="Straight Connector 9">
-            <a:extLst>
-              <a:ext uri="{FF2B5EF4-FFF2-40B4-BE49-F238E27FC236}">
-                <a16:creationId xmlns:a16="http://schemas.microsoft.com/office/drawing/2014/main" id="{A8DE2F7B-96F3-2DD5-D289-05F9EB8BF08B}"/>
+          <p:cNvPr id="11" name="Straight Connector 10">
+            <a:extLst>
+              <a:ext uri="{FF2B5EF4-FFF2-40B4-BE49-F238E27FC236}">
+                <a16:creationId xmlns:a16="http://schemas.microsoft.com/office/drawing/2014/main" id="{78110B7E-6494-2FCC-660F-1953077BDC36}"/>
               </a:ext>
             </a:extLst>
           </p:cNvPr>
@@ -11892,8 +14368,8 @@
         </p:nvCxnSpPr>
         <p:spPr>
           <a:xfrm>
-            <a:off x="2873829" y="3428999"/>
-            <a:ext cx="4336509" cy="0"/>
+            <a:off x="5571565" y="2884073"/>
+            <a:ext cx="848820" cy="0"/>
           </a:xfrm>
           <a:prstGeom prst="line">
             <a:avLst/>
@@ -11919,204 +14395,10 @@
           </a:fontRef>
         </p:style>
       </p:cxnSp>
-      <p:cxnSp>
-        <p:nvCxnSpPr>
-          <p:cNvPr id="13" name="Straight Connector 12">
-            <a:extLst>
-              <a:ext uri="{FF2B5EF4-FFF2-40B4-BE49-F238E27FC236}">
-                <a16:creationId xmlns:a16="http://schemas.microsoft.com/office/drawing/2014/main" id="{07A02780-C941-1BAF-5DE9-77B4A1236844}"/>
-              </a:ext>
-            </a:extLst>
-          </p:cNvPr>
-          <p:cNvCxnSpPr>
-            <a:cxnSpLocks/>
-          </p:cNvCxnSpPr>
-          <p:nvPr/>
-        </p:nvCxnSpPr>
-        <p:spPr>
-          <a:xfrm>
-            <a:off x="5564777" y="3771921"/>
-            <a:ext cx="5160548" cy="0"/>
-          </a:xfrm>
-          <a:prstGeom prst="line">
-            <a:avLst/>
-          </a:prstGeom>
-          <a:ln>
-            <a:solidFill>
-              <a:srgbClr val="FFFF00"/>
-            </a:solidFill>
-          </a:ln>
-        </p:spPr>
-        <p:style>
-          <a:lnRef idx="2">
-            <a:schemeClr val="accent1"/>
-          </a:lnRef>
-          <a:fillRef idx="0">
-            <a:schemeClr val="accent1"/>
-          </a:fillRef>
-          <a:effectRef idx="1">
-            <a:schemeClr val="accent1"/>
-          </a:effectRef>
-          <a:fontRef idx="minor">
-            <a:schemeClr val="tx1"/>
-          </a:fontRef>
-        </p:style>
-      </p:cxnSp>
-      <p:cxnSp>
-        <p:nvCxnSpPr>
-          <p:cNvPr id="16" name="Straight Connector 15">
-            <a:extLst>
-              <a:ext uri="{FF2B5EF4-FFF2-40B4-BE49-F238E27FC236}">
-                <a16:creationId xmlns:a16="http://schemas.microsoft.com/office/drawing/2014/main" id="{0E63DE3F-4B7E-97C3-505B-C6CD5DC1B342}"/>
-              </a:ext>
-            </a:extLst>
-          </p:cNvPr>
-          <p:cNvCxnSpPr>
-            <a:cxnSpLocks/>
-          </p:cNvCxnSpPr>
-          <p:nvPr/>
-        </p:nvCxnSpPr>
-        <p:spPr>
-          <a:xfrm>
-            <a:off x="5564777" y="2236736"/>
-            <a:ext cx="5160548" cy="0"/>
-          </a:xfrm>
-          <a:prstGeom prst="line">
-            <a:avLst/>
-          </a:prstGeom>
-          <a:ln>
-            <a:solidFill>
-              <a:srgbClr val="FFFF00"/>
-            </a:solidFill>
-          </a:ln>
-        </p:spPr>
-        <p:style>
-          <a:lnRef idx="2">
-            <a:schemeClr val="accent1"/>
-          </a:lnRef>
-          <a:fillRef idx="0">
-            <a:schemeClr val="accent1"/>
-          </a:fillRef>
-          <a:effectRef idx="1">
-            <a:schemeClr val="accent1"/>
-          </a:effectRef>
-          <a:fontRef idx="minor">
-            <a:schemeClr val="tx1"/>
-          </a:fontRef>
-        </p:style>
-      </p:cxnSp>
-      <p:sp>
-        <p:nvSpPr>
-          <p:cNvPr id="2" name="Rectangle 1">
-            <a:extLst>
-              <a:ext uri="{FF2B5EF4-FFF2-40B4-BE49-F238E27FC236}">
-                <a16:creationId xmlns:a16="http://schemas.microsoft.com/office/drawing/2014/main" id="{33F60A1D-CF9E-A9D8-ED31-489D7EC30975}"/>
-              </a:ext>
-            </a:extLst>
-          </p:cNvPr>
-          <p:cNvSpPr/>
-          <p:nvPr/>
-        </p:nvSpPr>
-        <p:spPr>
-          <a:xfrm>
-            <a:off x="2873828" y="3436217"/>
-            <a:ext cx="4336509" cy="946928"/>
-          </a:xfrm>
-          <a:prstGeom prst="rect">
-            <a:avLst/>
-          </a:prstGeom>
-          <a:solidFill>
-            <a:srgbClr val="FFFF00">
-              <a:alpha val="22000"/>
-            </a:srgbClr>
-          </a:solidFill>
-          <a:ln>
-            <a:noFill/>
-          </a:ln>
-        </p:spPr>
-        <p:style>
-          <a:lnRef idx="2">
-            <a:schemeClr val="accent1">
-              <a:shade val="15000"/>
-            </a:schemeClr>
-          </a:lnRef>
-          <a:fillRef idx="1">
-            <a:schemeClr val="accent1"/>
-          </a:fillRef>
-          <a:effectRef idx="0">
-            <a:schemeClr val="accent1"/>
-          </a:effectRef>
-          <a:fontRef idx="minor">
-            <a:schemeClr val="lt1"/>
-          </a:fontRef>
-        </p:style>
-        <p:txBody>
-          <a:bodyPr rtlCol="0" anchor="ctr"/>
-          <a:lstStyle/>
-          <a:p>
-            <a:pPr algn="ctr"/>
-            <a:endParaRPr lang="en-GB"/>
-          </a:p>
-        </p:txBody>
-      </p:sp>
-      <p:sp>
-        <p:nvSpPr>
-          <p:cNvPr id="6" name="Rectangle 5">
-            <a:extLst>
-              <a:ext uri="{FF2B5EF4-FFF2-40B4-BE49-F238E27FC236}">
-                <a16:creationId xmlns:a16="http://schemas.microsoft.com/office/drawing/2014/main" id="{AD4B1D9D-9969-EC49-7239-28253B002DC4}"/>
-              </a:ext>
-            </a:extLst>
-          </p:cNvPr>
-          <p:cNvSpPr/>
-          <p:nvPr/>
-        </p:nvSpPr>
-        <p:spPr>
-          <a:xfrm>
-            <a:off x="5564777" y="2229519"/>
-            <a:ext cx="5160548" cy="1540632"/>
-          </a:xfrm>
-          <a:prstGeom prst="rect">
-            <a:avLst/>
-          </a:prstGeom>
-          <a:solidFill>
-            <a:srgbClr val="FFFF00">
-              <a:alpha val="22000"/>
-            </a:srgbClr>
-          </a:solidFill>
-          <a:ln>
-            <a:noFill/>
-          </a:ln>
-        </p:spPr>
-        <p:style>
-          <a:lnRef idx="2">
-            <a:schemeClr val="accent1">
-              <a:shade val="15000"/>
-            </a:schemeClr>
-          </a:lnRef>
-          <a:fillRef idx="1">
-            <a:schemeClr val="accent1"/>
-          </a:fillRef>
-          <a:effectRef idx="0">
-            <a:schemeClr val="accent1"/>
-          </a:effectRef>
-          <a:fontRef idx="minor">
-            <a:schemeClr val="lt1"/>
-          </a:fontRef>
-        </p:style>
-        <p:txBody>
-          <a:bodyPr rtlCol="0" anchor="ctr"/>
-          <a:lstStyle/>
-          <a:p>
-            <a:pPr algn="ctr"/>
-            <a:endParaRPr lang="en-GB"/>
-          </a:p>
-        </p:txBody>
-      </p:sp>
     </p:spTree>
     <p:extLst>
       <p:ext uri="{BB962C8B-B14F-4D97-AF65-F5344CB8AC3E}">
-        <p14:creationId xmlns:p14="http://schemas.microsoft.com/office/powerpoint/2010/main" val="3477899506"/>
+        <p14:creationId xmlns:p14="http://schemas.microsoft.com/office/powerpoint/2010/main" val="347023000"/>
       </p:ext>
     </p:extLst>
   </p:cSld>
@@ -12148,7 +14430,7 @@
           <p:cNvPr id="5" name="Picture 4">
             <a:extLst>
               <a:ext uri="{FF2B5EF4-FFF2-40B4-BE49-F238E27FC236}">
-                <a16:creationId xmlns:a16="http://schemas.microsoft.com/office/drawing/2014/main" id="{5C0EE8CA-BEC2-2A27-9DA5-CF4BBA9883E7}"/>
+                <a16:creationId xmlns:a16="http://schemas.microsoft.com/office/drawing/2014/main" id="{A62C7047-9E9E-A076-652A-3C1A88E5F5F9}"/>
               </a:ext>
             </a:extLst>
           </p:cNvPr>
@@ -12165,233 +14447,8 @@
         </p:blipFill>
         <p:spPr>
           <a:xfrm>
-            <a:off x="336660" y="241009"/>
-            <a:ext cx="7637445" cy="3018023"/>
-          </a:xfrm>
-          <a:prstGeom prst="rect">
-            <a:avLst/>
-          </a:prstGeom>
-        </p:spPr>
-      </p:pic>
-      <p:pic>
-        <p:nvPicPr>
-          <p:cNvPr id="7" name="Picture 6">
-            <a:extLst>
-              <a:ext uri="{FF2B5EF4-FFF2-40B4-BE49-F238E27FC236}">
-                <a16:creationId xmlns:a16="http://schemas.microsoft.com/office/drawing/2014/main" id="{83835B6C-2D33-B9CF-1272-5BF54C95994B}"/>
-              </a:ext>
-            </a:extLst>
-          </p:cNvPr>
-          <p:cNvPicPr>
-            <a:picLocks noChangeAspect="1"/>
-          </p:cNvPicPr>
-          <p:nvPr/>
-        </p:nvPicPr>
-        <p:blipFill>
-          <a:blip r:embed="rId3"/>
-          <a:stretch>
-            <a:fillRect/>
-          </a:stretch>
-        </p:blipFill>
-        <p:spPr>
-          <a:xfrm>
-            <a:off x="336660" y="3429000"/>
-            <a:ext cx="7639877" cy="2855259"/>
-          </a:xfrm>
-          <a:prstGeom prst="rect">
-            <a:avLst/>
-          </a:prstGeom>
-        </p:spPr>
-      </p:pic>
-      <p:sp>
-        <p:nvSpPr>
-          <p:cNvPr id="8" name="Rectangle 7">
-            <a:extLst>
-              <a:ext uri="{FF2B5EF4-FFF2-40B4-BE49-F238E27FC236}">
-                <a16:creationId xmlns:a16="http://schemas.microsoft.com/office/drawing/2014/main" id="{E179226B-CD64-D964-C8E1-D9043197564E}"/>
-              </a:ext>
-            </a:extLst>
-          </p:cNvPr>
-          <p:cNvSpPr/>
-          <p:nvPr/>
-        </p:nvSpPr>
-        <p:spPr>
-          <a:xfrm>
-            <a:off x="5051613" y="3980329"/>
-            <a:ext cx="2685954" cy="528918"/>
-          </a:xfrm>
-          <a:prstGeom prst="rect">
-            <a:avLst/>
-          </a:prstGeom>
-          <a:solidFill>
-            <a:schemeClr val="accent2">
-              <a:lumMod val="75000"/>
-              <a:alpha val="22000"/>
-            </a:schemeClr>
-          </a:solidFill>
-          <a:ln>
-            <a:noFill/>
-          </a:ln>
-        </p:spPr>
-        <p:style>
-          <a:lnRef idx="2">
-            <a:schemeClr val="accent1">
-              <a:shade val="15000"/>
-            </a:schemeClr>
-          </a:lnRef>
-          <a:fillRef idx="1">
-            <a:schemeClr val="accent1"/>
-          </a:fillRef>
-          <a:effectRef idx="0">
-            <a:schemeClr val="accent1"/>
-          </a:effectRef>
-          <a:fontRef idx="minor">
-            <a:schemeClr val="lt1"/>
-          </a:fontRef>
-        </p:style>
-        <p:txBody>
-          <a:bodyPr rtlCol="0" anchor="ctr"/>
-          <a:lstStyle/>
-          <a:p>
-            <a:pPr algn="ctr"/>
-            <a:endParaRPr lang="en-GB"/>
-          </a:p>
-        </p:txBody>
-      </p:sp>
-      <p:sp>
-        <p:nvSpPr>
-          <p:cNvPr id="9" name="Rectangle 8">
-            <a:extLst>
-              <a:ext uri="{FF2B5EF4-FFF2-40B4-BE49-F238E27FC236}">
-                <a16:creationId xmlns:a16="http://schemas.microsoft.com/office/drawing/2014/main" id="{19A47CE5-6A20-D480-3073-4846B62CB487}"/>
-              </a:ext>
-            </a:extLst>
-          </p:cNvPr>
-          <p:cNvSpPr/>
-          <p:nvPr/>
-        </p:nvSpPr>
-        <p:spPr>
-          <a:xfrm>
-            <a:off x="2773680" y="4380550"/>
-            <a:ext cx="731519" cy="257393"/>
-          </a:xfrm>
-          <a:prstGeom prst="rect">
-            <a:avLst/>
-          </a:prstGeom>
-          <a:solidFill>
-            <a:schemeClr val="accent2">
-              <a:lumMod val="75000"/>
-              <a:alpha val="22000"/>
-            </a:schemeClr>
-          </a:solidFill>
-          <a:ln>
-            <a:noFill/>
-          </a:ln>
-        </p:spPr>
-        <p:style>
-          <a:lnRef idx="2">
-            <a:schemeClr val="accent1">
-              <a:shade val="15000"/>
-            </a:schemeClr>
-          </a:lnRef>
-          <a:fillRef idx="1">
-            <a:schemeClr val="accent1"/>
-          </a:fillRef>
-          <a:effectRef idx="0">
-            <a:schemeClr val="accent1"/>
-          </a:effectRef>
-          <a:fontRef idx="minor">
-            <a:schemeClr val="lt1"/>
-          </a:fontRef>
-        </p:style>
-        <p:txBody>
-          <a:bodyPr rtlCol="0" anchor="ctr"/>
-          <a:lstStyle/>
-          <a:p>
-            <a:pPr algn="ctr"/>
-            <a:endParaRPr lang="en-GB"/>
-          </a:p>
-        </p:txBody>
-      </p:sp>
-      <p:sp>
-        <p:nvSpPr>
-          <p:cNvPr id="10" name="Rectangle 9">
-            <a:extLst>
-              <a:ext uri="{FF2B5EF4-FFF2-40B4-BE49-F238E27FC236}">
-                <a16:creationId xmlns:a16="http://schemas.microsoft.com/office/drawing/2014/main" id="{B2A8ACF8-B563-99EE-B0FE-0F4CB59F5A05}"/>
-              </a:ext>
-            </a:extLst>
-          </p:cNvPr>
-          <p:cNvSpPr/>
-          <p:nvPr/>
-        </p:nvSpPr>
-        <p:spPr>
-          <a:xfrm>
-            <a:off x="4155382" y="3679510"/>
-            <a:ext cx="896231" cy="356913"/>
-          </a:xfrm>
-          <a:prstGeom prst="rect">
-            <a:avLst/>
-          </a:prstGeom>
-          <a:solidFill>
-            <a:schemeClr val="accent2">
-              <a:lumMod val="75000"/>
-              <a:alpha val="22000"/>
-            </a:schemeClr>
-          </a:solidFill>
-          <a:ln>
-            <a:noFill/>
-          </a:ln>
-        </p:spPr>
-        <p:style>
-          <a:lnRef idx="2">
-            <a:schemeClr val="accent1">
-              <a:shade val="15000"/>
-            </a:schemeClr>
-          </a:lnRef>
-          <a:fillRef idx="1">
-            <a:schemeClr val="accent1"/>
-          </a:fillRef>
-          <a:effectRef idx="0">
-            <a:schemeClr val="accent1"/>
-          </a:effectRef>
-          <a:fontRef idx="minor">
-            <a:schemeClr val="lt1"/>
-          </a:fontRef>
-        </p:style>
-        <p:txBody>
-          <a:bodyPr rtlCol="0" anchor="ctr"/>
-          <a:lstStyle/>
-          <a:p>
-            <a:pPr algn="ctr"/>
-            <a:endParaRPr lang="en-GB"/>
-          </a:p>
-        </p:txBody>
-      </p:sp>
-      <p:pic>
-        <p:nvPicPr>
-          <p:cNvPr id="12" name="Picture 11">
-            <a:extLst>
-              <a:ext uri="{FF2B5EF4-FFF2-40B4-BE49-F238E27FC236}">
-                <a16:creationId xmlns:a16="http://schemas.microsoft.com/office/drawing/2014/main" id="{DA2FE381-0975-F6AD-7EF1-AE1F94F61806}"/>
-              </a:ext>
-            </a:extLst>
-          </p:cNvPr>
-          <p:cNvPicPr>
-            <a:picLocks noChangeAspect="1"/>
-          </p:cNvPicPr>
-          <p:nvPr/>
-        </p:nvPicPr>
-        <p:blipFill>
-          <a:blip r:embed="rId4"/>
-          <a:stretch>
-            <a:fillRect/>
-          </a:stretch>
-        </p:blipFill>
-        <p:spPr>
-          <a:xfrm>
-            <a:off x="6414942" y="294473"/>
-            <a:ext cx="5325462" cy="2810132"/>
+            <a:off x="806178" y="1282589"/>
+            <a:ext cx="10579644" cy="4292821"/>
           </a:xfrm>
           <a:prstGeom prst="rect">
             <a:avLst/>
@@ -12400,10 +14457,10 @@
       </p:pic>
       <p:cxnSp>
         <p:nvCxnSpPr>
-          <p:cNvPr id="13" name="Straight Connector 12">
-            <a:extLst>
-              <a:ext uri="{FF2B5EF4-FFF2-40B4-BE49-F238E27FC236}">
-                <a16:creationId xmlns:a16="http://schemas.microsoft.com/office/drawing/2014/main" id="{FE75E0FB-021D-01FD-05FD-63C65725D71F}"/>
+          <p:cNvPr id="7" name="Straight Connector 6">
+            <a:extLst>
+              <a:ext uri="{FF2B5EF4-FFF2-40B4-BE49-F238E27FC236}">
+                <a16:creationId xmlns:a16="http://schemas.microsoft.com/office/drawing/2014/main" id="{0AABEBD6-264F-211D-CCD8-6A5B4CC8EDE7}"/>
               </a:ext>
             </a:extLst>
           </p:cNvPr>
@@ -12414,8 +14471,94 @@
         </p:nvCxnSpPr>
         <p:spPr>
           <a:xfrm>
-            <a:off x="8987246" y="1053737"/>
-            <a:ext cx="818605" cy="0"/>
+            <a:off x="2843349" y="4375928"/>
+            <a:ext cx="4337627" cy="0"/>
+          </a:xfrm>
+          <a:prstGeom prst="line">
+            <a:avLst/>
+          </a:prstGeom>
+          <a:ln>
+            <a:solidFill>
+              <a:srgbClr val="FFFF00"/>
+            </a:solidFill>
+          </a:ln>
+        </p:spPr>
+        <p:style>
+          <a:lnRef idx="2">
+            <a:schemeClr val="accent1"/>
+          </a:lnRef>
+          <a:fillRef idx="0">
+            <a:schemeClr val="accent1"/>
+          </a:fillRef>
+          <a:effectRef idx="1">
+            <a:schemeClr val="accent1"/>
+          </a:effectRef>
+          <a:fontRef idx="minor">
+            <a:schemeClr val="tx1"/>
+          </a:fontRef>
+        </p:style>
+      </p:cxnSp>
+      <p:cxnSp>
+        <p:nvCxnSpPr>
+          <p:cNvPr id="10" name="Straight Connector 9">
+            <a:extLst>
+              <a:ext uri="{FF2B5EF4-FFF2-40B4-BE49-F238E27FC236}">
+                <a16:creationId xmlns:a16="http://schemas.microsoft.com/office/drawing/2014/main" id="{A8DE2F7B-96F3-2DD5-D289-05F9EB8BF08B}"/>
+              </a:ext>
+            </a:extLst>
+          </p:cNvPr>
+          <p:cNvCxnSpPr>
+            <a:cxnSpLocks/>
+          </p:cNvCxnSpPr>
+          <p:nvPr/>
+        </p:nvCxnSpPr>
+        <p:spPr>
+          <a:xfrm>
+            <a:off x="2873829" y="3428999"/>
+            <a:ext cx="4336509" cy="0"/>
+          </a:xfrm>
+          <a:prstGeom prst="line">
+            <a:avLst/>
+          </a:prstGeom>
+          <a:ln>
+            <a:solidFill>
+              <a:srgbClr val="FFFF00"/>
+            </a:solidFill>
+          </a:ln>
+        </p:spPr>
+        <p:style>
+          <a:lnRef idx="2">
+            <a:schemeClr val="accent1"/>
+          </a:lnRef>
+          <a:fillRef idx="0">
+            <a:schemeClr val="accent1"/>
+          </a:fillRef>
+          <a:effectRef idx="1">
+            <a:schemeClr val="accent1"/>
+          </a:effectRef>
+          <a:fontRef idx="minor">
+            <a:schemeClr val="tx1"/>
+          </a:fontRef>
+        </p:style>
+      </p:cxnSp>
+      <p:cxnSp>
+        <p:nvCxnSpPr>
+          <p:cNvPr id="13" name="Straight Connector 12">
+            <a:extLst>
+              <a:ext uri="{FF2B5EF4-FFF2-40B4-BE49-F238E27FC236}">
+                <a16:creationId xmlns:a16="http://schemas.microsoft.com/office/drawing/2014/main" id="{07A02780-C941-1BAF-5DE9-77B4A1236844}"/>
+              </a:ext>
+            </a:extLst>
+          </p:cNvPr>
+          <p:cNvCxnSpPr>
+            <a:cxnSpLocks/>
+          </p:cNvCxnSpPr>
+          <p:nvPr/>
+        </p:nvCxnSpPr>
+        <p:spPr>
+          <a:xfrm>
+            <a:off x="5564777" y="3771921"/>
+            <a:ext cx="5160548" cy="0"/>
           </a:xfrm>
           <a:prstGeom prst="line">
             <a:avLst/>
@@ -12446,7 +14589,7 @@
           <p:cNvPr id="16" name="Straight Connector 15">
             <a:extLst>
               <a:ext uri="{FF2B5EF4-FFF2-40B4-BE49-F238E27FC236}">
-                <a16:creationId xmlns:a16="http://schemas.microsoft.com/office/drawing/2014/main" id="{4001D132-358C-C0B3-1231-B3397A59E24A}"/>
+                <a16:creationId xmlns:a16="http://schemas.microsoft.com/office/drawing/2014/main" id="{0E63DE3F-4B7E-97C3-505B-C6CD5DC1B342}"/>
               </a:ext>
             </a:extLst>
           </p:cNvPr>
@@ -12457,8 +14600,8 @@
         </p:nvCxnSpPr>
         <p:spPr>
           <a:xfrm>
-            <a:off x="8987246" y="666205"/>
-            <a:ext cx="818605" cy="0"/>
+            <a:off x="5564777" y="2236736"/>
+            <a:ext cx="5160548" cy="0"/>
           </a:xfrm>
           <a:prstGeom prst="line">
             <a:avLst/>
@@ -12486,10 +14629,10 @@
       </p:cxnSp>
       <p:sp>
         <p:nvSpPr>
-          <p:cNvPr id="19" name="Rectangle 18">
-            <a:extLst>
-              <a:ext uri="{FF2B5EF4-FFF2-40B4-BE49-F238E27FC236}">
-                <a16:creationId xmlns:a16="http://schemas.microsoft.com/office/drawing/2014/main" id="{02747AEE-E505-B9A9-9188-D077CE594BD6}"/>
+          <p:cNvPr id="2" name="Rectangle 1">
+            <a:extLst>
+              <a:ext uri="{FF2B5EF4-FFF2-40B4-BE49-F238E27FC236}">
+                <a16:creationId xmlns:a16="http://schemas.microsoft.com/office/drawing/2014/main" id="{33F60A1D-CF9E-A9D8-ED31-489D7EC30975}"/>
               </a:ext>
             </a:extLst>
           </p:cNvPr>
@@ -12498,17 +14641,16 @@
         </p:nvSpPr>
         <p:spPr>
           <a:xfrm>
-            <a:off x="8573589" y="666205"/>
-            <a:ext cx="1928947" cy="387511"/>
+            <a:off x="2873828" y="3436217"/>
+            <a:ext cx="4336509" cy="946928"/>
           </a:xfrm>
           <a:prstGeom prst="rect">
             <a:avLst/>
           </a:prstGeom>
           <a:solidFill>
-            <a:schemeClr val="accent2">
-              <a:lumMod val="75000"/>
+            <a:srgbClr val="FFFF00">
               <a:alpha val="22000"/>
-            </a:schemeClr>
+            </a:srgbClr>
           </a:solidFill>
           <a:ln>
             <a:noFill/>
@@ -12539,10 +14681,64 @@
           </a:p>
         </p:txBody>
       </p:sp>
+      <p:sp>
+        <p:nvSpPr>
+          <p:cNvPr id="6" name="Rectangle 5">
+            <a:extLst>
+              <a:ext uri="{FF2B5EF4-FFF2-40B4-BE49-F238E27FC236}">
+                <a16:creationId xmlns:a16="http://schemas.microsoft.com/office/drawing/2014/main" id="{AD4B1D9D-9969-EC49-7239-28253B002DC4}"/>
+              </a:ext>
+            </a:extLst>
+          </p:cNvPr>
+          <p:cNvSpPr/>
+          <p:nvPr/>
+        </p:nvSpPr>
+        <p:spPr>
+          <a:xfrm>
+            <a:off x="5564777" y="2229519"/>
+            <a:ext cx="5160548" cy="1540632"/>
+          </a:xfrm>
+          <a:prstGeom prst="rect">
+            <a:avLst/>
+          </a:prstGeom>
+          <a:solidFill>
+            <a:srgbClr val="FFFF00">
+              <a:alpha val="22000"/>
+            </a:srgbClr>
+          </a:solidFill>
+          <a:ln>
+            <a:noFill/>
+          </a:ln>
+        </p:spPr>
+        <p:style>
+          <a:lnRef idx="2">
+            <a:schemeClr val="accent1">
+              <a:shade val="15000"/>
+            </a:schemeClr>
+          </a:lnRef>
+          <a:fillRef idx="1">
+            <a:schemeClr val="accent1"/>
+          </a:fillRef>
+          <a:effectRef idx="0">
+            <a:schemeClr val="accent1"/>
+          </a:effectRef>
+          <a:fontRef idx="minor">
+            <a:schemeClr val="lt1"/>
+          </a:fontRef>
+        </p:style>
+        <p:txBody>
+          <a:bodyPr rtlCol="0" anchor="ctr"/>
+          <a:lstStyle/>
+          <a:p>
+            <a:pPr algn="ctr"/>
+            <a:endParaRPr lang="en-GB"/>
+          </a:p>
+        </p:txBody>
+      </p:sp>
     </p:spTree>
     <p:extLst>
       <p:ext uri="{BB962C8B-B14F-4D97-AF65-F5344CB8AC3E}">
-        <p14:creationId xmlns:p14="http://schemas.microsoft.com/office/powerpoint/2010/main" val="3910363495"/>
+        <p14:creationId xmlns:p14="http://schemas.microsoft.com/office/powerpoint/2010/main" val="3477899506"/>
       </p:ext>
     </p:extLst>
   </p:cSld>
@@ -12574,7 +14770,7 @@
           <p:cNvPr id="5" name="Picture 4">
             <a:extLst>
               <a:ext uri="{FF2B5EF4-FFF2-40B4-BE49-F238E27FC236}">
-                <a16:creationId xmlns:a16="http://schemas.microsoft.com/office/drawing/2014/main" id="{06270A01-3FB3-2CC7-BEA0-8A78AA36D224}"/>
+                <a16:creationId xmlns:a16="http://schemas.microsoft.com/office/drawing/2014/main" id="{5C0EE8CA-BEC2-2A27-9DA5-CF4BBA9883E7}"/>
               </a:ext>
             </a:extLst>
           </p:cNvPr>
@@ -12591,8 +14787,233 @@
         </p:blipFill>
         <p:spPr>
           <a:xfrm>
-            <a:off x="222755" y="228646"/>
-            <a:ext cx="9817605" cy="3753043"/>
+            <a:off x="336660" y="241009"/>
+            <a:ext cx="7637445" cy="3018023"/>
+          </a:xfrm>
+          <a:prstGeom prst="rect">
+            <a:avLst/>
+          </a:prstGeom>
+        </p:spPr>
+      </p:pic>
+      <p:pic>
+        <p:nvPicPr>
+          <p:cNvPr id="7" name="Picture 6">
+            <a:extLst>
+              <a:ext uri="{FF2B5EF4-FFF2-40B4-BE49-F238E27FC236}">
+                <a16:creationId xmlns:a16="http://schemas.microsoft.com/office/drawing/2014/main" id="{83835B6C-2D33-B9CF-1272-5BF54C95994B}"/>
+              </a:ext>
+            </a:extLst>
+          </p:cNvPr>
+          <p:cNvPicPr>
+            <a:picLocks noChangeAspect="1"/>
+          </p:cNvPicPr>
+          <p:nvPr/>
+        </p:nvPicPr>
+        <p:blipFill>
+          <a:blip r:embed="rId3"/>
+          <a:stretch>
+            <a:fillRect/>
+          </a:stretch>
+        </p:blipFill>
+        <p:spPr>
+          <a:xfrm>
+            <a:off x="336660" y="3429000"/>
+            <a:ext cx="7639877" cy="2855259"/>
+          </a:xfrm>
+          <a:prstGeom prst="rect">
+            <a:avLst/>
+          </a:prstGeom>
+        </p:spPr>
+      </p:pic>
+      <p:sp>
+        <p:nvSpPr>
+          <p:cNvPr id="8" name="Rectangle 7">
+            <a:extLst>
+              <a:ext uri="{FF2B5EF4-FFF2-40B4-BE49-F238E27FC236}">
+                <a16:creationId xmlns:a16="http://schemas.microsoft.com/office/drawing/2014/main" id="{E179226B-CD64-D964-C8E1-D9043197564E}"/>
+              </a:ext>
+            </a:extLst>
+          </p:cNvPr>
+          <p:cNvSpPr/>
+          <p:nvPr/>
+        </p:nvSpPr>
+        <p:spPr>
+          <a:xfrm>
+            <a:off x="5051613" y="3980329"/>
+            <a:ext cx="2685954" cy="528918"/>
+          </a:xfrm>
+          <a:prstGeom prst="rect">
+            <a:avLst/>
+          </a:prstGeom>
+          <a:solidFill>
+            <a:schemeClr val="accent2">
+              <a:lumMod val="75000"/>
+              <a:alpha val="22000"/>
+            </a:schemeClr>
+          </a:solidFill>
+          <a:ln>
+            <a:noFill/>
+          </a:ln>
+        </p:spPr>
+        <p:style>
+          <a:lnRef idx="2">
+            <a:schemeClr val="accent1">
+              <a:shade val="15000"/>
+            </a:schemeClr>
+          </a:lnRef>
+          <a:fillRef idx="1">
+            <a:schemeClr val="accent1"/>
+          </a:fillRef>
+          <a:effectRef idx="0">
+            <a:schemeClr val="accent1"/>
+          </a:effectRef>
+          <a:fontRef idx="minor">
+            <a:schemeClr val="lt1"/>
+          </a:fontRef>
+        </p:style>
+        <p:txBody>
+          <a:bodyPr rtlCol="0" anchor="ctr"/>
+          <a:lstStyle/>
+          <a:p>
+            <a:pPr algn="ctr"/>
+            <a:endParaRPr lang="en-GB"/>
+          </a:p>
+        </p:txBody>
+      </p:sp>
+      <p:sp>
+        <p:nvSpPr>
+          <p:cNvPr id="9" name="Rectangle 8">
+            <a:extLst>
+              <a:ext uri="{FF2B5EF4-FFF2-40B4-BE49-F238E27FC236}">
+                <a16:creationId xmlns:a16="http://schemas.microsoft.com/office/drawing/2014/main" id="{19A47CE5-6A20-D480-3073-4846B62CB487}"/>
+              </a:ext>
+            </a:extLst>
+          </p:cNvPr>
+          <p:cNvSpPr/>
+          <p:nvPr/>
+        </p:nvSpPr>
+        <p:spPr>
+          <a:xfrm>
+            <a:off x="2773680" y="4380550"/>
+            <a:ext cx="731519" cy="257393"/>
+          </a:xfrm>
+          <a:prstGeom prst="rect">
+            <a:avLst/>
+          </a:prstGeom>
+          <a:solidFill>
+            <a:schemeClr val="accent2">
+              <a:lumMod val="75000"/>
+              <a:alpha val="22000"/>
+            </a:schemeClr>
+          </a:solidFill>
+          <a:ln>
+            <a:noFill/>
+          </a:ln>
+        </p:spPr>
+        <p:style>
+          <a:lnRef idx="2">
+            <a:schemeClr val="accent1">
+              <a:shade val="15000"/>
+            </a:schemeClr>
+          </a:lnRef>
+          <a:fillRef idx="1">
+            <a:schemeClr val="accent1"/>
+          </a:fillRef>
+          <a:effectRef idx="0">
+            <a:schemeClr val="accent1"/>
+          </a:effectRef>
+          <a:fontRef idx="minor">
+            <a:schemeClr val="lt1"/>
+          </a:fontRef>
+        </p:style>
+        <p:txBody>
+          <a:bodyPr rtlCol="0" anchor="ctr"/>
+          <a:lstStyle/>
+          <a:p>
+            <a:pPr algn="ctr"/>
+            <a:endParaRPr lang="en-GB"/>
+          </a:p>
+        </p:txBody>
+      </p:sp>
+      <p:sp>
+        <p:nvSpPr>
+          <p:cNvPr id="10" name="Rectangle 9">
+            <a:extLst>
+              <a:ext uri="{FF2B5EF4-FFF2-40B4-BE49-F238E27FC236}">
+                <a16:creationId xmlns:a16="http://schemas.microsoft.com/office/drawing/2014/main" id="{B2A8ACF8-B563-99EE-B0FE-0F4CB59F5A05}"/>
+              </a:ext>
+            </a:extLst>
+          </p:cNvPr>
+          <p:cNvSpPr/>
+          <p:nvPr/>
+        </p:nvSpPr>
+        <p:spPr>
+          <a:xfrm>
+            <a:off x="4155382" y="3679510"/>
+            <a:ext cx="896231" cy="356913"/>
+          </a:xfrm>
+          <a:prstGeom prst="rect">
+            <a:avLst/>
+          </a:prstGeom>
+          <a:solidFill>
+            <a:schemeClr val="accent2">
+              <a:lumMod val="75000"/>
+              <a:alpha val="22000"/>
+            </a:schemeClr>
+          </a:solidFill>
+          <a:ln>
+            <a:noFill/>
+          </a:ln>
+        </p:spPr>
+        <p:style>
+          <a:lnRef idx="2">
+            <a:schemeClr val="accent1">
+              <a:shade val="15000"/>
+            </a:schemeClr>
+          </a:lnRef>
+          <a:fillRef idx="1">
+            <a:schemeClr val="accent1"/>
+          </a:fillRef>
+          <a:effectRef idx="0">
+            <a:schemeClr val="accent1"/>
+          </a:effectRef>
+          <a:fontRef idx="minor">
+            <a:schemeClr val="lt1"/>
+          </a:fontRef>
+        </p:style>
+        <p:txBody>
+          <a:bodyPr rtlCol="0" anchor="ctr"/>
+          <a:lstStyle/>
+          <a:p>
+            <a:pPr algn="ctr"/>
+            <a:endParaRPr lang="en-GB"/>
+          </a:p>
+        </p:txBody>
+      </p:sp>
+      <p:pic>
+        <p:nvPicPr>
+          <p:cNvPr id="12" name="Picture 11">
+            <a:extLst>
+              <a:ext uri="{FF2B5EF4-FFF2-40B4-BE49-F238E27FC236}">
+                <a16:creationId xmlns:a16="http://schemas.microsoft.com/office/drawing/2014/main" id="{DA2FE381-0975-F6AD-7EF1-AE1F94F61806}"/>
+              </a:ext>
+            </a:extLst>
+          </p:cNvPr>
+          <p:cNvPicPr>
+            <a:picLocks noChangeAspect="1"/>
+          </p:cNvPicPr>
+          <p:nvPr/>
+        </p:nvPicPr>
+        <p:blipFill>
+          <a:blip r:embed="rId4"/>
+          <a:stretch>
+            <a:fillRect/>
+          </a:stretch>
+        </p:blipFill>
+        <p:spPr>
+          <a:xfrm>
+            <a:off x="6414942" y="294473"/>
+            <a:ext cx="5325462" cy="2810132"/>
           </a:xfrm>
           <a:prstGeom prst="rect">
             <a:avLst/>
@@ -12601,10 +15022,10 @@
       </p:pic>
       <p:cxnSp>
         <p:nvCxnSpPr>
-          <p:cNvPr id="12" name="Straight Connector 11">
-            <a:extLst>
-              <a:ext uri="{FF2B5EF4-FFF2-40B4-BE49-F238E27FC236}">
-                <a16:creationId xmlns:a16="http://schemas.microsoft.com/office/drawing/2014/main" id="{578683B6-991F-7F56-D393-851A74B1BB26}"/>
+          <p:cNvPr id="13" name="Straight Connector 12">
+            <a:extLst>
+              <a:ext uri="{FF2B5EF4-FFF2-40B4-BE49-F238E27FC236}">
+                <a16:creationId xmlns:a16="http://schemas.microsoft.com/office/drawing/2014/main" id="{FE75E0FB-021D-01FD-05FD-63C65725D71F}"/>
               </a:ext>
             </a:extLst>
           </p:cNvPr>
@@ -12615,17 +15036,16 @@
         </p:nvCxnSpPr>
         <p:spPr>
           <a:xfrm>
-            <a:off x="2804160" y="1891838"/>
-            <a:ext cx="5464630" cy="0"/>
+            <a:off x="8987246" y="1053737"/>
+            <a:ext cx="818605" cy="0"/>
           </a:xfrm>
           <a:prstGeom prst="line">
             <a:avLst/>
           </a:prstGeom>
-          <a:ln w="9525">
+          <a:ln>
             <a:solidFill>
               <a:srgbClr val="FFFF00"/>
             </a:solidFill>
-            <a:prstDash val="dash"/>
           </a:ln>
         </p:spPr>
         <p:style>
@@ -12645,10 +15065,10 @@
       </p:cxnSp>
       <p:cxnSp>
         <p:nvCxnSpPr>
-          <p:cNvPr id="6" name="Straight Connector 5">
-            <a:extLst>
-              <a:ext uri="{FF2B5EF4-FFF2-40B4-BE49-F238E27FC236}">
-                <a16:creationId xmlns:a16="http://schemas.microsoft.com/office/drawing/2014/main" id="{0B7EAF12-D267-467B-67BE-24CBC550853F}"/>
+          <p:cNvPr id="16" name="Straight Connector 15">
+            <a:extLst>
+              <a:ext uri="{FF2B5EF4-FFF2-40B4-BE49-F238E27FC236}">
+                <a16:creationId xmlns:a16="http://schemas.microsoft.com/office/drawing/2014/main" id="{4001D132-358C-C0B3-1231-B3397A59E24A}"/>
               </a:ext>
             </a:extLst>
           </p:cNvPr>
@@ -12659,8 +15079,8 @@
         </p:nvCxnSpPr>
         <p:spPr>
           <a:xfrm>
-            <a:off x="4180376" y="2873438"/>
-            <a:ext cx="1674514" cy="0"/>
+            <a:off x="8987246" y="666205"/>
+            <a:ext cx="818605" cy="0"/>
           </a:xfrm>
           <a:prstGeom prst="line">
             <a:avLst/>
@@ -12669,93 +15089,6 @@
             <a:solidFill>
               <a:srgbClr val="FFFF00"/>
             </a:solidFill>
-          </a:ln>
-        </p:spPr>
-        <p:style>
-          <a:lnRef idx="2">
-            <a:schemeClr val="accent1"/>
-          </a:lnRef>
-          <a:fillRef idx="0">
-            <a:schemeClr val="accent1"/>
-          </a:fillRef>
-          <a:effectRef idx="1">
-            <a:schemeClr val="accent1"/>
-          </a:effectRef>
-          <a:fontRef idx="minor">
-            <a:schemeClr val="tx1"/>
-          </a:fontRef>
-        </p:style>
-      </p:cxnSp>
-      <p:cxnSp>
-        <p:nvCxnSpPr>
-          <p:cNvPr id="9" name="Straight Connector 8">
-            <a:extLst>
-              <a:ext uri="{FF2B5EF4-FFF2-40B4-BE49-F238E27FC236}">
-                <a16:creationId xmlns:a16="http://schemas.microsoft.com/office/drawing/2014/main" id="{00A927E4-B834-603A-3162-773CA602FE93}"/>
-              </a:ext>
-            </a:extLst>
-          </p:cNvPr>
-          <p:cNvCxnSpPr>
-            <a:cxnSpLocks/>
-          </p:cNvCxnSpPr>
-          <p:nvPr/>
-        </p:nvCxnSpPr>
-        <p:spPr>
-          <a:xfrm>
-            <a:off x="4180376" y="1891838"/>
-            <a:ext cx="1674514" cy="0"/>
-          </a:xfrm>
-          <a:prstGeom prst="line">
-            <a:avLst/>
-          </a:prstGeom>
-          <a:ln w="19050">
-            <a:solidFill>
-              <a:srgbClr val="FFFF00"/>
-            </a:solidFill>
-          </a:ln>
-        </p:spPr>
-        <p:style>
-          <a:lnRef idx="2">
-            <a:schemeClr val="accent1"/>
-          </a:lnRef>
-          <a:fillRef idx="0">
-            <a:schemeClr val="accent1"/>
-          </a:fillRef>
-          <a:effectRef idx="1">
-            <a:schemeClr val="accent1"/>
-          </a:effectRef>
-          <a:fontRef idx="minor">
-            <a:schemeClr val="tx1"/>
-          </a:fontRef>
-        </p:style>
-      </p:cxnSp>
-      <p:cxnSp>
-        <p:nvCxnSpPr>
-          <p:cNvPr id="10" name="Straight Connector 9">
-            <a:extLst>
-              <a:ext uri="{FF2B5EF4-FFF2-40B4-BE49-F238E27FC236}">
-                <a16:creationId xmlns:a16="http://schemas.microsoft.com/office/drawing/2014/main" id="{7611024F-7C7C-526C-EFA2-4D5192BE191A}"/>
-              </a:ext>
-            </a:extLst>
-          </p:cNvPr>
-          <p:cNvCxnSpPr>
-            <a:cxnSpLocks/>
-          </p:cNvCxnSpPr>
-          <p:nvPr/>
-        </p:nvCxnSpPr>
-        <p:spPr>
-          <a:xfrm>
-            <a:off x="2804160" y="2874672"/>
-            <a:ext cx="5473338" cy="0"/>
-          </a:xfrm>
-          <a:prstGeom prst="line">
-            <a:avLst/>
-          </a:prstGeom>
-          <a:ln w="9525">
-            <a:solidFill>
-              <a:srgbClr val="FFFF00"/>
-            </a:solidFill>
-            <a:prstDash val="dash"/>
           </a:ln>
         </p:spPr>
         <p:style>
@@ -12775,10 +15108,10 @@
       </p:cxnSp>
       <p:sp>
         <p:nvSpPr>
-          <p:cNvPr id="16" name="Rectangle 15">
-            <a:extLst>
-              <a:ext uri="{FF2B5EF4-FFF2-40B4-BE49-F238E27FC236}">
-                <a16:creationId xmlns:a16="http://schemas.microsoft.com/office/drawing/2014/main" id="{E28ABFBF-10F3-83D9-855E-27D31B7AC3E2}"/>
+          <p:cNvPr id="19" name="Rectangle 18">
+            <a:extLst>
+              <a:ext uri="{FF2B5EF4-FFF2-40B4-BE49-F238E27FC236}">
+                <a16:creationId xmlns:a16="http://schemas.microsoft.com/office/drawing/2014/main" id="{02747AEE-E505-B9A9-9188-D077CE594BD6}"/>
               </a:ext>
             </a:extLst>
           </p:cNvPr>
@@ -12787,16 +15120,17 @@
         </p:nvSpPr>
         <p:spPr>
           <a:xfrm>
-            <a:off x="3052353" y="1887452"/>
-            <a:ext cx="5325293" cy="984706"/>
+            <a:off x="8573589" y="666205"/>
+            <a:ext cx="1928947" cy="387511"/>
           </a:xfrm>
           <a:prstGeom prst="rect">
             <a:avLst/>
           </a:prstGeom>
           <a:solidFill>
-            <a:srgbClr val="FFFF00">
+            <a:schemeClr val="accent2">
+              <a:lumMod val="75000"/>
               <a:alpha val="22000"/>
-            </a:srgbClr>
+            </a:schemeClr>
           </a:solidFill>
           <a:ln>
             <a:noFill/>
@@ -12830,7 +15164,7 @@
     </p:spTree>
     <p:extLst>
       <p:ext uri="{BB962C8B-B14F-4D97-AF65-F5344CB8AC3E}">
-        <p14:creationId xmlns:p14="http://schemas.microsoft.com/office/powerpoint/2010/main" val="138630216"/>
+        <p14:creationId xmlns:p14="http://schemas.microsoft.com/office/powerpoint/2010/main" val="3910363495"/>
       </p:ext>
     </p:extLst>
   </p:cSld>

</xml_diff>

<commit_message>
created MultiSignals and CountTouches
</commit_message>
<xml_diff>
--- a/architecture.pptx
+++ b/architecture.pptx
@@ -7626,676 +7626,82 @@
           <a:chExt cx="0" cy="0"/>
         </a:xfrm>
       </p:grpSpPr>
-      <p:grpSp>
-        <p:nvGrpSpPr>
-          <p:cNvPr id="24" name="Group 23">
-            <a:extLst>
-              <a:ext uri="{FF2B5EF4-FFF2-40B4-BE49-F238E27FC236}">
-                <a16:creationId xmlns:a16="http://schemas.microsoft.com/office/drawing/2014/main" id="{EE565A71-1425-7BBB-DA9A-9749D3B9D07C}"/>
-              </a:ext>
-            </a:extLst>
-          </p:cNvPr>
-          <p:cNvGrpSpPr/>
-          <p:nvPr/>
-        </p:nvGrpSpPr>
-        <p:grpSpPr>
-          <a:xfrm>
-            <a:off x="1436840" y="1298197"/>
-            <a:ext cx="265671" cy="1822622"/>
-            <a:chOff x="3231290" y="2990335"/>
-            <a:chExt cx="265671" cy="1822622"/>
-          </a:xfrm>
-        </p:grpSpPr>
-        <p:cxnSp>
-          <p:nvCxnSpPr>
-            <p:cNvPr id="25" name="Straight Connector 24">
-              <a:extLst>
-                <a:ext uri="{FF2B5EF4-FFF2-40B4-BE49-F238E27FC236}">
-                  <a16:creationId xmlns:a16="http://schemas.microsoft.com/office/drawing/2014/main" id="{78A7AF2C-C433-AB09-AF71-D34CD28DF88F}"/>
-                </a:ext>
-              </a:extLst>
-            </p:cNvPr>
-            <p:cNvCxnSpPr>
-              <a:cxnSpLocks/>
-            </p:cNvCxnSpPr>
-            <p:nvPr/>
-          </p:nvCxnSpPr>
-          <p:spPr>
-            <a:xfrm>
-              <a:off x="3361038" y="2990335"/>
-              <a:ext cx="0" cy="1822622"/>
-            </a:xfrm>
-            <a:prstGeom prst="line">
-              <a:avLst/>
-            </a:prstGeom>
-          </p:spPr>
-          <p:style>
-            <a:lnRef idx="2">
-              <a:schemeClr val="accent1"/>
-            </a:lnRef>
-            <a:fillRef idx="0">
-              <a:schemeClr val="accent1"/>
-            </a:fillRef>
-            <a:effectRef idx="1">
-              <a:schemeClr val="accent1"/>
-            </a:effectRef>
-            <a:fontRef idx="minor">
-              <a:schemeClr val="tx1"/>
-            </a:fontRef>
-          </p:style>
-        </p:cxnSp>
-        <p:sp>
-          <p:nvSpPr>
-            <p:cNvPr id="26" name="Rectangle 25">
-              <a:extLst>
-                <a:ext uri="{FF2B5EF4-FFF2-40B4-BE49-F238E27FC236}">
-                  <a16:creationId xmlns:a16="http://schemas.microsoft.com/office/drawing/2014/main" id="{1EF10919-8420-54A8-E6EA-85C7F892F2FE}"/>
-                </a:ext>
-              </a:extLst>
-            </p:cNvPr>
-            <p:cNvSpPr/>
-            <p:nvPr/>
-          </p:nvSpPr>
-          <p:spPr>
-            <a:xfrm>
-              <a:off x="3231290" y="3472250"/>
-              <a:ext cx="265671" cy="951470"/>
-            </a:xfrm>
-            <a:prstGeom prst="rect">
-              <a:avLst/>
-            </a:prstGeom>
-            <a:solidFill>
-              <a:srgbClr val="FF0000"/>
-            </a:solidFill>
-          </p:spPr>
-          <p:style>
-            <a:lnRef idx="2">
-              <a:schemeClr val="accent1">
-                <a:shade val="15000"/>
-              </a:schemeClr>
-            </a:lnRef>
-            <a:fillRef idx="1">
-              <a:schemeClr val="accent1"/>
-            </a:fillRef>
-            <a:effectRef idx="0">
-              <a:schemeClr val="accent1"/>
-            </a:effectRef>
-            <a:fontRef idx="minor">
-              <a:schemeClr val="lt1"/>
-            </a:fontRef>
-          </p:style>
-          <p:txBody>
-            <a:bodyPr rtlCol="0" anchor="ctr"/>
-            <a:lstStyle/>
-            <a:p>
-              <a:pPr algn="ctr"/>
-              <a:endParaRPr lang="en-GB"/>
-            </a:p>
-          </p:txBody>
-        </p:sp>
-      </p:grpSp>
-      <p:grpSp>
-        <p:nvGrpSpPr>
-          <p:cNvPr id="27" name="Group 26">
-            <a:extLst>
-              <a:ext uri="{FF2B5EF4-FFF2-40B4-BE49-F238E27FC236}">
-                <a16:creationId xmlns:a16="http://schemas.microsoft.com/office/drawing/2014/main" id="{70DAA600-9DE4-29CD-B5EA-EA2DDC13DD5B}"/>
-              </a:ext>
-            </a:extLst>
-          </p:cNvPr>
-          <p:cNvGrpSpPr/>
-          <p:nvPr/>
-        </p:nvGrpSpPr>
-        <p:grpSpPr>
-          <a:xfrm>
-            <a:off x="2802008" y="2209508"/>
-            <a:ext cx="265671" cy="1822622"/>
-            <a:chOff x="3231290" y="2990335"/>
-            <a:chExt cx="265671" cy="1822622"/>
-          </a:xfrm>
-        </p:grpSpPr>
-        <p:cxnSp>
-          <p:nvCxnSpPr>
-            <p:cNvPr id="28" name="Straight Connector 27">
-              <a:extLst>
-                <a:ext uri="{FF2B5EF4-FFF2-40B4-BE49-F238E27FC236}">
-                  <a16:creationId xmlns:a16="http://schemas.microsoft.com/office/drawing/2014/main" id="{A1AC170B-CA69-4371-3059-F2F9DB907A63}"/>
-                </a:ext>
-              </a:extLst>
-            </p:cNvPr>
-            <p:cNvCxnSpPr>
-              <a:cxnSpLocks/>
-            </p:cNvCxnSpPr>
-            <p:nvPr/>
-          </p:nvCxnSpPr>
-          <p:spPr>
-            <a:xfrm>
-              <a:off x="3361038" y="2990335"/>
-              <a:ext cx="0" cy="1822622"/>
-            </a:xfrm>
-            <a:prstGeom prst="line">
-              <a:avLst/>
-            </a:prstGeom>
-          </p:spPr>
-          <p:style>
-            <a:lnRef idx="2">
-              <a:schemeClr val="accent1"/>
-            </a:lnRef>
-            <a:fillRef idx="0">
-              <a:schemeClr val="accent1"/>
-            </a:fillRef>
-            <a:effectRef idx="1">
-              <a:schemeClr val="accent1"/>
-            </a:effectRef>
-            <a:fontRef idx="minor">
-              <a:schemeClr val="tx1"/>
-            </a:fontRef>
-          </p:style>
-        </p:cxnSp>
-        <p:sp>
-          <p:nvSpPr>
-            <p:cNvPr id="29" name="Rectangle 28">
-              <a:extLst>
-                <a:ext uri="{FF2B5EF4-FFF2-40B4-BE49-F238E27FC236}">
-                  <a16:creationId xmlns:a16="http://schemas.microsoft.com/office/drawing/2014/main" id="{D88B8F7E-9B15-D7D9-FCD4-D3E820E73908}"/>
-                </a:ext>
-              </a:extLst>
-            </p:cNvPr>
-            <p:cNvSpPr/>
-            <p:nvPr/>
-          </p:nvSpPr>
-          <p:spPr>
-            <a:xfrm>
-              <a:off x="3231290" y="3472250"/>
-              <a:ext cx="265671" cy="951470"/>
-            </a:xfrm>
-            <a:prstGeom prst="rect">
-              <a:avLst/>
-            </a:prstGeom>
-            <a:solidFill>
-              <a:srgbClr val="92D050"/>
-            </a:solidFill>
-          </p:spPr>
-          <p:style>
-            <a:lnRef idx="2">
-              <a:schemeClr val="accent1">
-                <a:shade val="15000"/>
-              </a:schemeClr>
-            </a:lnRef>
-            <a:fillRef idx="1">
-              <a:schemeClr val="accent1"/>
-            </a:fillRef>
-            <a:effectRef idx="0">
-              <a:schemeClr val="accent1"/>
-            </a:effectRef>
-            <a:fontRef idx="minor">
-              <a:schemeClr val="lt1"/>
-            </a:fontRef>
-          </p:style>
-          <p:txBody>
-            <a:bodyPr rtlCol="0" anchor="ctr"/>
-            <a:lstStyle/>
-            <a:p>
-              <a:pPr algn="ctr"/>
-              <a:endParaRPr lang="en-GB"/>
-            </a:p>
-          </p:txBody>
-        </p:sp>
-      </p:grpSp>
-      <p:grpSp>
-        <p:nvGrpSpPr>
-          <p:cNvPr id="30" name="Group 29">
-            <a:extLst>
-              <a:ext uri="{FF2B5EF4-FFF2-40B4-BE49-F238E27FC236}">
-                <a16:creationId xmlns:a16="http://schemas.microsoft.com/office/drawing/2014/main" id="{F1FF564A-D2DA-B814-0158-89B9E2CD7569}"/>
-              </a:ext>
-            </a:extLst>
-          </p:cNvPr>
-          <p:cNvGrpSpPr/>
-          <p:nvPr/>
-        </p:nvGrpSpPr>
-        <p:grpSpPr>
-          <a:xfrm>
-            <a:off x="1907115" y="1868649"/>
-            <a:ext cx="265671" cy="1822622"/>
-            <a:chOff x="3231290" y="2990335"/>
-            <a:chExt cx="265671" cy="1822622"/>
-          </a:xfrm>
-        </p:grpSpPr>
-        <p:cxnSp>
-          <p:nvCxnSpPr>
-            <p:cNvPr id="31" name="Straight Connector 30">
-              <a:extLst>
-                <a:ext uri="{FF2B5EF4-FFF2-40B4-BE49-F238E27FC236}">
-                  <a16:creationId xmlns:a16="http://schemas.microsoft.com/office/drawing/2014/main" id="{246B02A4-3D8B-F817-2907-72B6551B8A90}"/>
-                </a:ext>
-              </a:extLst>
-            </p:cNvPr>
-            <p:cNvCxnSpPr>
-              <a:cxnSpLocks/>
-            </p:cNvCxnSpPr>
-            <p:nvPr/>
-          </p:nvCxnSpPr>
-          <p:spPr>
-            <a:xfrm>
-              <a:off x="3361038" y="2990335"/>
-              <a:ext cx="0" cy="1822622"/>
-            </a:xfrm>
-            <a:prstGeom prst="line">
-              <a:avLst/>
-            </a:prstGeom>
-          </p:spPr>
-          <p:style>
-            <a:lnRef idx="2">
-              <a:schemeClr val="accent1"/>
-            </a:lnRef>
-            <a:fillRef idx="0">
-              <a:schemeClr val="accent1"/>
-            </a:fillRef>
-            <a:effectRef idx="1">
-              <a:schemeClr val="accent1"/>
-            </a:effectRef>
-            <a:fontRef idx="minor">
-              <a:schemeClr val="tx1"/>
-            </a:fontRef>
-          </p:style>
-        </p:cxnSp>
-        <p:sp>
-          <p:nvSpPr>
-            <p:cNvPr id="32" name="Rectangle 31">
-              <a:extLst>
-                <a:ext uri="{FF2B5EF4-FFF2-40B4-BE49-F238E27FC236}">
-                  <a16:creationId xmlns:a16="http://schemas.microsoft.com/office/drawing/2014/main" id="{45B42DCC-0140-5D5B-0044-C225A7B57A7F}"/>
-                </a:ext>
-              </a:extLst>
-            </p:cNvPr>
-            <p:cNvSpPr/>
-            <p:nvPr/>
-          </p:nvSpPr>
-          <p:spPr>
-            <a:xfrm>
-              <a:off x="3231290" y="3472250"/>
-              <a:ext cx="265671" cy="951470"/>
-            </a:xfrm>
-            <a:prstGeom prst="rect">
-              <a:avLst/>
-            </a:prstGeom>
-            <a:solidFill>
-              <a:srgbClr val="FF0000"/>
-            </a:solidFill>
-          </p:spPr>
-          <p:style>
-            <a:lnRef idx="2">
-              <a:schemeClr val="accent1">
-                <a:shade val="15000"/>
-              </a:schemeClr>
-            </a:lnRef>
-            <a:fillRef idx="1">
-              <a:schemeClr val="accent1"/>
-            </a:fillRef>
-            <a:effectRef idx="0">
-              <a:schemeClr val="accent1"/>
-            </a:effectRef>
-            <a:fontRef idx="minor">
-              <a:schemeClr val="lt1"/>
-            </a:fontRef>
-          </p:style>
-          <p:txBody>
-            <a:bodyPr rtlCol="0" anchor="ctr"/>
-            <a:lstStyle/>
-            <a:p>
-              <a:pPr algn="ctr"/>
-              <a:endParaRPr lang="en-GB"/>
-            </a:p>
-          </p:txBody>
-        </p:sp>
-      </p:grpSp>
-      <p:grpSp>
-        <p:nvGrpSpPr>
-          <p:cNvPr id="33" name="Group 32">
-            <a:extLst>
-              <a:ext uri="{FF2B5EF4-FFF2-40B4-BE49-F238E27FC236}">
-                <a16:creationId xmlns:a16="http://schemas.microsoft.com/office/drawing/2014/main" id="{046BF2E4-84E6-A461-A0CC-0FE5FABC7E52}"/>
-              </a:ext>
-            </a:extLst>
-          </p:cNvPr>
-          <p:cNvGrpSpPr/>
-          <p:nvPr/>
-        </p:nvGrpSpPr>
-        <p:grpSpPr>
-          <a:xfrm>
-            <a:off x="4573500" y="3460269"/>
-            <a:ext cx="265671" cy="1822622"/>
-            <a:chOff x="3231290" y="2990335"/>
-            <a:chExt cx="265671" cy="1822622"/>
-          </a:xfrm>
-        </p:grpSpPr>
-        <p:cxnSp>
-          <p:nvCxnSpPr>
-            <p:cNvPr id="34" name="Straight Connector 33">
-              <a:extLst>
-                <a:ext uri="{FF2B5EF4-FFF2-40B4-BE49-F238E27FC236}">
-                  <a16:creationId xmlns:a16="http://schemas.microsoft.com/office/drawing/2014/main" id="{9A11AF54-C840-4668-B1A6-CFE670A5D2DB}"/>
-                </a:ext>
-              </a:extLst>
-            </p:cNvPr>
-            <p:cNvCxnSpPr>
-              <a:cxnSpLocks/>
-            </p:cNvCxnSpPr>
-            <p:nvPr/>
-          </p:nvCxnSpPr>
-          <p:spPr>
-            <a:xfrm>
-              <a:off x="3361038" y="2990335"/>
-              <a:ext cx="0" cy="1822622"/>
-            </a:xfrm>
-            <a:prstGeom prst="line">
-              <a:avLst/>
-            </a:prstGeom>
-          </p:spPr>
-          <p:style>
-            <a:lnRef idx="2">
-              <a:schemeClr val="accent1"/>
-            </a:lnRef>
-            <a:fillRef idx="0">
-              <a:schemeClr val="accent1"/>
-            </a:fillRef>
-            <a:effectRef idx="1">
-              <a:schemeClr val="accent1"/>
-            </a:effectRef>
-            <a:fontRef idx="minor">
-              <a:schemeClr val="tx1"/>
-            </a:fontRef>
-          </p:style>
-        </p:cxnSp>
-        <p:sp>
-          <p:nvSpPr>
-            <p:cNvPr id="35" name="Rectangle 34">
-              <a:extLst>
-                <a:ext uri="{FF2B5EF4-FFF2-40B4-BE49-F238E27FC236}">
-                  <a16:creationId xmlns:a16="http://schemas.microsoft.com/office/drawing/2014/main" id="{54F80C21-A1C7-8A4F-5C3F-3C650CF5BDD1}"/>
-                </a:ext>
-              </a:extLst>
-            </p:cNvPr>
-            <p:cNvSpPr/>
-            <p:nvPr/>
-          </p:nvSpPr>
-          <p:spPr>
-            <a:xfrm>
-              <a:off x="3231290" y="3472250"/>
-              <a:ext cx="265671" cy="951470"/>
-            </a:xfrm>
-            <a:prstGeom prst="rect">
-              <a:avLst/>
-            </a:prstGeom>
-            <a:solidFill>
-              <a:srgbClr val="92D050"/>
-            </a:solidFill>
-          </p:spPr>
-          <p:style>
-            <a:lnRef idx="2">
-              <a:schemeClr val="accent1">
-                <a:shade val="15000"/>
-              </a:schemeClr>
-            </a:lnRef>
-            <a:fillRef idx="1">
-              <a:schemeClr val="accent1"/>
-            </a:fillRef>
-            <a:effectRef idx="0">
-              <a:schemeClr val="accent1"/>
-            </a:effectRef>
-            <a:fontRef idx="minor">
-              <a:schemeClr val="lt1"/>
-            </a:fontRef>
-          </p:style>
-          <p:txBody>
-            <a:bodyPr rtlCol="0" anchor="ctr"/>
-            <a:lstStyle/>
-            <a:p>
-              <a:pPr algn="ctr"/>
-              <a:endParaRPr lang="en-GB"/>
-            </a:p>
-          </p:txBody>
-        </p:sp>
-      </p:grpSp>
-      <p:grpSp>
-        <p:nvGrpSpPr>
-          <p:cNvPr id="36" name="Group 35">
-            <a:extLst>
-              <a:ext uri="{FF2B5EF4-FFF2-40B4-BE49-F238E27FC236}">
-                <a16:creationId xmlns:a16="http://schemas.microsoft.com/office/drawing/2014/main" id="{25F943F6-6DC6-3E78-51E0-080A0698E20B}"/>
-              </a:ext>
-            </a:extLst>
-          </p:cNvPr>
-          <p:cNvGrpSpPr/>
-          <p:nvPr/>
-        </p:nvGrpSpPr>
-        <p:grpSpPr>
-          <a:xfrm>
-            <a:off x="2341760" y="2350564"/>
-            <a:ext cx="265671" cy="1822622"/>
-            <a:chOff x="3231290" y="2990335"/>
-            <a:chExt cx="265671" cy="1822622"/>
-          </a:xfrm>
-        </p:grpSpPr>
-        <p:cxnSp>
-          <p:nvCxnSpPr>
-            <p:cNvPr id="37" name="Straight Connector 36">
-              <a:extLst>
-                <a:ext uri="{FF2B5EF4-FFF2-40B4-BE49-F238E27FC236}">
-                  <a16:creationId xmlns:a16="http://schemas.microsoft.com/office/drawing/2014/main" id="{06E74711-9EF1-3A85-4370-27689C107788}"/>
-                </a:ext>
-              </a:extLst>
-            </p:cNvPr>
-            <p:cNvCxnSpPr>
-              <a:cxnSpLocks/>
-            </p:cNvCxnSpPr>
-            <p:nvPr/>
-          </p:nvCxnSpPr>
-          <p:spPr>
-            <a:xfrm>
-              <a:off x="3361038" y="2990335"/>
-              <a:ext cx="0" cy="1822622"/>
-            </a:xfrm>
-            <a:prstGeom prst="line">
-              <a:avLst/>
-            </a:prstGeom>
-          </p:spPr>
-          <p:style>
-            <a:lnRef idx="2">
-              <a:schemeClr val="accent1"/>
-            </a:lnRef>
-            <a:fillRef idx="0">
-              <a:schemeClr val="accent1"/>
-            </a:fillRef>
-            <a:effectRef idx="1">
-              <a:schemeClr val="accent1"/>
-            </a:effectRef>
-            <a:fontRef idx="minor">
-              <a:schemeClr val="tx1"/>
-            </a:fontRef>
-          </p:style>
-        </p:cxnSp>
-        <p:sp>
-          <p:nvSpPr>
-            <p:cNvPr id="38" name="Rectangle 37">
-              <a:extLst>
-                <a:ext uri="{FF2B5EF4-FFF2-40B4-BE49-F238E27FC236}">
-                  <a16:creationId xmlns:a16="http://schemas.microsoft.com/office/drawing/2014/main" id="{4753CE6C-C200-CF7F-4182-73229C737D31}"/>
-                </a:ext>
-              </a:extLst>
-            </p:cNvPr>
-            <p:cNvSpPr/>
-            <p:nvPr/>
-          </p:nvSpPr>
-          <p:spPr>
-            <a:xfrm>
-              <a:off x="3231290" y="3472250"/>
-              <a:ext cx="265671" cy="951470"/>
-            </a:xfrm>
-            <a:prstGeom prst="rect">
-              <a:avLst/>
-            </a:prstGeom>
-            <a:solidFill>
-              <a:srgbClr val="FF0000"/>
-            </a:solidFill>
-          </p:spPr>
-          <p:style>
-            <a:lnRef idx="2">
-              <a:schemeClr val="accent1">
-                <a:shade val="15000"/>
-              </a:schemeClr>
-            </a:lnRef>
-            <a:fillRef idx="1">
-              <a:schemeClr val="accent1"/>
-            </a:fillRef>
-            <a:effectRef idx="0">
-              <a:schemeClr val="accent1"/>
-            </a:effectRef>
-            <a:fontRef idx="minor">
-              <a:schemeClr val="lt1"/>
-            </a:fontRef>
-          </p:style>
-          <p:txBody>
-            <a:bodyPr rtlCol="0" anchor="ctr"/>
-            <a:lstStyle/>
-            <a:p>
-              <a:pPr algn="ctr"/>
-              <a:endParaRPr lang="en-GB"/>
-            </a:p>
-          </p:txBody>
-        </p:sp>
-      </p:grpSp>
-      <p:grpSp>
-        <p:nvGrpSpPr>
-          <p:cNvPr id="39" name="Group 38">
-            <a:extLst>
-              <a:ext uri="{FF2B5EF4-FFF2-40B4-BE49-F238E27FC236}">
-                <a16:creationId xmlns:a16="http://schemas.microsoft.com/office/drawing/2014/main" id="{A9C390CD-2B0E-06C4-E6AF-9323D37F4CD1}"/>
-              </a:ext>
-            </a:extLst>
-          </p:cNvPr>
-          <p:cNvGrpSpPr/>
-          <p:nvPr/>
-        </p:nvGrpSpPr>
-        <p:grpSpPr>
-          <a:xfrm>
-            <a:off x="3289645" y="2350564"/>
-            <a:ext cx="265671" cy="1822622"/>
-            <a:chOff x="3231290" y="2990335"/>
-            <a:chExt cx="265671" cy="1822622"/>
-          </a:xfrm>
-        </p:grpSpPr>
-        <p:cxnSp>
-          <p:nvCxnSpPr>
-            <p:cNvPr id="40" name="Straight Connector 39">
-              <a:extLst>
-                <a:ext uri="{FF2B5EF4-FFF2-40B4-BE49-F238E27FC236}">
-                  <a16:creationId xmlns:a16="http://schemas.microsoft.com/office/drawing/2014/main" id="{9FB39181-9500-3F4C-B045-5D402258E15D}"/>
-                </a:ext>
-              </a:extLst>
-            </p:cNvPr>
-            <p:cNvCxnSpPr>
-              <a:cxnSpLocks/>
-            </p:cNvCxnSpPr>
-            <p:nvPr/>
-          </p:nvCxnSpPr>
-          <p:spPr>
-            <a:xfrm>
-              <a:off x="3361038" y="2990335"/>
-              <a:ext cx="0" cy="1822622"/>
-            </a:xfrm>
-            <a:prstGeom prst="line">
-              <a:avLst/>
-            </a:prstGeom>
-          </p:spPr>
-          <p:style>
-            <a:lnRef idx="2">
-              <a:schemeClr val="accent1"/>
-            </a:lnRef>
-            <a:fillRef idx="0">
-              <a:schemeClr val="accent1"/>
-            </a:fillRef>
-            <a:effectRef idx="1">
-              <a:schemeClr val="accent1"/>
-            </a:effectRef>
-            <a:fontRef idx="minor">
-              <a:schemeClr val="tx1"/>
-            </a:fontRef>
-          </p:style>
-        </p:cxnSp>
-        <p:sp>
-          <p:nvSpPr>
-            <p:cNvPr id="41" name="Rectangle 40">
-              <a:extLst>
-                <a:ext uri="{FF2B5EF4-FFF2-40B4-BE49-F238E27FC236}">
-                  <a16:creationId xmlns:a16="http://schemas.microsoft.com/office/drawing/2014/main" id="{C8DCD3A1-AFBB-89BB-560B-40E061072B49}"/>
-                </a:ext>
-              </a:extLst>
-            </p:cNvPr>
-            <p:cNvSpPr/>
-            <p:nvPr/>
-          </p:nvSpPr>
-          <p:spPr>
-            <a:xfrm>
-              <a:off x="3231290" y="3472250"/>
-              <a:ext cx="265671" cy="951470"/>
-            </a:xfrm>
-            <a:prstGeom prst="rect">
-              <a:avLst/>
-            </a:prstGeom>
-            <a:solidFill>
-              <a:srgbClr val="FF0000"/>
-            </a:solidFill>
-          </p:spPr>
-          <p:style>
-            <a:lnRef idx="2">
-              <a:schemeClr val="accent1">
-                <a:shade val="15000"/>
-              </a:schemeClr>
-            </a:lnRef>
-            <a:fillRef idx="1">
-              <a:schemeClr val="accent1"/>
-            </a:fillRef>
-            <a:effectRef idx="0">
-              <a:schemeClr val="accent1"/>
-            </a:effectRef>
-            <a:fontRef idx="minor">
-              <a:schemeClr val="lt1"/>
-            </a:fontRef>
-          </p:style>
-          <p:txBody>
-            <a:bodyPr rtlCol="0" anchor="ctr"/>
-            <a:lstStyle/>
-            <a:p>
-              <a:pPr algn="ctr"/>
-              <a:endParaRPr lang="en-GB"/>
-            </a:p>
-          </p:txBody>
-        </p:sp>
-      </p:grpSp>
+      <p:sp>
+        <p:nvSpPr>
+          <p:cNvPr id="2" name="Rectangle 1">
+            <a:extLst>
+              <a:ext uri="{FF2B5EF4-FFF2-40B4-BE49-F238E27FC236}">
+                <a16:creationId xmlns:a16="http://schemas.microsoft.com/office/drawing/2014/main" id="{F3A0FF59-B83D-90AE-010B-AA3C08B066A9}"/>
+              </a:ext>
+            </a:extLst>
+          </p:cNvPr>
+          <p:cNvSpPr/>
+          <p:nvPr/>
+        </p:nvSpPr>
+        <p:spPr>
+          <a:xfrm>
+            <a:off x="5314424" y="5884874"/>
+            <a:ext cx="3322041" cy="524312"/>
+          </a:xfrm>
+          <a:prstGeom prst="rect">
+            <a:avLst/>
+          </a:prstGeom>
+          <a:solidFill>
+            <a:schemeClr val="accent2"/>
+          </a:solidFill>
+        </p:spPr>
+        <p:style>
+          <a:lnRef idx="2">
+            <a:schemeClr val="accent1">
+              <a:shade val="15000"/>
+            </a:schemeClr>
+          </a:lnRef>
+          <a:fillRef idx="1">
+            <a:schemeClr val="accent1"/>
+          </a:fillRef>
+          <a:effectRef idx="0">
+            <a:schemeClr val="accent1"/>
+          </a:effectRef>
+          <a:fontRef idx="minor">
+            <a:schemeClr val="lt1"/>
+          </a:fontRef>
+        </p:style>
+        <p:txBody>
+          <a:bodyPr rtlCol="0" anchor="ctr"/>
+          <a:lstStyle/>
+          <a:p>
+            <a:pPr algn="ctr"/>
+            <a:endParaRPr lang="en-GB"/>
+          </a:p>
+        </p:txBody>
+      </p:sp>
       <p:cxnSp>
         <p:nvCxnSpPr>
-          <p:cNvPr id="42" name="Straight Connector 41">
-            <a:extLst>
-              <a:ext uri="{FF2B5EF4-FFF2-40B4-BE49-F238E27FC236}">
-                <a16:creationId xmlns:a16="http://schemas.microsoft.com/office/drawing/2014/main" id="{5FF9406B-6B2A-B47F-F35E-4767B4ADD102}"/>
+          <p:cNvPr id="5" name="Straight Arrow Connector 4">
+            <a:extLst>
+              <a:ext uri="{FF2B5EF4-FFF2-40B4-BE49-F238E27FC236}">
+                <a16:creationId xmlns:a16="http://schemas.microsoft.com/office/drawing/2014/main" id="{FBF33A0D-EFAC-78AB-3548-FF5D5EDC96C0}"/>
               </a:ext>
             </a:extLst>
           </p:cNvPr>
           <p:cNvCxnSpPr>
             <a:cxnSpLocks/>
+            <a:stCxn id="9" idx="3"/>
+            <a:endCxn id="2" idx="1"/>
           </p:cNvCxnSpPr>
           <p:nvPr/>
         </p:nvCxnSpPr>
         <p:spPr>
           <a:xfrm>
-            <a:off x="1554368" y="1353038"/>
-            <a:ext cx="4762906" cy="3628239"/>
-          </a:xfrm>
-          <a:prstGeom prst="line">
-            <a:avLst/>
-          </a:prstGeom>
+            <a:off x="4043492" y="3101830"/>
+            <a:ext cx="1270932" cy="3045200"/>
+          </a:xfrm>
+          <a:prstGeom prst="straightConnector1">
+            <a:avLst/>
+          </a:prstGeom>
+          <a:ln>
+            <a:tailEnd type="triangle"/>
+          </a:ln>
         </p:spPr>
         <p:style>
           <a:lnRef idx="2">
@@ -8312,330 +7718,55 @@
           </a:fontRef>
         </p:style>
       </p:cxnSp>
-      <p:grpSp>
-        <p:nvGrpSpPr>
-          <p:cNvPr id="45" name="Group 44">
-            <a:extLst>
-              <a:ext uri="{FF2B5EF4-FFF2-40B4-BE49-F238E27FC236}">
-                <a16:creationId xmlns:a16="http://schemas.microsoft.com/office/drawing/2014/main" id="{21FE05DA-C4EF-054D-8E61-78C783BAFC4C}"/>
-              </a:ext>
-            </a:extLst>
-          </p:cNvPr>
-          <p:cNvGrpSpPr/>
-          <p:nvPr/>
-        </p:nvGrpSpPr>
-        <p:grpSpPr>
-          <a:xfrm>
-            <a:off x="3767622" y="2779960"/>
-            <a:ext cx="265671" cy="1822622"/>
-            <a:chOff x="3231290" y="2990335"/>
-            <a:chExt cx="265671" cy="1822622"/>
-          </a:xfrm>
-        </p:grpSpPr>
-        <p:cxnSp>
-          <p:nvCxnSpPr>
-            <p:cNvPr id="46" name="Straight Connector 45">
-              <a:extLst>
-                <a:ext uri="{FF2B5EF4-FFF2-40B4-BE49-F238E27FC236}">
-                  <a16:creationId xmlns:a16="http://schemas.microsoft.com/office/drawing/2014/main" id="{99D8DF0D-DC63-A7BF-B2AE-77557FC7DB91}"/>
-                </a:ext>
-              </a:extLst>
-            </p:cNvPr>
-            <p:cNvCxnSpPr>
-              <a:cxnSpLocks/>
-            </p:cNvCxnSpPr>
-            <p:nvPr/>
-          </p:nvCxnSpPr>
-          <p:spPr>
-            <a:xfrm>
-              <a:off x="3361038" y="2990335"/>
-              <a:ext cx="0" cy="1822622"/>
-            </a:xfrm>
-            <a:prstGeom prst="line">
-              <a:avLst/>
-            </a:prstGeom>
-          </p:spPr>
-          <p:style>
-            <a:lnRef idx="2">
-              <a:schemeClr val="accent1"/>
-            </a:lnRef>
-            <a:fillRef idx="0">
-              <a:schemeClr val="accent1"/>
-            </a:fillRef>
-            <a:effectRef idx="1">
-              <a:schemeClr val="accent1"/>
-            </a:effectRef>
-            <a:fontRef idx="minor">
-              <a:schemeClr val="tx1"/>
-            </a:fontRef>
-          </p:style>
-        </p:cxnSp>
-        <p:sp>
-          <p:nvSpPr>
-            <p:cNvPr id="47" name="Rectangle 46">
-              <a:extLst>
-                <a:ext uri="{FF2B5EF4-FFF2-40B4-BE49-F238E27FC236}">
-                  <a16:creationId xmlns:a16="http://schemas.microsoft.com/office/drawing/2014/main" id="{980C5F5F-303A-46EF-51F6-50FB0F431D44}"/>
-                </a:ext>
-              </a:extLst>
-            </p:cNvPr>
-            <p:cNvSpPr/>
-            <p:nvPr/>
-          </p:nvSpPr>
-          <p:spPr>
-            <a:xfrm>
-              <a:off x="3231290" y="3472250"/>
-              <a:ext cx="265671" cy="951470"/>
-            </a:xfrm>
-            <a:prstGeom prst="rect">
-              <a:avLst/>
-            </a:prstGeom>
-            <a:solidFill>
-              <a:srgbClr val="FF0000"/>
-            </a:solidFill>
-          </p:spPr>
-          <p:style>
-            <a:lnRef idx="2">
-              <a:schemeClr val="accent1">
-                <a:shade val="15000"/>
-              </a:schemeClr>
-            </a:lnRef>
-            <a:fillRef idx="1">
-              <a:schemeClr val="accent1"/>
-            </a:fillRef>
-            <a:effectRef idx="0">
-              <a:schemeClr val="accent1"/>
-            </a:effectRef>
-            <a:fontRef idx="minor">
-              <a:schemeClr val="lt1"/>
-            </a:fontRef>
-          </p:style>
-          <p:txBody>
-            <a:bodyPr rtlCol="0" anchor="ctr"/>
-            <a:lstStyle/>
-            <a:p>
-              <a:pPr algn="ctr"/>
-              <a:endParaRPr lang="en-GB"/>
-            </a:p>
-          </p:txBody>
-        </p:sp>
-      </p:grpSp>
-      <p:grpSp>
-        <p:nvGrpSpPr>
-          <p:cNvPr id="48" name="Group 47">
-            <a:extLst>
-              <a:ext uri="{FF2B5EF4-FFF2-40B4-BE49-F238E27FC236}">
-                <a16:creationId xmlns:a16="http://schemas.microsoft.com/office/drawing/2014/main" id="{5E7909E4-55D5-53E8-9F3C-CF8BE21C3CCC}"/>
-              </a:ext>
-            </a:extLst>
-          </p:cNvPr>
-          <p:cNvGrpSpPr/>
-          <p:nvPr/>
-        </p:nvGrpSpPr>
-        <p:grpSpPr>
-          <a:xfrm>
-            <a:off x="4178081" y="3593361"/>
-            <a:ext cx="265671" cy="1822622"/>
-            <a:chOff x="3231290" y="2990335"/>
-            <a:chExt cx="265671" cy="1822622"/>
-          </a:xfrm>
-        </p:grpSpPr>
-        <p:cxnSp>
-          <p:nvCxnSpPr>
-            <p:cNvPr id="49" name="Straight Connector 48">
-              <a:extLst>
-                <a:ext uri="{FF2B5EF4-FFF2-40B4-BE49-F238E27FC236}">
-                  <a16:creationId xmlns:a16="http://schemas.microsoft.com/office/drawing/2014/main" id="{3A0B1B1D-72AE-8CAD-3D4C-5E7E13F1DCAC}"/>
-                </a:ext>
-              </a:extLst>
-            </p:cNvPr>
-            <p:cNvCxnSpPr>
-              <a:cxnSpLocks/>
-            </p:cNvCxnSpPr>
-            <p:nvPr/>
-          </p:nvCxnSpPr>
-          <p:spPr>
-            <a:xfrm>
-              <a:off x="3361038" y="2990335"/>
-              <a:ext cx="0" cy="1822622"/>
-            </a:xfrm>
-            <a:prstGeom prst="line">
-              <a:avLst/>
-            </a:prstGeom>
-          </p:spPr>
-          <p:style>
-            <a:lnRef idx="2">
-              <a:schemeClr val="accent1"/>
-            </a:lnRef>
-            <a:fillRef idx="0">
-              <a:schemeClr val="accent1"/>
-            </a:fillRef>
-            <a:effectRef idx="1">
-              <a:schemeClr val="accent1"/>
-            </a:effectRef>
-            <a:fontRef idx="minor">
-              <a:schemeClr val="tx1"/>
-            </a:fontRef>
-          </p:style>
-        </p:cxnSp>
-        <p:sp>
-          <p:nvSpPr>
-            <p:cNvPr id="50" name="Rectangle 49">
-              <a:extLst>
-                <a:ext uri="{FF2B5EF4-FFF2-40B4-BE49-F238E27FC236}">
-                  <a16:creationId xmlns:a16="http://schemas.microsoft.com/office/drawing/2014/main" id="{7A278773-BB80-43DC-9C17-C7A7B9F5335E}"/>
-                </a:ext>
-              </a:extLst>
-            </p:cNvPr>
-            <p:cNvSpPr/>
-            <p:nvPr/>
-          </p:nvSpPr>
-          <p:spPr>
-            <a:xfrm>
-              <a:off x="3231290" y="3472250"/>
-              <a:ext cx="265671" cy="951470"/>
-            </a:xfrm>
-            <a:prstGeom prst="rect">
-              <a:avLst/>
-            </a:prstGeom>
-            <a:solidFill>
-              <a:srgbClr val="FF0000"/>
-            </a:solidFill>
-          </p:spPr>
-          <p:style>
-            <a:lnRef idx="2">
-              <a:schemeClr val="accent1">
-                <a:shade val="15000"/>
-              </a:schemeClr>
-            </a:lnRef>
-            <a:fillRef idx="1">
-              <a:schemeClr val="accent1"/>
-            </a:fillRef>
-            <a:effectRef idx="0">
-              <a:schemeClr val="accent1"/>
-            </a:effectRef>
-            <a:fontRef idx="minor">
-              <a:schemeClr val="lt1"/>
-            </a:fontRef>
-          </p:style>
-          <p:txBody>
-            <a:bodyPr rtlCol="0" anchor="ctr"/>
-            <a:lstStyle/>
-            <a:p>
-              <a:pPr algn="ctr"/>
-              <a:endParaRPr lang="en-GB"/>
-            </a:p>
-          </p:txBody>
-        </p:sp>
-      </p:grpSp>
-      <p:grpSp>
-        <p:nvGrpSpPr>
-          <p:cNvPr id="51" name="Group 50">
-            <a:extLst>
-              <a:ext uri="{FF2B5EF4-FFF2-40B4-BE49-F238E27FC236}">
-                <a16:creationId xmlns:a16="http://schemas.microsoft.com/office/drawing/2014/main" id="{54A626DE-2B23-3068-1955-7CC200FE7478}"/>
-              </a:ext>
-            </a:extLst>
-          </p:cNvPr>
-          <p:cNvGrpSpPr/>
-          <p:nvPr/>
-        </p:nvGrpSpPr>
-        <p:grpSpPr>
-          <a:xfrm>
-            <a:off x="4968919" y="3597556"/>
-            <a:ext cx="265671" cy="1822622"/>
-            <a:chOff x="3231290" y="2990335"/>
-            <a:chExt cx="265671" cy="1822622"/>
-          </a:xfrm>
-        </p:grpSpPr>
-        <p:cxnSp>
-          <p:nvCxnSpPr>
-            <p:cNvPr id="52" name="Straight Connector 51">
-              <a:extLst>
-                <a:ext uri="{FF2B5EF4-FFF2-40B4-BE49-F238E27FC236}">
-                  <a16:creationId xmlns:a16="http://schemas.microsoft.com/office/drawing/2014/main" id="{A6E384D7-5302-1C3E-15F4-A0C5DE668AD4}"/>
-                </a:ext>
-              </a:extLst>
-            </p:cNvPr>
-            <p:cNvCxnSpPr>
-              <a:cxnSpLocks/>
-            </p:cNvCxnSpPr>
-            <p:nvPr/>
-          </p:nvCxnSpPr>
-          <p:spPr>
-            <a:xfrm>
-              <a:off x="3361038" y="2990335"/>
-              <a:ext cx="0" cy="1822622"/>
-            </a:xfrm>
-            <a:prstGeom prst="line">
-              <a:avLst/>
-            </a:prstGeom>
-          </p:spPr>
-          <p:style>
-            <a:lnRef idx="2">
-              <a:schemeClr val="accent1"/>
-            </a:lnRef>
-            <a:fillRef idx="0">
-              <a:schemeClr val="accent1"/>
-            </a:fillRef>
-            <a:effectRef idx="1">
-              <a:schemeClr val="accent1"/>
-            </a:effectRef>
-            <a:fontRef idx="minor">
-              <a:schemeClr val="tx1"/>
-            </a:fontRef>
-          </p:style>
-        </p:cxnSp>
-        <p:sp>
-          <p:nvSpPr>
-            <p:cNvPr id="53" name="Rectangle 52">
-              <a:extLst>
-                <a:ext uri="{FF2B5EF4-FFF2-40B4-BE49-F238E27FC236}">
-                  <a16:creationId xmlns:a16="http://schemas.microsoft.com/office/drawing/2014/main" id="{14E2BDC5-7E34-1E78-A51E-AC2A0069EFDD}"/>
-                </a:ext>
-              </a:extLst>
-            </p:cNvPr>
-            <p:cNvSpPr/>
-            <p:nvPr/>
-          </p:nvSpPr>
-          <p:spPr>
-            <a:xfrm>
-              <a:off x="3231290" y="3472250"/>
-              <a:ext cx="265671" cy="951470"/>
-            </a:xfrm>
-            <a:prstGeom prst="rect">
-              <a:avLst/>
-            </a:prstGeom>
-            <a:solidFill>
-              <a:srgbClr val="FF0000"/>
-            </a:solidFill>
-          </p:spPr>
-          <p:style>
-            <a:lnRef idx="2">
-              <a:schemeClr val="accent1">
-                <a:shade val="15000"/>
-              </a:schemeClr>
-            </a:lnRef>
-            <a:fillRef idx="1">
-              <a:schemeClr val="accent1"/>
-            </a:fillRef>
-            <a:effectRef idx="0">
-              <a:schemeClr val="accent1"/>
-            </a:effectRef>
-            <a:fontRef idx="minor">
-              <a:schemeClr val="lt1"/>
-            </a:fontRef>
-          </p:style>
-          <p:txBody>
-            <a:bodyPr rtlCol="0" anchor="ctr"/>
-            <a:lstStyle/>
-            <a:p>
-              <a:pPr algn="ctr"/>
-              <a:endParaRPr lang="en-GB"/>
-            </a:p>
-          </p:txBody>
-        </p:sp>
-      </p:grpSp>
+      <p:sp>
+        <p:nvSpPr>
+          <p:cNvPr id="9" name="Rectangle 8">
+            <a:extLst>
+              <a:ext uri="{FF2B5EF4-FFF2-40B4-BE49-F238E27FC236}">
+                <a16:creationId xmlns:a16="http://schemas.microsoft.com/office/drawing/2014/main" id="{E88BCCC4-A957-8B89-8858-F7FEDA9941CB}"/>
+              </a:ext>
+            </a:extLst>
+          </p:cNvPr>
+          <p:cNvSpPr/>
+          <p:nvPr/>
+        </p:nvSpPr>
+        <p:spPr>
+          <a:xfrm>
+            <a:off x="721451" y="2839674"/>
+            <a:ext cx="3322041" cy="524312"/>
+          </a:xfrm>
+          <a:prstGeom prst="rect">
+            <a:avLst/>
+          </a:prstGeom>
+          <a:solidFill>
+            <a:schemeClr val="accent2"/>
+          </a:solidFill>
+        </p:spPr>
+        <p:style>
+          <a:lnRef idx="2">
+            <a:schemeClr val="accent1">
+              <a:shade val="15000"/>
+            </a:schemeClr>
+          </a:lnRef>
+          <a:fillRef idx="1">
+            <a:schemeClr val="accent1"/>
+          </a:fillRef>
+          <a:effectRef idx="0">
+            <a:schemeClr val="accent1"/>
+          </a:effectRef>
+          <a:fontRef idx="minor">
+            <a:schemeClr val="lt1"/>
+          </a:fontRef>
+        </p:style>
+        <p:txBody>
+          <a:bodyPr rtlCol="0" anchor="ctr"/>
+          <a:lstStyle/>
+          <a:p>
+            <a:pPr algn="ctr"/>
+            <a:endParaRPr lang="en-GB"/>
+          </a:p>
+        </p:txBody>
+      </p:sp>
     </p:spTree>
     <p:extLst>
       <p:ext uri="{BB962C8B-B14F-4D97-AF65-F5344CB8AC3E}">

</xml_diff>

<commit_message>
created backtester within Frame
</commit_message>
<xml_diff>
--- a/architecture.pptx
+++ b/architecture.pptx
@@ -6,17 +6,19 @@
   </p:sldMasterIdLst>
   <p:sldIdLst>
     <p:sldId id="256" r:id="rId2"/>
-    <p:sldId id="257" r:id="rId3"/>
-    <p:sldId id="267" r:id="rId4"/>
-    <p:sldId id="258" r:id="rId5"/>
-    <p:sldId id="259" r:id="rId6"/>
-    <p:sldId id="260" r:id="rId7"/>
-    <p:sldId id="265" r:id="rId8"/>
-    <p:sldId id="261" r:id="rId9"/>
-    <p:sldId id="262" r:id="rId10"/>
-    <p:sldId id="264" r:id="rId11"/>
-    <p:sldId id="263" r:id="rId12"/>
-    <p:sldId id="266" r:id="rId13"/>
+    <p:sldId id="268" r:id="rId3"/>
+    <p:sldId id="257" r:id="rId4"/>
+    <p:sldId id="267" r:id="rId5"/>
+    <p:sldId id="258" r:id="rId6"/>
+    <p:sldId id="259" r:id="rId7"/>
+    <p:sldId id="260" r:id="rId8"/>
+    <p:sldId id="265" r:id="rId9"/>
+    <p:sldId id="261" r:id="rId10"/>
+    <p:sldId id="262" r:id="rId11"/>
+    <p:sldId id="264" r:id="rId12"/>
+    <p:sldId id="263" r:id="rId13"/>
+    <p:sldId id="266" r:id="rId14"/>
+    <p:sldId id="269" r:id="rId15"/>
   </p:sldIdLst>
   <p:sldSz cx="12192000" cy="6858000"/>
   <p:notesSz cx="6858000" cy="9144000"/>
@@ -272,7 +274,7 @@
           <a:p>
             <a:fld id="{E836676F-0B3F-419A-970B-6F0A8B86F3B3}" type="datetimeFigureOut">
               <a:rPr lang="en-GB" smtClean="0"/>
-              <a:t>26/12/2024</a:t>
+              <a:t>29/12/2024</a:t>
             </a:fld>
             <a:endParaRPr lang="en-GB"/>
           </a:p>
@@ -472,7 +474,7 @@
           <a:p>
             <a:fld id="{E836676F-0B3F-419A-970B-6F0A8B86F3B3}" type="datetimeFigureOut">
               <a:rPr lang="en-GB" smtClean="0"/>
-              <a:t>26/12/2024</a:t>
+              <a:t>29/12/2024</a:t>
             </a:fld>
             <a:endParaRPr lang="en-GB"/>
           </a:p>
@@ -682,7 +684,7 @@
           <a:p>
             <a:fld id="{E836676F-0B3F-419A-970B-6F0A8B86F3B3}" type="datetimeFigureOut">
               <a:rPr lang="en-GB" smtClean="0"/>
-              <a:t>26/12/2024</a:t>
+              <a:t>29/12/2024</a:t>
             </a:fld>
             <a:endParaRPr lang="en-GB"/>
           </a:p>
@@ -882,7 +884,7 @@
           <a:p>
             <a:fld id="{E836676F-0B3F-419A-970B-6F0A8B86F3B3}" type="datetimeFigureOut">
               <a:rPr lang="en-GB" smtClean="0"/>
-              <a:t>26/12/2024</a:t>
+              <a:t>29/12/2024</a:t>
             </a:fld>
             <a:endParaRPr lang="en-GB"/>
           </a:p>
@@ -1158,7 +1160,7 @@
           <a:p>
             <a:fld id="{E836676F-0B3F-419A-970B-6F0A8B86F3B3}" type="datetimeFigureOut">
               <a:rPr lang="en-GB" smtClean="0"/>
-              <a:t>26/12/2024</a:t>
+              <a:t>29/12/2024</a:t>
             </a:fld>
             <a:endParaRPr lang="en-GB"/>
           </a:p>
@@ -1426,7 +1428,7 @@
           <a:p>
             <a:fld id="{E836676F-0B3F-419A-970B-6F0A8B86F3B3}" type="datetimeFigureOut">
               <a:rPr lang="en-GB" smtClean="0"/>
-              <a:t>26/12/2024</a:t>
+              <a:t>29/12/2024</a:t>
             </a:fld>
             <a:endParaRPr lang="en-GB"/>
           </a:p>
@@ -1841,7 +1843,7 @@
           <a:p>
             <a:fld id="{E836676F-0B3F-419A-970B-6F0A8B86F3B3}" type="datetimeFigureOut">
               <a:rPr lang="en-GB" smtClean="0"/>
-              <a:t>26/12/2024</a:t>
+              <a:t>29/12/2024</a:t>
             </a:fld>
             <a:endParaRPr lang="en-GB"/>
           </a:p>
@@ -1983,7 +1985,7 @@
           <a:p>
             <a:fld id="{E836676F-0B3F-419A-970B-6F0A8B86F3B3}" type="datetimeFigureOut">
               <a:rPr lang="en-GB" smtClean="0"/>
-              <a:t>26/12/2024</a:t>
+              <a:t>29/12/2024</a:t>
             </a:fld>
             <a:endParaRPr lang="en-GB"/>
           </a:p>
@@ -2096,7 +2098,7 @@
           <a:p>
             <a:fld id="{E836676F-0B3F-419A-970B-6F0A8B86F3B3}" type="datetimeFigureOut">
               <a:rPr lang="en-GB" smtClean="0"/>
-              <a:t>26/12/2024</a:t>
+              <a:t>29/12/2024</a:t>
             </a:fld>
             <a:endParaRPr lang="en-GB"/>
           </a:p>
@@ -2409,7 +2411,7 @@
           <a:p>
             <a:fld id="{E836676F-0B3F-419A-970B-6F0A8B86F3B3}" type="datetimeFigureOut">
               <a:rPr lang="en-GB" smtClean="0"/>
-              <a:t>26/12/2024</a:t>
+              <a:t>29/12/2024</a:t>
             </a:fld>
             <a:endParaRPr lang="en-GB"/>
           </a:p>
@@ -2698,7 +2700,7 @@
           <a:p>
             <a:fld id="{E836676F-0B3F-419A-970B-6F0A8B86F3B3}" type="datetimeFigureOut">
               <a:rPr lang="en-GB" smtClean="0"/>
-              <a:t>26/12/2024</a:t>
+              <a:t>29/12/2024</a:t>
             </a:fld>
             <a:endParaRPr lang="en-GB"/>
           </a:p>
@@ -2941,7 +2943,7 @@
           <a:p>
             <a:fld id="{E836676F-0B3F-419A-970B-6F0A8B86F3B3}" type="datetimeFigureOut">
               <a:rPr lang="en-GB" smtClean="0"/>
-              <a:t>26/12/2024</a:t>
+              <a:t>29/12/2024</a:t>
             </a:fld>
             <a:endParaRPr lang="en-GB"/>
           </a:p>
@@ -5145,10 +5147,10 @@
       </p:grpSpPr>
       <p:pic>
         <p:nvPicPr>
-          <p:cNvPr id="3" name="Picture 2">
-            <a:extLst>
-              <a:ext uri="{FF2B5EF4-FFF2-40B4-BE49-F238E27FC236}">
-                <a16:creationId xmlns:a16="http://schemas.microsoft.com/office/drawing/2014/main" id="{EF2A13E4-73F8-406B-90F9-D41AFEB45C03}"/>
+          <p:cNvPr id="5" name="Picture 4">
+            <a:extLst>
+              <a:ext uri="{FF2B5EF4-FFF2-40B4-BE49-F238E27FC236}">
+                <a16:creationId xmlns:a16="http://schemas.microsoft.com/office/drawing/2014/main" id="{5C0EE8CA-BEC2-2A27-9DA5-CF4BBA9883E7}"/>
               </a:ext>
             </a:extLst>
           </p:cNvPr>
@@ -5165,8 +5167,233 @@
         </p:blipFill>
         <p:spPr>
           <a:xfrm>
-            <a:off x="347162" y="299120"/>
-            <a:ext cx="9836656" cy="3340272"/>
+            <a:off x="336660" y="241009"/>
+            <a:ext cx="7637445" cy="3018023"/>
+          </a:xfrm>
+          <a:prstGeom prst="rect">
+            <a:avLst/>
+          </a:prstGeom>
+        </p:spPr>
+      </p:pic>
+      <p:pic>
+        <p:nvPicPr>
+          <p:cNvPr id="7" name="Picture 6">
+            <a:extLst>
+              <a:ext uri="{FF2B5EF4-FFF2-40B4-BE49-F238E27FC236}">
+                <a16:creationId xmlns:a16="http://schemas.microsoft.com/office/drawing/2014/main" id="{83835B6C-2D33-B9CF-1272-5BF54C95994B}"/>
+              </a:ext>
+            </a:extLst>
+          </p:cNvPr>
+          <p:cNvPicPr>
+            <a:picLocks noChangeAspect="1"/>
+          </p:cNvPicPr>
+          <p:nvPr/>
+        </p:nvPicPr>
+        <p:blipFill>
+          <a:blip r:embed="rId3"/>
+          <a:stretch>
+            <a:fillRect/>
+          </a:stretch>
+        </p:blipFill>
+        <p:spPr>
+          <a:xfrm>
+            <a:off x="336660" y="3429000"/>
+            <a:ext cx="7639877" cy="2855259"/>
+          </a:xfrm>
+          <a:prstGeom prst="rect">
+            <a:avLst/>
+          </a:prstGeom>
+        </p:spPr>
+      </p:pic>
+      <p:sp>
+        <p:nvSpPr>
+          <p:cNvPr id="8" name="Rectangle 7">
+            <a:extLst>
+              <a:ext uri="{FF2B5EF4-FFF2-40B4-BE49-F238E27FC236}">
+                <a16:creationId xmlns:a16="http://schemas.microsoft.com/office/drawing/2014/main" id="{E179226B-CD64-D964-C8E1-D9043197564E}"/>
+              </a:ext>
+            </a:extLst>
+          </p:cNvPr>
+          <p:cNvSpPr/>
+          <p:nvPr/>
+        </p:nvSpPr>
+        <p:spPr>
+          <a:xfrm>
+            <a:off x="5051613" y="3980329"/>
+            <a:ext cx="2685954" cy="528918"/>
+          </a:xfrm>
+          <a:prstGeom prst="rect">
+            <a:avLst/>
+          </a:prstGeom>
+          <a:solidFill>
+            <a:schemeClr val="accent2">
+              <a:lumMod val="75000"/>
+              <a:alpha val="22000"/>
+            </a:schemeClr>
+          </a:solidFill>
+          <a:ln>
+            <a:noFill/>
+          </a:ln>
+        </p:spPr>
+        <p:style>
+          <a:lnRef idx="2">
+            <a:schemeClr val="accent1">
+              <a:shade val="15000"/>
+            </a:schemeClr>
+          </a:lnRef>
+          <a:fillRef idx="1">
+            <a:schemeClr val="accent1"/>
+          </a:fillRef>
+          <a:effectRef idx="0">
+            <a:schemeClr val="accent1"/>
+          </a:effectRef>
+          <a:fontRef idx="minor">
+            <a:schemeClr val="lt1"/>
+          </a:fontRef>
+        </p:style>
+        <p:txBody>
+          <a:bodyPr rtlCol="0" anchor="ctr"/>
+          <a:lstStyle/>
+          <a:p>
+            <a:pPr algn="ctr"/>
+            <a:endParaRPr lang="en-GB"/>
+          </a:p>
+        </p:txBody>
+      </p:sp>
+      <p:sp>
+        <p:nvSpPr>
+          <p:cNvPr id="9" name="Rectangle 8">
+            <a:extLst>
+              <a:ext uri="{FF2B5EF4-FFF2-40B4-BE49-F238E27FC236}">
+                <a16:creationId xmlns:a16="http://schemas.microsoft.com/office/drawing/2014/main" id="{19A47CE5-6A20-D480-3073-4846B62CB487}"/>
+              </a:ext>
+            </a:extLst>
+          </p:cNvPr>
+          <p:cNvSpPr/>
+          <p:nvPr/>
+        </p:nvSpPr>
+        <p:spPr>
+          <a:xfrm>
+            <a:off x="2773680" y="4380550"/>
+            <a:ext cx="731519" cy="257393"/>
+          </a:xfrm>
+          <a:prstGeom prst="rect">
+            <a:avLst/>
+          </a:prstGeom>
+          <a:solidFill>
+            <a:schemeClr val="accent2">
+              <a:lumMod val="75000"/>
+              <a:alpha val="22000"/>
+            </a:schemeClr>
+          </a:solidFill>
+          <a:ln>
+            <a:noFill/>
+          </a:ln>
+        </p:spPr>
+        <p:style>
+          <a:lnRef idx="2">
+            <a:schemeClr val="accent1">
+              <a:shade val="15000"/>
+            </a:schemeClr>
+          </a:lnRef>
+          <a:fillRef idx="1">
+            <a:schemeClr val="accent1"/>
+          </a:fillRef>
+          <a:effectRef idx="0">
+            <a:schemeClr val="accent1"/>
+          </a:effectRef>
+          <a:fontRef idx="minor">
+            <a:schemeClr val="lt1"/>
+          </a:fontRef>
+        </p:style>
+        <p:txBody>
+          <a:bodyPr rtlCol="0" anchor="ctr"/>
+          <a:lstStyle/>
+          <a:p>
+            <a:pPr algn="ctr"/>
+            <a:endParaRPr lang="en-GB"/>
+          </a:p>
+        </p:txBody>
+      </p:sp>
+      <p:sp>
+        <p:nvSpPr>
+          <p:cNvPr id="10" name="Rectangle 9">
+            <a:extLst>
+              <a:ext uri="{FF2B5EF4-FFF2-40B4-BE49-F238E27FC236}">
+                <a16:creationId xmlns:a16="http://schemas.microsoft.com/office/drawing/2014/main" id="{B2A8ACF8-B563-99EE-B0FE-0F4CB59F5A05}"/>
+              </a:ext>
+            </a:extLst>
+          </p:cNvPr>
+          <p:cNvSpPr/>
+          <p:nvPr/>
+        </p:nvSpPr>
+        <p:spPr>
+          <a:xfrm>
+            <a:off x="4155382" y="3679510"/>
+            <a:ext cx="896231" cy="356913"/>
+          </a:xfrm>
+          <a:prstGeom prst="rect">
+            <a:avLst/>
+          </a:prstGeom>
+          <a:solidFill>
+            <a:schemeClr val="accent2">
+              <a:lumMod val="75000"/>
+              <a:alpha val="22000"/>
+            </a:schemeClr>
+          </a:solidFill>
+          <a:ln>
+            <a:noFill/>
+          </a:ln>
+        </p:spPr>
+        <p:style>
+          <a:lnRef idx="2">
+            <a:schemeClr val="accent1">
+              <a:shade val="15000"/>
+            </a:schemeClr>
+          </a:lnRef>
+          <a:fillRef idx="1">
+            <a:schemeClr val="accent1"/>
+          </a:fillRef>
+          <a:effectRef idx="0">
+            <a:schemeClr val="accent1"/>
+          </a:effectRef>
+          <a:fontRef idx="minor">
+            <a:schemeClr val="lt1"/>
+          </a:fontRef>
+        </p:style>
+        <p:txBody>
+          <a:bodyPr rtlCol="0" anchor="ctr"/>
+          <a:lstStyle/>
+          <a:p>
+            <a:pPr algn="ctr"/>
+            <a:endParaRPr lang="en-GB"/>
+          </a:p>
+        </p:txBody>
+      </p:sp>
+      <p:pic>
+        <p:nvPicPr>
+          <p:cNvPr id="12" name="Picture 11">
+            <a:extLst>
+              <a:ext uri="{FF2B5EF4-FFF2-40B4-BE49-F238E27FC236}">
+                <a16:creationId xmlns:a16="http://schemas.microsoft.com/office/drawing/2014/main" id="{DA2FE381-0975-F6AD-7EF1-AE1F94F61806}"/>
+              </a:ext>
+            </a:extLst>
+          </p:cNvPr>
+          <p:cNvPicPr>
+            <a:picLocks noChangeAspect="1"/>
+          </p:cNvPicPr>
+          <p:nvPr/>
+        </p:nvPicPr>
+        <p:blipFill>
+          <a:blip r:embed="rId4"/>
+          <a:stretch>
+            <a:fillRect/>
+          </a:stretch>
+        </p:blipFill>
+        <p:spPr>
+          <a:xfrm>
+            <a:off x="6414942" y="294473"/>
+            <a:ext cx="5325462" cy="2810132"/>
           </a:xfrm>
           <a:prstGeom prst="rect">
             <a:avLst/>
@@ -5175,10 +5402,10 @@
       </p:pic>
       <p:cxnSp>
         <p:nvCxnSpPr>
-          <p:cNvPr id="6" name="Straight Connector 5">
-            <a:extLst>
-              <a:ext uri="{FF2B5EF4-FFF2-40B4-BE49-F238E27FC236}">
-                <a16:creationId xmlns:a16="http://schemas.microsoft.com/office/drawing/2014/main" id="{0B7EAF12-D267-467B-67BE-24CBC550853F}"/>
+          <p:cNvPr id="13" name="Straight Connector 12">
+            <a:extLst>
+              <a:ext uri="{FF2B5EF4-FFF2-40B4-BE49-F238E27FC236}">
+                <a16:creationId xmlns:a16="http://schemas.microsoft.com/office/drawing/2014/main" id="{FE75E0FB-021D-01FD-05FD-63C65725D71F}"/>
               </a:ext>
             </a:extLst>
           </p:cNvPr>
@@ -5188,9 +5415,9 @@
           <p:nvPr/>
         </p:nvCxnSpPr>
         <p:spPr>
-          <a:xfrm flipV="1">
-            <a:off x="8441983" y="2864840"/>
-            <a:ext cx="1431859" cy="428048"/>
+          <a:xfrm>
+            <a:off x="8987246" y="1053737"/>
+            <a:ext cx="818605" cy="0"/>
           </a:xfrm>
           <a:prstGeom prst="line">
             <a:avLst/>
@@ -5218,10 +5445,10 @@
       </p:cxnSp>
       <p:cxnSp>
         <p:nvCxnSpPr>
-          <p:cNvPr id="9" name="Straight Connector 8">
-            <a:extLst>
-              <a:ext uri="{FF2B5EF4-FFF2-40B4-BE49-F238E27FC236}">
-                <a16:creationId xmlns:a16="http://schemas.microsoft.com/office/drawing/2014/main" id="{00A927E4-B834-603A-3162-773CA602FE93}"/>
+          <p:cNvPr id="16" name="Straight Connector 15">
+            <a:extLst>
+              <a:ext uri="{FF2B5EF4-FFF2-40B4-BE49-F238E27FC236}">
+                <a16:creationId xmlns:a16="http://schemas.microsoft.com/office/drawing/2014/main" id="{4001D132-358C-C0B3-1231-B3397A59E24A}"/>
               </a:ext>
             </a:extLst>
           </p:cNvPr>
@@ -5232,95 +5459,8 @@
         </p:nvCxnSpPr>
         <p:spPr>
           <a:xfrm>
-            <a:off x="9055916" y="1598103"/>
-            <a:ext cx="666924" cy="1019262"/>
-          </a:xfrm>
-          <a:prstGeom prst="line">
-            <a:avLst/>
-          </a:prstGeom>
-          <a:ln w="19050">
-            <a:solidFill>
-              <a:srgbClr val="FF0000"/>
-            </a:solidFill>
-          </a:ln>
-        </p:spPr>
-        <p:style>
-          <a:lnRef idx="2">
-            <a:schemeClr val="accent1"/>
-          </a:lnRef>
-          <a:fillRef idx="0">
-            <a:schemeClr val="accent1"/>
-          </a:fillRef>
-          <a:effectRef idx="1">
-            <a:schemeClr val="accent1"/>
-          </a:effectRef>
-          <a:fontRef idx="minor">
-            <a:schemeClr val="tx1"/>
-          </a:fontRef>
-        </p:style>
-      </p:cxnSp>
-      <p:cxnSp>
-        <p:nvCxnSpPr>
-          <p:cNvPr id="10" name="Straight Connector 9">
-            <a:extLst>
-              <a:ext uri="{FF2B5EF4-FFF2-40B4-BE49-F238E27FC236}">
-                <a16:creationId xmlns:a16="http://schemas.microsoft.com/office/drawing/2014/main" id="{7611024F-7C7C-526C-EFA2-4D5192BE191A}"/>
-              </a:ext>
-            </a:extLst>
-          </p:cNvPr>
-          <p:cNvCxnSpPr>
-            <a:cxnSpLocks/>
-          </p:cNvCxnSpPr>
-          <p:nvPr/>
-        </p:nvCxnSpPr>
-        <p:spPr>
-          <a:xfrm>
-            <a:off x="3705976" y="3969435"/>
-            <a:ext cx="5473338" cy="0"/>
-          </a:xfrm>
-          <a:prstGeom prst="line">
-            <a:avLst/>
-          </a:prstGeom>
-          <a:ln w="9525">
-            <a:solidFill>
-              <a:srgbClr val="FFFF00"/>
-            </a:solidFill>
-            <a:prstDash val="dash"/>
-          </a:ln>
-        </p:spPr>
-        <p:style>
-          <a:lnRef idx="2">
-            <a:schemeClr val="accent1"/>
-          </a:lnRef>
-          <a:fillRef idx="0">
-            <a:schemeClr val="accent1"/>
-          </a:fillRef>
-          <a:effectRef idx="1">
-            <a:schemeClr val="accent1"/>
-          </a:effectRef>
-          <a:fontRef idx="minor">
-            <a:schemeClr val="tx1"/>
-          </a:fontRef>
-        </p:style>
-      </p:cxnSp>
-      <p:cxnSp>
-        <p:nvCxnSpPr>
-          <p:cNvPr id="20" name="Straight Connector 19">
-            <a:extLst>
-              <a:ext uri="{FF2B5EF4-FFF2-40B4-BE49-F238E27FC236}">
-                <a16:creationId xmlns:a16="http://schemas.microsoft.com/office/drawing/2014/main" id="{E4AB0656-BC3A-A5A5-5471-472A2ADCEC91}"/>
-              </a:ext>
-            </a:extLst>
-          </p:cNvPr>
-          <p:cNvCxnSpPr>
-            <a:cxnSpLocks/>
-          </p:cNvCxnSpPr>
-          <p:nvPr/>
-        </p:nvCxnSpPr>
-        <p:spPr>
-          <a:xfrm>
-            <a:off x="3829959" y="3414319"/>
-            <a:ext cx="523927" cy="0"/>
+            <a:off x="8987246" y="666205"/>
+            <a:ext cx="818605" cy="0"/>
           </a:xfrm>
           <a:prstGeom prst="line">
             <a:avLst/>
@@ -5328,135 +5468,6 @@
           <a:ln>
             <a:solidFill>
               <a:srgbClr val="FFFF00"/>
-            </a:solidFill>
-          </a:ln>
-        </p:spPr>
-        <p:style>
-          <a:lnRef idx="2">
-            <a:schemeClr val="accent1"/>
-          </a:lnRef>
-          <a:fillRef idx="0">
-            <a:schemeClr val="accent1"/>
-          </a:fillRef>
-          <a:effectRef idx="1">
-            <a:schemeClr val="accent1"/>
-          </a:effectRef>
-          <a:fontRef idx="minor">
-            <a:schemeClr val="tx1"/>
-          </a:fontRef>
-        </p:style>
-      </p:cxnSp>
-      <p:cxnSp>
-        <p:nvCxnSpPr>
-          <p:cNvPr id="21" name="Straight Connector 20">
-            <a:extLst>
-              <a:ext uri="{FF2B5EF4-FFF2-40B4-BE49-F238E27FC236}">
-                <a16:creationId xmlns:a16="http://schemas.microsoft.com/office/drawing/2014/main" id="{AB50AC21-E512-E0E9-D6F1-EFD996BA12AE}"/>
-              </a:ext>
-            </a:extLst>
-          </p:cNvPr>
-          <p:cNvCxnSpPr>
-            <a:cxnSpLocks/>
-          </p:cNvCxnSpPr>
-          <p:nvPr/>
-        </p:nvCxnSpPr>
-        <p:spPr>
-          <a:xfrm>
-            <a:off x="6870584" y="560142"/>
-            <a:ext cx="1732326" cy="2518722"/>
-          </a:xfrm>
-          <a:prstGeom prst="line">
-            <a:avLst/>
-          </a:prstGeom>
-          <a:ln w="19050">
-            <a:solidFill>
-              <a:srgbClr val="FF0000"/>
-            </a:solidFill>
-          </a:ln>
-        </p:spPr>
-        <p:style>
-          <a:lnRef idx="2">
-            <a:schemeClr val="accent1"/>
-          </a:lnRef>
-          <a:fillRef idx="0">
-            <a:schemeClr val="accent1"/>
-          </a:fillRef>
-          <a:effectRef idx="1">
-            <a:schemeClr val="accent1"/>
-          </a:effectRef>
-          <a:fontRef idx="minor">
-            <a:schemeClr val="tx1"/>
-          </a:fontRef>
-        </p:style>
-      </p:cxnSp>
-      <p:cxnSp>
-        <p:nvCxnSpPr>
-          <p:cNvPr id="23" name="Straight Connector 22">
-            <a:extLst>
-              <a:ext uri="{FF2B5EF4-FFF2-40B4-BE49-F238E27FC236}">
-                <a16:creationId xmlns:a16="http://schemas.microsoft.com/office/drawing/2014/main" id="{0ACA9FA3-9C61-EF61-BA7A-605CE82EDAF1}"/>
-              </a:ext>
-            </a:extLst>
-          </p:cNvPr>
-          <p:cNvCxnSpPr>
-            <a:cxnSpLocks/>
-          </p:cNvCxnSpPr>
-          <p:nvPr/>
-        </p:nvCxnSpPr>
-        <p:spPr>
-          <a:xfrm>
-            <a:off x="2554416" y="787835"/>
-            <a:ext cx="1799470" cy="2641165"/>
-          </a:xfrm>
-          <a:prstGeom prst="line">
-            <a:avLst/>
-          </a:prstGeom>
-          <a:ln w="19050">
-            <a:solidFill>
-              <a:srgbClr val="FF0000"/>
-            </a:solidFill>
-          </a:ln>
-        </p:spPr>
-        <p:style>
-          <a:lnRef idx="2">
-            <a:schemeClr val="accent1"/>
-          </a:lnRef>
-          <a:fillRef idx="0">
-            <a:schemeClr val="accent1"/>
-          </a:fillRef>
-          <a:effectRef idx="1">
-            <a:schemeClr val="accent1"/>
-          </a:effectRef>
-          <a:fontRef idx="minor">
-            <a:schemeClr val="tx1"/>
-          </a:fontRef>
-        </p:style>
-      </p:cxnSp>
-      <p:cxnSp>
-        <p:nvCxnSpPr>
-          <p:cNvPr id="25" name="Straight Connector 24">
-            <a:extLst>
-              <a:ext uri="{FF2B5EF4-FFF2-40B4-BE49-F238E27FC236}">
-                <a16:creationId xmlns:a16="http://schemas.microsoft.com/office/drawing/2014/main" id="{2B10BE10-256C-2F98-DB6E-D371495A03B0}"/>
-              </a:ext>
-            </a:extLst>
-          </p:cNvPr>
-          <p:cNvCxnSpPr>
-            <a:cxnSpLocks/>
-          </p:cNvCxnSpPr>
-          <p:nvPr/>
-        </p:nvCxnSpPr>
-        <p:spPr>
-          <a:xfrm>
-            <a:off x="708869" y="452276"/>
-            <a:ext cx="1442874" cy="0"/>
-          </a:xfrm>
-          <a:prstGeom prst="line">
-            <a:avLst/>
-          </a:prstGeom>
-          <a:ln w="19050">
-            <a:solidFill>
-              <a:srgbClr val="FF0000"/>
             </a:solidFill>
           </a:ln>
         </p:spPr>
@@ -5477,10 +5488,10 @@
       </p:cxnSp>
       <p:sp>
         <p:nvSpPr>
-          <p:cNvPr id="32" name="Rectangle 31">
-            <a:extLst>
-              <a:ext uri="{FF2B5EF4-FFF2-40B4-BE49-F238E27FC236}">
-                <a16:creationId xmlns:a16="http://schemas.microsoft.com/office/drawing/2014/main" id="{349638FB-7D5B-1D91-B612-0970897C5962}"/>
+          <p:cNvPr id="19" name="Rectangle 18">
+            <a:extLst>
+              <a:ext uri="{FF2B5EF4-FFF2-40B4-BE49-F238E27FC236}">
+                <a16:creationId xmlns:a16="http://schemas.microsoft.com/office/drawing/2014/main" id="{02747AEE-E505-B9A9-9188-D077CE594BD6}"/>
               </a:ext>
             </a:extLst>
           </p:cNvPr>
@@ -5489,16 +5500,17 @@
         </p:nvSpPr>
         <p:spPr>
           <a:xfrm>
-            <a:off x="612723" y="758474"/>
-            <a:ext cx="2877097" cy="1410081"/>
+            <a:off x="8573589" y="666205"/>
+            <a:ext cx="1928947" cy="387511"/>
           </a:xfrm>
           <a:prstGeom prst="rect">
             <a:avLst/>
           </a:prstGeom>
           <a:solidFill>
-            <a:srgbClr val="FFFF00">
+            <a:schemeClr val="accent2">
+              <a:lumMod val="75000"/>
               <a:alpha val="22000"/>
-            </a:srgbClr>
+            </a:schemeClr>
           </a:solidFill>
           <a:ln>
             <a:noFill/>
@@ -5529,256 +5541,10 @@
           </a:p>
         </p:txBody>
       </p:sp>
-      <p:cxnSp>
-        <p:nvCxnSpPr>
-          <p:cNvPr id="35" name="Straight Connector 34">
-            <a:extLst>
-              <a:ext uri="{FF2B5EF4-FFF2-40B4-BE49-F238E27FC236}">
-                <a16:creationId xmlns:a16="http://schemas.microsoft.com/office/drawing/2014/main" id="{3EE10494-C1B7-5FA9-6532-53083499B2F4}"/>
-              </a:ext>
-            </a:extLst>
-          </p:cNvPr>
-          <p:cNvCxnSpPr>
-            <a:cxnSpLocks/>
-          </p:cNvCxnSpPr>
-          <p:nvPr/>
-        </p:nvCxnSpPr>
-        <p:spPr>
-          <a:xfrm flipV="1">
-            <a:off x="4165518" y="1191237"/>
-            <a:ext cx="3082570" cy="2290194"/>
-          </a:xfrm>
-          <a:prstGeom prst="line">
-            <a:avLst/>
-          </a:prstGeom>
-          <a:ln>
-            <a:solidFill>
-              <a:srgbClr val="FFFF00"/>
-            </a:solidFill>
-          </a:ln>
-        </p:spPr>
-        <p:style>
-          <a:lnRef idx="2">
-            <a:schemeClr val="accent1"/>
-          </a:lnRef>
-          <a:fillRef idx="0">
-            <a:schemeClr val="accent1"/>
-          </a:fillRef>
-          <a:effectRef idx="1">
-            <a:schemeClr val="accent1"/>
-          </a:effectRef>
-          <a:fontRef idx="minor">
-            <a:schemeClr val="tx1"/>
-          </a:fontRef>
-        </p:style>
-      </p:cxnSp>
-      <p:pic>
-        <p:nvPicPr>
-          <p:cNvPr id="41" name="Picture 40">
-            <a:extLst>
-              <a:ext uri="{FF2B5EF4-FFF2-40B4-BE49-F238E27FC236}">
-                <a16:creationId xmlns:a16="http://schemas.microsoft.com/office/drawing/2014/main" id="{4A8FA56F-1EC5-5097-3BF7-7A7053368C20}"/>
-              </a:ext>
-            </a:extLst>
-          </p:cNvPr>
-          <p:cNvPicPr>
-            <a:picLocks noChangeAspect="1"/>
-          </p:cNvPicPr>
-          <p:nvPr/>
-        </p:nvPicPr>
-        <p:blipFill>
-          <a:blip r:embed="rId3"/>
-          <a:stretch>
-            <a:fillRect/>
-          </a:stretch>
-        </p:blipFill>
-        <p:spPr>
-          <a:xfrm>
-            <a:off x="470478" y="3678572"/>
-            <a:ext cx="8077904" cy="2918254"/>
-          </a:xfrm>
-          <a:prstGeom prst="rect">
-            <a:avLst/>
-          </a:prstGeom>
-        </p:spPr>
-      </p:pic>
-      <p:cxnSp>
-        <p:nvCxnSpPr>
-          <p:cNvPr id="42" name="Straight Connector 41">
-            <a:extLst>
-              <a:ext uri="{FF2B5EF4-FFF2-40B4-BE49-F238E27FC236}">
-                <a16:creationId xmlns:a16="http://schemas.microsoft.com/office/drawing/2014/main" id="{0AF3FEB3-0582-5B69-BC35-6634829C5927}"/>
-              </a:ext>
-            </a:extLst>
-          </p:cNvPr>
-          <p:cNvCxnSpPr>
-            <a:cxnSpLocks/>
-          </p:cNvCxnSpPr>
-          <p:nvPr/>
-        </p:nvCxnSpPr>
-        <p:spPr>
-          <a:xfrm>
-            <a:off x="6350466" y="5652082"/>
-            <a:ext cx="981512" cy="757107"/>
-          </a:xfrm>
-          <a:prstGeom prst="line">
-            <a:avLst/>
-          </a:prstGeom>
-          <a:ln w="19050">
-            <a:solidFill>
-              <a:srgbClr val="FF0000"/>
-            </a:solidFill>
-          </a:ln>
-        </p:spPr>
-        <p:style>
-          <a:lnRef idx="2">
-            <a:schemeClr val="accent1"/>
-          </a:lnRef>
-          <a:fillRef idx="0">
-            <a:schemeClr val="accent1"/>
-          </a:fillRef>
-          <a:effectRef idx="1">
-            <a:schemeClr val="accent1"/>
-          </a:effectRef>
-          <a:fontRef idx="minor">
-            <a:schemeClr val="tx1"/>
-          </a:fontRef>
-        </p:style>
-      </p:cxnSp>
-      <p:cxnSp>
-        <p:nvCxnSpPr>
-          <p:cNvPr id="46" name="Straight Connector 45">
-            <a:extLst>
-              <a:ext uri="{FF2B5EF4-FFF2-40B4-BE49-F238E27FC236}">
-                <a16:creationId xmlns:a16="http://schemas.microsoft.com/office/drawing/2014/main" id="{9EF310CC-1EDC-6648-24EC-61E346ECCFF6}"/>
-              </a:ext>
-            </a:extLst>
-          </p:cNvPr>
-          <p:cNvCxnSpPr>
-            <a:cxnSpLocks/>
-          </p:cNvCxnSpPr>
-          <p:nvPr/>
-        </p:nvCxnSpPr>
-        <p:spPr>
-          <a:xfrm>
-            <a:off x="1870745" y="4383248"/>
-            <a:ext cx="5905849" cy="1568741"/>
-          </a:xfrm>
-          <a:prstGeom prst="line">
-            <a:avLst/>
-          </a:prstGeom>
-          <a:ln w="19050">
-            <a:solidFill>
-              <a:srgbClr val="FF0000"/>
-            </a:solidFill>
-          </a:ln>
-        </p:spPr>
-        <p:style>
-          <a:lnRef idx="2">
-            <a:schemeClr val="accent1"/>
-          </a:lnRef>
-          <a:fillRef idx="0">
-            <a:schemeClr val="accent1"/>
-          </a:fillRef>
-          <a:effectRef idx="1">
-            <a:schemeClr val="accent1"/>
-          </a:effectRef>
-          <a:fontRef idx="minor">
-            <a:schemeClr val="tx1"/>
-          </a:fontRef>
-        </p:style>
-      </p:cxnSp>
-      <p:cxnSp>
-        <p:nvCxnSpPr>
-          <p:cNvPr id="55" name="Straight Connector 54">
-            <a:extLst>
-              <a:ext uri="{FF2B5EF4-FFF2-40B4-BE49-F238E27FC236}">
-                <a16:creationId xmlns:a16="http://schemas.microsoft.com/office/drawing/2014/main" id="{8152550E-EA43-9D6B-CFE8-7D277511306D}"/>
-              </a:ext>
-            </a:extLst>
-          </p:cNvPr>
-          <p:cNvCxnSpPr>
-            <a:cxnSpLocks/>
-          </p:cNvCxnSpPr>
-          <p:nvPr/>
-        </p:nvCxnSpPr>
-        <p:spPr>
-          <a:xfrm>
-            <a:off x="6808051" y="6459523"/>
-            <a:ext cx="523927" cy="0"/>
-          </a:xfrm>
-          <a:prstGeom prst="line">
-            <a:avLst/>
-          </a:prstGeom>
-          <a:ln>
-            <a:solidFill>
-              <a:srgbClr val="FFFF00"/>
-            </a:solidFill>
-          </a:ln>
-        </p:spPr>
-        <p:style>
-          <a:lnRef idx="2">
-            <a:schemeClr val="accent1"/>
-          </a:lnRef>
-          <a:fillRef idx="0">
-            <a:schemeClr val="accent1"/>
-          </a:fillRef>
-          <a:effectRef idx="1">
-            <a:schemeClr val="accent1"/>
-          </a:effectRef>
-          <a:fontRef idx="minor">
-            <a:schemeClr val="tx1"/>
-          </a:fontRef>
-        </p:style>
-      </p:cxnSp>
-      <p:cxnSp>
-        <p:nvCxnSpPr>
-          <p:cNvPr id="56" name="Straight Connector 55">
-            <a:extLst>
-              <a:ext uri="{FF2B5EF4-FFF2-40B4-BE49-F238E27FC236}">
-                <a16:creationId xmlns:a16="http://schemas.microsoft.com/office/drawing/2014/main" id="{BA2E2107-256F-3FAA-1084-55BA0D10E46B}"/>
-              </a:ext>
-            </a:extLst>
-          </p:cNvPr>
-          <p:cNvCxnSpPr>
-            <a:cxnSpLocks/>
-          </p:cNvCxnSpPr>
-          <p:nvPr/>
-        </p:nvCxnSpPr>
-        <p:spPr>
-          <a:xfrm flipV="1">
-            <a:off x="7327784" y="4995644"/>
-            <a:ext cx="1114199" cy="1463879"/>
-          </a:xfrm>
-          <a:prstGeom prst="line">
-            <a:avLst/>
-          </a:prstGeom>
-          <a:ln w="6350">
-            <a:solidFill>
-              <a:srgbClr val="FFFF00"/>
-            </a:solidFill>
-            <a:prstDash val="dash"/>
-          </a:ln>
-        </p:spPr>
-        <p:style>
-          <a:lnRef idx="2">
-            <a:schemeClr val="accent1"/>
-          </a:lnRef>
-          <a:fillRef idx="0">
-            <a:schemeClr val="accent1"/>
-          </a:fillRef>
-          <a:effectRef idx="1">
-            <a:schemeClr val="accent1"/>
-          </a:effectRef>
-          <a:fontRef idx="minor">
-            <a:schemeClr val="tx1"/>
-          </a:fontRef>
-        </p:style>
-      </p:cxnSp>
     </p:spTree>
     <p:extLst>
       <p:ext uri="{BB962C8B-B14F-4D97-AF65-F5344CB8AC3E}">
-        <p14:creationId xmlns:p14="http://schemas.microsoft.com/office/powerpoint/2010/main" val="138630216"/>
+        <p14:creationId xmlns:p14="http://schemas.microsoft.com/office/powerpoint/2010/main" val="3910363495"/>
       </p:ext>
     </p:extLst>
   </p:cSld>
@@ -5807,10 +5573,10 @@
       </p:grpSpPr>
       <p:pic>
         <p:nvPicPr>
-          <p:cNvPr id="15" name="Picture 14">
-            <a:extLst>
-              <a:ext uri="{FF2B5EF4-FFF2-40B4-BE49-F238E27FC236}">
-                <a16:creationId xmlns:a16="http://schemas.microsoft.com/office/drawing/2014/main" id="{DFC00C86-E5CC-781C-5A4D-2361A7CF00C8}"/>
+          <p:cNvPr id="3" name="Picture 2">
+            <a:extLst>
+              <a:ext uri="{FF2B5EF4-FFF2-40B4-BE49-F238E27FC236}">
+                <a16:creationId xmlns:a16="http://schemas.microsoft.com/office/drawing/2014/main" id="{EF2A13E4-73F8-406B-90F9-D41AFEB45C03}"/>
               </a:ext>
             </a:extLst>
           </p:cNvPr>
@@ -5827,104 +5593,20 @@
         </p:blipFill>
         <p:spPr>
           <a:xfrm>
-            <a:off x="412412" y="3321490"/>
-            <a:ext cx="9608044" cy="3302170"/>
+            <a:off x="347162" y="299120"/>
+            <a:ext cx="9836656" cy="3340272"/>
           </a:xfrm>
           <a:prstGeom prst="rect">
             <a:avLst/>
           </a:prstGeom>
         </p:spPr>
       </p:pic>
-      <p:pic>
-        <p:nvPicPr>
-          <p:cNvPr id="3" name="Picture 2">
-            <a:extLst>
-              <a:ext uri="{FF2B5EF4-FFF2-40B4-BE49-F238E27FC236}">
-                <a16:creationId xmlns:a16="http://schemas.microsoft.com/office/drawing/2014/main" id="{364673B3-F0E1-91E9-8766-8D76147CE9AE}"/>
-              </a:ext>
-            </a:extLst>
-          </p:cNvPr>
-          <p:cNvPicPr>
-            <a:picLocks noChangeAspect="1"/>
-          </p:cNvPicPr>
-          <p:nvPr/>
-        </p:nvPicPr>
-        <p:blipFill>
-          <a:blip r:embed="rId3"/>
-          <a:stretch>
-            <a:fillRect/>
-          </a:stretch>
-        </p:blipFill>
-        <p:spPr>
-          <a:xfrm>
-            <a:off x="199290" y="181743"/>
-            <a:ext cx="8469162" cy="3066685"/>
-          </a:xfrm>
-          <a:prstGeom prst="rect">
-            <a:avLst/>
-          </a:prstGeom>
-        </p:spPr>
-      </p:pic>
-      <p:sp>
-        <p:nvSpPr>
-          <p:cNvPr id="4" name="Rectangle 3">
-            <a:extLst>
-              <a:ext uri="{FF2B5EF4-FFF2-40B4-BE49-F238E27FC236}">
-                <a16:creationId xmlns:a16="http://schemas.microsoft.com/office/drawing/2014/main" id="{D29696C0-A8E4-D75E-327B-3D2677249776}"/>
-              </a:ext>
-            </a:extLst>
-          </p:cNvPr>
-          <p:cNvSpPr/>
-          <p:nvPr/>
-        </p:nvSpPr>
-        <p:spPr>
-          <a:xfrm>
-            <a:off x="9650016" y="1349150"/>
-            <a:ext cx="1010195" cy="552994"/>
-          </a:xfrm>
-          <a:prstGeom prst="rect">
-            <a:avLst/>
-          </a:prstGeom>
-          <a:solidFill>
-            <a:srgbClr val="FFC000">
-              <a:alpha val="22000"/>
-            </a:srgbClr>
-          </a:solidFill>
-          <a:ln>
-            <a:noFill/>
-          </a:ln>
-        </p:spPr>
-        <p:style>
-          <a:lnRef idx="2">
-            <a:schemeClr val="accent1">
-              <a:shade val="15000"/>
-            </a:schemeClr>
-          </a:lnRef>
-          <a:fillRef idx="1">
-            <a:schemeClr val="accent1"/>
-          </a:fillRef>
-          <a:effectRef idx="0">
-            <a:schemeClr val="accent1"/>
-          </a:effectRef>
-          <a:fontRef idx="minor">
-            <a:schemeClr val="lt1"/>
-          </a:fontRef>
-        </p:style>
-        <p:txBody>
-          <a:bodyPr rtlCol="0" anchor="ctr"/>
-          <a:lstStyle/>
-          <a:p>
-            <a:pPr algn="ctr"/>
-            <a:endParaRPr lang="en-GB"/>
-          </a:p>
-        </p:txBody>
-      </p:sp>
       <p:cxnSp>
         <p:nvCxnSpPr>
-          <p:cNvPr id="5" name="Straight Connector 4">
-            <a:extLst>
-              <a:ext uri="{FF2B5EF4-FFF2-40B4-BE49-F238E27FC236}">
-                <a16:creationId xmlns:a16="http://schemas.microsoft.com/office/drawing/2014/main" id="{48625322-297F-2F65-34AA-CEF8C140DC8A}"/>
+          <p:cNvPr id="6" name="Straight Connector 5">
+            <a:extLst>
+              <a:ext uri="{FF2B5EF4-FFF2-40B4-BE49-F238E27FC236}">
+                <a16:creationId xmlns:a16="http://schemas.microsoft.com/office/drawing/2014/main" id="{0B7EAF12-D267-467B-67BE-24CBC550853F}"/>
               </a:ext>
             </a:extLst>
           </p:cNvPr>
@@ -5934,9 +5616,9 @@
           <p:nvPr/>
         </p:nvCxnSpPr>
         <p:spPr>
-          <a:xfrm flipH="1">
-            <a:off x="6530829" y="426870"/>
-            <a:ext cx="1463879" cy="399446"/>
+          <a:xfrm flipV="1">
+            <a:off x="8441983" y="2864840"/>
+            <a:ext cx="1431859" cy="428048"/>
           </a:xfrm>
           <a:prstGeom prst="line">
             <a:avLst/>
@@ -5964,10 +5646,10 @@
       </p:cxnSp>
       <p:cxnSp>
         <p:nvCxnSpPr>
-          <p:cNvPr id="22" name="Straight Connector 21">
-            <a:extLst>
-              <a:ext uri="{FF2B5EF4-FFF2-40B4-BE49-F238E27FC236}">
-                <a16:creationId xmlns:a16="http://schemas.microsoft.com/office/drawing/2014/main" id="{51934E3D-C1D6-CCED-317D-E13917F549BA}"/>
+          <p:cNvPr id="9" name="Straight Connector 8">
+            <a:extLst>
+              <a:ext uri="{FF2B5EF4-FFF2-40B4-BE49-F238E27FC236}">
+                <a16:creationId xmlns:a16="http://schemas.microsoft.com/office/drawing/2014/main" id="{00A927E4-B834-603A-3162-773CA602FE93}"/>
               </a:ext>
             </a:extLst>
           </p:cNvPr>
@@ -5977,9 +5659,96 @@
           <p:nvPr/>
         </p:nvCxnSpPr>
         <p:spPr>
-          <a:xfrm flipH="1">
-            <a:off x="7592037" y="426870"/>
-            <a:ext cx="444616" cy="59691"/>
+          <a:xfrm>
+            <a:off x="9055916" y="1598103"/>
+            <a:ext cx="666924" cy="1019262"/>
+          </a:xfrm>
+          <a:prstGeom prst="line">
+            <a:avLst/>
+          </a:prstGeom>
+          <a:ln w="19050">
+            <a:solidFill>
+              <a:srgbClr val="FF0000"/>
+            </a:solidFill>
+          </a:ln>
+        </p:spPr>
+        <p:style>
+          <a:lnRef idx="2">
+            <a:schemeClr val="accent1"/>
+          </a:lnRef>
+          <a:fillRef idx="0">
+            <a:schemeClr val="accent1"/>
+          </a:fillRef>
+          <a:effectRef idx="1">
+            <a:schemeClr val="accent1"/>
+          </a:effectRef>
+          <a:fontRef idx="minor">
+            <a:schemeClr val="tx1"/>
+          </a:fontRef>
+        </p:style>
+      </p:cxnSp>
+      <p:cxnSp>
+        <p:nvCxnSpPr>
+          <p:cNvPr id="10" name="Straight Connector 9">
+            <a:extLst>
+              <a:ext uri="{FF2B5EF4-FFF2-40B4-BE49-F238E27FC236}">
+                <a16:creationId xmlns:a16="http://schemas.microsoft.com/office/drawing/2014/main" id="{7611024F-7C7C-526C-EFA2-4D5192BE191A}"/>
+              </a:ext>
+            </a:extLst>
+          </p:cNvPr>
+          <p:cNvCxnSpPr>
+            <a:cxnSpLocks/>
+          </p:cNvCxnSpPr>
+          <p:nvPr/>
+        </p:nvCxnSpPr>
+        <p:spPr>
+          <a:xfrm>
+            <a:off x="3705976" y="3969435"/>
+            <a:ext cx="5473338" cy="0"/>
+          </a:xfrm>
+          <a:prstGeom prst="line">
+            <a:avLst/>
+          </a:prstGeom>
+          <a:ln w="9525">
+            <a:solidFill>
+              <a:srgbClr val="FFFF00"/>
+            </a:solidFill>
+            <a:prstDash val="dash"/>
+          </a:ln>
+        </p:spPr>
+        <p:style>
+          <a:lnRef idx="2">
+            <a:schemeClr val="accent1"/>
+          </a:lnRef>
+          <a:fillRef idx="0">
+            <a:schemeClr val="accent1"/>
+          </a:fillRef>
+          <a:effectRef idx="1">
+            <a:schemeClr val="accent1"/>
+          </a:effectRef>
+          <a:fontRef idx="minor">
+            <a:schemeClr val="tx1"/>
+          </a:fontRef>
+        </p:style>
+      </p:cxnSp>
+      <p:cxnSp>
+        <p:nvCxnSpPr>
+          <p:cNvPr id="20" name="Straight Connector 19">
+            <a:extLst>
+              <a:ext uri="{FF2B5EF4-FFF2-40B4-BE49-F238E27FC236}">
+                <a16:creationId xmlns:a16="http://schemas.microsoft.com/office/drawing/2014/main" id="{E4AB0656-BC3A-A5A5-5471-472A2ADCEC91}"/>
+              </a:ext>
+            </a:extLst>
+          </p:cNvPr>
+          <p:cNvCxnSpPr>
+            <a:cxnSpLocks/>
+          </p:cNvCxnSpPr>
+          <p:nvPr/>
+        </p:nvCxnSpPr>
+        <p:spPr>
+          <a:xfrm>
+            <a:off x="3829959" y="3414319"/>
+            <a:ext cx="523927" cy="0"/>
           </a:xfrm>
           <a:prstGeom prst="line">
             <a:avLst/>
@@ -5987,6 +5756,92 @@
           <a:ln>
             <a:solidFill>
               <a:srgbClr val="FFFF00"/>
+            </a:solidFill>
+          </a:ln>
+        </p:spPr>
+        <p:style>
+          <a:lnRef idx="2">
+            <a:schemeClr val="accent1"/>
+          </a:lnRef>
+          <a:fillRef idx="0">
+            <a:schemeClr val="accent1"/>
+          </a:fillRef>
+          <a:effectRef idx="1">
+            <a:schemeClr val="accent1"/>
+          </a:effectRef>
+          <a:fontRef idx="minor">
+            <a:schemeClr val="tx1"/>
+          </a:fontRef>
+        </p:style>
+      </p:cxnSp>
+      <p:cxnSp>
+        <p:nvCxnSpPr>
+          <p:cNvPr id="21" name="Straight Connector 20">
+            <a:extLst>
+              <a:ext uri="{FF2B5EF4-FFF2-40B4-BE49-F238E27FC236}">
+                <a16:creationId xmlns:a16="http://schemas.microsoft.com/office/drawing/2014/main" id="{AB50AC21-E512-E0E9-D6F1-EFD996BA12AE}"/>
+              </a:ext>
+            </a:extLst>
+          </p:cNvPr>
+          <p:cNvCxnSpPr>
+            <a:cxnSpLocks/>
+          </p:cNvCxnSpPr>
+          <p:nvPr/>
+        </p:nvCxnSpPr>
+        <p:spPr>
+          <a:xfrm>
+            <a:off x="6870584" y="560142"/>
+            <a:ext cx="1732326" cy="2518722"/>
+          </a:xfrm>
+          <a:prstGeom prst="line">
+            <a:avLst/>
+          </a:prstGeom>
+          <a:ln w="19050">
+            <a:solidFill>
+              <a:srgbClr val="FF0000"/>
+            </a:solidFill>
+          </a:ln>
+        </p:spPr>
+        <p:style>
+          <a:lnRef idx="2">
+            <a:schemeClr val="accent1"/>
+          </a:lnRef>
+          <a:fillRef idx="0">
+            <a:schemeClr val="accent1"/>
+          </a:fillRef>
+          <a:effectRef idx="1">
+            <a:schemeClr val="accent1"/>
+          </a:effectRef>
+          <a:fontRef idx="minor">
+            <a:schemeClr val="tx1"/>
+          </a:fontRef>
+        </p:style>
+      </p:cxnSp>
+      <p:cxnSp>
+        <p:nvCxnSpPr>
+          <p:cNvPr id="23" name="Straight Connector 22">
+            <a:extLst>
+              <a:ext uri="{FF2B5EF4-FFF2-40B4-BE49-F238E27FC236}">
+                <a16:creationId xmlns:a16="http://schemas.microsoft.com/office/drawing/2014/main" id="{0ACA9FA3-9C61-EF61-BA7A-605CE82EDAF1}"/>
+              </a:ext>
+            </a:extLst>
+          </p:cNvPr>
+          <p:cNvCxnSpPr>
+            <a:cxnSpLocks/>
+          </p:cNvCxnSpPr>
+          <p:nvPr/>
+        </p:nvCxnSpPr>
+        <p:spPr>
+          <a:xfrm>
+            <a:off x="2554416" y="787835"/>
+            <a:ext cx="1799470" cy="2641165"/>
+          </a:xfrm>
+          <a:prstGeom prst="line">
+            <a:avLst/>
+          </a:prstGeom>
+          <a:ln w="19050">
+            <a:solidFill>
+              <a:srgbClr val="FF0000"/>
             </a:solidFill>
           </a:ln>
         </p:spPr>
@@ -6010,7 +5865,7 @@
           <p:cNvPr id="25" name="Straight Connector 24">
             <a:extLst>
               <a:ext uri="{FF2B5EF4-FFF2-40B4-BE49-F238E27FC236}">
-                <a16:creationId xmlns:a16="http://schemas.microsoft.com/office/drawing/2014/main" id="{E10E13B2-7364-1B0F-7081-2ADD3AB37EB1}"/>
+                <a16:creationId xmlns:a16="http://schemas.microsoft.com/office/drawing/2014/main" id="{2B10BE10-256C-2F98-DB6E-D371495A03B0}"/>
               </a:ext>
             </a:extLst>
           </p:cNvPr>
@@ -6020,9 +5875,106 @@
           <p:nvPr/>
         </p:nvCxnSpPr>
         <p:spPr>
-          <a:xfrm flipH="1">
-            <a:off x="4899171" y="426870"/>
-            <a:ext cx="3137482" cy="697255"/>
+          <a:xfrm>
+            <a:off x="708869" y="452276"/>
+            <a:ext cx="1442874" cy="0"/>
+          </a:xfrm>
+          <a:prstGeom prst="line">
+            <a:avLst/>
+          </a:prstGeom>
+          <a:ln w="19050">
+            <a:solidFill>
+              <a:srgbClr val="FF0000"/>
+            </a:solidFill>
+          </a:ln>
+        </p:spPr>
+        <p:style>
+          <a:lnRef idx="2">
+            <a:schemeClr val="accent1"/>
+          </a:lnRef>
+          <a:fillRef idx="0">
+            <a:schemeClr val="accent1"/>
+          </a:fillRef>
+          <a:effectRef idx="1">
+            <a:schemeClr val="accent1"/>
+          </a:effectRef>
+          <a:fontRef idx="minor">
+            <a:schemeClr val="tx1"/>
+          </a:fontRef>
+        </p:style>
+      </p:cxnSp>
+      <p:sp>
+        <p:nvSpPr>
+          <p:cNvPr id="32" name="Rectangle 31">
+            <a:extLst>
+              <a:ext uri="{FF2B5EF4-FFF2-40B4-BE49-F238E27FC236}">
+                <a16:creationId xmlns:a16="http://schemas.microsoft.com/office/drawing/2014/main" id="{349638FB-7D5B-1D91-B612-0970897C5962}"/>
+              </a:ext>
+            </a:extLst>
+          </p:cNvPr>
+          <p:cNvSpPr/>
+          <p:nvPr/>
+        </p:nvSpPr>
+        <p:spPr>
+          <a:xfrm>
+            <a:off x="612723" y="758474"/>
+            <a:ext cx="2877097" cy="1410081"/>
+          </a:xfrm>
+          <a:prstGeom prst="rect">
+            <a:avLst/>
+          </a:prstGeom>
+          <a:solidFill>
+            <a:srgbClr val="FFFF00">
+              <a:alpha val="22000"/>
+            </a:srgbClr>
+          </a:solidFill>
+          <a:ln>
+            <a:noFill/>
+          </a:ln>
+        </p:spPr>
+        <p:style>
+          <a:lnRef idx="2">
+            <a:schemeClr val="accent1">
+              <a:shade val="15000"/>
+            </a:schemeClr>
+          </a:lnRef>
+          <a:fillRef idx="1">
+            <a:schemeClr val="accent1"/>
+          </a:fillRef>
+          <a:effectRef idx="0">
+            <a:schemeClr val="accent1"/>
+          </a:effectRef>
+          <a:fontRef idx="minor">
+            <a:schemeClr val="lt1"/>
+          </a:fontRef>
+        </p:style>
+        <p:txBody>
+          <a:bodyPr rtlCol="0" anchor="ctr"/>
+          <a:lstStyle/>
+          <a:p>
+            <a:pPr algn="ctr"/>
+            <a:endParaRPr lang="en-GB"/>
+          </a:p>
+        </p:txBody>
+      </p:sp>
+      <p:cxnSp>
+        <p:nvCxnSpPr>
+          <p:cNvPr id="35" name="Straight Connector 34">
+            <a:extLst>
+              <a:ext uri="{FF2B5EF4-FFF2-40B4-BE49-F238E27FC236}">
+                <a16:creationId xmlns:a16="http://schemas.microsoft.com/office/drawing/2014/main" id="{3EE10494-C1B7-5FA9-6532-53083499B2F4}"/>
+              </a:ext>
+            </a:extLst>
+          </p:cNvPr>
+          <p:cNvCxnSpPr>
+            <a:cxnSpLocks/>
+          </p:cNvCxnSpPr>
+          <p:nvPr/>
+        </p:nvCxnSpPr>
+        <p:spPr>
+          <a:xfrm flipV="1">
+            <a:off x="4165518" y="1191237"/>
+            <a:ext cx="3082570" cy="2290194"/>
           </a:xfrm>
           <a:prstGeom prst="line">
             <a:avLst/>
@@ -6031,6 +5983,209 @@
             <a:solidFill>
               <a:srgbClr val="FFFF00"/>
             </a:solidFill>
+          </a:ln>
+        </p:spPr>
+        <p:style>
+          <a:lnRef idx="2">
+            <a:schemeClr val="accent1"/>
+          </a:lnRef>
+          <a:fillRef idx="0">
+            <a:schemeClr val="accent1"/>
+          </a:fillRef>
+          <a:effectRef idx="1">
+            <a:schemeClr val="accent1"/>
+          </a:effectRef>
+          <a:fontRef idx="minor">
+            <a:schemeClr val="tx1"/>
+          </a:fontRef>
+        </p:style>
+      </p:cxnSp>
+      <p:pic>
+        <p:nvPicPr>
+          <p:cNvPr id="41" name="Picture 40">
+            <a:extLst>
+              <a:ext uri="{FF2B5EF4-FFF2-40B4-BE49-F238E27FC236}">
+                <a16:creationId xmlns:a16="http://schemas.microsoft.com/office/drawing/2014/main" id="{4A8FA56F-1EC5-5097-3BF7-7A7053368C20}"/>
+              </a:ext>
+            </a:extLst>
+          </p:cNvPr>
+          <p:cNvPicPr>
+            <a:picLocks noChangeAspect="1"/>
+          </p:cNvPicPr>
+          <p:nvPr/>
+        </p:nvPicPr>
+        <p:blipFill>
+          <a:blip r:embed="rId3"/>
+          <a:stretch>
+            <a:fillRect/>
+          </a:stretch>
+        </p:blipFill>
+        <p:spPr>
+          <a:xfrm>
+            <a:off x="470478" y="3678572"/>
+            <a:ext cx="8077904" cy="2918254"/>
+          </a:xfrm>
+          <a:prstGeom prst="rect">
+            <a:avLst/>
+          </a:prstGeom>
+        </p:spPr>
+      </p:pic>
+      <p:cxnSp>
+        <p:nvCxnSpPr>
+          <p:cNvPr id="42" name="Straight Connector 41">
+            <a:extLst>
+              <a:ext uri="{FF2B5EF4-FFF2-40B4-BE49-F238E27FC236}">
+                <a16:creationId xmlns:a16="http://schemas.microsoft.com/office/drawing/2014/main" id="{0AF3FEB3-0582-5B69-BC35-6634829C5927}"/>
+              </a:ext>
+            </a:extLst>
+          </p:cNvPr>
+          <p:cNvCxnSpPr>
+            <a:cxnSpLocks/>
+          </p:cNvCxnSpPr>
+          <p:nvPr/>
+        </p:nvCxnSpPr>
+        <p:spPr>
+          <a:xfrm>
+            <a:off x="6350466" y="5652082"/>
+            <a:ext cx="981512" cy="757107"/>
+          </a:xfrm>
+          <a:prstGeom prst="line">
+            <a:avLst/>
+          </a:prstGeom>
+          <a:ln w="19050">
+            <a:solidFill>
+              <a:srgbClr val="FF0000"/>
+            </a:solidFill>
+          </a:ln>
+        </p:spPr>
+        <p:style>
+          <a:lnRef idx="2">
+            <a:schemeClr val="accent1"/>
+          </a:lnRef>
+          <a:fillRef idx="0">
+            <a:schemeClr val="accent1"/>
+          </a:fillRef>
+          <a:effectRef idx="1">
+            <a:schemeClr val="accent1"/>
+          </a:effectRef>
+          <a:fontRef idx="minor">
+            <a:schemeClr val="tx1"/>
+          </a:fontRef>
+        </p:style>
+      </p:cxnSp>
+      <p:cxnSp>
+        <p:nvCxnSpPr>
+          <p:cNvPr id="46" name="Straight Connector 45">
+            <a:extLst>
+              <a:ext uri="{FF2B5EF4-FFF2-40B4-BE49-F238E27FC236}">
+                <a16:creationId xmlns:a16="http://schemas.microsoft.com/office/drawing/2014/main" id="{9EF310CC-1EDC-6648-24EC-61E346ECCFF6}"/>
+              </a:ext>
+            </a:extLst>
+          </p:cNvPr>
+          <p:cNvCxnSpPr>
+            <a:cxnSpLocks/>
+          </p:cNvCxnSpPr>
+          <p:nvPr/>
+        </p:nvCxnSpPr>
+        <p:spPr>
+          <a:xfrm>
+            <a:off x="1870745" y="4383248"/>
+            <a:ext cx="5905849" cy="1568741"/>
+          </a:xfrm>
+          <a:prstGeom prst="line">
+            <a:avLst/>
+          </a:prstGeom>
+          <a:ln w="19050">
+            <a:solidFill>
+              <a:srgbClr val="FF0000"/>
+            </a:solidFill>
+          </a:ln>
+        </p:spPr>
+        <p:style>
+          <a:lnRef idx="2">
+            <a:schemeClr val="accent1"/>
+          </a:lnRef>
+          <a:fillRef idx="0">
+            <a:schemeClr val="accent1"/>
+          </a:fillRef>
+          <a:effectRef idx="1">
+            <a:schemeClr val="accent1"/>
+          </a:effectRef>
+          <a:fontRef idx="minor">
+            <a:schemeClr val="tx1"/>
+          </a:fontRef>
+        </p:style>
+      </p:cxnSp>
+      <p:cxnSp>
+        <p:nvCxnSpPr>
+          <p:cNvPr id="55" name="Straight Connector 54">
+            <a:extLst>
+              <a:ext uri="{FF2B5EF4-FFF2-40B4-BE49-F238E27FC236}">
+                <a16:creationId xmlns:a16="http://schemas.microsoft.com/office/drawing/2014/main" id="{8152550E-EA43-9D6B-CFE8-7D277511306D}"/>
+              </a:ext>
+            </a:extLst>
+          </p:cNvPr>
+          <p:cNvCxnSpPr>
+            <a:cxnSpLocks/>
+          </p:cNvCxnSpPr>
+          <p:nvPr/>
+        </p:nvCxnSpPr>
+        <p:spPr>
+          <a:xfrm>
+            <a:off x="6808051" y="6459523"/>
+            <a:ext cx="523927" cy="0"/>
+          </a:xfrm>
+          <a:prstGeom prst="line">
+            <a:avLst/>
+          </a:prstGeom>
+          <a:ln>
+            <a:solidFill>
+              <a:srgbClr val="FFFF00"/>
+            </a:solidFill>
+          </a:ln>
+        </p:spPr>
+        <p:style>
+          <a:lnRef idx="2">
+            <a:schemeClr val="accent1"/>
+          </a:lnRef>
+          <a:fillRef idx="0">
+            <a:schemeClr val="accent1"/>
+          </a:fillRef>
+          <a:effectRef idx="1">
+            <a:schemeClr val="accent1"/>
+          </a:effectRef>
+          <a:fontRef idx="minor">
+            <a:schemeClr val="tx1"/>
+          </a:fontRef>
+        </p:style>
+      </p:cxnSp>
+      <p:cxnSp>
+        <p:nvCxnSpPr>
+          <p:cNvPr id="56" name="Straight Connector 55">
+            <a:extLst>
+              <a:ext uri="{FF2B5EF4-FFF2-40B4-BE49-F238E27FC236}">
+                <a16:creationId xmlns:a16="http://schemas.microsoft.com/office/drawing/2014/main" id="{BA2E2107-256F-3FAA-1084-55BA0D10E46B}"/>
+              </a:ext>
+            </a:extLst>
+          </p:cNvPr>
+          <p:cNvCxnSpPr>
+            <a:cxnSpLocks/>
+          </p:cNvCxnSpPr>
+          <p:nvPr/>
+        </p:nvCxnSpPr>
+        <p:spPr>
+          <a:xfrm flipV="1">
+            <a:off x="7327784" y="4995644"/>
+            <a:ext cx="1114199" cy="1463879"/>
+          </a:xfrm>
+          <a:prstGeom prst="line">
+            <a:avLst/>
+          </a:prstGeom>
+          <a:ln w="6350">
+            <a:solidFill>
+              <a:srgbClr val="FFFF00"/>
+            </a:solidFill>
+            <a:prstDash val="dash"/>
           </a:ln>
         </p:spPr>
         <p:style>
@@ -6051,7 +6206,7 @@
     </p:spTree>
     <p:extLst>
       <p:ext uri="{BB962C8B-B14F-4D97-AF65-F5344CB8AC3E}">
-        <p14:creationId xmlns:p14="http://schemas.microsoft.com/office/powerpoint/2010/main" val="415382485"/>
+        <p14:creationId xmlns:p14="http://schemas.microsoft.com/office/powerpoint/2010/main" val="138630216"/>
       </p:ext>
     </p:extLst>
   </p:cSld>
@@ -6080,6 +6235,279 @@
       </p:grpSpPr>
       <p:pic>
         <p:nvPicPr>
+          <p:cNvPr id="15" name="Picture 14">
+            <a:extLst>
+              <a:ext uri="{FF2B5EF4-FFF2-40B4-BE49-F238E27FC236}">
+                <a16:creationId xmlns:a16="http://schemas.microsoft.com/office/drawing/2014/main" id="{DFC00C86-E5CC-781C-5A4D-2361A7CF00C8}"/>
+              </a:ext>
+            </a:extLst>
+          </p:cNvPr>
+          <p:cNvPicPr>
+            <a:picLocks noChangeAspect="1"/>
+          </p:cNvPicPr>
+          <p:nvPr/>
+        </p:nvPicPr>
+        <p:blipFill>
+          <a:blip r:embed="rId2"/>
+          <a:stretch>
+            <a:fillRect/>
+          </a:stretch>
+        </p:blipFill>
+        <p:spPr>
+          <a:xfrm>
+            <a:off x="412412" y="3321490"/>
+            <a:ext cx="9608044" cy="3302170"/>
+          </a:xfrm>
+          <a:prstGeom prst="rect">
+            <a:avLst/>
+          </a:prstGeom>
+        </p:spPr>
+      </p:pic>
+      <p:pic>
+        <p:nvPicPr>
+          <p:cNvPr id="3" name="Picture 2">
+            <a:extLst>
+              <a:ext uri="{FF2B5EF4-FFF2-40B4-BE49-F238E27FC236}">
+                <a16:creationId xmlns:a16="http://schemas.microsoft.com/office/drawing/2014/main" id="{364673B3-F0E1-91E9-8766-8D76147CE9AE}"/>
+              </a:ext>
+            </a:extLst>
+          </p:cNvPr>
+          <p:cNvPicPr>
+            <a:picLocks noChangeAspect="1"/>
+          </p:cNvPicPr>
+          <p:nvPr/>
+        </p:nvPicPr>
+        <p:blipFill>
+          <a:blip r:embed="rId3"/>
+          <a:stretch>
+            <a:fillRect/>
+          </a:stretch>
+        </p:blipFill>
+        <p:spPr>
+          <a:xfrm>
+            <a:off x="199290" y="181743"/>
+            <a:ext cx="8469162" cy="3066685"/>
+          </a:xfrm>
+          <a:prstGeom prst="rect">
+            <a:avLst/>
+          </a:prstGeom>
+        </p:spPr>
+      </p:pic>
+      <p:sp>
+        <p:nvSpPr>
+          <p:cNvPr id="4" name="Rectangle 3">
+            <a:extLst>
+              <a:ext uri="{FF2B5EF4-FFF2-40B4-BE49-F238E27FC236}">
+                <a16:creationId xmlns:a16="http://schemas.microsoft.com/office/drawing/2014/main" id="{D29696C0-A8E4-D75E-327B-3D2677249776}"/>
+              </a:ext>
+            </a:extLst>
+          </p:cNvPr>
+          <p:cNvSpPr/>
+          <p:nvPr/>
+        </p:nvSpPr>
+        <p:spPr>
+          <a:xfrm>
+            <a:off x="9650016" y="1349150"/>
+            <a:ext cx="1010195" cy="552994"/>
+          </a:xfrm>
+          <a:prstGeom prst="rect">
+            <a:avLst/>
+          </a:prstGeom>
+          <a:solidFill>
+            <a:srgbClr val="FFC000">
+              <a:alpha val="22000"/>
+            </a:srgbClr>
+          </a:solidFill>
+          <a:ln>
+            <a:noFill/>
+          </a:ln>
+        </p:spPr>
+        <p:style>
+          <a:lnRef idx="2">
+            <a:schemeClr val="accent1">
+              <a:shade val="15000"/>
+            </a:schemeClr>
+          </a:lnRef>
+          <a:fillRef idx="1">
+            <a:schemeClr val="accent1"/>
+          </a:fillRef>
+          <a:effectRef idx="0">
+            <a:schemeClr val="accent1"/>
+          </a:effectRef>
+          <a:fontRef idx="minor">
+            <a:schemeClr val="lt1"/>
+          </a:fontRef>
+        </p:style>
+        <p:txBody>
+          <a:bodyPr rtlCol="0" anchor="ctr"/>
+          <a:lstStyle/>
+          <a:p>
+            <a:pPr algn="ctr"/>
+            <a:endParaRPr lang="en-GB"/>
+          </a:p>
+        </p:txBody>
+      </p:sp>
+      <p:cxnSp>
+        <p:nvCxnSpPr>
+          <p:cNvPr id="5" name="Straight Connector 4">
+            <a:extLst>
+              <a:ext uri="{FF2B5EF4-FFF2-40B4-BE49-F238E27FC236}">
+                <a16:creationId xmlns:a16="http://schemas.microsoft.com/office/drawing/2014/main" id="{48625322-297F-2F65-34AA-CEF8C140DC8A}"/>
+              </a:ext>
+            </a:extLst>
+          </p:cNvPr>
+          <p:cNvCxnSpPr>
+            <a:cxnSpLocks/>
+          </p:cNvCxnSpPr>
+          <p:nvPr/>
+        </p:nvCxnSpPr>
+        <p:spPr>
+          <a:xfrm flipH="1">
+            <a:off x="6530829" y="426870"/>
+            <a:ext cx="1463879" cy="399446"/>
+          </a:xfrm>
+          <a:prstGeom prst="line">
+            <a:avLst/>
+          </a:prstGeom>
+          <a:ln>
+            <a:solidFill>
+              <a:srgbClr val="FFFF00"/>
+            </a:solidFill>
+          </a:ln>
+        </p:spPr>
+        <p:style>
+          <a:lnRef idx="2">
+            <a:schemeClr val="accent1"/>
+          </a:lnRef>
+          <a:fillRef idx="0">
+            <a:schemeClr val="accent1"/>
+          </a:fillRef>
+          <a:effectRef idx="1">
+            <a:schemeClr val="accent1"/>
+          </a:effectRef>
+          <a:fontRef idx="minor">
+            <a:schemeClr val="tx1"/>
+          </a:fontRef>
+        </p:style>
+      </p:cxnSp>
+      <p:cxnSp>
+        <p:nvCxnSpPr>
+          <p:cNvPr id="22" name="Straight Connector 21">
+            <a:extLst>
+              <a:ext uri="{FF2B5EF4-FFF2-40B4-BE49-F238E27FC236}">
+                <a16:creationId xmlns:a16="http://schemas.microsoft.com/office/drawing/2014/main" id="{51934E3D-C1D6-CCED-317D-E13917F549BA}"/>
+              </a:ext>
+            </a:extLst>
+          </p:cNvPr>
+          <p:cNvCxnSpPr>
+            <a:cxnSpLocks/>
+          </p:cNvCxnSpPr>
+          <p:nvPr/>
+        </p:nvCxnSpPr>
+        <p:spPr>
+          <a:xfrm flipH="1">
+            <a:off x="7592037" y="426870"/>
+            <a:ext cx="444616" cy="59691"/>
+          </a:xfrm>
+          <a:prstGeom prst="line">
+            <a:avLst/>
+          </a:prstGeom>
+          <a:ln>
+            <a:solidFill>
+              <a:srgbClr val="FFFF00"/>
+            </a:solidFill>
+          </a:ln>
+        </p:spPr>
+        <p:style>
+          <a:lnRef idx="2">
+            <a:schemeClr val="accent1"/>
+          </a:lnRef>
+          <a:fillRef idx="0">
+            <a:schemeClr val="accent1"/>
+          </a:fillRef>
+          <a:effectRef idx="1">
+            <a:schemeClr val="accent1"/>
+          </a:effectRef>
+          <a:fontRef idx="minor">
+            <a:schemeClr val="tx1"/>
+          </a:fontRef>
+        </p:style>
+      </p:cxnSp>
+      <p:cxnSp>
+        <p:nvCxnSpPr>
+          <p:cNvPr id="25" name="Straight Connector 24">
+            <a:extLst>
+              <a:ext uri="{FF2B5EF4-FFF2-40B4-BE49-F238E27FC236}">
+                <a16:creationId xmlns:a16="http://schemas.microsoft.com/office/drawing/2014/main" id="{E10E13B2-7364-1B0F-7081-2ADD3AB37EB1}"/>
+              </a:ext>
+            </a:extLst>
+          </p:cNvPr>
+          <p:cNvCxnSpPr>
+            <a:cxnSpLocks/>
+          </p:cNvCxnSpPr>
+          <p:nvPr/>
+        </p:nvCxnSpPr>
+        <p:spPr>
+          <a:xfrm flipH="1">
+            <a:off x="4899171" y="426870"/>
+            <a:ext cx="3137482" cy="697255"/>
+          </a:xfrm>
+          <a:prstGeom prst="line">
+            <a:avLst/>
+          </a:prstGeom>
+          <a:ln>
+            <a:solidFill>
+              <a:srgbClr val="FFFF00"/>
+            </a:solidFill>
+          </a:ln>
+        </p:spPr>
+        <p:style>
+          <a:lnRef idx="2">
+            <a:schemeClr val="accent1"/>
+          </a:lnRef>
+          <a:fillRef idx="0">
+            <a:schemeClr val="accent1"/>
+          </a:fillRef>
+          <a:effectRef idx="1">
+            <a:schemeClr val="accent1"/>
+          </a:effectRef>
+          <a:fontRef idx="minor">
+            <a:schemeClr val="tx1"/>
+          </a:fontRef>
+        </p:style>
+      </p:cxnSp>
+    </p:spTree>
+    <p:extLst>
+      <p:ext uri="{BB962C8B-B14F-4D97-AF65-F5344CB8AC3E}">
+        <p14:creationId xmlns:p14="http://schemas.microsoft.com/office/powerpoint/2010/main" val="415382485"/>
+      </p:ext>
+    </p:extLst>
+  </p:cSld>
+  <p:clrMapOvr>
+    <a:masterClrMapping/>
+  </p:clrMapOvr>
+</p:sld>
+</file>
+
+<file path=ppt/slides/slide13.xml><?xml version="1.0" encoding="utf-8"?>
+<p:sld xmlns:a="http://schemas.openxmlformats.org/drawingml/2006/main" xmlns:r="http://schemas.openxmlformats.org/officeDocument/2006/relationships" xmlns:p="http://schemas.openxmlformats.org/presentationml/2006/main">
+  <p:cSld>
+    <p:spTree>
+      <p:nvGrpSpPr>
+        <p:cNvPr id="1" name=""/>
+        <p:cNvGrpSpPr/>
+        <p:nvPr/>
+      </p:nvGrpSpPr>
+      <p:grpSpPr>
+        <a:xfrm>
+          <a:off x="0" y="0"/>
+          <a:ext cx="0" cy="0"/>
+          <a:chOff x="0" y="0"/>
+          <a:chExt cx="0" cy="0"/>
+        </a:xfrm>
+      </p:grpSpPr>
+      <p:pic>
+        <p:nvPicPr>
           <p:cNvPr id="3" name="Picture 2">
             <a:extLst>
               <a:ext uri="{FF2B5EF4-FFF2-40B4-BE49-F238E27FC236}">
@@ -7037,6 +7465,572 @@
     <p:extLst>
       <p:ext uri="{BB962C8B-B14F-4D97-AF65-F5344CB8AC3E}">
         <p14:creationId xmlns:p14="http://schemas.microsoft.com/office/powerpoint/2010/main" val="1632626330"/>
+      </p:ext>
+    </p:extLst>
+  </p:cSld>
+  <p:clrMapOvr>
+    <a:masterClrMapping/>
+  </p:clrMapOvr>
+</p:sld>
+</file>
+
+<file path=ppt/slides/slide14.xml><?xml version="1.0" encoding="utf-8"?>
+<p:sld xmlns:a="http://schemas.openxmlformats.org/drawingml/2006/main" xmlns:r="http://schemas.openxmlformats.org/officeDocument/2006/relationships" xmlns:p="http://schemas.openxmlformats.org/presentationml/2006/main">
+  <p:cSld>
+    <p:spTree>
+      <p:nvGrpSpPr>
+        <p:cNvPr id="1" name=""/>
+        <p:cNvGrpSpPr/>
+        <p:nvPr/>
+      </p:nvGrpSpPr>
+      <p:grpSpPr>
+        <a:xfrm>
+          <a:off x="0" y="0"/>
+          <a:ext cx="0" cy="0"/>
+          <a:chOff x="0" y="0"/>
+          <a:chExt cx="0" cy="0"/>
+        </a:xfrm>
+      </p:grpSpPr>
+      <p:pic>
+        <p:nvPicPr>
+          <p:cNvPr id="3" name="Picture 2">
+            <a:extLst>
+              <a:ext uri="{FF2B5EF4-FFF2-40B4-BE49-F238E27FC236}">
+                <a16:creationId xmlns:a16="http://schemas.microsoft.com/office/drawing/2014/main" id="{8AD26C46-70CD-8C6C-E38B-1D43C513C34A}"/>
+              </a:ext>
+            </a:extLst>
+          </p:cNvPr>
+          <p:cNvPicPr>
+            <a:picLocks noChangeAspect="1"/>
+          </p:cNvPicPr>
+          <p:nvPr/>
+        </p:nvPicPr>
+        <p:blipFill>
+          <a:blip r:embed="rId2"/>
+          <a:stretch>
+            <a:fillRect/>
+          </a:stretch>
+        </p:blipFill>
+        <p:spPr>
+          <a:xfrm>
+            <a:off x="1042297" y="667332"/>
+            <a:ext cx="7506086" cy="2724290"/>
+          </a:xfrm>
+          <a:prstGeom prst="rect">
+            <a:avLst/>
+          </a:prstGeom>
+        </p:spPr>
+      </p:pic>
+      <p:sp>
+        <p:nvSpPr>
+          <p:cNvPr id="4" name="Rectangle 3">
+            <a:extLst>
+              <a:ext uri="{FF2B5EF4-FFF2-40B4-BE49-F238E27FC236}">
+                <a16:creationId xmlns:a16="http://schemas.microsoft.com/office/drawing/2014/main" id="{6BAA4D69-7573-2AB9-464D-862D74047AB7}"/>
+              </a:ext>
+            </a:extLst>
+          </p:cNvPr>
+          <p:cNvSpPr/>
+          <p:nvPr/>
+        </p:nvSpPr>
+        <p:spPr>
+          <a:xfrm>
+            <a:off x="5553511" y="4828523"/>
+            <a:ext cx="1929467" cy="884380"/>
+          </a:xfrm>
+          <a:prstGeom prst="rect">
+            <a:avLst/>
+          </a:prstGeom>
+          <a:solidFill>
+            <a:srgbClr val="FFFF00">
+              <a:alpha val="22000"/>
+            </a:srgbClr>
+          </a:solidFill>
+          <a:ln>
+            <a:noFill/>
+          </a:ln>
+        </p:spPr>
+        <p:style>
+          <a:lnRef idx="2">
+            <a:schemeClr val="accent1">
+              <a:shade val="15000"/>
+            </a:schemeClr>
+          </a:lnRef>
+          <a:fillRef idx="1">
+            <a:schemeClr val="accent1"/>
+          </a:fillRef>
+          <a:effectRef idx="0">
+            <a:schemeClr val="accent1"/>
+          </a:effectRef>
+          <a:fontRef idx="minor">
+            <a:schemeClr val="lt1"/>
+          </a:fontRef>
+        </p:style>
+        <p:txBody>
+          <a:bodyPr rtlCol="0" anchor="ctr"/>
+          <a:lstStyle/>
+          <a:p>
+            <a:pPr algn="ctr"/>
+            <a:endParaRPr lang="en-GB"/>
+          </a:p>
+        </p:txBody>
+      </p:sp>
+      <p:sp>
+        <p:nvSpPr>
+          <p:cNvPr id="5" name="Rectangle 4">
+            <a:extLst>
+              <a:ext uri="{FF2B5EF4-FFF2-40B4-BE49-F238E27FC236}">
+                <a16:creationId xmlns:a16="http://schemas.microsoft.com/office/drawing/2014/main" id="{EE79E7A4-8B66-EA42-1287-6623EEDDB8CE}"/>
+              </a:ext>
+            </a:extLst>
+          </p:cNvPr>
+          <p:cNvSpPr/>
+          <p:nvPr/>
+        </p:nvSpPr>
+        <p:spPr>
+          <a:xfrm>
+            <a:off x="2168554" y="1526796"/>
+            <a:ext cx="1908496" cy="885040"/>
+          </a:xfrm>
+          <a:prstGeom prst="rect">
+            <a:avLst/>
+          </a:prstGeom>
+          <a:solidFill>
+            <a:srgbClr val="FFFF00">
+              <a:alpha val="22000"/>
+            </a:srgbClr>
+          </a:solidFill>
+          <a:ln>
+            <a:noFill/>
+          </a:ln>
+        </p:spPr>
+        <p:style>
+          <a:lnRef idx="2">
+            <a:schemeClr val="accent1">
+              <a:shade val="15000"/>
+            </a:schemeClr>
+          </a:lnRef>
+          <a:fillRef idx="1">
+            <a:schemeClr val="accent1"/>
+          </a:fillRef>
+          <a:effectRef idx="0">
+            <a:schemeClr val="accent1"/>
+          </a:effectRef>
+          <a:fontRef idx="minor">
+            <a:schemeClr val="lt1"/>
+          </a:fontRef>
+        </p:style>
+        <p:txBody>
+          <a:bodyPr rtlCol="0" anchor="ctr"/>
+          <a:lstStyle/>
+          <a:p>
+            <a:pPr algn="ctr"/>
+            <a:endParaRPr lang="en-GB"/>
+          </a:p>
+        </p:txBody>
+      </p:sp>
+      <p:sp>
+        <p:nvSpPr>
+          <p:cNvPr id="9" name="Freeform: Shape 8">
+            <a:extLst>
+              <a:ext uri="{FF2B5EF4-FFF2-40B4-BE49-F238E27FC236}">
+                <a16:creationId xmlns:a16="http://schemas.microsoft.com/office/drawing/2014/main" id="{86EC64C6-6B36-512D-F30A-126F3C84E9EA}"/>
+              </a:ext>
+            </a:extLst>
+          </p:cNvPr>
+          <p:cNvSpPr/>
+          <p:nvPr/>
+        </p:nvSpPr>
+        <p:spPr>
+          <a:xfrm>
+            <a:off x="2780949" y="3823248"/>
+            <a:ext cx="2617366" cy="106959"/>
+          </a:xfrm>
+          <a:custGeom>
+            <a:avLst/>
+            <a:gdLst>
+              <a:gd name="connsiteX0" fmla="*/ 0 w 2617366"/>
+              <a:gd name="connsiteY0" fmla="*/ 213919 h 213919"/>
+              <a:gd name="connsiteX1" fmla="*/ 1925274 w 2617366"/>
+              <a:gd name="connsiteY1" fmla="*/ 213919 h 213919"/>
+              <a:gd name="connsiteX2" fmla="*/ 1929468 w 2617366"/>
+              <a:gd name="connsiteY2" fmla="*/ 4195 h 213919"/>
+              <a:gd name="connsiteX3" fmla="*/ 2617366 w 2617366"/>
+              <a:gd name="connsiteY3" fmla="*/ 0 h 213919"/>
+            </a:gdLst>
+            <a:ahLst/>
+            <a:cxnLst>
+              <a:cxn ang="0">
+                <a:pos x="connsiteX0" y="connsiteY0"/>
+              </a:cxn>
+              <a:cxn ang="0">
+                <a:pos x="connsiteX1" y="connsiteY1"/>
+              </a:cxn>
+              <a:cxn ang="0">
+                <a:pos x="connsiteX2" y="connsiteY2"/>
+              </a:cxn>
+              <a:cxn ang="0">
+                <a:pos x="connsiteX3" y="connsiteY3"/>
+              </a:cxn>
+            </a:cxnLst>
+            <a:rect l="l" t="t" r="r" b="b"/>
+            <a:pathLst>
+              <a:path w="2617366" h="213919">
+                <a:moveTo>
+                  <a:pt x="0" y="213919"/>
+                </a:moveTo>
+                <a:lnTo>
+                  <a:pt x="1925274" y="213919"/>
+                </a:lnTo>
+                <a:lnTo>
+                  <a:pt x="1929468" y="4195"/>
+                </a:lnTo>
+                <a:lnTo>
+                  <a:pt x="2617366" y="0"/>
+                </a:lnTo>
+              </a:path>
+            </a:pathLst>
+          </a:custGeom>
+          <a:noFill/>
+          <a:ln>
+            <a:solidFill>
+              <a:srgbClr val="FFFF00"/>
+            </a:solidFill>
+          </a:ln>
+        </p:spPr>
+        <p:style>
+          <a:lnRef idx="2">
+            <a:schemeClr val="accent1">
+              <a:shade val="15000"/>
+            </a:schemeClr>
+          </a:lnRef>
+          <a:fillRef idx="1">
+            <a:schemeClr val="accent1"/>
+          </a:fillRef>
+          <a:effectRef idx="0">
+            <a:schemeClr val="accent1"/>
+          </a:effectRef>
+          <a:fontRef idx="minor">
+            <a:schemeClr val="lt1"/>
+          </a:fontRef>
+        </p:style>
+        <p:txBody>
+          <a:bodyPr rtlCol="0" anchor="ctr"/>
+          <a:lstStyle/>
+          <a:p>
+            <a:pPr algn="ctr"/>
+            <a:endParaRPr lang="en-GB"/>
+          </a:p>
+        </p:txBody>
+      </p:sp>
+      <p:sp>
+        <p:nvSpPr>
+          <p:cNvPr id="10" name="Freeform: Shape 9">
+            <a:extLst>
+              <a:ext uri="{FF2B5EF4-FFF2-40B4-BE49-F238E27FC236}">
+                <a16:creationId xmlns:a16="http://schemas.microsoft.com/office/drawing/2014/main" id="{FBE95B43-F15C-6846-8734-FE829C55CDC3}"/>
+              </a:ext>
+            </a:extLst>
+          </p:cNvPr>
+          <p:cNvSpPr/>
+          <p:nvPr/>
+        </p:nvSpPr>
+        <p:spPr>
+          <a:xfrm>
+            <a:off x="3456263" y="3955039"/>
+            <a:ext cx="2583811" cy="222971"/>
+          </a:xfrm>
+          <a:custGeom>
+            <a:avLst/>
+            <a:gdLst>
+              <a:gd name="connsiteX0" fmla="*/ 0 w 2617366"/>
+              <a:gd name="connsiteY0" fmla="*/ 213919 h 213919"/>
+              <a:gd name="connsiteX1" fmla="*/ 1925274 w 2617366"/>
+              <a:gd name="connsiteY1" fmla="*/ 213919 h 213919"/>
+              <a:gd name="connsiteX2" fmla="*/ 1929468 w 2617366"/>
+              <a:gd name="connsiteY2" fmla="*/ 4195 h 213919"/>
+              <a:gd name="connsiteX3" fmla="*/ 2617366 w 2617366"/>
+              <a:gd name="connsiteY3" fmla="*/ 0 h 213919"/>
+            </a:gdLst>
+            <a:ahLst/>
+            <a:cxnLst>
+              <a:cxn ang="0">
+                <a:pos x="connsiteX0" y="connsiteY0"/>
+              </a:cxn>
+              <a:cxn ang="0">
+                <a:pos x="connsiteX1" y="connsiteY1"/>
+              </a:cxn>
+              <a:cxn ang="0">
+                <a:pos x="connsiteX2" y="connsiteY2"/>
+              </a:cxn>
+              <a:cxn ang="0">
+                <a:pos x="connsiteX3" y="connsiteY3"/>
+              </a:cxn>
+            </a:cxnLst>
+            <a:rect l="l" t="t" r="r" b="b"/>
+            <a:pathLst>
+              <a:path w="2617366" h="213919">
+                <a:moveTo>
+                  <a:pt x="0" y="213919"/>
+                </a:moveTo>
+                <a:lnTo>
+                  <a:pt x="1925274" y="213919"/>
+                </a:lnTo>
+                <a:lnTo>
+                  <a:pt x="1929468" y="4195"/>
+                </a:lnTo>
+                <a:lnTo>
+                  <a:pt x="2617366" y="0"/>
+                </a:lnTo>
+              </a:path>
+            </a:pathLst>
+          </a:custGeom>
+          <a:noFill/>
+          <a:ln>
+            <a:solidFill>
+              <a:srgbClr val="FFFF00"/>
+            </a:solidFill>
+          </a:ln>
+        </p:spPr>
+        <p:style>
+          <a:lnRef idx="2">
+            <a:schemeClr val="accent1">
+              <a:shade val="15000"/>
+            </a:schemeClr>
+          </a:lnRef>
+          <a:fillRef idx="1">
+            <a:schemeClr val="accent1"/>
+          </a:fillRef>
+          <a:effectRef idx="0">
+            <a:schemeClr val="accent1"/>
+          </a:effectRef>
+          <a:fontRef idx="minor">
+            <a:schemeClr val="lt1"/>
+          </a:fontRef>
+        </p:style>
+        <p:txBody>
+          <a:bodyPr rtlCol="0" anchor="ctr"/>
+          <a:lstStyle/>
+          <a:p>
+            <a:pPr algn="ctr"/>
+            <a:endParaRPr lang="en-GB"/>
+          </a:p>
+        </p:txBody>
+      </p:sp>
+      <p:sp>
+        <p:nvSpPr>
+          <p:cNvPr id="11" name="Freeform: Shape 10">
+            <a:extLst>
+              <a:ext uri="{FF2B5EF4-FFF2-40B4-BE49-F238E27FC236}">
+                <a16:creationId xmlns:a16="http://schemas.microsoft.com/office/drawing/2014/main" id="{243FF0AA-E3FD-F721-97A6-29C708BE4D2B}"/>
+              </a:ext>
+            </a:extLst>
+          </p:cNvPr>
+          <p:cNvSpPr/>
+          <p:nvPr/>
+        </p:nvSpPr>
+        <p:spPr>
+          <a:xfrm>
+            <a:off x="6430162" y="3763103"/>
+            <a:ext cx="3435292" cy="696286"/>
+          </a:xfrm>
+          <a:custGeom>
+            <a:avLst/>
+            <a:gdLst>
+              <a:gd name="connsiteX0" fmla="*/ 0 w 3435292"/>
+              <a:gd name="connsiteY0" fmla="*/ 687897 h 696286"/>
+              <a:gd name="connsiteX1" fmla="*/ 1002484 w 3435292"/>
+              <a:gd name="connsiteY1" fmla="*/ 696286 h 696286"/>
+              <a:gd name="connsiteX2" fmla="*/ 2197915 w 3435292"/>
+              <a:gd name="connsiteY2" fmla="*/ 662730 h 696286"/>
+              <a:gd name="connsiteX3" fmla="*/ 2206304 w 3435292"/>
+              <a:gd name="connsiteY3" fmla="*/ 0 h 696286"/>
+              <a:gd name="connsiteX4" fmla="*/ 3435292 w 3435292"/>
+              <a:gd name="connsiteY4" fmla="*/ 16778 h 696286"/>
+            </a:gdLst>
+            <a:ahLst/>
+            <a:cxnLst>
+              <a:cxn ang="0">
+                <a:pos x="connsiteX0" y="connsiteY0"/>
+              </a:cxn>
+              <a:cxn ang="0">
+                <a:pos x="connsiteX1" y="connsiteY1"/>
+              </a:cxn>
+              <a:cxn ang="0">
+                <a:pos x="connsiteX2" y="connsiteY2"/>
+              </a:cxn>
+              <a:cxn ang="0">
+                <a:pos x="connsiteX3" y="connsiteY3"/>
+              </a:cxn>
+              <a:cxn ang="0">
+                <a:pos x="connsiteX4" y="connsiteY4"/>
+              </a:cxn>
+            </a:cxnLst>
+            <a:rect l="l" t="t" r="r" b="b"/>
+            <a:pathLst>
+              <a:path w="3435292" h="696286">
+                <a:moveTo>
+                  <a:pt x="0" y="687897"/>
+                </a:moveTo>
+                <a:lnTo>
+                  <a:pt x="1002484" y="696286"/>
+                </a:lnTo>
+                <a:lnTo>
+                  <a:pt x="2197915" y="662730"/>
+                </a:lnTo>
+                <a:lnTo>
+                  <a:pt x="2206304" y="0"/>
+                </a:lnTo>
+                <a:lnTo>
+                  <a:pt x="3435292" y="16778"/>
+                </a:lnTo>
+              </a:path>
+            </a:pathLst>
+          </a:custGeom>
+          <a:noFill/>
+          <a:ln>
+            <a:solidFill>
+              <a:srgbClr val="FFFF00"/>
+            </a:solidFill>
+          </a:ln>
+        </p:spPr>
+        <p:style>
+          <a:lnRef idx="2">
+            <a:schemeClr val="accent1">
+              <a:shade val="15000"/>
+            </a:schemeClr>
+          </a:lnRef>
+          <a:fillRef idx="1">
+            <a:schemeClr val="accent1"/>
+          </a:fillRef>
+          <a:effectRef idx="0">
+            <a:schemeClr val="accent1"/>
+          </a:effectRef>
+          <a:fontRef idx="minor">
+            <a:schemeClr val="lt1"/>
+          </a:fontRef>
+        </p:style>
+        <p:txBody>
+          <a:bodyPr rtlCol="0" anchor="ctr"/>
+          <a:lstStyle/>
+          <a:p>
+            <a:pPr algn="ctr"/>
+            <a:endParaRPr lang="en-GB"/>
+          </a:p>
+        </p:txBody>
+      </p:sp>
+      <p:sp>
+        <p:nvSpPr>
+          <p:cNvPr id="12" name="Rectangle 11">
+            <a:extLst>
+              <a:ext uri="{FF2B5EF4-FFF2-40B4-BE49-F238E27FC236}">
+                <a16:creationId xmlns:a16="http://schemas.microsoft.com/office/drawing/2014/main" id="{F7194CDD-1829-9364-4848-2135025634F6}"/>
+              </a:ext>
+            </a:extLst>
+          </p:cNvPr>
+          <p:cNvSpPr/>
+          <p:nvPr/>
+        </p:nvSpPr>
+        <p:spPr>
+          <a:xfrm>
+            <a:off x="4945310" y="1730541"/>
+            <a:ext cx="1031846" cy="740018"/>
+          </a:xfrm>
+          <a:prstGeom prst="rect">
+            <a:avLst/>
+          </a:prstGeom>
+          <a:solidFill>
+            <a:srgbClr val="FFFF00">
+              <a:alpha val="22000"/>
+            </a:srgbClr>
+          </a:solidFill>
+          <a:ln>
+            <a:noFill/>
+          </a:ln>
+        </p:spPr>
+        <p:style>
+          <a:lnRef idx="2">
+            <a:schemeClr val="accent1">
+              <a:shade val="15000"/>
+            </a:schemeClr>
+          </a:lnRef>
+          <a:fillRef idx="1">
+            <a:schemeClr val="accent1"/>
+          </a:fillRef>
+          <a:effectRef idx="0">
+            <a:schemeClr val="accent1"/>
+          </a:effectRef>
+          <a:fontRef idx="minor">
+            <a:schemeClr val="lt1"/>
+          </a:fontRef>
+        </p:style>
+        <p:txBody>
+          <a:bodyPr rtlCol="0" anchor="ctr"/>
+          <a:lstStyle/>
+          <a:p>
+            <a:pPr algn="ctr"/>
+            <a:endParaRPr lang="en-GB"/>
+          </a:p>
+        </p:txBody>
+      </p:sp>
+      <p:sp>
+        <p:nvSpPr>
+          <p:cNvPr id="13" name="Rectangle 12">
+            <a:extLst>
+              <a:ext uri="{FF2B5EF4-FFF2-40B4-BE49-F238E27FC236}">
+                <a16:creationId xmlns:a16="http://schemas.microsoft.com/office/drawing/2014/main" id="{94600E5A-16EC-413E-D603-E95ED9E499BA}"/>
+              </a:ext>
+            </a:extLst>
+          </p:cNvPr>
+          <p:cNvSpPr/>
+          <p:nvPr/>
+        </p:nvSpPr>
+        <p:spPr>
+          <a:xfrm>
+            <a:off x="4299358" y="884043"/>
+            <a:ext cx="645952" cy="542085"/>
+          </a:xfrm>
+          <a:prstGeom prst="rect">
+            <a:avLst/>
+          </a:prstGeom>
+          <a:solidFill>
+            <a:srgbClr val="FFFF00">
+              <a:alpha val="22000"/>
+            </a:srgbClr>
+          </a:solidFill>
+          <a:ln>
+            <a:noFill/>
+          </a:ln>
+        </p:spPr>
+        <p:style>
+          <a:lnRef idx="2">
+            <a:schemeClr val="accent1">
+              <a:shade val="15000"/>
+            </a:schemeClr>
+          </a:lnRef>
+          <a:fillRef idx="1">
+            <a:schemeClr val="accent1"/>
+          </a:fillRef>
+          <a:effectRef idx="0">
+            <a:schemeClr val="accent1"/>
+          </a:effectRef>
+          <a:fontRef idx="minor">
+            <a:schemeClr val="lt1"/>
+          </a:fontRef>
+        </p:style>
+        <p:txBody>
+          <a:bodyPr rtlCol="0" anchor="ctr"/>
+          <a:lstStyle/>
+          <a:p>
+            <a:pPr algn="ctr"/>
+            <a:endParaRPr lang="en-GB"/>
+          </a:p>
+        </p:txBody>
+      </p:sp>
+    </p:spTree>
+    <p:extLst>
+      <p:ext uri="{BB962C8B-B14F-4D97-AF65-F5344CB8AC3E}">
+        <p14:creationId xmlns:p14="http://schemas.microsoft.com/office/powerpoint/2010/main" val="1777189340"/>
       </p:ext>
     </p:extLst>
   </p:cSld>
@@ -7068,6 +8062,750 @@
           <p:cNvPr id="4" name="Rectangle 3">
             <a:extLst>
               <a:ext uri="{FF2B5EF4-FFF2-40B4-BE49-F238E27FC236}">
+                <a16:creationId xmlns:a16="http://schemas.microsoft.com/office/drawing/2014/main" id="{D77AF7D0-A1EE-77F1-04ED-2F63F718BD86}"/>
+              </a:ext>
+            </a:extLst>
+          </p:cNvPr>
+          <p:cNvSpPr/>
+          <p:nvPr/>
+        </p:nvSpPr>
+        <p:spPr>
+          <a:xfrm>
+            <a:off x="377513" y="3527571"/>
+            <a:ext cx="3124892" cy="644362"/>
+          </a:xfrm>
+          <a:prstGeom prst="rect">
+            <a:avLst/>
+          </a:prstGeom>
+        </p:spPr>
+        <p:style>
+          <a:lnRef idx="2">
+            <a:schemeClr val="accent1">
+              <a:shade val="15000"/>
+            </a:schemeClr>
+          </a:lnRef>
+          <a:fillRef idx="1">
+            <a:schemeClr val="accent1"/>
+          </a:fillRef>
+          <a:effectRef idx="0">
+            <a:schemeClr val="accent1"/>
+          </a:effectRef>
+          <a:fontRef idx="minor">
+            <a:schemeClr val="lt1"/>
+          </a:fontRef>
+        </p:style>
+        <p:txBody>
+          <a:bodyPr rtlCol="0" anchor="ctr"/>
+          <a:lstStyle/>
+          <a:p>
+            <a:pPr algn="ctr"/>
+            <a:endParaRPr lang="en-GB"/>
+          </a:p>
+        </p:txBody>
+      </p:sp>
+      <p:grpSp>
+        <p:nvGrpSpPr>
+          <p:cNvPr id="6" name="Group 5">
+            <a:extLst>
+              <a:ext uri="{FF2B5EF4-FFF2-40B4-BE49-F238E27FC236}">
+                <a16:creationId xmlns:a16="http://schemas.microsoft.com/office/drawing/2014/main" id="{F5123784-1AB2-0F68-7C91-A6A1A973EBBB}"/>
+              </a:ext>
+            </a:extLst>
+          </p:cNvPr>
+          <p:cNvGrpSpPr/>
+          <p:nvPr/>
+        </p:nvGrpSpPr>
+        <p:grpSpPr>
+          <a:xfrm>
+            <a:off x="4242957" y="2917593"/>
+            <a:ext cx="120703" cy="644365"/>
+            <a:chOff x="3231290" y="2990335"/>
+            <a:chExt cx="265671" cy="1822622"/>
+          </a:xfrm>
+        </p:grpSpPr>
+        <p:cxnSp>
+          <p:nvCxnSpPr>
+            <p:cNvPr id="7" name="Straight Connector 6">
+              <a:extLst>
+                <a:ext uri="{FF2B5EF4-FFF2-40B4-BE49-F238E27FC236}">
+                  <a16:creationId xmlns:a16="http://schemas.microsoft.com/office/drawing/2014/main" id="{8E1B07A9-125E-3E1E-A466-71330A470CC6}"/>
+                </a:ext>
+              </a:extLst>
+            </p:cNvPr>
+            <p:cNvCxnSpPr>
+              <a:cxnSpLocks/>
+            </p:cNvCxnSpPr>
+            <p:nvPr/>
+          </p:nvCxnSpPr>
+          <p:spPr>
+            <a:xfrm>
+              <a:off x="3361038" y="2990335"/>
+              <a:ext cx="0" cy="1822622"/>
+            </a:xfrm>
+            <a:prstGeom prst="line">
+              <a:avLst/>
+            </a:prstGeom>
+          </p:spPr>
+          <p:style>
+            <a:lnRef idx="2">
+              <a:schemeClr val="accent1"/>
+            </a:lnRef>
+            <a:fillRef idx="0">
+              <a:schemeClr val="accent1"/>
+            </a:fillRef>
+            <a:effectRef idx="1">
+              <a:schemeClr val="accent1"/>
+            </a:effectRef>
+            <a:fontRef idx="minor">
+              <a:schemeClr val="tx1"/>
+            </a:fontRef>
+          </p:style>
+        </p:cxnSp>
+        <p:sp>
+          <p:nvSpPr>
+            <p:cNvPr id="8" name="Rectangle 7">
+              <a:extLst>
+                <a:ext uri="{FF2B5EF4-FFF2-40B4-BE49-F238E27FC236}">
+                  <a16:creationId xmlns:a16="http://schemas.microsoft.com/office/drawing/2014/main" id="{7970C5A8-C81F-73BA-1163-2727CD6DD56F}"/>
+                </a:ext>
+              </a:extLst>
+            </p:cNvPr>
+            <p:cNvSpPr/>
+            <p:nvPr/>
+          </p:nvSpPr>
+          <p:spPr>
+            <a:xfrm>
+              <a:off x="3231290" y="3472250"/>
+              <a:ext cx="265671" cy="951470"/>
+            </a:xfrm>
+            <a:prstGeom prst="rect">
+              <a:avLst/>
+            </a:prstGeom>
+            <a:solidFill>
+              <a:srgbClr val="FF0000"/>
+            </a:solidFill>
+          </p:spPr>
+          <p:style>
+            <a:lnRef idx="2">
+              <a:schemeClr val="accent1">
+                <a:shade val="15000"/>
+              </a:schemeClr>
+            </a:lnRef>
+            <a:fillRef idx="1">
+              <a:schemeClr val="accent1"/>
+            </a:fillRef>
+            <a:effectRef idx="0">
+              <a:schemeClr val="accent1"/>
+            </a:effectRef>
+            <a:fontRef idx="minor">
+              <a:schemeClr val="lt1"/>
+            </a:fontRef>
+          </p:style>
+          <p:txBody>
+            <a:bodyPr rtlCol="0" anchor="ctr"/>
+            <a:lstStyle/>
+            <a:p>
+              <a:pPr algn="ctr"/>
+              <a:endParaRPr lang="en-GB"/>
+            </a:p>
+          </p:txBody>
+        </p:sp>
+      </p:grpSp>
+      <p:grpSp>
+        <p:nvGrpSpPr>
+          <p:cNvPr id="9" name="Group 8">
+            <a:extLst>
+              <a:ext uri="{FF2B5EF4-FFF2-40B4-BE49-F238E27FC236}">
+                <a16:creationId xmlns:a16="http://schemas.microsoft.com/office/drawing/2014/main" id="{BB4DE465-9531-0E5B-1548-9F48659DF23A}"/>
+              </a:ext>
+            </a:extLst>
+          </p:cNvPr>
+          <p:cNvGrpSpPr/>
+          <p:nvPr/>
+        </p:nvGrpSpPr>
+        <p:grpSpPr>
+          <a:xfrm>
+            <a:off x="3683700" y="2877425"/>
+            <a:ext cx="120708" cy="1002484"/>
+            <a:chOff x="3231290" y="2990335"/>
+            <a:chExt cx="265671" cy="1822622"/>
+          </a:xfrm>
+        </p:grpSpPr>
+        <p:cxnSp>
+          <p:nvCxnSpPr>
+            <p:cNvPr id="10" name="Straight Connector 9">
+              <a:extLst>
+                <a:ext uri="{FF2B5EF4-FFF2-40B4-BE49-F238E27FC236}">
+                  <a16:creationId xmlns:a16="http://schemas.microsoft.com/office/drawing/2014/main" id="{B660B1A9-5FA0-A745-3D2E-7F5CC1900D60}"/>
+                </a:ext>
+              </a:extLst>
+            </p:cNvPr>
+            <p:cNvCxnSpPr>
+              <a:cxnSpLocks/>
+            </p:cNvCxnSpPr>
+            <p:nvPr/>
+          </p:nvCxnSpPr>
+          <p:spPr>
+            <a:xfrm>
+              <a:off x="3361038" y="2990335"/>
+              <a:ext cx="0" cy="1822622"/>
+            </a:xfrm>
+            <a:prstGeom prst="line">
+              <a:avLst/>
+            </a:prstGeom>
+          </p:spPr>
+          <p:style>
+            <a:lnRef idx="2">
+              <a:schemeClr val="accent1"/>
+            </a:lnRef>
+            <a:fillRef idx="0">
+              <a:schemeClr val="accent1"/>
+            </a:fillRef>
+            <a:effectRef idx="1">
+              <a:schemeClr val="accent1"/>
+            </a:effectRef>
+            <a:fontRef idx="minor">
+              <a:schemeClr val="tx1"/>
+            </a:fontRef>
+          </p:style>
+        </p:cxnSp>
+        <p:sp>
+          <p:nvSpPr>
+            <p:cNvPr id="11" name="Rectangle 10">
+              <a:extLst>
+                <a:ext uri="{FF2B5EF4-FFF2-40B4-BE49-F238E27FC236}">
+                  <a16:creationId xmlns:a16="http://schemas.microsoft.com/office/drawing/2014/main" id="{128C363D-D0A1-D4FA-9ABE-24DA733D5FAD}"/>
+                </a:ext>
+              </a:extLst>
+            </p:cNvPr>
+            <p:cNvSpPr/>
+            <p:nvPr/>
+          </p:nvSpPr>
+          <p:spPr>
+            <a:xfrm>
+              <a:off x="3231290" y="3472250"/>
+              <a:ext cx="265671" cy="951470"/>
+            </a:xfrm>
+            <a:prstGeom prst="rect">
+              <a:avLst/>
+            </a:prstGeom>
+            <a:solidFill>
+              <a:srgbClr val="92D050"/>
+            </a:solidFill>
+          </p:spPr>
+          <p:style>
+            <a:lnRef idx="2">
+              <a:schemeClr val="accent1">
+                <a:shade val="15000"/>
+              </a:schemeClr>
+            </a:lnRef>
+            <a:fillRef idx="1">
+              <a:schemeClr val="accent1"/>
+            </a:fillRef>
+            <a:effectRef idx="0">
+              <a:schemeClr val="accent1"/>
+            </a:effectRef>
+            <a:fontRef idx="minor">
+              <a:schemeClr val="lt1"/>
+            </a:fontRef>
+          </p:style>
+          <p:txBody>
+            <a:bodyPr rtlCol="0" anchor="ctr"/>
+            <a:lstStyle/>
+            <a:p>
+              <a:pPr algn="ctr"/>
+              <a:endParaRPr lang="en-GB"/>
+            </a:p>
+          </p:txBody>
+        </p:sp>
+      </p:grpSp>
+      <p:cxnSp>
+        <p:nvCxnSpPr>
+          <p:cNvPr id="13" name="Straight Connector 12">
+            <a:extLst>
+              <a:ext uri="{FF2B5EF4-FFF2-40B4-BE49-F238E27FC236}">
+                <a16:creationId xmlns:a16="http://schemas.microsoft.com/office/drawing/2014/main" id="{834138D8-6BFC-4D97-8AF6-847D3647E1A5}"/>
+              </a:ext>
+            </a:extLst>
+          </p:cNvPr>
+          <p:cNvCxnSpPr>
+            <a:cxnSpLocks/>
+          </p:cNvCxnSpPr>
+          <p:nvPr/>
+        </p:nvCxnSpPr>
+        <p:spPr>
+          <a:xfrm>
+            <a:off x="3561127" y="3527571"/>
+            <a:ext cx="2671893" cy="0"/>
+          </a:xfrm>
+          <a:prstGeom prst="line">
+            <a:avLst/>
+          </a:prstGeom>
+          <a:ln>
+            <a:prstDash val="dash"/>
+          </a:ln>
+        </p:spPr>
+        <p:style>
+          <a:lnRef idx="2">
+            <a:schemeClr val="accent1"/>
+          </a:lnRef>
+          <a:fillRef idx="0">
+            <a:schemeClr val="accent1"/>
+          </a:fillRef>
+          <a:effectRef idx="1">
+            <a:schemeClr val="accent1"/>
+          </a:effectRef>
+          <a:fontRef idx="minor">
+            <a:schemeClr val="tx1"/>
+          </a:fontRef>
+        </p:style>
+      </p:cxnSp>
+      <p:grpSp>
+        <p:nvGrpSpPr>
+          <p:cNvPr id="15" name="Group 14">
+            <a:extLst>
+              <a:ext uri="{FF2B5EF4-FFF2-40B4-BE49-F238E27FC236}">
+                <a16:creationId xmlns:a16="http://schemas.microsoft.com/office/drawing/2014/main" id="{C602925D-1DC1-D192-2C5B-61E93A810FE3}"/>
+              </a:ext>
+            </a:extLst>
+          </p:cNvPr>
+          <p:cNvGrpSpPr/>
+          <p:nvPr/>
+        </p:nvGrpSpPr>
+        <p:grpSpPr>
+          <a:xfrm>
+            <a:off x="3964731" y="2390864"/>
+            <a:ext cx="120708" cy="1002484"/>
+            <a:chOff x="3231290" y="2990335"/>
+            <a:chExt cx="265671" cy="1822622"/>
+          </a:xfrm>
+        </p:grpSpPr>
+        <p:cxnSp>
+          <p:nvCxnSpPr>
+            <p:cNvPr id="16" name="Straight Connector 15">
+              <a:extLst>
+                <a:ext uri="{FF2B5EF4-FFF2-40B4-BE49-F238E27FC236}">
+                  <a16:creationId xmlns:a16="http://schemas.microsoft.com/office/drawing/2014/main" id="{CFAE81BC-62DA-6D08-E49B-E9E5B6003402}"/>
+                </a:ext>
+              </a:extLst>
+            </p:cNvPr>
+            <p:cNvCxnSpPr>
+              <a:cxnSpLocks/>
+            </p:cNvCxnSpPr>
+            <p:nvPr/>
+          </p:nvCxnSpPr>
+          <p:spPr>
+            <a:xfrm>
+              <a:off x="3361038" y="2990335"/>
+              <a:ext cx="0" cy="1822622"/>
+            </a:xfrm>
+            <a:prstGeom prst="line">
+              <a:avLst/>
+            </a:prstGeom>
+          </p:spPr>
+          <p:style>
+            <a:lnRef idx="2">
+              <a:schemeClr val="accent1"/>
+            </a:lnRef>
+            <a:fillRef idx="0">
+              <a:schemeClr val="accent1"/>
+            </a:fillRef>
+            <a:effectRef idx="1">
+              <a:schemeClr val="accent1"/>
+            </a:effectRef>
+            <a:fontRef idx="minor">
+              <a:schemeClr val="tx1"/>
+            </a:fontRef>
+          </p:style>
+        </p:cxnSp>
+        <p:sp>
+          <p:nvSpPr>
+            <p:cNvPr id="17" name="Rectangle 16">
+              <a:extLst>
+                <a:ext uri="{FF2B5EF4-FFF2-40B4-BE49-F238E27FC236}">
+                  <a16:creationId xmlns:a16="http://schemas.microsoft.com/office/drawing/2014/main" id="{804FECEB-08DD-AF29-AB6E-D7BD63BF3309}"/>
+                </a:ext>
+              </a:extLst>
+            </p:cNvPr>
+            <p:cNvSpPr/>
+            <p:nvPr/>
+          </p:nvSpPr>
+          <p:spPr>
+            <a:xfrm>
+              <a:off x="3231290" y="3472250"/>
+              <a:ext cx="265671" cy="951470"/>
+            </a:xfrm>
+            <a:prstGeom prst="rect">
+              <a:avLst/>
+            </a:prstGeom>
+            <a:solidFill>
+              <a:srgbClr val="92D050"/>
+            </a:solidFill>
+          </p:spPr>
+          <p:style>
+            <a:lnRef idx="2">
+              <a:schemeClr val="accent1">
+                <a:shade val="15000"/>
+              </a:schemeClr>
+            </a:lnRef>
+            <a:fillRef idx="1">
+              <a:schemeClr val="accent1"/>
+            </a:fillRef>
+            <a:effectRef idx="0">
+              <a:schemeClr val="accent1"/>
+            </a:effectRef>
+            <a:fontRef idx="minor">
+              <a:schemeClr val="lt1"/>
+            </a:fontRef>
+          </p:style>
+          <p:txBody>
+            <a:bodyPr rtlCol="0" anchor="ctr"/>
+            <a:lstStyle/>
+            <a:p>
+              <a:pPr algn="ctr"/>
+              <a:endParaRPr lang="en-GB"/>
+            </a:p>
+          </p:txBody>
+        </p:sp>
+      </p:grpSp>
+      <p:grpSp>
+        <p:nvGrpSpPr>
+          <p:cNvPr id="18" name="Group 17">
+            <a:extLst>
+              <a:ext uri="{FF2B5EF4-FFF2-40B4-BE49-F238E27FC236}">
+                <a16:creationId xmlns:a16="http://schemas.microsoft.com/office/drawing/2014/main" id="{D29116A9-34C8-7ECA-7F0C-84405DB93326}"/>
+              </a:ext>
+            </a:extLst>
+          </p:cNvPr>
+          <p:cNvGrpSpPr/>
+          <p:nvPr/>
+        </p:nvGrpSpPr>
+        <p:grpSpPr>
+          <a:xfrm>
+            <a:off x="4465266" y="3239330"/>
+            <a:ext cx="120703" cy="644365"/>
+            <a:chOff x="3231290" y="2990335"/>
+            <a:chExt cx="265671" cy="1822622"/>
+          </a:xfrm>
+        </p:grpSpPr>
+        <p:cxnSp>
+          <p:nvCxnSpPr>
+            <p:cNvPr id="19" name="Straight Connector 18">
+              <a:extLst>
+                <a:ext uri="{FF2B5EF4-FFF2-40B4-BE49-F238E27FC236}">
+                  <a16:creationId xmlns:a16="http://schemas.microsoft.com/office/drawing/2014/main" id="{A2659EBD-9039-BDA5-363E-DDE480D5F874}"/>
+                </a:ext>
+              </a:extLst>
+            </p:cNvPr>
+            <p:cNvCxnSpPr>
+              <a:cxnSpLocks/>
+            </p:cNvCxnSpPr>
+            <p:nvPr/>
+          </p:nvCxnSpPr>
+          <p:spPr>
+            <a:xfrm>
+              <a:off x="3361038" y="2990335"/>
+              <a:ext cx="0" cy="1822622"/>
+            </a:xfrm>
+            <a:prstGeom prst="line">
+              <a:avLst/>
+            </a:prstGeom>
+          </p:spPr>
+          <p:style>
+            <a:lnRef idx="2">
+              <a:schemeClr val="accent1"/>
+            </a:lnRef>
+            <a:fillRef idx="0">
+              <a:schemeClr val="accent1"/>
+            </a:fillRef>
+            <a:effectRef idx="1">
+              <a:schemeClr val="accent1"/>
+            </a:effectRef>
+            <a:fontRef idx="minor">
+              <a:schemeClr val="tx1"/>
+            </a:fontRef>
+          </p:style>
+        </p:cxnSp>
+        <p:sp>
+          <p:nvSpPr>
+            <p:cNvPr id="20" name="Rectangle 19">
+              <a:extLst>
+                <a:ext uri="{FF2B5EF4-FFF2-40B4-BE49-F238E27FC236}">
+                  <a16:creationId xmlns:a16="http://schemas.microsoft.com/office/drawing/2014/main" id="{3AC73FDB-D1AE-E9F4-AA57-D779EAEDE80C}"/>
+                </a:ext>
+              </a:extLst>
+            </p:cNvPr>
+            <p:cNvSpPr/>
+            <p:nvPr/>
+          </p:nvSpPr>
+          <p:spPr>
+            <a:xfrm>
+              <a:off x="3231290" y="3472250"/>
+              <a:ext cx="265671" cy="951470"/>
+            </a:xfrm>
+            <a:prstGeom prst="rect">
+              <a:avLst/>
+            </a:prstGeom>
+            <a:solidFill>
+              <a:srgbClr val="FF0000"/>
+            </a:solidFill>
+          </p:spPr>
+          <p:style>
+            <a:lnRef idx="2">
+              <a:schemeClr val="accent1">
+                <a:shade val="15000"/>
+              </a:schemeClr>
+            </a:lnRef>
+            <a:fillRef idx="1">
+              <a:schemeClr val="accent1"/>
+            </a:fillRef>
+            <a:effectRef idx="0">
+              <a:schemeClr val="accent1"/>
+            </a:effectRef>
+            <a:fontRef idx="minor">
+              <a:schemeClr val="lt1"/>
+            </a:fontRef>
+          </p:style>
+          <p:txBody>
+            <a:bodyPr rtlCol="0" anchor="ctr"/>
+            <a:lstStyle/>
+            <a:p>
+              <a:pPr algn="ctr"/>
+              <a:endParaRPr lang="en-GB"/>
+            </a:p>
+          </p:txBody>
+        </p:sp>
+      </p:grpSp>
+      <p:grpSp>
+        <p:nvGrpSpPr>
+          <p:cNvPr id="21" name="Group 20">
+            <a:extLst>
+              <a:ext uri="{FF2B5EF4-FFF2-40B4-BE49-F238E27FC236}">
+                <a16:creationId xmlns:a16="http://schemas.microsoft.com/office/drawing/2014/main" id="{78982D3D-5066-C99D-80A5-6D9B6E15A0ED}"/>
+              </a:ext>
+            </a:extLst>
+          </p:cNvPr>
+          <p:cNvGrpSpPr/>
+          <p:nvPr/>
+        </p:nvGrpSpPr>
+        <p:grpSpPr>
+          <a:xfrm>
+            <a:off x="4686170" y="2669948"/>
+            <a:ext cx="120708" cy="1002484"/>
+            <a:chOff x="3231290" y="2990335"/>
+            <a:chExt cx="265671" cy="1822622"/>
+          </a:xfrm>
+        </p:grpSpPr>
+        <p:cxnSp>
+          <p:nvCxnSpPr>
+            <p:cNvPr id="22" name="Straight Connector 21">
+              <a:extLst>
+                <a:ext uri="{FF2B5EF4-FFF2-40B4-BE49-F238E27FC236}">
+                  <a16:creationId xmlns:a16="http://schemas.microsoft.com/office/drawing/2014/main" id="{F562906F-4849-3963-4937-6EFEEB4B978C}"/>
+                </a:ext>
+              </a:extLst>
+            </p:cNvPr>
+            <p:cNvCxnSpPr>
+              <a:cxnSpLocks/>
+            </p:cNvCxnSpPr>
+            <p:nvPr/>
+          </p:nvCxnSpPr>
+          <p:spPr>
+            <a:xfrm>
+              <a:off x="3361038" y="2990335"/>
+              <a:ext cx="0" cy="1822622"/>
+            </a:xfrm>
+            <a:prstGeom prst="line">
+              <a:avLst/>
+            </a:prstGeom>
+          </p:spPr>
+          <p:style>
+            <a:lnRef idx="2">
+              <a:schemeClr val="accent1"/>
+            </a:lnRef>
+            <a:fillRef idx="0">
+              <a:schemeClr val="accent1"/>
+            </a:fillRef>
+            <a:effectRef idx="1">
+              <a:schemeClr val="accent1"/>
+            </a:effectRef>
+            <a:fontRef idx="minor">
+              <a:schemeClr val="tx1"/>
+            </a:fontRef>
+          </p:style>
+        </p:cxnSp>
+        <p:sp>
+          <p:nvSpPr>
+            <p:cNvPr id="23" name="Rectangle 22">
+              <a:extLst>
+                <a:ext uri="{FF2B5EF4-FFF2-40B4-BE49-F238E27FC236}">
+                  <a16:creationId xmlns:a16="http://schemas.microsoft.com/office/drawing/2014/main" id="{591DDAD4-68E2-5BBB-A409-BE15ECCF3AAD}"/>
+                </a:ext>
+              </a:extLst>
+            </p:cNvPr>
+            <p:cNvSpPr/>
+            <p:nvPr/>
+          </p:nvSpPr>
+          <p:spPr>
+            <a:xfrm>
+              <a:off x="3231290" y="3472250"/>
+              <a:ext cx="265671" cy="951470"/>
+            </a:xfrm>
+            <a:prstGeom prst="rect">
+              <a:avLst/>
+            </a:prstGeom>
+            <a:solidFill>
+              <a:srgbClr val="92D050"/>
+            </a:solidFill>
+          </p:spPr>
+          <p:style>
+            <a:lnRef idx="2">
+              <a:schemeClr val="accent1">
+                <a:shade val="15000"/>
+              </a:schemeClr>
+            </a:lnRef>
+            <a:fillRef idx="1">
+              <a:schemeClr val="accent1"/>
+            </a:fillRef>
+            <a:effectRef idx="0">
+              <a:schemeClr val="accent1"/>
+            </a:effectRef>
+            <a:fontRef idx="minor">
+              <a:schemeClr val="lt1"/>
+            </a:fontRef>
+          </p:style>
+          <p:txBody>
+            <a:bodyPr rtlCol="0" anchor="ctr"/>
+            <a:lstStyle/>
+            <a:p>
+              <a:pPr algn="ctr"/>
+              <a:endParaRPr lang="en-GB"/>
+            </a:p>
+          </p:txBody>
+        </p:sp>
+      </p:grpSp>
+      <p:cxnSp>
+        <p:nvCxnSpPr>
+          <p:cNvPr id="26" name="Straight Arrow Connector 25">
+            <a:extLst>
+              <a:ext uri="{FF2B5EF4-FFF2-40B4-BE49-F238E27FC236}">
+                <a16:creationId xmlns:a16="http://schemas.microsoft.com/office/drawing/2014/main" id="{3D2F4AF4-4188-3E66-AF4A-B2791DC63671}"/>
+              </a:ext>
+            </a:extLst>
+          </p:cNvPr>
+          <p:cNvCxnSpPr>
+            <a:cxnSpLocks/>
+          </p:cNvCxnSpPr>
+          <p:nvPr/>
+        </p:nvCxnSpPr>
+        <p:spPr>
+          <a:xfrm flipH="1">
+            <a:off x="5045494" y="3238150"/>
+            <a:ext cx="527121" cy="1180"/>
+          </a:xfrm>
+          <a:prstGeom prst="straightConnector1">
+            <a:avLst/>
+          </a:prstGeom>
+          <a:ln>
+            <a:solidFill>
+              <a:schemeClr val="accent6">
+                <a:lumMod val="75000"/>
+              </a:schemeClr>
+            </a:solidFill>
+            <a:tailEnd type="triangle"/>
+          </a:ln>
+        </p:spPr>
+        <p:style>
+          <a:lnRef idx="2">
+            <a:schemeClr val="accent1"/>
+          </a:lnRef>
+          <a:fillRef idx="0">
+            <a:schemeClr val="accent1"/>
+          </a:fillRef>
+          <a:effectRef idx="1">
+            <a:schemeClr val="accent1"/>
+          </a:effectRef>
+          <a:fontRef idx="minor">
+            <a:schemeClr val="tx1"/>
+          </a:fontRef>
+        </p:style>
+      </p:cxnSp>
+      <p:cxnSp>
+        <p:nvCxnSpPr>
+          <p:cNvPr id="30" name="Straight Connector 29">
+            <a:extLst>
+              <a:ext uri="{FF2B5EF4-FFF2-40B4-BE49-F238E27FC236}">
+                <a16:creationId xmlns:a16="http://schemas.microsoft.com/office/drawing/2014/main" id="{EC8DAB89-DC31-DECE-9FDC-DC23039C27BB}"/>
+              </a:ext>
+            </a:extLst>
+          </p:cNvPr>
+          <p:cNvCxnSpPr>
+            <a:cxnSpLocks/>
+          </p:cNvCxnSpPr>
+          <p:nvPr/>
+        </p:nvCxnSpPr>
+        <p:spPr>
+          <a:xfrm>
+            <a:off x="4524215" y="3239330"/>
+            <a:ext cx="444617" cy="0"/>
+          </a:xfrm>
+          <a:prstGeom prst="line">
+            <a:avLst/>
+          </a:prstGeom>
+          <a:ln>
+            <a:prstDash val="dash"/>
+          </a:ln>
+        </p:spPr>
+        <p:style>
+          <a:lnRef idx="2">
+            <a:schemeClr val="accent1"/>
+          </a:lnRef>
+          <a:fillRef idx="0">
+            <a:schemeClr val="accent1"/>
+          </a:fillRef>
+          <a:effectRef idx="1">
+            <a:schemeClr val="accent1"/>
+          </a:effectRef>
+          <a:fontRef idx="minor">
+            <a:schemeClr val="tx1"/>
+          </a:fontRef>
+        </p:style>
+      </p:cxnSp>
+    </p:spTree>
+    <p:extLst>
+      <p:ext uri="{BB962C8B-B14F-4D97-AF65-F5344CB8AC3E}">
+        <p14:creationId xmlns:p14="http://schemas.microsoft.com/office/powerpoint/2010/main" val="1222357576"/>
+      </p:ext>
+    </p:extLst>
+  </p:cSld>
+  <p:clrMapOvr>
+    <a:masterClrMapping/>
+  </p:clrMapOvr>
+</p:sld>
+</file>
+
+<file path=ppt/slides/slide3.xml><?xml version="1.0" encoding="utf-8"?>
+<p:sld xmlns:a="http://schemas.openxmlformats.org/drawingml/2006/main" xmlns:r="http://schemas.openxmlformats.org/officeDocument/2006/relationships" xmlns:p="http://schemas.openxmlformats.org/presentationml/2006/main">
+  <p:cSld>
+    <p:spTree>
+      <p:nvGrpSpPr>
+        <p:cNvPr id="1" name=""/>
+        <p:cNvGrpSpPr/>
+        <p:nvPr/>
+      </p:nvGrpSpPr>
+      <p:grpSpPr>
+        <a:xfrm>
+          <a:off x="0" y="0"/>
+          <a:ext cx="0" cy="0"/>
+          <a:chOff x="0" y="0"/>
+          <a:chExt cx="0" cy="0"/>
+        </a:xfrm>
+      </p:grpSpPr>
+      <p:sp>
+        <p:nvSpPr>
+          <p:cNvPr id="4" name="Rectangle 3">
+            <a:extLst>
+              <a:ext uri="{FF2B5EF4-FFF2-40B4-BE49-F238E27FC236}">
                 <a16:creationId xmlns:a16="http://schemas.microsoft.com/office/drawing/2014/main" id="{0BA68BFC-2446-08F4-CBF9-958825FE247D}"/>
               </a:ext>
             </a:extLst>
@@ -7603,7 +9341,7 @@
 </p:sld>
 </file>
 
-<file path=ppt/slides/slide3.xml><?xml version="1.0" encoding="utf-8"?>
+<file path=ppt/slides/slide4.xml><?xml version="1.0" encoding="utf-8"?>
 <p:sld xmlns:a="http://schemas.openxmlformats.org/drawingml/2006/main" xmlns:r="http://schemas.openxmlformats.org/officeDocument/2006/relationships" xmlns:p="http://schemas.openxmlformats.org/presentationml/2006/main">
   <p:cSld>
     <p:spTree>
@@ -7780,7 +9518,7 @@
 </p:sld>
 </file>
 
-<file path=ppt/slides/slide4.xml><?xml version="1.0" encoding="utf-8"?>
+<file path=ppt/slides/slide5.xml><?xml version="1.0" encoding="utf-8"?>
 <p:sld xmlns:a="http://schemas.openxmlformats.org/drawingml/2006/main" xmlns:r="http://schemas.openxmlformats.org/officeDocument/2006/relationships" xmlns:p="http://schemas.openxmlformats.org/presentationml/2006/main">
   <p:cSld>
     <p:spTree>
@@ -9948,7 +11686,7 @@
 </p:sld>
 </file>
 
-<file path=ppt/slides/slide5.xml><?xml version="1.0" encoding="utf-8"?>
+<file path=ppt/slides/slide6.xml><?xml version="1.0" encoding="utf-8"?>
 <p:sld xmlns:a="http://schemas.openxmlformats.org/drawingml/2006/main" xmlns:r="http://schemas.openxmlformats.org/officeDocument/2006/relationships" xmlns:p="http://schemas.openxmlformats.org/presentationml/2006/main">
   <p:cSld>
     <p:spTree>
@@ -12790,7 +14528,7 @@
 </p:sld>
 </file>
 
-<file path=ppt/slides/slide6.xml><?xml version="1.0" encoding="utf-8"?>
+<file path=ppt/slides/slide7.xml><?xml version="1.0" encoding="utf-8"?>
 <p:sld xmlns:a="http://schemas.openxmlformats.org/drawingml/2006/main" xmlns:r="http://schemas.openxmlformats.org/officeDocument/2006/relationships" xmlns:p="http://schemas.openxmlformats.org/presentationml/2006/main">
   <p:cSld>
     <p:spTree>
@@ -13330,206 +15068,6 @@
     <p:extLst>
       <p:ext uri="{BB962C8B-B14F-4D97-AF65-F5344CB8AC3E}">
         <p14:creationId xmlns:p14="http://schemas.microsoft.com/office/powerpoint/2010/main" val="2848408170"/>
-      </p:ext>
-    </p:extLst>
-  </p:cSld>
-  <p:clrMapOvr>
-    <a:masterClrMapping/>
-  </p:clrMapOvr>
-</p:sld>
-</file>
-
-<file path=ppt/slides/slide7.xml><?xml version="1.0" encoding="utf-8"?>
-<p:sld xmlns:a="http://schemas.openxmlformats.org/drawingml/2006/main" xmlns:r="http://schemas.openxmlformats.org/officeDocument/2006/relationships" xmlns:p="http://schemas.openxmlformats.org/presentationml/2006/main">
-  <p:cSld>
-    <p:spTree>
-      <p:nvGrpSpPr>
-        <p:cNvPr id="1" name=""/>
-        <p:cNvGrpSpPr/>
-        <p:nvPr/>
-      </p:nvGrpSpPr>
-      <p:grpSpPr>
-        <a:xfrm>
-          <a:off x="0" y="0"/>
-          <a:ext cx="0" cy="0"/>
-          <a:chOff x="0" y="0"/>
-          <a:chExt cx="0" cy="0"/>
-        </a:xfrm>
-      </p:grpSpPr>
-      <p:pic>
-        <p:nvPicPr>
-          <p:cNvPr id="7" name="Picture 6">
-            <a:extLst>
-              <a:ext uri="{FF2B5EF4-FFF2-40B4-BE49-F238E27FC236}">
-                <a16:creationId xmlns:a16="http://schemas.microsoft.com/office/drawing/2014/main" id="{63D2CB16-81AD-523B-442E-0149C3A914B0}"/>
-              </a:ext>
-            </a:extLst>
-          </p:cNvPr>
-          <p:cNvPicPr>
-            <a:picLocks noChangeAspect="1"/>
-          </p:cNvPicPr>
-          <p:nvPr/>
-        </p:nvPicPr>
-        <p:blipFill>
-          <a:blip r:embed="rId2"/>
-          <a:stretch>
-            <a:fillRect/>
-          </a:stretch>
-        </p:blipFill>
-        <p:spPr>
-          <a:xfrm>
-            <a:off x="1063366" y="1590580"/>
-            <a:ext cx="10065267" cy="3676839"/>
-          </a:xfrm>
-          <a:prstGeom prst="rect">
-            <a:avLst/>
-          </a:prstGeom>
-        </p:spPr>
-      </p:pic>
-      <p:sp>
-        <p:nvSpPr>
-          <p:cNvPr id="8" name="Rectangle 7">
-            <a:extLst>
-              <a:ext uri="{FF2B5EF4-FFF2-40B4-BE49-F238E27FC236}">
-                <a16:creationId xmlns:a16="http://schemas.microsoft.com/office/drawing/2014/main" id="{01902D24-DD4D-E215-B065-50A7223AC561}"/>
-              </a:ext>
-            </a:extLst>
-          </p:cNvPr>
-          <p:cNvSpPr/>
-          <p:nvPr/>
-        </p:nvSpPr>
-        <p:spPr>
-          <a:xfrm>
-            <a:off x="4563035" y="2247449"/>
-            <a:ext cx="2294965" cy="643669"/>
-          </a:xfrm>
-          <a:prstGeom prst="rect">
-            <a:avLst/>
-          </a:prstGeom>
-          <a:solidFill>
-            <a:srgbClr val="FFFF00">
-              <a:alpha val="22000"/>
-            </a:srgbClr>
-          </a:solidFill>
-          <a:ln>
-            <a:noFill/>
-          </a:ln>
-        </p:spPr>
-        <p:style>
-          <a:lnRef idx="2">
-            <a:schemeClr val="accent1">
-              <a:shade val="15000"/>
-            </a:schemeClr>
-          </a:lnRef>
-          <a:fillRef idx="1">
-            <a:schemeClr val="accent1"/>
-          </a:fillRef>
-          <a:effectRef idx="0">
-            <a:schemeClr val="accent1"/>
-          </a:effectRef>
-          <a:fontRef idx="minor">
-            <a:schemeClr val="lt1"/>
-          </a:fontRef>
-        </p:style>
-        <p:txBody>
-          <a:bodyPr rtlCol="0" anchor="ctr"/>
-          <a:lstStyle/>
-          <a:p>
-            <a:pPr algn="ctr"/>
-            <a:endParaRPr lang="en-GB"/>
-          </a:p>
-        </p:txBody>
-      </p:sp>
-      <p:cxnSp>
-        <p:nvCxnSpPr>
-          <p:cNvPr id="9" name="Straight Connector 8">
-            <a:extLst>
-              <a:ext uri="{FF2B5EF4-FFF2-40B4-BE49-F238E27FC236}">
-                <a16:creationId xmlns:a16="http://schemas.microsoft.com/office/drawing/2014/main" id="{E602F0FA-5980-F2B3-1B31-DE520EABED2B}"/>
-              </a:ext>
-            </a:extLst>
-          </p:cNvPr>
-          <p:cNvCxnSpPr>
-            <a:cxnSpLocks/>
-          </p:cNvCxnSpPr>
-          <p:nvPr/>
-        </p:nvCxnSpPr>
-        <p:spPr>
-          <a:xfrm>
-            <a:off x="5558118" y="2265508"/>
-            <a:ext cx="848820" cy="0"/>
-          </a:xfrm>
-          <a:prstGeom prst="line">
-            <a:avLst/>
-          </a:prstGeom>
-          <a:ln>
-            <a:solidFill>
-              <a:srgbClr val="FFFF00"/>
-            </a:solidFill>
-          </a:ln>
-        </p:spPr>
-        <p:style>
-          <a:lnRef idx="2">
-            <a:schemeClr val="accent1"/>
-          </a:lnRef>
-          <a:fillRef idx="0">
-            <a:schemeClr val="accent1"/>
-          </a:fillRef>
-          <a:effectRef idx="1">
-            <a:schemeClr val="accent1"/>
-          </a:effectRef>
-          <a:fontRef idx="minor">
-            <a:schemeClr val="tx1"/>
-          </a:fontRef>
-        </p:style>
-      </p:cxnSp>
-      <p:cxnSp>
-        <p:nvCxnSpPr>
-          <p:cNvPr id="11" name="Straight Connector 10">
-            <a:extLst>
-              <a:ext uri="{FF2B5EF4-FFF2-40B4-BE49-F238E27FC236}">
-                <a16:creationId xmlns:a16="http://schemas.microsoft.com/office/drawing/2014/main" id="{78110B7E-6494-2FCC-660F-1953077BDC36}"/>
-              </a:ext>
-            </a:extLst>
-          </p:cNvPr>
-          <p:cNvCxnSpPr>
-            <a:cxnSpLocks/>
-          </p:cNvCxnSpPr>
-          <p:nvPr/>
-        </p:nvCxnSpPr>
-        <p:spPr>
-          <a:xfrm>
-            <a:off x="5571565" y="2884073"/>
-            <a:ext cx="848820" cy="0"/>
-          </a:xfrm>
-          <a:prstGeom prst="line">
-            <a:avLst/>
-          </a:prstGeom>
-          <a:ln>
-            <a:solidFill>
-              <a:srgbClr val="FFFF00"/>
-            </a:solidFill>
-          </a:ln>
-        </p:spPr>
-        <p:style>
-          <a:lnRef idx="2">
-            <a:schemeClr val="accent1"/>
-          </a:lnRef>
-          <a:fillRef idx="0">
-            <a:schemeClr val="accent1"/>
-          </a:fillRef>
-          <a:effectRef idx="1">
-            <a:schemeClr val="accent1"/>
-          </a:effectRef>
-          <a:fontRef idx="minor">
-            <a:schemeClr val="tx1"/>
-          </a:fontRef>
-        </p:style>
-      </p:cxnSp>
-    </p:spTree>
-    <p:extLst>
-      <p:ext uri="{BB962C8B-B14F-4D97-AF65-F5344CB8AC3E}">
-        <p14:creationId xmlns:p14="http://schemas.microsoft.com/office/powerpoint/2010/main" val="347023000"/>
       </p:ext>
     </p:extLst>
   </p:cSld>
@@ -13558,10 +15096,10 @@
       </p:grpSpPr>
       <p:pic>
         <p:nvPicPr>
-          <p:cNvPr id="5" name="Picture 4">
-            <a:extLst>
-              <a:ext uri="{FF2B5EF4-FFF2-40B4-BE49-F238E27FC236}">
-                <a16:creationId xmlns:a16="http://schemas.microsoft.com/office/drawing/2014/main" id="{A62C7047-9E9E-A076-652A-3C1A88E5F5F9}"/>
+          <p:cNvPr id="7" name="Picture 6">
+            <a:extLst>
+              <a:ext uri="{FF2B5EF4-FFF2-40B4-BE49-F238E27FC236}">
+                <a16:creationId xmlns:a16="http://schemas.microsoft.com/office/drawing/2014/main" id="{63D2CB16-81AD-523B-442E-0149C3A914B0}"/>
               </a:ext>
             </a:extLst>
           </p:cNvPr>
@@ -13578,20 +15116,74 @@
         </p:blipFill>
         <p:spPr>
           <a:xfrm>
-            <a:off x="806178" y="1282589"/>
-            <a:ext cx="10579644" cy="4292821"/>
+            <a:off x="1063366" y="1590580"/>
+            <a:ext cx="10065267" cy="3676839"/>
           </a:xfrm>
           <a:prstGeom prst="rect">
             <a:avLst/>
           </a:prstGeom>
         </p:spPr>
       </p:pic>
+      <p:sp>
+        <p:nvSpPr>
+          <p:cNvPr id="8" name="Rectangle 7">
+            <a:extLst>
+              <a:ext uri="{FF2B5EF4-FFF2-40B4-BE49-F238E27FC236}">
+                <a16:creationId xmlns:a16="http://schemas.microsoft.com/office/drawing/2014/main" id="{01902D24-DD4D-E215-B065-50A7223AC561}"/>
+              </a:ext>
+            </a:extLst>
+          </p:cNvPr>
+          <p:cNvSpPr/>
+          <p:nvPr/>
+        </p:nvSpPr>
+        <p:spPr>
+          <a:xfrm>
+            <a:off x="4563035" y="2247449"/>
+            <a:ext cx="2294965" cy="643669"/>
+          </a:xfrm>
+          <a:prstGeom prst="rect">
+            <a:avLst/>
+          </a:prstGeom>
+          <a:solidFill>
+            <a:srgbClr val="FFFF00">
+              <a:alpha val="22000"/>
+            </a:srgbClr>
+          </a:solidFill>
+          <a:ln>
+            <a:noFill/>
+          </a:ln>
+        </p:spPr>
+        <p:style>
+          <a:lnRef idx="2">
+            <a:schemeClr val="accent1">
+              <a:shade val="15000"/>
+            </a:schemeClr>
+          </a:lnRef>
+          <a:fillRef idx="1">
+            <a:schemeClr val="accent1"/>
+          </a:fillRef>
+          <a:effectRef idx="0">
+            <a:schemeClr val="accent1"/>
+          </a:effectRef>
+          <a:fontRef idx="minor">
+            <a:schemeClr val="lt1"/>
+          </a:fontRef>
+        </p:style>
+        <p:txBody>
+          <a:bodyPr rtlCol="0" anchor="ctr"/>
+          <a:lstStyle/>
+          <a:p>
+            <a:pPr algn="ctr"/>
+            <a:endParaRPr lang="en-GB"/>
+          </a:p>
+        </p:txBody>
+      </p:sp>
       <p:cxnSp>
         <p:nvCxnSpPr>
-          <p:cNvPr id="7" name="Straight Connector 6">
-            <a:extLst>
-              <a:ext uri="{FF2B5EF4-FFF2-40B4-BE49-F238E27FC236}">
-                <a16:creationId xmlns:a16="http://schemas.microsoft.com/office/drawing/2014/main" id="{0AABEBD6-264F-211D-CCD8-6A5B4CC8EDE7}"/>
+          <p:cNvPr id="9" name="Straight Connector 8">
+            <a:extLst>
+              <a:ext uri="{FF2B5EF4-FFF2-40B4-BE49-F238E27FC236}">
+                <a16:creationId xmlns:a16="http://schemas.microsoft.com/office/drawing/2014/main" id="{E602F0FA-5980-F2B3-1B31-DE520EABED2B}"/>
               </a:ext>
             </a:extLst>
           </p:cNvPr>
@@ -13602,8 +15194,8 @@
         </p:nvCxnSpPr>
         <p:spPr>
           <a:xfrm>
-            <a:off x="2843349" y="4375928"/>
-            <a:ext cx="4337627" cy="0"/>
+            <a:off x="5558118" y="2265508"/>
+            <a:ext cx="848820" cy="0"/>
           </a:xfrm>
           <a:prstGeom prst="line">
             <a:avLst/>
@@ -13631,10 +15223,10 @@
       </p:cxnSp>
       <p:cxnSp>
         <p:nvCxnSpPr>
-          <p:cNvPr id="10" name="Straight Connector 9">
-            <a:extLst>
-              <a:ext uri="{FF2B5EF4-FFF2-40B4-BE49-F238E27FC236}">
-                <a16:creationId xmlns:a16="http://schemas.microsoft.com/office/drawing/2014/main" id="{A8DE2F7B-96F3-2DD5-D289-05F9EB8BF08B}"/>
+          <p:cNvPr id="11" name="Straight Connector 10">
+            <a:extLst>
+              <a:ext uri="{FF2B5EF4-FFF2-40B4-BE49-F238E27FC236}">
+                <a16:creationId xmlns:a16="http://schemas.microsoft.com/office/drawing/2014/main" id="{78110B7E-6494-2FCC-660F-1953077BDC36}"/>
               </a:ext>
             </a:extLst>
           </p:cNvPr>
@@ -13645,8 +15237,8 @@
         </p:nvCxnSpPr>
         <p:spPr>
           <a:xfrm>
-            <a:off x="2873829" y="3428999"/>
-            <a:ext cx="4336509" cy="0"/>
+            <a:off x="5571565" y="2884073"/>
+            <a:ext cx="848820" cy="0"/>
           </a:xfrm>
           <a:prstGeom prst="line">
             <a:avLst/>
@@ -13672,204 +15264,10 @@
           </a:fontRef>
         </p:style>
       </p:cxnSp>
-      <p:cxnSp>
-        <p:nvCxnSpPr>
-          <p:cNvPr id="13" name="Straight Connector 12">
-            <a:extLst>
-              <a:ext uri="{FF2B5EF4-FFF2-40B4-BE49-F238E27FC236}">
-                <a16:creationId xmlns:a16="http://schemas.microsoft.com/office/drawing/2014/main" id="{07A02780-C941-1BAF-5DE9-77B4A1236844}"/>
-              </a:ext>
-            </a:extLst>
-          </p:cNvPr>
-          <p:cNvCxnSpPr>
-            <a:cxnSpLocks/>
-          </p:cNvCxnSpPr>
-          <p:nvPr/>
-        </p:nvCxnSpPr>
-        <p:spPr>
-          <a:xfrm>
-            <a:off x="5564777" y="3771921"/>
-            <a:ext cx="5160548" cy="0"/>
-          </a:xfrm>
-          <a:prstGeom prst="line">
-            <a:avLst/>
-          </a:prstGeom>
-          <a:ln>
-            <a:solidFill>
-              <a:srgbClr val="FFFF00"/>
-            </a:solidFill>
-          </a:ln>
-        </p:spPr>
-        <p:style>
-          <a:lnRef idx="2">
-            <a:schemeClr val="accent1"/>
-          </a:lnRef>
-          <a:fillRef idx="0">
-            <a:schemeClr val="accent1"/>
-          </a:fillRef>
-          <a:effectRef idx="1">
-            <a:schemeClr val="accent1"/>
-          </a:effectRef>
-          <a:fontRef idx="minor">
-            <a:schemeClr val="tx1"/>
-          </a:fontRef>
-        </p:style>
-      </p:cxnSp>
-      <p:cxnSp>
-        <p:nvCxnSpPr>
-          <p:cNvPr id="16" name="Straight Connector 15">
-            <a:extLst>
-              <a:ext uri="{FF2B5EF4-FFF2-40B4-BE49-F238E27FC236}">
-                <a16:creationId xmlns:a16="http://schemas.microsoft.com/office/drawing/2014/main" id="{0E63DE3F-4B7E-97C3-505B-C6CD5DC1B342}"/>
-              </a:ext>
-            </a:extLst>
-          </p:cNvPr>
-          <p:cNvCxnSpPr>
-            <a:cxnSpLocks/>
-          </p:cNvCxnSpPr>
-          <p:nvPr/>
-        </p:nvCxnSpPr>
-        <p:spPr>
-          <a:xfrm>
-            <a:off x="5564777" y="2236736"/>
-            <a:ext cx="5160548" cy="0"/>
-          </a:xfrm>
-          <a:prstGeom prst="line">
-            <a:avLst/>
-          </a:prstGeom>
-          <a:ln>
-            <a:solidFill>
-              <a:srgbClr val="FFFF00"/>
-            </a:solidFill>
-          </a:ln>
-        </p:spPr>
-        <p:style>
-          <a:lnRef idx="2">
-            <a:schemeClr val="accent1"/>
-          </a:lnRef>
-          <a:fillRef idx="0">
-            <a:schemeClr val="accent1"/>
-          </a:fillRef>
-          <a:effectRef idx="1">
-            <a:schemeClr val="accent1"/>
-          </a:effectRef>
-          <a:fontRef idx="minor">
-            <a:schemeClr val="tx1"/>
-          </a:fontRef>
-        </p:style>
-      </p:cxnSp>
-      <p:sp>
-        <p:nvSpPr>
-          <p:cNvPr id="2" name="Rectangle 1">
-            <a:extLst>
-              <a:ext uri="{FF2B5EF4-FFF2-40B4-BE49-F238E27FC236}">
-                <a16:creationId xmlns:a16="http://schemas.microsoft.com/office/drawing/2014/main" id="{33F60A1D-CF9E-A9D8-ED31-489D7EC30975}"/>
-              </a:ext>
-            </a:extLst>
-          </p:cNvPr>
-          <p:cNvSpPr/>
-          <p:nvPr/>
-        </p:nvSpPr>
-        <p:spPr>
-          <a:xfrm>
-            <a:off x="2873828" y="3436217"/>
-            <a:ext cx="4336509" cy="946928"/>
-          </a:xfrm>
-          <a:prstGeom prst="rect">
-            <a:avLst/>
-          </a:prstGeom>
-          <a:solidFill>
-            <a:srgbClr val="FFFF00">
-              <a:alpha val="22000"/>
-            </a:srgbClr>
-          </a:solidFill>
-          <a:ln>
-            <a:noFill/>
-          </a:ln>
-        </p:spPr>
-        <p:style>
-          <a:lnRef idx="2">
-            <a:schemeClr val="accent1">
-              <a:shade val="15000"/>
-            </a:schemeClr>
-          </a:lnRef>
-          <a:fillRef idx="1">
-            <a:schemeClr val="accent1"/>
-          </a:fillRef>
-          <a:effectRef idx="0">
-            <a:schemeClr val="accent1"/>
-          </a:effectRef>
-          <a:fontRef idx="minor">
-            <a:schemeClr val="lt1"/>
-          </a:fontRef>
-        </p:style>
-        <p:txBody>
-          <a:bodyPr rtlCol="0" anchor="ctr"/>
-          <a:lstStyle/>
-          <a:p>
-            <a:pPr algn="ctr"/>
-            <a:endParaRPr lang="en-GB"/>
-          </a:p>
-        </p:txBody>
-      </p:sp>
-      <p:sp>
-        <p:nvSpPr>
-          <p:cNvPr id="6" name="Rectangle 5">
-            <a:extLst>
-              <a:ext uri="{FF2B5EF4-FFF2-40B4-BE49-F238E27FC236}">
-                <a16:creationId xmlns:a16="http://schemas.microsoft.com/office/drawing/2014/main" id="{AD4B1D9D-9969-EC49-7239-28253B002DC4}"/>
-              </a:ext>
-            </a:extLst>
-          </p:cNvPr>
-          <p:cNvSpPr/>
-          <p:nvPr/>
-        </p:nvSpPr>
-        <p:spPr>
-          <a:xfrm>
-            <a:off x="5564777" y="2229519"/>
-            <a:ext cx="5160548" cy="1540632"/>
-          </a:xfrm>
-          <a:prstGeom prst="rect">
-            <a:avLst/>
-          </a:prstGeom>
-          <a:solidFill>
-            <a:srgbClr val="FFFF00">
-              <a:alpha val="22000"/>
-            </a:srgbClr>
-          </a:solidFill>
-          <a:ln>
-            <a:noFill/>
-          </a:ln>
-        </p:spPr>
-        <p:style>
-          <a:lnRef idx="2">
-            <a:schemeClr val="accent1">
-              <a:shade val="15000"/>
-            </a:schemeClr>
-          </a:lnRef>
-          <a:fillRef idx="1">
-            <a:schemeClr val="accent1"/>
-          </a:fillRef>
-          <a:effectRef idx="0">
-            <a:schemeClr val="accent1"/>
-          </a:effectRef>
-          <a:fontRef idx="minor">
-            <a:schemeClr val="lt1"/>
-          </a:fontRef>
-        </p:style>
-        <p:txBody>
-          <a:bodyPr rtlCol="0" anchor="ctr"/>
-          <a:lstStyle/>
-          <a:p>
-            <a:pPr algn="ctr"/>
-            <a:endParaRPr lang="en-GB"/>
-          </a:p>
-        </p:txBody>
-      </p:sp>
     </p:spTree>
     <p:extLst>
       <p:ext uri="{BB962C8B-B14F-4D97-AF65-F5344CB8AC3E}">
-        <p14:creationId xmlns:p14="http://schemas.microsoft.com/office/powerpoint/2010/main" val="3477899506"/>
+        <p14:creationId xmlns:p14="http://schemas.microsoft.com/office/powerpoint/2010/main" val="347023000"/>
       </p:ext>
     </p:extLst>
   </p:cSld>
@@ -13901,7 +15299,7 @@
           <p:cNvPr id="5" name="Picture 4">
             <a:extLst>
               <a:ext uri="{FF2B5EF4-FFF2-40B4-BE49-F238E27FC236}">
-                <a16:creationId xmlns:a16="http://schemas.microsoft.com/office/drawing/2014/main" id="{5C0EE8CA-BEC2-2A27-9DA5-CF4BBA9883E7}"/>
+                <a16:creationId xmlns:a16="http://schemas.microsoft.com/office/drawing/2014/main" id="{A62C7047-9E9E-A076-652A-3C1A88E5F5F9}"/>
               </a:ext>
             </a:extLst>
           </p:cNvPr>
@@ -13918,233 +15316,8 @@
         </p:blipFill>
         <p:spPr>
           <a:xfrm>
-            <a:off x="336660" y="241009"/>
-            <a:ext cx="7637445" cy="3018023"/>
-          </a:xfrm>
-          <a:prstGeom prst="rect">
-            <a:avLst/>
-          </a:prstGeom>
-        </p:spPr>
-      </p:pic>
-      <p:pic>
-        <p:nvPicPr>
-          <p:cNvPr id="7" name="Picture 6">
-            <a:extLst>
-              <a:ext uri="{FF2B5EF4-FFF2-40B4-BE49-F238E27FC236}">
-                <a16:creationId xmlns:a16="http://schemas.microsoft.com/office/drawing/2014/main" id="{83835B6C-2D33-B9CF-1272-5BF54C95994B}"/>
-              </a:ext>
-            </a:extLst>
-          </p:cNvPr>
-          <p:cNvPicPr>
-            <a:picLocks noChangeAspect="1"/>
-          </p:cNvPicPr>
-          <p:nvPr/>
-        </p:nvPicPr>
-        <p:blipFill>
-          <a:blip r:embed="rId3"/>
-          <a:stretch>
-            <a:fillRect/>
-          </a:stretch>
-        </p:blipFill>
-        <p:spPr>
-          <a:xfrm>
-            <a:off x="336660" y="3429000"/>
-            <a:ext cx="7639877" cy="2855259"/>
-          </a:xfrm>
-          <a:prstGeom prst="rect">
-            <a:avLst/>
-          </a:prstGeom>
-        </p:spPr>
-      </p:pic>
-      <p:sp>
-        <p:nvSpPr>
-          <p:cNvPr id="8" name="Rectangle 7">
-            <a:extLst>
-              <a:ext uri="{FF2B5EF4-FFF2-40B4-BE49-F238E27FC236}">
-                <a16:creationId xmlns:a16="http://schemas.microsoft.com/office/drawing/2014/main" id="{E179226B-CD64-D964-C8E1-D9043197564E}"/>
-              </a:ext>
-            </a:extLst>
-          </p:cNvPr>
-          <p:cNvSpPr/>
-          <p:nvPr/>
-        </p:nvSpPr>
-        <p:spPr>
-          <a:xfrm>
-            <a:off x="5051613" y="3980329"/>
-            <a:ext cx="2685954" cy="528918"/>
-          </a:xfrm>
-          <a:prstGeom prst="rect">
-            <a:avLst/>
-          </a:prstGeom>
-          <a:solidFill>
-            <a:schemeClr val="accent2">
-              <a:lumMod val="75000"/>
-              <a:alpha val="22000"/>
-            </a:schemeClr>
-          </a:solidFill>
-          <a:ln>
-            <a:noFill/>
-          </a:ln>
-        </p:spPr>
-        <p:style>
-          <a:lnRef idx="2">
-            <a:schemeClr val="accent1">
-              <a:shade val="15000"/>
-            </a:schemeClr>
-          </a:lnRef>
-          <a:fillRef idx="1">
-            <a:schemeClr val="accent1"/>
-          </a:fillRef>
-          <a:effectRef idx="0">
-            <a:schemeClr val="accent1"/>
-          </a:effectRef>
-          <a:fontRef idx="minor">
-            <a:schemeClr val="lt1"/>
-          </a:fontRef>
-        </p:style>
-        <p:txBody>
-          <a:bodyPr rtlCol="0" anchor="ctr"/>
-          <a:lstStyle/>
-          <a:p>
-            <a:pPr algn="ctr"/>
-            <a:endParaRPr lang="en-GB"/>
-          </a:p>
-        </p:txBody>
-      </p:sp>
-      <p:sp>
-        <p:nvSpPr>
-          <p:cNvPr id="9" name="Rectangle 8">
-            <a:extLst>
-              <a:ext uri="{FF2B5EF4-FFF2-40B4-BE49-F238E27FC236}">
-                <a16:creationId xmlns:a16="http://schemas.microsoft.com/office/drawing/2014/main" id="{19A47CE5-6A20-D480-3073-4846B62CB487}"/>
-              </a:ext>
-            </a:extLst>
-          </p:cNvPr>
-          <p:cNvSpPr/>
-          <p:nvPr/>
-        </p:nvSpPr>
-        <p:spPr>
-          <a:xfrm>
-            <a:off x="2773680" y="4380550"/>
-            <a:ext cx="731519" cy="257393"/>
-          </a:xfrm>
-          <a:prstGeom prst="rect">
-            <a:avLst/>
-          </a:prstGeom>
-          <a:solidFill>
-            <a:schemeClr val="accent2">
-              <a:lumMod val="75000"/>
-              <a:alpha val="22000"/>
-            </a:schemeClr>
-          </a:solidFill>
-          <a:ln>
-            <a:noFill/>
-          </a:ln>
-        </p:spPr>
-        <p:style>
-          <a:lnRef idx="2">
-            <a:schemeClr val="accent1">
-              <a:shade val="15000"/>
-            </a:schemeClr>
-          </a:lnRef>
-          <a:fillRef idx="1">
-            <a:schemeClr val="accent1"/>
-          </a:fillRef>
-          <a:effectRef idx="0">
-            <a:schemeClr val="accent1"/>
-          </a:effectRef>
-          <a:fontRef idx="minor">
-            <a:schemeClr val="lt1"/>
-          </a:fontRef>
-        </p:style>
-        <p:txBody>
-          <a:bodyPr rtlCol="0" anchor="ctr"/>
-          <a:lstStyle/>
-          <a:p>
-            <a:pPr algn="ctr"/>
-            <a:endParaRPr lang="en-GB"/>
-          </a:p>
-        </p:txBody>
-      </p:sp>
-      <p:sp>
-        <p:nvSpPr>
-          <p:cNvPr id="10" name="Rectangle 9">
-            <a:extLst>
-              <a:ext uri="{FF2B5EF4-FFF2-40B4-BE49-F238E27FC236}">
-                <a16:creationId xmlns:a16="http://schemas.microsoft.com/office/drawing/2014/main" id="{B2A8ACF8-B563-99EE-B0FE-0F4CB59F5A05}"/>
-              </a:ext>
-            </a:extLst>
-          </p:cNvPr>
-          <p:cNvSpPr/>
-          <p:nvPr/>
-        </p:nvSpPr>
-        <p:spPr>
-          <a:xfrm>
-            <a:off x="4155382" y="3679510"/>
-            <a:ext cx="896231" cy="356913"/>
-          </a:xfrm>
-          <a:prstGeom prst="rect">
-            <a:avLst/>
-          </a:prstGeom>
-          <a:solidFill>
-            <a:schemeClr val="accent2">
-              <a:lumMod val="75000"/>
-              <a:alpha val="22000"/>
-            </a:schemeClr>
-          </a:solidFill>
-          <a:ln>
-            <a:noFill/>
-          </a:ln>
-        </p:spPr>
-        <p:style>
-          <a:lnRef idx="2">
-            <a:schemeClr val="accent1">
-              <a:shade val="15000"/>
-            </a:schemeClr>
-          </a:lnRef>
-          <a:fillRef idx="1">
-            <a:schemeClr val="accent1"/>
-          </a:fillRef>
-          <a:effectRef idx="0">
-            <a:schemeClr val="accent1"/>
-          </a:effectRef>
-          <a:fontRef idx="minor">
-            <a:schemeClr val="lt1"/>
-          </a:fontRef>
-        </p:style>
-        <p:txBody>
-          <a:bodyPr rtlCol="0" anchor="ctr"/>
-          <a:lstStyle/>
-          <a:p>
-            <a:pPr algn="ctr"/>
-            <a:endParaRPr lang="en-GB"/>
-          </a:p>
-        </p:txBody>
-      </p:sp>
-      <p:pic>
-        <p:nvPicPr>
-          <p:cNvPr id="12" name="Picture 11">
-            <a:extLst>
-              <a:ext uri="{FF2B5EF4-FFF2-40B4-BE49-F238E27FC236}">
-                <a16:creationId xmlns:a16="http://schemas.microsoft.com/office/drawing/2014/main" id="{DA2FE381-0975-F6AD-7EF1-AE1F94F61806}"/>
-              </a:ext>
-            </a:extLst>
-          </p:cNvPr>
-          <p:cNvPicPr>
-            <a:picLocks noChangeAspect="1"/>
-          </p:cNvPicPr>
-          <p:nvPr/>
-        </p:nvPicPr>
-        <p:blipFill>
-          <a:blip r:embed="rId4"/>
-          <a:stretch>
-            <a:fillRect/>
-          </a:stretch>
-        </p:blipFill>
-        <p:spPr>
-          <a:xfrm>
-            <a:off x="6414942" y="294473"/>
-            <a:ext cx="5325462" cy="2810132"/>
+            <a:off x="806178" y="1282589"/>
+            <a:ext cx="10579644" cy="4292821"/>
           </a:xfrm>
           <a:prstGeom prst="rect">
             <a:avLst/>
@@ -14153,10 +15326,10 @@
       </p:pic>
       <p:cxnSp>
         <p:nvCxnSpPr>
-          <p:cNvPr id="13" name="Straight Connector 12">
-            <a:extLst>
-              <a:ext uri="{FF2B5EF4-FFF2-40B4-BE49-F238E27FC236}">
-                <a16:creationId xmlns:a16="http://schemas.microsoft.com/office/drawing/2014/main" id="{FE75E0FB-021D-01FD-05FD-63C65725D71F}"/>
+          <p:cNvPr id="7" name="Straight Connector 6">
+            <a:extLst>
+              <a:ext uri="{FF2B5EF4-FFF2-40B4-BE49-F238E27FC236}">
+                <a16:creationId xmlns:a16="http://schemas.microsoft.com/office/drawing/2014/main" id="{0AABEBD6-264F-211D-CCD8-6A5B4CC8EDE7}"/>
               </a:ext>
             </a:extLst>
           </p:cNvPr>
@@ -14167,8 +15340,94 @@
         </p:nvCxnSpPr>
         <p:spPr>
           <a:xfrm>
-            <a:off x="8987246" y="1053737"/>
-            <a:ext cx="818605" cy="0"/>
+            <a:off x="2843349" y="4375928"/>
+            <a:ext cx="4337627" cy="0"/>
+          </a:xfrm>
+          <a:prstGeom prst="line">
+            <a:avLst/>
+          </a:prstGeom>
+          <a:ln>
+            <a:solidFill>
+              <a:srgbClr val="FFFF00"/>
+            </a:solidFill>
+          </a:ln>
+        </p:spPr>
+        <p:style>
+          <a:lnRef idx="2">
+            <a:schemeClr val="accent1"/>
+          </a:lnRef>
+          <a:fillRef idx="0">
+            <a:schemeClr val="accent1"/>
+          </a:fillRef>
+          <a:effectRef idx="1">
+            <a:schemeClr val="accent1"/>
+          </a:effectRef>
+          <a:fontRef idx="minor">
+            <a:schemeClr val="tx1"/>
+          </a:fontRef>
+        </p:style>
+      </p:cxnSp>
+      <p:cxnSp>
+        <p:nvCxnSpPr>
+          <p:cNvPr id="10" name="Straight Connector 9">
+            <a:extLst>
+              <a:ext uri="{FF2B5EF4-FFF2-40B4-BE49-F238E27FC236}">
+                <a16:creationId xmlns:a16="http://schemas.microsoft.com/office/drawing/2014/main" id="{A8DE2F7B-96F3-2DD5-D289-05F9EB8BF08B}"/>
+              </a:ext>
+            </a:extLst>
+          </p:cNvPr>
+          <p:cNvCxnSpPr>
+            <a:cxnSpLocks/>
+          </p:cNvCxnSpPr>
+          <p:nvPr/>
+        </p:nvCxnSpPr>
+        <p:spPr>
+          <a:xfrm>
+            <a:off x="2873829" y="3428999"/>
+            <a:ext cx="4336509" cy="0"/>
+          </a:xfrm>
+          <a:prstGeom prst="line">
+            <a:avLst/>
+          </a:prstGeom>
+          <a:ln>
+            <a:solidFill>
+              <a:srgbClr val="FFFF00"/>
+            </a:solidFill>
+          </a:ln>
+        </p:spPr>
+        <p:style>
+          <a:lnRef idx="2">
+            <a:schemeClr val="accent1"/>
+          </a:lnRef>
+          <a:fillRef idx="0">
+            <a:schemeClr val="accent1"/>
+          </a:fillRef>
+          <a:effectRef idx="1">
+            <a:schemeClr val="accent1"/>
+          </a:effectRef>
+          <a:fontRef idx="minor">
+            <a:schemeClr val="tx1"/>
+          </a:fontRef>
+        </p:style>
+      </p:cxnSp>
+      <p:cxnSp>
+        <p:nvCxnSpPr>
+          <p:cNvPr id="13" name="Straight Connector 12">
+            <a:extLst>
+              <a:ext uri="{FF2B5EF4-FFF2-40B4-BE49-F238E27FC236}">
+                <a16:creationId xmlns:a16="http://schemas.microsoft.com/office/drawing/2014/main" id="{07A02780-C941-1BAF-5DE9-77B4A1236844}"/>
+              </a:ext>
+            </a:extLst>
+          </p:cNvPr>
+          <p:cNvCxnSpPr>
+            <a:cxnSpLocks/>
+          </p:cNvCxnSpPr>
+          <p:nvPr/>
+        </p:nvCxnSpPr>
+        <p:spPr>
+          <a:xfrm>
+            <a:off x="5564777" y="3771921"/>
+            <a:ext cx="5160548" cy="0"/>
           </a:xfrm>
           <a:prstGeom prst="line">
             <a:avLst/>
@@ -14199,7 +15458,7 @@
           <p:cNvPr id="16" name="Straight Connector 15">
             <a:extLst>
               <a:ext uri="{FF2B5EF4-FFF2-40B4-BE49-F238E27FC236}">
-                <a16:creationId xmlns:a16="http://schemas.microsoft.com/office/drawing/2014/main" id="{4001D132-358C-C0B3-1231-B3397A59E24A}"/>
+                <a16:creationId xmlns:a16="http://schemas.microsoft.com/office/drawing/2014/main" id="{0E63DE3F-4B7E-97C3-505B-C6CD5DC1B342}"/>
               </a:ext>
             </a:extLst>
           </p:cNvPr>
@@ -14210,8 +15469,8 @@
         </p:nvCxnSpPr>
         <p:spPr>
           <a:xfrm>
-            <a:off x="8987246" y="666205"/>
-            <a:ext cx="818605" cy="0"/>
+            <a:off x="5564777" y="2236736"/>
+            <a:ext cx="5160548" cy="0"/>
           </a:xfrm>
           <a:prstGeom prst="line">
             <a:avLst/>
@@ -14239,10 +15498,10 @@
       </p:cxnSp>
       <p:sp>
         <p:nvSpPr>
-          <p:cNvPr id="19" name="Rectangle 18">
-            <a:extLst>
-              <a:ext uri="{FF2B5EF4-FFF2-40B4-BE49-F238E27FC236}">
-                <a16:creationId xmlns:a16="http://schemas.microsoft.com/office/drawing/2014/main" id="{02747AEE-E505-B9A9-9188-D077CE594BD6}"/>
+          <p:cNvPr id="2" name="Rectangle 1">
+            <a:extLst>
+              <a:ext uri="{FF2B5EF4-FFF2-40B4-BE49-F238E27FC236}">
+                <a16:creationId xmlns:a16="http://schemas.microsoft.com/office/drawing/2014/main" id="{33F60A1D-CF9E-A9D8-ED31-489D7EC30975}"/>
               </a:ext>
             </a:extLst>
           </p:cNvPr>
@@ -14251,17 +15510,16 @@
         </p:nvSpPr>
         <p:spPr>
           <a:xfrm>
-            <a:off x="8573589" y="666205"/>
-            <a:ext cx="1928947" cy="387511"/>
+            <a:off x="2873828" y="3436217"/>
+            <a:ext cx="4336509" cy="946928"/>
           </a:xfrm>
           <a:prstGeom prst="rect">
             <a:avLst/>
           </a:prstGeom>
           <a:solidFill>
-            <a:schemeClr val="accent2">
-              <a:lumMod val="75000"/>
+            <a:srgbClr val="FFFF00">
               <a:alpha val="22000"/>
-            </a:schemeClr>
+            </a:srgbClr>
           </a:solidFill>
           <a:ln>
             <a:noFill/>
@@ -14292,10 +15550,64 @@
           </a:p>
         </p:txBody>
       </p:sp>
+      <p:sp>
+        <p:nvSpPr>
+          <p:cNvPr id="6" name="Rectangle 5">
+            <a:extLst>
+              <a:ext uri="{FF2B5EF4-FFF2-40B4-BE49-F238E27FC236}">
+                <a16:creationId xmlns:a16="http://schemas.microsoft.com/office/drawing/2014/main" id="{AD4B1D9D-9969-EC49-7239-28253B002DC4}"/>
+              </a:ext>
+            </a:extLst>
+          </p:cNvPr>
+          <p:cNvSpPr/>
+          <p:nvPr/>
+        </p:nvSpPr>
+        <p:spPr>
+          <a:xfrm>
+            <a:off x="5564777" y="2229519"/>
+            <a:ext cx="5160548" cy="1540632"/>
+          </a:xfrm>
+          <a:prstGeom prst="rect">
+            <a:avLst/>
+          </a:prstGeom>
+          <a:solidFill>
+            <a:srgbClr val="FFFF00">
+              <a:alpha val="22000"/>
+            </a:srgbClr>
+          </a:solidFill>
+          <a:ln>
+            <a:noFill/>
+          </a:ln>
+        </p:spPr>
+        <p:style>
+          <a:lnRef idx="2">
+            <a:schemeClr val="accent1">
+              <a:shade val="15000"/>
+            </a:schemeClr>
+          </a:lnRef>
+          <a:fillRef idx="1">
+            <a:schemeClr val="accent1"/>
+          </a:fillRef>
+          <a:effectRef idx="0">
+            <a:schemeClr val="accent1"/>
+          </a:effectRef>
+          <a:fontRef idx="minor">
+            <a:schemeClr val="lt1"/>
+          </a:fontRef>
+        </p:style>
+        <p:txBody>
+          <a:bodyPr rtlCol="0" anchor="ctr"/>
+          <a:lstStyle/>
+          <a:p>
+            <a:pPr algn="ctr"/>
+            <a:endParaRPr lang="en-GB"/>
+          </a:p>
+        </p:txBody>
+      </p:sp>
     </p:spTree>
     <p:extLst>
       <p:ext uri="{BB962C8B-B14F-4D97-AF65-F5344CB8AC3E}">
-        <p14:creationId xmlns:p14="http://schemas.microsoft.com/office/powerpoint/2010/main" val="3910363495"/>
+        <p14:creationId xmlns:p14="http://schemas.microsoft.com/office/powerpoint/2010/main" val="3477899506"/>
       </p:ext>
     </p:extLst>
   </p:cSld>

</xml_diff>